<commit_message>
Did I. and II. parts in presentation
</commit_message>
<xml_diff>
--- a/Livrables/Présentation.pptx
+++ b/Livrables/Présentation.pptx
@@ -2,17 +2,20 @@
 <file path=ppt/presentation.xml><?xml version="1.0" encoding="utf-8"?>
 <p:presentation xmlns:a="http://schemas.openxmlformats.org/drawingml/2006/main" xmlns:r="http://schemas.openxmlformats.org/officeDocument/2006/relationships" xmlns:p="http://schemas.openxmlformats.org/presentationml/2006/main" autoCompressPictures="0">
   <p:sldMasterIdLst>
-    <p:sldMasterId id="2147483648" r:id="rId1"/>
+    <p:sldMasterId id="2147483667" r:id="rId1"/>
   </p:sldMasterIdLst>
   <p:sldIdLst>
     <p:sldId id="256" r:id="rId2"/>
-    <p:sldId id="257" r:id="rId3"/>
-    <p:sldId id="258" r:id="rId4"/>
-    <p:sldId id="261" r:id="rId5"/>
-    <p:sldId id="259" r:id="rId6"/>
-    <p:sldId id="260" r:id="rId7"/>
-    <p:sldId id="262" r:id="rId8"/>
-    <p:sldId id="263" r:id="rId9"/>
+    <p:sldId id="265" r:id="rId3"/>
+    <p:sldId id="257" r:id="rId4"/>
+    <p:sldId id="258" r:id="rId5"/>
+    <p:sldId id="261" r:id="rId6"/>
+    <p:sldId id="266" r:id="rId7"/>
+    <p:sldId id="267" r:id="rId8"/>
+    <p:sldId id="259" r:id="rId9"/>
+    <p:sldId id="260" r:id="rId10"/>
+    <p:sldId id="262" r:id="rId11"/>
+    <p:sldId id="263" r:id="rId12"/>
   </p:sldIdLst>
   <p:sldSz cx="12192000" cy="6858000"/>
   <p:notesSz cx="6858000" cy="9144000"/>
@@ -111,6 +114,17 @@
       </a:defRPr>
     </a:lvl9pPr>
   </p:defaultTextStyle>
+  <p:extLst>
+    <p:ext uri="{EFAFB233-063F-42B5-8137-9DF3F51BA10A}">
+      <p15:sldGuideLst xmlns:p15="http://schemas.microsoft.com/office/powerpoint/2012/main">
+        <p15:guide id="1" orient="horz" pos="2160" userDrawn="1">
+          <p15:clr>
+            <a:srgbClr val="A4A3A4"/>
+          </p15:clr>
+        </p15:guide>
+      </p15:sldGuideLst>
+    </p:ext>
+  </p:extLst>
 </p:presentation>
 </file>
 
@@ -400,7 +414,7 @@
           <a:lstStyle/>
           <a:p>
             <a:fld id="{08B9EBBA-996F-894A-B54A-D6246ED52CEA}" type="datetimeFigureOut">
-              <a:rPr lang="en-US" dirty="0"/>
+              <a:rPr lang="en-US" smtClean="0"/>
               <a:pPr/>
               <a:t>6/11/2018</a:t>
             </a:fld>
@@ -443,7 +457,7 @@
           <a:lstStyle/>
           <a:p>
             <a:fld id="{D57F1E4F-1CFF-5643-939E-217C01CDF565}" type="slidenum">
-              <a:rPr lang="en-US" dirty="0"/>
+              <a:rPr lang="en-US" smtClean="0"/>
               <a:pPr/>
               <a:t>‹N°›</a:t>
             </a:fld>
@@ -452,6 +466,11 @@
         </p:txBody>
       </p:sp>
     </p:spTree>
+    <p:extLst>
+      <p:ext uri="{BB962C8B-B14F-4D97-AF65-F5344CB8AC3E}">
+        <p14:creationId xmlns:p14="http://schemas.microsoft.com/office/powerpoint/2010/main" val="2236082991"/>
+      </p:ext>
+    </p:extLst>
   </p:cSld>
   <p:clrMapOvr>
     <a:masterClrMapping/>
@@ -715,7 +734,7 @@
           <a:lstStyle/>
           <a:p>
             <a:fld id="{18C79C5D-2A6F-F04D-97DA-BEF2467B64E4}" type="datetimeFigureOut">
-              <a:rPr lang="en-US" dirty="0"/>
+              <a:rPr lang="en-US" smtClean="0"/>
               <a:pPr/>
               <a:t>6/11/2018</a:t>
             </a:fld>
@@ -758,7 +777,7 @@
           <a:lstStyle/>
           <a:p>
             <a:fld id="{D57F1E4F-1CFF-5643-939E-217C01CDF565}" type="slidenum">
-              <a:rPr lang="en-US" dirty="0"/>
+              <a:rPr lang="en-US" smtClean="0"/>
               <a:pPr/>
               <a:t>‹N°›</a:t>
             </a:fld>
@@ -767,6 +786,11 @@
         </p:txBody>
       </p:sp>
     </p:spTree>
+    <p:extLst>
+      <p:ext uri="{BB962C8B-B14F-4D97-AF65-F5344CB8AC3E}">
+        <p14:creationId xmlns:p14="http://schemas.microsoft.com/office/powerpoint/2010/main" val="1732734282"/>
+      </p:ext>
+    </p:extLst>
   </p:cSld>
   <p:clrMapOvr>
     <a:masterClrMapping/>
@@ -1200,7 +1224,7 @@
           <a:lstStyle/>
           <a:p>
             <a:fld id="{8DFA1846-DA80-1C48-A609-854EA85C59AD}" type="datetimeFigureOut">
-              <a:rPr lang="en-US" dirty="0"/>
+              <a:rPr lang="en-US" smtClean="0"/>
               <a:pPr/>
               <a:t>6/11/2018</a:t>
             </a:fld>
@@ -1243,7 +1267,7 @@
           <a:lstStyle/>
           <a:p>
             <a:fld id="{D57F1E4F-1CFF-5643-939E-217C01CDF565}" type="slidenum">
-              <a:rPr lang="en-US" dirty="0"/>
+              <a:rPr lang="en-US" smtClean="0"/>
               <a:pPr/>
               <a:t>‹N°›</a:t>
             </a:fld>
@@ -1252,6 +1276,11 @@
         </p:txBody>
       </p:sp>
     </p:spTree>
+    <p:extLst>
+      <p:ext uri="{BB962C8B-B14F-4D97-AF65-F5344CB8AC3E}">
+        <p14:creationId xmlns:p14="http://schemas.microsoft.com/office/powerpoint/2010/main" val="937314517"/>
+      </p:ext>
+    </p:extLst>
   </p:cSld>
   <p:clrMapOvr>
     <a:masterClrMapping/>
@@ -1566,7 +1595,7 @@
           <a:lstStyle/>
           <a:p>
             <a:fld id="{FBF54567-0DE4-3F47-BF90-CB84690072F9}" type="datetimeFigureOut">
-              <a:rPr lang="en-US" dirty="0"/>
+              <a:rPr lang="en-US" smtClean="0"/>
               <a:pPr/>
               <a:t>6/11/2018</a:t>
             </a:fld>
@@ -1609,7 +1638,7 @@
           <a:lstStyle/>
           <a:p>
             <a:fld id="{D57F1E4F-1CFF-5643-939E-217C01CDF565}" type="slidenum">
-              <a:rPr lang="en-US" dirty="0"/>
+              <a:rPr lang="en-US" smtClean="0"/>
               <a:pPr/>
               <a:t>‹N°›</a:t>
             </a:fld>
@@ -1618,6 +1647,11 @@
         </p:txBody>
       </p:sp>
     </p:spTree>
+    <p:extLst>
+      <p:ext uri="{BB962C8B-B14F-4D97-AF65-F5344CB8AC3E}">
+        <p14:creationId xmlns:p14="http://schemas.microsoft.com/office/powerpoint/2010/main" val="1546917443"/>
+      </p:ext>
+    </p:extLst>
   </p:cSld>
   <p:clrMapOvr>
     <a:masterClrMapping/>
@@ -1836,7 +1870,7 @@
           <a:lstStyle/>
           <a:p>
             <a:fld id="{C6C52C72-DE31-F449-A4ED-4C594FD91407}" type="datetimeFigureOut">
-              <a:rPr lang="en-US" dirty="0"/>
+              <a:rPr lang="en-US" smtClean="0"/>
               <a:pPr/>
               <a:t>6/11/2018</a:t>
             </a:fld>
@@ -1879,7 +1913,7 @@
           <a:lstStyle/>
           <a:p>
             <a:fld id="{D57F1E4F-1CFF-5643-939E-217C01CDF565}" type="slidenum">
-              <a:rPr lang="en-US" dirty="0"/>
+              <a:rPr lang="en-US" smtClean="0"/>
               <a:pPr/>
               <a:t>‹N°›</a:t>
             </a:fld>
@@ -1888,6 +1922,11 @@
         </p:txBody>
       </p:sp>
     </p:spTree>
+    <p:extLst>
+      <p:ext uri="{BB962C8B-B14F-4D97-AF65-F5344CB8AC3E}">
+        <p14:creationId xmlns:p14="http://schemas.microsoft.com/office/powerpoint/2010/main" val="1441238007"/>
+      </p:ext>
+    </p:extLst>
   </p:cSld>
   <p:clrMapOvr>
     <a:masterClrMapping/>
@@ -2118,7 +2157,7 @@
           <a:lstStyle/>
           <a:p>
             <a:fld id="{ED62726E-379B-B349-9EED-81ED093FA806}" type="datetimeFigureOut">
-              <a:rPr lang="en-US" dirty="0"/>
+              <a:rPr lang="en-US" smtClean="0"/>
               <a:pPr/>
               <a:t>6/11/2018</a:t>
             </a:fld>
@@ -2161,7 +2200,7 @@
           <a:lstStyle/>
           <a:p>
             <a:fld id="{D57F1E4F-1CFF-5643-939E-217C01CDF565}" type="slidenum">
-              <a:rPr lang="en-US" dirty="0"/>
+              <a:rPr lang="en-US" smtClean="0"/>
               <a:pPr/>
               <a:t>‹N°›</a:t>
             </a:fld>
@@ -2170,6 +2209,11 @@
         </p:txBody>
       </p:sp>
     </p:spTree>
+    <p:extLst>
+      <p:ext uri="{BB962C8B-B14F-4D97-AF65-F5344CB8AC3E}">
+        <p14:creationId xmlns:p14="http://schemas.microsoft.com/office/powerpoint/2010/main" val="2151287571"/>
+      </p:ext>
+    </p:extLst>
   </p:cSld>
   <p:clrMapOvr>
     <a:masterClrMapping/>
@@ -2398,7 +2442,7 @@
           <a:lstStyle/>
           <a:p>
             <a:fld id="{9B3A1323-8D79-1946-B0D7-40001CF92E9D}" type="datetimeFigureOut">
-              <a:rPr lang="en-US" dirty="0"/>
+              <a:rPr lang="en-US" smtClean="0"/>
               <a:pPr/>
               <a:t>6/11/2018</a:t>
             </a:fld>
@@ -2441,7 +2485,7 @@
           <a:lstStyle/>
           <a:p>
             <a:fld id="{D57F1E4F-1CFF-5643-939E-217C01CDF565}" type="slidenum">
-              <a:rPr lang="en-US" dirty="0"/>
+              <a:rPr lang="en-US" smtClean="0"/>
               <a:pPr/>
               <a:t>‹N°›</a:t>
             </a:fld>
@@ -2450,6 +2494,11 @@
         </p:txBody>
       </p:sp>
     </p:spTree>
+    <p:extLst>
+      <p:ext uri="{BB962C8B-B14F-4D97-AF65-F5344CB8AC3E}">
+        <p14:creationId xmlns:p14="http://schemas.microsoft.com/office/powerpoint/2010/main" val="2819882756"/>
+      </p:ext>
+    </p:extLst>
   </p:cSld>
   <p:clrMapOvr>
     <a:masterClrMapping/>
@@ -2738,7 +2787,7 @@
           <a:lstStyle/>
           <a:p>
             <a:fld id="{8DFA1846-DA80-1C48-A609-854EA85C59AD}" type="datetimeFigureOut">
-              <a:rPr lang="en-US" dirty="0"/>
+              <a:rPr lang="en-US" smtClean="0"/>
               <a:pPr/>
               <a:t>6/11/2018</a:t>
             </a:fld>
@@ -2781,7 +2830,7 @@
           <a:lstStyle/>
           <a:p>
             <a:fld id="{D57F1E4F-1CFF-5643-939E-217C01CDF565}" type="slidenum">
-              <a:rPr lang="en-US" dirty="0"/>
+              <a:rPr lang="en-US" smtClean="0"/>
               <a:pPr/>
               <a:t>‹N°›</a:t>
             </a:fld>
@@ -2790,6 +2839,11 @@
         </p:txBody>
       </p:sp>
     </p:spTree>
+    <p:extLst>
+      <p:ext uri="{BB962C8B-B14F-4D97-AF65-F5344CB8AC3E}">
+        <p14:creationId xmlns:p14="http://schemas.microsoft.com/office/powerpoint/2010/main" val="3649095479"/>
+      </p:ext>
+    </p:extLst>
   </p:cSld>
   <p:clrMapOvr>
     <a:masterClrMapping/>
@@ -3074,7 +3128,7 @@
           <a:lstStyle/>
           <a:p>
             <a:fld id="{57302355-E14B-8545-A8F8-0FE83CC9D524}" type="datetimeFigureOut">
-              <a:rPr lang="en-US" dirty="0"/>
+              <a:rPr lang="en-US" smtClean="0"/>
               <a:pPr/>
               <a:t>6/11/2018</a:t>
             </a:fld>
@@ -3117,7 +3171,7 @@
           <a:lstStyle/>
           <a:p>
             <a:fld id="{D57F1E4F-1CFF-5643-939E-217C01CDF565}" type="slidenum">
-              <a:rPr lang="en-US" dirty="0"/>
+              <a:rPr lang="en-US" smtClean="0"/>
               <a:pPr/>
               <a:t>‹N°›</a:t>
             </a:fld>
@@ -3126,6 +3180,11 @@
         </p:txBody>
       </p:sp>
     </p:spTree>
+    <p:extLst>
+      <p:ext uri="{BB962C8B-B14F-4D97-AF65-F5344CB8AC3E}">
+        <p14:creationId xmlns:p14="http://schemas.microsoft.com/office/powerpoint/2010/main" val="3541525030"/>
+      </p:ext>
+    </p:extLst>
   </p:cSld>
   <p:clrMapOvr>
     <a:masterClrMapping/>
@@ -3548,7 +3607,7 @@
           <a:lstStyle/>
           <a:p>
             <a:fld id="{02640F58-564D-2B4F-AE67-E407BA4FCF45}" type="datetimeFigureOut">
-              <a:rPr lang="en-US" dirty="0"/>
+              <a:rPr lang="en-US" smtClean="0"/>
               <a:pPr/>
               <a:t>6/11/2018</a:t>
             </a:fld>
@@ -3591,7 +3650,7 @@
           <a:lstStyle/>
           <a:p>
             <a:fld id="{D57F1E4F-1CFF-5643-939E-217C01CDF565}" type="slidenum">
-              <a:rPr lang="en-US" dirty="0"/>
+              <a:rPr lang="en-US" smtClean="0"/>
               <a:pPr/>
               <a:t>‹N°›</a:t>
             </a:fld>
@@ -3600,6 +3659,11 @@
         </p:txBody>
       </p:sp>
     </p:spTree>
+    <p:extLst>
+      <p:ext uri="{BB962C8B-B14F-4D97-AF65-F5344CB8AC3E}">
+        <p14:creationId xmlns:p14="http://schemas.microsoft.com/office/powerpoint/2010/main" val="1216840526"/>
+      </p:ext>
+    </p:extLst>
   </p:cSld>
   <p:clrMapOvr>
     <a:masterClrMapping/>
@@ -3766,7 +3830,7 @@
           <a:lstStyle/>
           <a:p>
             <a:fld id="{F13A34C8-038E-2045-AF43-DF7DBB8E0E9E}" type="datetimeFigureOut">
-              <a:rPr lang="en-US" dirty="0"/>
+              <a:rPr lang="en-US" smtClean="0"/>
               <a:pPr/>
               <a:t>6/11/2018</a:t>
             </a:fld>
@@ -3809,7 +3873,7 @@
           <a:lstStyle/>
           <a:p>
             <a:fld id="{D57F1E4F-1CFF-5643-939E-217C01CDF565}" type="slidenum">
-              <a:rPr lang="en-US" dirty="0"/>
+              <a:rPr lang="en-US" smtClean="0"/>
               <a:pPr/>
               <a:t>‹N°›</a:t>
             </a:fld>
@@ -3818,6 +3882,11 @@
         </p:txBody>
       </p:sp>
     </p:spTree>
+    <p:extLst>
+      <p:ext uri="{BB962C8B-B14F-4D97-AF65-F5344CB8AC3E}">
+        <p14:creationId xmlns:p14="http://schemas.microsoft.com/office/powerpoint/2010/main" val="3276201826"/>
+      </p:ext>
+    </p:extLst>
   </p:cSld>
   <p:clrMapOvr>
     <a:masterClrMapping/>
@@ -3858,7 +3927,7 @@
           <a:lstStyle/>
           <a:p>
             <a:fld id="{8818C68F-D26B-8F47-958C-23B49CF8A634}" type="datetimeFigureOut">
-              <a:rPr lang="en-US" dirty="0"/>
+              <a:rPr lang="en-US" smtClean="0"/>
               <a:pPr/>
               <a:t>6/11/2018</a:t>
             </a:fld>
@@ -3901,7 +3970,7 @@
           <a:lstStyle/>
           <a:p>
             <a:fld id="{D57F1E4F-1CFF-5643-939E-217C01CDF565}" type="slidenum">
-              <a:rPr lang="en-US" dirty="0"/>
+              <a:rPr lang="en-US" smtClean="0"/>
               <a:pPr/>
               <a:t>‹N°›</a:t>
             </a:fld>
@@ -3910,6 +3979,11 @@
         </p:txBody>
       </p:sp>
     </p:spTree>
+    <p:extLst>
+      <p:ext uri="{BB962C8B-B14F-4D97-AF65-F5344CB8AC3E}">
+        <p14:creationId xmlns:p14="http://schemas.microsoft.com/office/powerpoint/2010/main" val="4187035802"/>
+      </p:ext>
+    </p:extLst>
   </p:cSld>
   <p:clrMapOvr>
     <a:masterClrMapping/>
@@ -4322,7 +4396,7 @@
           <a:lstStyle/>
           <a:p>
             <a:fld id="{D0DF5E60-9974-AC48-9591-99C2BB44B7CF}" type="datetimeFigureOut">
-              <a:rPr lang="en-US" dirty="0"/>
+              <a:rPr lang="en-US" smtClean="0"/>
               <a:pPr/>
               <a:t>6/11/2018</a:t>
             </a:fld>
@@ -4365,7 +4439,7 @@
           <a:lstStyle/>
           <a:p>
             <a:fld id="{D57F1E4F-1CFF-5643-939E-217C01CDF565}" type="slidenum">
-              <a:rPr lang="en-US" dirty="0"/>
+              <a:rPr lang="en-US" smtClean="0"/>
               <a:pPr/>
               <a:t>‹N°›</a:t>
             </a:fld>
@@ -4374,6 +4448,11 @@
         </p:txBody>
       </p:sp>
     </p:spTree>
+    <p:extLst>
+      <p:ext uri="{BB962C8B-B14F-4D97-AF65-F5344CB8AC3E}">
+        <p14:creationId xmlns:p14="http://schemas.microsoft.com/office/powerpoint/2010/main" val="2754861645"/>
+      </p:ext>
+    </p:extLst>
   </p:cSld>
   <p:clrMapOvr>
     <a:masterClrMapping/>
@@ -4632,7 +4711,7 @@
           <a:lstStyle/>
           <a:p>
             <a:fld id="{18C79C5D-2A6F-F04D-97DA-BEF2467B64E4}" type="datetimeFigureOut">
-              <a:rPr lang="en-US" dirty="0"/>
+              <a:rPr lang="en-US" smtClean="0"/>
               <a:pPr/>
               <a:t>6/11/2018</a:t>
             </a:fld>
@@ -4685,7 +4764,7 @@
           <a:lstStyle/>
           <a:p>
             <a:fld id="{D57F1E4F-1CFF-5643-939E-217C01CDF565}" type="slidenum">
-              <a:rPr lang="en-US" dirty="0"/>
+              <a:rPr lang="en-US" smtClean="0"/>
               <a:pPr/>
               <a:t>‹N°›</a:t>
             </a:fld>
@@ -4694,6 +4773,11 @@
         </p:txBody>
       </p:sp>
     </p:spTree>
+    <p:extLst>
+      <p:ext uri="{BB962C8B-B14F-4D97-AF65-F5344CB8AC3E}">
+        <p14:creationId xmlns:p14="http://schemas.microsoft.com/office/powerpoint/2010/main" val="1827967282"/>
+      </p:ext>
+    </p:extLst>
   </p:cSld>
   <p:clrMapOvr>
     <a:masterClrMapping/>
@@ -4899,7 +4983,7 @@
           </a:lstStyle>
           <a:p>
             <a:fld id="{09B482E8-6E0E-1B4F-B1FD-C69DB9E858D9}" type="datetimeFigureOut">
-              <a:rPr lang="en-US" dirty="0"/>
+              <a:rPr lang="en-US" smtClean="0"/>
               <a:pPr/>
               <a:t>6/11/2018</a:t>
             </a:fld>
@@ -4939,7 +5023,7 @@
           </a:lstStyle>
           <a:p>
             <a:fld id="{D57F1E4F-1CFF-5643-939E-217C01CDF565}" type="slidenum">
-              <a:rPr lang="en-US" dirty="0"/>
+              <a:rPr lang="en-US" smtClean="0"/>
               <a:pPr/>
               <a:t>‹N°›</a:t>
             </a:fld>
@@ -4948,23 +5032,28 @@
         </p:txBody>
       </p:sp>
     </p:spTree>
+    <p:extLst>
+      <p:ext uri="{BB962C8B-B14F-4D97-AF65-F5344CB8AC3E}">
+        <p14:creationId xmlns:p14="http://schemas.microsoft.com/office/powerpoint/2010/main" val="2877556667"/>
+      </p:ext>
+    </p:extLst>
   </p:cSld>
   <p:clrMap bg1="dk1" tx1="lt1" bg2="dk2" tx2="lt2" accent1="accent1" accent2="accent2" accent3="accent3" accent4="accent4" accent5="accent5" accent6="accent6" hlink="hlink" folHlink="folHlink"/>
   <p:sldLayoutIdLst>
-    <p:sldLayoutId id="2147483649" r:id="rId1"/>
-    <p:sldLayoutId id="2147483650" r:id="rId2"/>
-    <p:sldLayoutId id="2147483651" r:id="rId3"/>
-    <p:sldLayoutId id="2147483652" r:id="rId4"/>
-    <p:sldLayoutId id="2147483653" r:id="rId5"/>
-    <p:sldLayoutId id="2147483654" r:id="rId6"/>
-    <p:sldLayoutId id="2147483655" r:id="rId7"/>
-    <p:sldLayoutId id="2147483656" r:id="rId8"/>
-    <p:sldLayoutId id="2147483663" r:id="rId9"/>
-    <p:sldLayoutId id="2147483657" r:id="rId10"/>
-    <p:sldLayoutId id="2147483666" r:id="rId11"/>
-    <p:sldLayoutId id="2147483661" r:id="rId12"/>
-    <p:sldLayoutId id="2147483658" r:id="rId13"/>
-    <p:sldLayoutId id="2147483659" r:id="rId14"/>
+    <p:sldLayoutId id="2147483668" r:id="rId1"/>
+    <p:sldLayoutId id="2147483669" r:id="rId2"/>
+    <p:sldLayoutId id="2147483670" r:id="rId3"/>
+    <p:sldLayoutId id="2147483671" r:id="rId4"/>
+    <p:sldLayoutId id="2147483672" r:id="rId5"/>
+    <p:sldLayoutId id="2147483673" r:id="rId6"/>
+    <p:sldLayoutId id="2147483674" r:id="rId7"/>
+    <p:sldLayoutId id="2147483675" r:id="rId8"/>
+    <p:sldLayoutId id="2147483676" r:id="rId9"/>
+    <p:sldLayoutId id="2147483677" r:id="rId10"/>
+    <p:sldLayoutId id="2147483678" r:id="rId11"/>
+    <p:sldLayoutId id="2147483679" r:id="rId12"/>
+    <p:sldLayoutId id="2147483680" r:id="rId13"/>
+    <p:sldLayoutId id="2147483681" r:id="rId14"/>
   </p:sldLayoutIdLst>
   <p:hf sldNum="0" hdr="0" ftr="0" dt="0"/>
   <p:txStyles>
@@ -5392,8 +5481,8 @@
         </p:nvSpPr>
         <p:spPr>
           <a:xfrm>
-            <a:off x="1" y="5990596"/>
-            <a:ext cx="1880948" cy="867404"/>
+            <a:off x="-1" y="6400801"/>
+            <a:ext cx="4827639" cy="446546"/>
           </a:xfrm>
           <a:ln>
             <a:solidFill>
@@ -5402,20 +5491,24 @@
           </a:ln>
         </p:spPr>
         <p:txBody>
-          <a:bodyPr/>
-          <a:lstStyle/>
-          <a:p>
-            <a:r>
-              <a:rPr lang="fr-FR" dirty="0" smtClean="0"/>
-              <a:t>Laurent LAM</a:t>
-            </a:r>
-          </a:p>
-          <a:p>
-            <a:r>
-              <a:rPr lang="fr-FR" dirty="0" smtClean="0"/>
-              <a:t>Luc ZORRILLA</a:t>
-            </a:r>
-            <a:endParaRPr lang="fr-FR" dirty="0"/>
+          <a:bodyPr>
+            <a:noAutofit/>
+          </a:bodyPr>
+          <a:lstStyle/>
+          <a:p>
+            <a:r>
+              <a:rPr lang="fr-FR" sz="2400" dirty="0" smtClean="0"/>
+              <a:t>Laurent </a:t>
+            </a:r>
+            <a:r>
+              <a:rPr lang="fr-FR" sz="2400" dirty="0" smtClean="0"/>
+              <a:t>LAM &amp; Luc </a:t>
+            </a:r>
+            <a:r>
+              <a:rPr lang="fr-FR" sz="2400" dirty="0" smtClean="0"/>
+              <a:t>ZORRILLA</a:t>
+            </a:r>
+            <a:endParaRPr lang="fr-FR" sz="2400" dirty="0"/>
           </a:p>
         </p:txBody>
       </p:sp>
@@ -5429,8 +5522,8 @@
         </p:nvSpPr>
         <p:spPr>
           <a:xfrm>
-            <a:off x="3248298" y="5459374"/>
-            <a:ext cx="4920343" cy="844731"/>
+            <a:off x="-1" y="5288397"/>
+            <a:ext cx="12191998" cy="920814"/>
           </a:xfrm>
           <a:prstGeom prst="rect">
             <a:avLst/>
@@ -5573,8 +5666,8 @@
         </p:nvSpPr>
         <p:spPr>
           <a:xfrm>
-            <a:off x="10371909" y="6488469"/>
-            <a:ext cx="1820091" cy="369531"/>
+            <a:off x="9763433" y="6400801"/>
+            <a:ext cx="2428568" cy="457199"/>
           </a:xfrm>
           <a:prstGeom prst="rect">
             <a:avLst/>
@@ -5594,7 +5687,7 @@
         </p:spPr>
         <p:txBody>
           <a:bodyPr vert="horz" lIns="91440" tIns="45720" rIns="91440" bIns="45720" rtlCol="0" anchor="t">
-            <a:normAutofit/>
+            <a:noAutofit/>
           </a:bodyPr>
           <a:lstStyle>
             <a:lvl1pPr marL="0" indent="0" algn="l" defTabSz="457200" rtl="0" eaLnBrk="1" latinLnBrk="0" hangingPunct="1">
@@ -5805,10 +5898,10 @@
           </a:lstStyle>
           <a:p>
             <a:r>
-              <a:rPr lang="fr-FR" dirty="0" smtClean="0"/>
+              <a:rPr lang="fr-FR" sz="2400" dirty="0" smtClean="0"/>
               <a:t>IN104 – Page 1</a:t>
             </a:r>
-            <a:endParaRPr lang="fr-FR" dirty="0"/>
+            <a:endParaRPr lang="fr-FR" sz="2400" dirty="0"/>
           </a:p>
         </p:txBody>
       </p:sp>
@@ -5816,6 +5909,200 @@
     <p:extLst>
       <p:ext uri="{BB962C8B-B14F-4D97-AF65-F5344CB8AC3E}">
         <p14:creationId xmlns:p14="http://schemas.microsoft.com/office/powerpoint/2010/main" val="683562609"/>
+      </p:ext>
+    </p:extLst>
+  </p:cSld>
+  <p:clrMapOvr>
+    <a:masterClrMapping/>
+  </p:clrMapOvr>
+  <p:timing>
+    <p:tnLst>
+      <p:par>
+        <p:cTn id="1" dur="indefinite" restart="never" nodeType="tmRoot"/>
+      </p:par>
+    </p:tnLst>
+  </p:timing>
+</p:sld>
+</file>
+
+<file path=ppt/slides/slide10.xml><?xml version="1.0" encoding="utf-8"?>
+<p:sld xmlns:a="http://schemas.openxmlformats.org/drawingml/2006/main" xmlns:r="http://schemas.openxmlformats.org/officeDocument/2006/relationships" xmlns:p="http://schemas.openxmlformats.org/presentationml/2006/main">
+  <p:cSld>
+    <p:spTree>
+      <p:nvGrpSpPr>
+        <p:cNvPr id="1" name=""/>
+        <p:cNvGrpSpPr/>
+        <p:nvPr/>
+      </p:nvGrpSpPr>
+      <p:grpSpPr>
+        <a:xfrm>
+          <a:off x="0" y="0"/>
+          <a:ext cx="0" cy="0"/>
+          <a:chOff x="0" y="0"/>
+          <a:chExt cx="0" cy="0"/>
+        </a:xfrm>
+      </p:grpSpPr>
+      <p:sp>
+        <p:nvSpPr>
+          <p:cNvPr id="2" name="Titre 1"/>
+          <p:cNvSpPr>
+            <a:spLocks noGrp="1"/>
+          </p:cNvSpPr>
+          <p:nvPr>
+            <p:ph type="title"/>
+          </p:nvPr>
+        </p:nvSpPr>
+        <p:spPr>
+          <a:xfrm>
+            <a:off x="0" y="264306"/>
+            <a:ext cx="12192000" cy="970450"/>
+          </a:xfrm>
+          <a:ln>
+            <a:solidFill>
+              <a:srgbClr val="00B050"/>
+            </a:solidFill>
+          </a:ln>
+        </p:spPr>
+        <p:txBody>
+          <a:bodyPr/>
+          <a:lstStyle/>
+          <a:p>
+            <a:r>
+              <a:rPr lang="fr-FR" sz="5400" dirty="0" smtClean="0">
+                <a:solidFill>
+                  <a:schemeClr val="accent6"/>
+                </a:solidFill>
+              </a:rPr>
+              <a:t>IV. </a:t>
+            </a:r>
+            <a:r>
+              <a:rPr lang="fr-FR" sz="5400" dirty="0" smtClean="0"/>
+              <a:t>Performance</a:t>
+            </a:r>
+            <a:endParaRPr lang="fr-FR" sz="5400" dirty="0"/>
+          </a:p>
+        </p:txBody>
+      </p:sp>
+      <p:sp>
+        <p:nvSpPr>
+          <p:cNvPr id="3" name="Espace réservé du contenu 2"/>
+          <p:cNvSpPr>
+            <a:spLocks noGrp="1"/>
+          </p:cNvSpPr>
+          <p:nvPr>
+            <p:ph idx="1"/>
+          </p:nvPr>
+        </p:nvSpPr>
+        <p:spPr/>
+        <p:txBody>
+          <a:bodyPr/>
+          <a:lstStyle/>
+          <a:p>
+            <a:endParaRPr lang="fr-FR"/>
+          </a:p>
+        </p:txBody>
+      </p:sp>
+    </p:spTree>
+    <p:extLst>
+      <p:ext uri="{BB962C8B-B14F-4D97-AF65-F5344CB8AC3E}">
+        <p14:creationId xmlns:p14="http://schemas.microsoft.com/office/powerpoint/2010/main" val="3817966102"/>
+      </p:ext>
+    </p:extLst>
+  </p:cSld>
+  <p:clrMapOvr>
+    <a:masterClrMapping/>
+  </p:clrMapOvr>
+  <p:timing>
+    <p:tnLst>
+      <p:par>
+        <p:cTn id="1" dur="indefinite" restart="never" nodeType="tmRoot"/>
+      </p:par>
+    </p:tnLst>
+  </p:timing>
+</p:sld>
+</file>
+
+<file path=ppt/slides/slide11.xml><?xml version="1.0" encoding="utf-8"?>
+<p:sld xmlns:a="http://schemas.openxmlformats.org/drawingml/2006/main" xmlns:r="http://schemas.openxmlformats.org/officeDocument/2006/relationships" xmlns:p="http://schemas.openxmlformats.org/presentationml/2006/main">
+  <p:cSld>
+    <p:spTree>
+      <p:nvGrpSpPr>
+        <p:cNvPr id="1" name=""/>
+        <p:cNvGrpSpPr/>
+        <p:nvPr/>
+      </p:nvGrpSpPr>
+      <p:grpSpPr>
+        <a:xfrm>
+          <a:off x="0" y="0"/>
+          <a:ext cx="0" cy="0"/>
+          <a:chOff x="0" y="0"/>
+          <a:chExt cx="0" cy="0"/>
+        </a:xfrm>
+      </p:grpSpPr>
+      <p:sp>
+        <p:nvSpPr>
+          <p:cNvPr id="2" name="Titre 1"/>
+          <p:cNvSpPr>
+            <a:spLocks noGrp="1"/>
+          </p:cNvSpPr>
+          <p:nvPr>
+            <p:ph type="title"/>
+          </p:nvPr>
+        </p:nvSpPr>
+        <p:spPr>
+          <a:xfrm>
+            <a:off x="0" y="316559"/>
+            <a:ext cx="12192000" cy="970450"/>
+          </a:xfrm>
+          <a:ln>
+            <a:solidFill>
+              <a:srgbClr val="00B050"/>
+            </a:solidFill>
+          </a:ln>
+        </p:spPr>
+        <p:txBody>
+          <a:bodyPr/>
+          <a:lstStyle/>
+          <a:p>
+            <a:r>
+              <a:rPr lang="fr-FR" sz="5400" dirty="0" smtClean="0">
+                <a:solidFill>
+                  <a:schemeClr val="accent6"/>
+                </a:solidFill>
+              </a:rPr>
+              <a:t>V. </a:t>
+            </a:r>
+            <a:r>
+              <a:rPr lang="fr-FR" sz="5400" dirty="0" smtClean="0"/>
+              <a:t>Conclusion</a:t>
+            </a:r>
+            <a:endParaRPr lang="fr-FR" sz="5400" dirty="0"/>
+          </a:p>
+        </p:txBody>
+      </p:sp>
+      <p:sp>
+        <p:nvSpPr>
+          <p:cNvPr id="3" name="Espace réservé du contenu 2"/>
+          <p:cNvSpPr>
+            <a:spLocks noGrp="1"/>
+          </p:cNvSpPr>
+          <p:nvPr>
+            <p:ph idx="1"/>
+          </p:nvPr>
+        </p:nvSpPr>
+        <p:spPr/>
+        <p:txBody>
+          <a:bodyPr/>
+          <a:lstStyle/>
+          <a:p>
+            <a:endParaRPr lang="fr-FR"/>
+          </a:p>
+        </p:txBody>
+      </p:sp>
+    </p:spTree>
+    <p:extLst>
+      <p:ext uri="{BB962C8B-B14F-4D97-AF65-F5344CB8AC3E}">
+        <p14:creationId xmlns:p14="http://schemas.microsoft.com/office/powerpoint/2010/main" val="866067503"/>
       </p:ext>
     </p:extLst>
   </p:cSld>
@@ -5851,845 +6138,225 @@
       </p:grpSpPr>
       <p:sp>
         <p:nvSpPr>
-          <p:cNvPr id="2" name="Titre 1"/>
-          <p:cNvSpPr>
-            <a:spLocks noGrp="1"/>
-          </p:cNvSpPr>
-          <p:nvPr>
-            <p:ph type="title"/>
+          <p:cNvPr id="6" name="Titre 5"/>
+          <p:cNvSpPr>
+            <a:spLocks noGrp="1"/>
+          </p:cNvSpPr>
+          <p:nvPr>
+            <p:ph type="ctrTitle"/>
           </p:nvPr>
         </p:nvSpPr>
         <p:spPr>
           <a:xfrm>
-            <a:off x="0" y="351394"/>
-            <a:ext cx="12192000" cy="970450"/>
+            <a:off x="0" y="0"/>
+            <a:ext cx="12191999" cy="4902926"/>
           </a:xfrm>
           <a:ln>
             <a:solidFill>
-              <a:schemeClr val="accent2"/>
+              <a:srgbClr val="00B050"/>
             </a:solidFill>
           </a:ln>
         </p:spPr>
         <p:txBody>
-          <a:bodyPr/>
-          <a:lstStyle/>
-          <a:p>
-            <a:r>
-              <a:rPr lang="fr-FR" sz="5400" dirty="0" smtClean="0"/>
+          <a:bodyPr lIns="1656000" anchor="ctr">
+            <a:noAutofit/>
+          </a:bodyPr>
+          <a:lstStyle/>
+          <a:p>
+            <a:r>
+              <a:rPr lang="fr-FR" sz="4500" dirty="0" smtClean="0">
+                <a:solidFill>
+                  <a:schemeClr val="accent6"/>
+                </a:solidFill>
+              </a:rPr>
+              <a:t>I.     </a:t>
+            </a:r>
+            <a:r>
+              <a:rPr lang="fr-FR" sz="4500" dirty="0" smtClean="0"/>
               <a:t>Contexte et Problématique</a:t>
             </a:r>
-            <a:endParaRPr lang="fr-FR" sz="5400" dirty="0"/>
-          </a:p>
-        </p:txBody>
-      </p:sp>
-      <p:pic>
-        <p:nvPicPr>
-          <p:cNvPr id="4" name="Espace réservé du contenu 3"/>
-          <p:cNvPicPr>
-            <a:picLocks noGrp="1" noChangeAspect="1"/>
-          </p:cNvPicPr>
-          <p:nvPr>
-            <p:ph idx="1"/>
-          </p:nvPr>
-        </p:nvPicPr>
-        <p:blipFill>
-          <a:blip r:embed="rId2">
-            <a:extLst>
-              <a:ext uri="{28A0092B-C50C-407E-A947-70E740481C1C}">
-                <a14:useLocalDpi xmlns:a14="http://schemas.microsoft.com/office/drawing/2010/main" val="0"/>
-              </a:ext>
-            </a:extLst>
-          </a:blip>
-          <a:stretch>
-            <a:fillRect/>
-          </a:stretch>
-        </p:blipFill>
+            <a:br>
+              <a:rPr lang="fr-FR" sz="4500" dirty="0" smtClean="0"/>
+            </a:br>
+            <a:r>
+              <a:rPr lang="fr-FR" sz="4500" dirty="0" smtClean="0">
+                <a:solidFill>
+                  <a:schemeClr val="accent6"/>
+                </a:solidFill>
+              </a:rPr>
+              <a:t>II.    </a:t>
+            </a:r>
+            <a:r>
+              <a:rPr lang="fr-FR" sz="4500" dirty="0" smtClean="0"/>
+              <a:t>Solution : architecture &amp; design</a:t>
+            </a:r>
+            <a:br>
+              <a:rPr lang="fr-FR" sz="4500" dirty="0" smtClean="0"/>
+            </a:br>
+            <a:r>
+              <a:rPr lang="fr-FR" sz="4500" dirty="0" smtClean="0">
+                <a:solidFill>
+                  <a:schemeClr val="accent6"/>
+                </a:solidFill>
+              </a:rPr>
+              <a:t>III.   </a:t>
+            </a:r>
+            <a:r>
+              <a:rPr lang="fr-FR" sz="4500" dirty="0" smtClean="0"/>
+              <a:t>Vie du projet</a:t>
+            </a:r>
+            <a:br>
+              <a:rPr lang="fr-FR" sz="4500" dirty="0" smtClean="0"/>
+            </a:br>
+            <a:r>
+              <a:rPr lang="fr-FR" sz="4500" dirty="0" smtClean="0">
+                <a:solidFill>
+                  <a:schemeClr val="accent6"/>
+                </a:solidFill>
+              </a:rPr>
+              <a:t>IV.   </a:t>
+            </a:r>
+            <a:r>
+              <a:rPr lang="fr-FR" sz="4500" dirty="0" smtClean="0"/>
+              <a:t>Performances</a:t>
+            </a:r>
+            <a:br>
+              <a:rPr lang="fr-FR" sz="4500" dirty="0" smtClean="0"/>
+            </a:br>
+            <a:r>
+              <a:rPr lang="fr-FR" sz="4500" dirty="0" smtClean="0">
+                <a:solidFill>
+                  <a:schemeClr val="accent6"/>
+                </a:solidFill>
+              </a:rPr>
+              <a:t>V.    </a:t>
+            </a:r>
+            <a:r>
+              <a:rPr lang="fr-FR" sz="4500" dirty="0" smtClean="0"/>
+              <a:t>Conclusion</a:t>
+            </a:r>
+            <a:endParaRPr lang="fr-FR" sz="4500" dirty="0"/>
+          </a:p>
+        </p:txBody>
+      </p:sp>
+      <p:sp>
+        <p:nvSpPr>
+          <p:cNvPr id="9" name="Titre 1"/>
+          <p:cNvSpPr txBox="1">
+            <a:spLocks/>
+          </p:cNvSpPr>
+          <p:nvPr/>
+        </p:nvSpPr>
         <p:spPr>
           <a:xfrm>
-            <a:off x="5339269" y="2978384"/>
-            <a:ext cx="3805541" cy="3879616"/>
-          </a:xfrm>
-        </p:spPr>
-      </p:pic>
-      <p:sp>
-        <p:nvSpPr>
-          <p:cNvPr id="5" name="ZoneTexte 4"/>
-          <p:cNvSpPr txBox="1"/>
-          <p:nvPr/>
-        </p:nvSpPr>
-        <p:spPr>
-          <a:xfrm>
-            <a:off x="383281" y="2248510"/>
-            <a:ext cx="10091224" cy="553998"/>
+            <a:off x="0" y="5330952"/>
+            <a:ext cx="12192000" cy="970450"/>
           </a:xfrm>
           <a:prstGeom prst="rect">
             <a:avLst/>
           </a:prstGeom>
-          <a:noFill/>
           <a:ln>
             <a:solidFill>
               <a:srgbClr val="0070C0"/>
             </a:solidFill>
           </a:ln>
-        </p:spPr>
-        <p:txBody>
-          <a:bodyPr wrap="none" rtlCol="0">
-            <a:spAutoFit/>
-          </a:bodyPr>
-          <a:lstStyle/>
-          <a:p>
-            <a:r>
-              <a:rPr lang="fr-FR" sz="3000" dirty="0" smtClean="0"/>
-              <a:t>Trouver le chemin optimal pour résoudre le labyrinthe</a:t>
-            </a:r>
-            <a:endParaRPr lang="fr-FR" sz="3000" dirty="0"/>
-          </a:p>
-        </p:txBody>
-      </p:sp>
-      <p:sp>
-        <p:nvSpPr>
-          <p:cNvPr id="7" name="Ellipse 6"/>
-          <p:cNvSpPr/>
-          <p:nvPr/>
-        </p:nvSpPr>
-        <p:spPr>
-          <a:xfrm>
-            <a:off x="6244857" y="5332771"/>
-            <a:ext cx="191588" cy="182880"/>
-          </a:xfrm>
-          <a:prstGeom prst="ellipse">
-            <a:avLst/>
-          </a:prstGeom>
-        </p:spPr>
-        <p:style>
-          <a:lnRef idx="2">
-            <a:schemeClr val="accent1">
-              <a:shade val="50000"/>
-            </a:schemeClr>
-          </a:lnRef>
-          <a:fillRef idx="1">
-            <a:schemeClr val="accent1"/>
-          </a:fillRef>
-          <a:effectRef idx="0">
-            <a:schemeClr val="accent1"/>
-          </a:effectRef>
-          <a:fontRef idx="minor">
-            <a:schemeClr val="lt1"/>
-          </a:fontRef>
-        </p:style>
-        <p:txBody>
-          <a:bodyPr rtlCol="0" anchor="ctr"/>
-          <a:lstStyle/>
-          <a:p>
-            <a:pPr algn="ctr"/>
-            <a:endParaRPr lang="fr-FR"/>
-          </a:p>
-        </p:txBody>
-      </p:sp>
-      <p:sp>
-        <p:nvSpPr>
-          <p:cNvPr id="8" name="Ellipse 7"/>
-          <p:cNvSpPr/>
-          <p:nvPr/>
-        </p:nvSpPr>
-        <p:spPr>
-          <a:xfrm>
-            <a:off x="6858812" y="6303777"/>
-            <a:ext cx="191588" cy="182880"/>
-          </a:xfrm>
-          <a:prstGeom prst="ellipse">
-            <a:avLst/>
-          </a:prstGeom>
-        </p:spPr>
-        <p:style>
-          <a:lnRef idx="2">
-            <a:schemeClr val="accent1">
-              <a:shade val="50000"/>
-            </a:schemeClr>
-          </a:lnRef>
-          <a:fillRef idx="1">
-            <a:schemeClr val="accent1"/>
-          </a:fillRef>
-          <a:effectRef idx="0">
-            <a:schemeClr val="accent1"/>
-          </a:effectRef>
-          <a:fontRef idx="minor">
-            <a:schemeClr val="lt1"/>
-          </a:fontRef>
-        </p:style>
-        <p:txBody>
-          <a:bodyPr rtlCol="0" anchor="ctr"/>
-          <a:lstStyle/>
-          <a:p>
-            <a:pPr algn="ctr"/>
-            <a:endParaRPr lang="fr-FR"/>
-          </a:p>
-        </p:txBody>
-      </p:sp>
-      <p:sp>
-        <p:nvSpPr>
-          <p:cNvPr id="9" name="Ellipse 8"/>
-          <p:cNvSpPr/>
-          <p:nvPr/>
-        </p:nvSpPr>
-        <p:spPr>
-          <a:xfrm>
-            <a:off x="7490182" y="3930691"/>
-            <a:ext cx="191588" cy="182880"/>
-          </a:xfrm>
-          <a:prstGeom prst="ellipse">
-            <a:avLst/>
-          </a:prstGeom>
-        </p:spPr>
-        <p:style>
-          <a:lnRef idx="2">
-            <a:schemeClr val="accent1">
-              <a:shade val="50000"/>
-            </a:schemeClr>
-          </a:lnRef>
-          <a:fillRef idx="1">
-            <a:schemeClr val="accent1"/>
-          </a:fillRef>
-          <a:effectRef idx="0">
-            <a:schemeClr val="accent1"/>
-          </a:effectRef>
-          <a:fontRef idx="minor">
-            <a:schemeClr val="lt1"/>
-          </a:fontRef>
-        </p:style>
-        <p:txBody>
-          <a:bodyPr rtlCol="0" anchor="ctr"/>
-          <a:lstStyle/>
-          <a:p>
-            <a:pPr algn="ctr"/>
-            <a:endParaRPr lang="fr-FR"/>
-          </a:p>
-        </p:txBody>
-      </p:sp>
-      <p:sp>
-        <p:nvSpPr>
-          <p:cNvPr id="10" name="Ellipse 9"/>
-          <p:cNvSpPr/>
-          <p:nvPr/>
-        </p:nvSpPr>
-        <p:spPr>
-          <a:xfrm>
-            <a:off x="7906017" y="6177502"/>
-            <a:ext cx="191588" cy="182880"/>
-          </a:xfrm>
-          <a:prstGeom prst="ellipse">
-            <a:avLst/>
-          </a:prstGeom>
-        </p:spPr>
-        <p:style>
-          <a:lnRef idx="2">
-            <a:schemeClr val="accent1">
-              <a:shade val="50000"/>
-            </a:schemeClr>
-          </a:lnRef>
-          <a:fillRef idx="1">
-            <a:schemeClr val="accent1"/>
-          </a:fillRef>
-          <a:effectRef idx="0">
-            <a:schemeClr val="accent1"/>
-          </a:effectRef>
-          <a:fontRef idx="minor">
-            <a:schemeClr val="lt1"/>
-          </a:fontRef>
-        </p:style>
-        <p:txBody>
-          <a:bodyPr rtlCol="0" anchor="ctr"/>
-          <a:lstStyle/>
-          <a:p>
-            <a:pPr algn="ctr"/>
-            <a:endParaRPr lang="fr-FR"/>
-          </a:p>
-        </p:txBody>
-      </p:sp>
-      <p:sp>
-        <p:nvSpPr>
-          <p:cNvPr id="11" name="Ellipse 10"/>
-          <p:cNvSpPr/>
-          <p:nvPr/>
-        </p:nvSpPr>
-        <p:spPr>
-          <a:xfrm>
-            <a:off x="8352331" y="4826752"/>
-            <a:ext cx="191588" cy="182880"/>
-          </a:xfrm>
-          <a:prstGeom prst="ellipse">
-            <a:avLst/>
-          </a:prstGeom>
-        </p:spPr>
-        <p:style>
-          <a:lnRef idx="2">
-            <a:schemeClr val="accent1">
-              <a:shade val="50000"/>
-            </a:schemeClr>
-          </a:lnRef>
-          <a:fillRef idx="1">
-            <a:schemeClr val="accent1"/>
-          </a:fillRef>
-          <a:effectRef idx="0">
-            <a:schemeClr val="accent1"/>
-          </a:effectRef>
-          <a:fontRef idx="minor">
-            <a:schemeClr val="lt1"/>
-          </a:fontRef>
-        </p:style>
-        <p:txBody>
-          <a:bodyPr rtlCol="0" anchor="ctr"/>
-          <a:lstStyle/>
-          <a:p>
-            <a:pPr algn="ctr"/>
-            <a:endParaRPr lang="fr-FR"/>
-          </a:p>
-        </p:txBody>
-      </p:sp>
-      <p:sp>
-        <p:nvSpPr>
-          <p:cNvPr id="12" name="Ellipse 11"/>
-          <p:cNvSpPr/>
-          <p:nvPr/>
-        </p:nvSpPr>
-        <p:spPr>
-          <a:xfrm>
-            <a:off x="2042174" y="4929468"/>
-            <a:ext cx="353598" cy="322214"/>
-          </a:xfrm>
-          <a:prstGeom prst="ellipse">
-            <a:avLst/>
-          </a:prstGeom>
-        </p:spPr>
-        <p:style>
-          <a:lnRef idx="2">
-            <a:schemeClr val="accent1">
-              <a:shade val="50000"/>
-            </a:schemeClr>
-          </a:lnRef>
-          <a:fillRef idx="1">
-            <a:schemeClr val="accent1"/>
-          </a:fillRef>
-          <a:effectRef idx="0">
-            <a:schemeClr val="accent1"/>
-          </a:effectRef>
-          <a:fontRef idx="minor">
-            <a:schemeClr val="lt1"/>
-          </a:fontRef>
-        </p:style>
-        <p:txBody>
-          <a:bodyPr rtlCol="0" anchor="ctr"/>
-          <a:lstStyle/>
-          <a:p>
-            <a:pPr algn="ctr"/>
-            <a:endParaRPr lang="fr-FR"/>
-          </a:p>
-        </p:txBody>
-      </p:sp>
-      <p:sp>
-        <p:nvSpPr>
-          <p:cNvPr id="14" name="ZoneTexte 13"/>
-          <p:cNvSpPr txBox="1"/>
-          <p:nvPr/>
-        </p:nvSpPr>
-        <p:spPr>
-          <a:xfrm>
-            <a:off x="2642220" y="4796401"/>
-            <a:ext cx="1372492" cy="477054"/>
-          </a:xfrm>
-          <a:prstGeom prst="rect">
-            <a:avLst/>
-          </a:prstGeom>
-          <a:noFill/>
-        </p:spPr>
-        <p:txBody>
-          <a:bodyPr wrap="none" rtlCol="0">
-            <a:spAutoFit/>
-          </a:bodyPr>
-          <a:lstStyle/>
-          <a:p>
-            <a:r>
-              <a:rPr lang="fr-FR" sz="2500" dirty="0" smtClean="0"/>
-              <a:t>5 points</a:t>
-            </a:r>
-            <a:endParaRPr lang="fr-FR" sz="2500" dirty="0"/>
-          </a:p>
-        </p:txBody>
-      </p:sp>
-      <p:sp>
-        <p:nvSpPr>
-          <p:cNvPr id="15" name="Ellipse 14"/>
-          <p:cNvSpPr/>
-          <p:nvPr/>
-        </p:nvSpPr>
-        <p:spPr>
-          <a:xfrm>
-            <a:off x="2042174" y="5297660"/>
-            <a:ext cx="353598" cy="320435"/>
-          </a:xfrm>
-          <a:prstGeom prst="ellipse">
-            <a:avLst/>
-          </a:prstGeom>
-          <a:solidFill>
-            <a:schemeClr val="accent6"/>
-          </a:solidFill>
-        </p:spPr>
-        <p:style>
-          <a:lnRef idx="2">
-            <a:schemeClr val="accent1">
-              <a:shade val="50000"/>
-            </a:schemeClr>
-          </a:lnRef>
-          <a:fillRef idx="1">
-            <a:schemeClr val="accent1"/>
-          </a:fillRef>
-          <a:effectRef idx="0">
-            <a:schemeClr val="accent1"/>
-          </a:effectRef>
-          <a:fontRef idx="minor">
-            <a:schemeClr val="lt1"/>
-          </a:fontRef>
-        </p:style>
-        <p:txBody>
-          <a:bodyPr rtlCol="0" anchor="ctr"/>
-          <a:lstStyle/>
-          <a:p>
-            <a:pPr algn="ctr"/>
-            <a:endParaRPr lang="fr-FR"/>
-          </a:p>
-        </p:txBody>
-      </p:sp>
-      <p:sp>
-        <p:nvSpPr>
-          <p:cNvPr id="16" name="Ellipse 15"/>
-          <p:cNvSpPr/>
-          <p:nvPr/>
-        </p:nvSpPr>
-        <p:spPr>
-          <a:xfrm>
-            <a:off x="7574641" y="6358460"/>
-            <a:ext cx="191588" cy="182880"/>
-          </a:xfrm>
-          <a:prstGeom prst="ellipse">
-            <a:avLst/>
-          </a:prstGeom>
-          <a:solidFill>
-            <a:schemeClr val="accent6"/>
-          </a:solidFill>
-        </p:spPr>
-        <p:style>
-          <a:lnRef idx="2">
-            <a:schemeClr val="accent1">
-              <a:shade val="50000"/>
-            </a:schemeClr>
-          </a:lnRef>
-          <a:fillRef idx="1">
-            <a:schemeClr val="accent1"/>
-          </a:fillRef>
-          <a:effectRef idx="0">
-            <a:schemeClr val="accent1"/>
-          </a:effectRef>
-          <a:fontRef idx="minor">
-            <a:schemeClr val="lt1"/>
-          </a:fontRef>
-        </p:style>
-        <p:txBody>
-          <a:bodyPr rtlCol="0" anchor="ctr"/>
-          <a:lstStyle/>
-          <a:p>
-            <a:pPr algn="ctr"/>
-            <a:endParaRPr lang="fr-FR"/>
-          </a:p>
-        </p:txBody>
-      </p:sp>
-      <p:sp>
-        <p:nvSpPr>
-          <p:cNvPr id="17" name="ZoneTexte 16"/>
-          <p:cNvSpPr txBox="1"/>
-          <p:nvPr/>
-        </p:nvSpPr>
-        <p:spPr>
-          <a:xfrm>
-            <a:off x="2464287" y="5210980"/>
-            <a:ext cx="1728358" cy="477054"/>
-          </a:xfrm>
-          <a:prstGeom prst="rect">
-            <a:avLst/>
-          </a:prstGeom>
-          <a:noFill/>
-        </p:spPr>
-        <p:txBody>
-          <a:bodyPr wrap="none" rtlCol="0">
-            <a:spAutoFit/>
-          </a:bodyPr>
-          <a:lstStyle/>
-          <a:p>
-            <a:r>
-              <a:rPr lang="fr-FR" sz="2500" dirty="0" smtClean="0"/>
-              <a:t>500 points</a:t>
-            </a:r>
-            <a:endParaRPr lang="fr-FR" sz="2500" dirty="0"/>
-          </a:p>
-        </p:txBody>
-      </p:sp>
-      <p:sp>
-        <p:nvSpPr>
-          <p:cNvPr id="18" name="Rectangle 17"/>
-          <p:cNvSpPr/>
-          <p:nvPr/>
-        </p:nvSpPr>
-        <p:spPr>
-          <a:xfrm>
-            <a:off x="1883719" y="4143604"/>
-            <a:ext cx="2442535" cy="1635870"/>
-          </a:xfrm>
-          <a:prstGeom prst="rect">
-            <a:avLst/>
-          </a:prstGeom>
-          <a:noFill/>
-        </p:spPr>
-        <p:style>
-          <a:lnRef idx="2">
-            <a:schemeClr val="accent1">
-              <a:shade val="50000"/>
-            </a:schemeClr>
-          </a:lnRef>
-          <a:fillRef idx="1">
-            <a:schemeClr val="accent1"/>
-          </a:fillRef>
-          <a:effectRef idx="0">
-            <a:schemeClr val="accent1"/>
-          </a:effectRef>
-          <a:fontRef idx="minor">
-            <a:schemeClr val="lt1"/>
-          </a:fontRef>
-        </p:style>
-        <p:txBody>
-          <a:bodyPr rtlCol="0" anchor="ctr"/>
-          <a:lstStyle/>
-          <a:p>
-            <a:pPr algn="ctr"/>
-            <a:endParaRPr lang="fr-FR"/>
-          </a:p>
-        </p:txBody>
-      </p:sp>
-      <p:sp>
-        <p:nvSpPr>
-          <p:cNvPr id="19" name="ZoneTexte 18"/>
-          <p:cNvSpPr txBox="1"/>
-          <p:nvPr/>
-        </p:nvSpPr>
-        <p:spPr>
-          <a:xfrm>
-            <a:off x="1883718" y="3589606"/>
-            <a:ext cx="2442535" cy="553998"/>
-          </a:xfrm>
-          <a:prstGeom prst="rect">
-            <a:avLst/>
-          </a:prstGeom>
-          <a:noFill/>
-          <a:ln>
-            <a:solidFill>
-              <a:schemeClr val="accent1"/>
-            </a:solidFill>
-          </a:ln>
-        </p:spPr>
-        <p:txBody>
-          <a:bodyPr wrap="square" rtlCol="0">
-            <a:spAutoFit/>
-          </a:bodyPr>
-          <a:lstStyle/>
-          <a:p>
-            <a:r>
-              <a:rPr lang="fr-FR" sz="3000" dirty="0" smtClean="0"/>
-              <a:t>Exemple</a:t>
-            </a:r>
-            <a:endParaRPr lang="fr-FR" sz="3000" dirty="0"/>
-          </a:p>
-        </p:txBody>
-      </p:sp>
-      <p:sp>
-        <p:nvSpPr>
-          <p:cNvPr id="20" name="Rectangle 19"/>
-          <p:cNvSpPr/>
-          <p:nvPr/>
-        </p:nvSpPr>
-        <p:spPr>
-          <a:xfrm>
-            <a:off x="1883720" y="4112900"/>
-            <a:ext cx="2385589" cy="477054"/>
-          </a:xfrm>
-          <a:prstGeom prst="rect">
-            <a:avLst/>
-          </a:prstGeom>
-        </p:spPr>
-        <p:txBody>
-          <a:bodyPr wrap="none">
-            <a:spAutoFit/>
-          </a:bodyPr>
-          <a:lstStyle/>
-          <a:p>
-            <a:r>
-              <a:rPr lang="fr-FR" sz="2500" dirty="0" smtClean="0"/>
-              <a:t>Récompenses</a:t>
-            </a:r>
-            <a:endParaRPr lang="fr-FR" sz="2500" dirty="0"/>
-          </a:p>
-        </p:txBody>
-      </p:sp>
-      <p:sp>
-        <p:nvSpPr>
-          <p:cNvPr id="21" name="Sous-titre 2"/>
-          <p:cNvSpPr txBox="1">
-            <a:spLocks/>
-          </p:cNvSpPr>
-          <p:nvPr/>
-        </p:nvSpPr>
-        <p:spPr>
-          <a:xfrm>
-            <a:off x="10371909" y="6488469"/>
-            <a:ext cx="1820091" cy="369531"/>
-          </a:xfrm>
-          <a:prstGeom prst="rect">
-            <a:avLst/>
-          </a:prstGeom>
-          <a:ln>
-            <a:solidFill>
-              <a:schemeClr val="tx1"/>
-            </a:solidFill>
-          </a:ln>
           <a:effectLst>
             <a:outerShdw blurRad="50800" dir="14400000">
               <a:srgbClr val="000000">
-                <a:alpha val="40000"/>
+                <a:alpha val="60000"/>
               </a:srgbClr>
             </a:outerShdw>
           </a:effectLst>
         </p:spPr>
         <p:txBody>
-          <a:bodyPr vert="horz" lIns="91440" tIns="45720" rIns="91440" bIns="45720" rtlCol="0" anchor="t">
-            <a:normAutofit/>
+          <a:bodyPr vert="horz" lIns="91440" tIns="45720" rIns="91440" bIns="45720" rtlCol="0" anchor="b">
+            <a:noAutofit/>
           </a:bodyPr>
           <a:lstStyle>
-            <a:lvl1pPr marL="0" indent="0" algn="l" defTabSz="457200" rtl="0" eaLnBrk="1" latinLnBrk="0" hangingPunct="1">
+            <a:lvl1pPr algn="l" defTabSz="457200" rtl="0" eaLnBrk="1" latinLnBrk="0" hangingPunct="1">
               <a:spcBef>
-                <a:spcPct val="20000"/>
+                <a:spcPct val="0"/>
               </a:spcBef>
-              <a:spcAft>
-                <a:spcPts val="600"/>
-              </a:spcAft>
-              <a:buClr>
-                <a:schemeClr val="accent1"/>
-              </a:buClr>
-              <a:buFont typeface="Wingdings 2" charset="2"/>
-              <a:buNone/>
-              <a:defRPr sz="1800" kern="1200">
+              <a:buNone/>
+              <a:defRPr sz="5400" b="1" kern="1200">
                 <a:solidFill>
-                  <a:schemeClr val="tx1"/>
+                  <a:srgbClr val="FEFEFE"/>
                 </a:solidFill>
-                <a:latin typeface="+mn-lt"/>
-                <a:ea typeface="+mn-ea"/>
-                <a:cs typeface="+mn-cs"/>
+                <a:latin typeface="+mj-lt"/>
+                <a:ea typeface="+mj-ea"/>
+                <a:cs typeface="+mj-cs"/>
               </a:defRPr>
             </a:lvl1pPr>
-            <a:lvl2pPr marL="457200" indent="0" algn="ctr" defTabSz="457200" rtl="0" eaLnBrk="1" latinLnBrk="0" hangingPunct="1">
-              <a:spcBef>
-                <a:spcPct val="20000"/>
-              </a:spcBef>
-              <a:spcAft>
-                <a:spcPts val="600"/>
-              </a:spcAft>
-              <a:buClr>
-                <a:schemeClr val="accent1"/>
-              </a:buClr>
-              <a:buFont typeface="Wingdings 2" charset="2"/>
-              <a:buNone/>
-              <a:defRPr sz="1600" kern="1200">
+            <a:lvl2pPr eaLnBrk="1" hangingPunct="1">
+              <a:defRPr>
                 <a:solidFill>
-                  <a:schemeClr val="tx1">
-                    <a:tint val="75000"/>
-                  </a:schemeClr>
+                  <a:schemeClr val="tx2"/>
                 </a:solidFill>
-                <a:latin typeface="+mn-lt"/>
-                <a:ea typeface="+mn-ea"/>
-                <a:cs typeface="+mn-cs"/>
               </a:defRPr>
             </a:lvl2pPr>
-            <a:lvl3pPr marL="914400" indent="0" algn="ctr" defTabSz="457200" rtl="0" eaLnBrk="1" latinLnBrk="0" hangingPunct="1">
-              <a:spcBef>
-                <a:spcPct val="20000"/>
-              </a:spcBef>
-              <a:spcAft>
-                <a:spcPts val="600"/>
-              </a:spcAft>
-              <a:buClr>
-                <a:schemeClr val="accent1"/>
-              </a:buClr>
-              <a:buFont typeface="Wingdings 2" charset="2"/>
-              <a:buNone/>
-              <a:defRPr sz="1400" kern="1200">
+            <a:lvl3pPr eaLnBrk="1" hangingPunct="1">
+              <a:defRPr>
                 <a:solidFill>
-                  <a:schemeClr val="tx1">
-                    <a:tint val="75000"/>
-                  </a:schemeClr>
+                  <a:schemeClr val="tx2"/>
                 </a:solidFill>
-                <a:latin typeface="+mn-lt"/>
-                <a:ea typeface="+mn-ea"/>
-                <a:cs typeface="+mn-cs"/>
               </a:defRPr>
             </a:lvl3pPr>
-            <a:lvl4pPr marL="1371600" indent="0" algn="ctr" defTabSz="457200" rtl="0" eaLnBrk="1" latinLnBrk="0" hangingPunct="1">
-              <a:spcBef>
-                <a:spcPct val="20000"/>
-              </a:spcBef>
-              <a:spcAft>
-                <a:spcPts val="600"/>
-              </a:spcAft>
-              <a:buClr>
-                <a:schemeClr val="accent1"/>
-              </a:buClr>
-              <a:buFont typeface="Wingdings 2" charset="2"/>
-              <a:buNone/>
-              <a:defRPr sz="1200" kern="1200">
+            <a:lvl4pPr eaLnBrk="1" hangingPunct="1">
+              <a:defRPr>
                 <a:solidFill>
-                  <a:schemeClr val="tx1">
-                    <a:tint val="75000"/>
-                  </a:schemeClr>
+                  <a:schemeClr val="tx2"/>
                 </a:solidFill>
-                <a:latin typeface="+mn-lt"/>
-                <a:ea typeface="+mn-ea"/>
-                <a:cs typeface="+mn-cs"/>
               </a:defRPr>
             </a:lvl4pPr>
-            <a:lvl5pPr marL="1828800" indent="0" algn="ctr" defTabSz="457200" rtl="0" eaLnBrk="1" latinLnBrk="0" hangingPunct="1">
-              <a:spcBef>
-                <a:spcPct val="20000"/>
-              </a:spcBef>
-              <a:spcAft>
-                <a:spcPts val="600"/>
-              </a:spcAft>
-              <a:buClr>
-                <a:schemeClr val="accent1"/>
-              </a:buClr>
-              <a:buFont typeface="Wingdings 2" charset="2"/>
-              <a:buNone/>
-              <a:defRPr sz="1200" kern="1200">
+            <a:lvl5pPr eaLnBrk="1" hangingPunct="1">
+              <a:defRPr>
                 <a:solidFill>
-                  <a:schemeClr val="tx1">
-                    <a:tint val="75000"/>
-                  </a:schemeClr>
+                  <a:schemeClr val="tx2"/>
                 </a:solidFill>
-                <a:latin typeface="+mn-lt"/>
-                <a:ea typeface="+mn-ea"/>
-                <a:cs typeface="+mn-cs"/>
               </a:defRPr>
             </a:lvl5pPr>
-            <a:lvl6pPr marL="2286000" indent="0" algn="ctr" defTabSz="457200" rtl="0" eaLnBrk="1" latinLnBrk="0" hangingPunct="1">
-              <a:spcBef>
-                <a:spcPct val="20000"/>
-              </a:spcBef>
-              <a:spcAft>
-                <a:spcPts val="600"/>
-              </a:spcAft>
-              <a:buClr>
-                <a:schemeClr val="accent1"/>
-              </a:buClr>
-              <a:buFont typeface="Wingdings 2" charset="2"/>
-              <a:buNone/>
-              <a:defRPr sz="1200" kern="1200">
+            <a:lvl6pPr eaLnBrk="1" hangingPunct="1">
+              <a:defRPr>
                 <a:solidFill>
-                  <a:schemeClr val="tx1">
-                    <a:tint val="75000"/>
-                  </a:schemeClr>
+                  <a:schemeClr val="tx2"/>
                 </a:solidFill>
-                <a:latin typeface="+mn-lt"/>
-                <a:ea typeface="+mn-ea"/>
-                <a:cs typeface="+mn-cs"/>
               </a:defRPr>
             </a:lvl6pPr>
-            <a:lvl7pPr marL="2743200" indent="0" algn="ctr" defTabSz="457200" rtl="0" eaLnBrk="1" latinLnBrk="0" hangingPunct="1">
-              <a:spcBef>
-                <a:spcPct val="20000"/>
-              </a:spcBef>
-              <a:spcAft>
-                <a:spcPts val="600"/>
-              </a:spcAft>
-              <a:buClr>
-                <a:schemeClr val="accent1"/>
-              </a:buClr>
-              <a:buFont typeface="Wingdings 2" charset="2"/>
-              <a:buNone/>
-              <a:defRPr sz="1200" kern="1200">
+            <a:lvl7pPr eaLnBrk="1" hangingPunct="1">
+              <a:defRPr>
                 <a:solidFill>
-                  <a:schemeClr val="tx1">
-                    <a:tint val="75000"/>
-                  </a:schemeClr>
+                  <a:schemeClr val="tx2"/>
                 </a:solidFill>
-                <a:latin typeface="+mn-lt"/>
-                <a:ea typeface="+mn-ea"/>
-                <a:cs typeface="+mn-cs"/>
               </a:defRPr>
             </a:lvl7pPr>
-            <a:lvl8pPr marL="3200400" indent="0" algn="ctr" defTabSz="457200" rtl="0" eaLnBrk="1" latinLnBrk="0" hangingPunct="1">
-              <a:spcBef>
-                <a:spcPct val="20000"/>
-              </a:spcBef>
-              <a:spcAft>
-                <a:spcPts val="600"/>
-              </a:spcAft>
-              <a:buClr>
-                <a:schemeClr val="accent1"/>
-              </a:buClr>
-              <a:buFont typeface="Wingdings 2" charset="2"/>
-              <a:buNone/>
-              <a:defRPr sz="1200" kern="1200">
+            <a:lvl8pPr eaLnBrk="1" hangingPunct="1">
+              <a:defRPr>
                 <a:solidFill>
-                  <a:schemeClr val="tx1">
-                    <a:tint val="75000"/>
-                  </a:schemeClr>
+                  <a:schemeClr val="tx2"/>
                 </a:solidFill>
-                <a:latin typeface="+mn-lt"/>
-                <a:ea typeface="+mn-ea"/>
-                <a:cs typeface="+mn-cs"/>
               </a:defRPr>
             </a:lvl8pPr>
-            <a:lvl9pPr marL="3657600" indent="0" algn="ctr" defTabSz="457200" rtl="0" eaLnBrk="1" latinLnBrk="0" hangingPunct="1">
-              <a:spcBef>
-                <a:spcPct val="20000"/>
-              </a:spcBef>
-              <a:spcAft>
-                <a:spcPts val="600"/>
-              </a:spcAft>
-              <a:buClr>
-                <a:schemeClr val="accent1"/>
-              </a:buClr>
-              <a:buFont typeface="Wingdings 2" charset="2"/>
-              <a:buNone/>
-              <a:defRPr sz="1200" kern="1200">
+            <a:lvl9pPr eaLnBrk="1" hangingPunct="1">
+              <a:defRPr>
                 <a:solidFill>
-                  <a:schemeClr val="tx1">
-                    <a:tint val="75000"/>
-                  </a:schemeClr>
+                  <a:schemeClr val="tx2"/>
                 </a:solidFill>
-                <a:latin typeface="+mn-lt"/>
-                <a:ea typeface="+mn-ea"/>
-                <a:cs typeface="+mn-cs"/>
               </a:defRPr>
             </a:lvl9pPr>
           </a:lstStyle>
           <a:p>
             <a:r>
-              <a:rPr lang="fr-FR" dirty="0" smtClean="0"/>
-              <a:t>IN104 – Page 2</a:t>
-            </a:r>
-            <a:endParaRPr lang="fr-FR" dirty="0"/>
+              <a:rPr lang="fr-FR" sz="6000" dirty="0" smtClean="0"/>
+              <a:t>Sommaire</a:t>
+            </a:r>
+            <a:endParaRPr lang="fr-FR" sz="6000" dirty="0"/>
           </a:p>
         </p:txBody>
       </p:sp>
     </p:spTree>
     <p:extLst>
       <p:ext uri="{BB962C8B-B14F-4D97-AF65-F5344CB8AC3E}">
-        <p14:creationId xmlns:p14="http://schemas.microsoft.com/office/powerpoint/2010/main" val="2402268947"/>
+        <p14:creationId xmlns:p14="http://schemas.microsoft.com/office/powerpoint/2010/main" val="3587894767"/>
       </p:ext>
     </p:extLst>
   </p:cSld>
@@ -6735,12 +6402,12 @@
         </p:nvSpPr>
         <p:spPr>
           <a:xfrm>
-            <a:off x="0" y="322217"/>
-            <a:ext cx="12192000" cy="896984"/>
+            <a:off x="0" y="351394"/>
+            <a:ext cx="12192000" cy="970450"/>
           </a:xfrm>
           <a:ln>
             <a:solidFill>
-              <a:schemeClr val="accent2"/>
+              <a:srgbClr val="00B050"/>
             </a:solidFill>
           </a:ln>
         </p:spPr>
@@ -6749,285 +6416,584 @@
           <a:lstStyle/>
           <a:p>
             <a:r>
+              <a:rPr lang="fr-FR" sz="5400" dirty="0" smtClean="0">
+                <a:solidFill>
+                  <a:schemeClr val="accent6"/>
+                </a:solidFill>
+              </a:rPr>
+              <a:t>I. </a:t>
+            </a:r>
+            <a:r>
               <a:rPr lang="fr-FR" sz="5400" dirty="0" smtClean="0"/>
-              <a:t>Solution : architecture et design</a:t>
+              <a:t>Contexte </a:t>
+            </a:r>
+            <a:r>
+              <a:rPr lang="fr-FR" sz="5400" dirty="0" smtClean="0"/>
+              <a:t>et Problématique</a:t>
             </a:r>
             <a:endParaRPr lang="fr-FR" sz="5400" dirty="0"/>
           </a:p>
         </p:txBody>
       </p:sp>
-      <p:sp>
-        <p:nvSpPr>
-          <p:cNvPr id="3" name="Espace réservé du contenu 2"/>
-          <p:cNvSpPr>
-            <a:spLocks noGrp="1"/>
-          </p:cNvSpPr>
+      <p:pic>
+        <p:nvPicPr>
+          <p:cNvPr id="4" name="Espace réservé du contenu 3"/>
+          <p:cNvPicPr>
+            <a:picLocks noGrp="1" noChangeAspect="1"/>
+          </p:cNvPicPr>
           <p:nvPr>
             <p:ph idx="1"/>
           </p:nvPr>
-        </p:nvSpPr>
-        <p:spPr/>
-        <p:txBody>
-          <a:bodyPr/>
-          <a:lstStyle/>
-          <a:p>
-            <a:endParaRPr lang="fr-FR"/>
-          </a:p>
-        </p:txBody>
-      </p:sp>
-      <p:sp>
-        <p:nvSpPr>
-          <p:cNvPr id="5" name="Sous-titre 2"/>
-          <p:cNvSpPr txBox="1">
-            <a:spLocks/>
-          </p:cNvSpPr>
+        </p:nvPicPr>
+        <p:blipFill>
+          <a:blip r:embed="rId2">
+            <a:extLst>
+              <a:ext uri="{28A0092B-C50C-407E-A947-70E740481C1C}">
+                <a14:useLocalDpi xmlns:a14="http://schemas.microsoft.com/office/drawing/2010/main" val="0"/>
+              </a:ext>
+            </a:extLst>
+          </a:blip>
+          <a:stretch>
+            <a:fillRect/>
+          </a:stretch>
+        </p:blipFill>
+        <p:spPr>
+          <a:xfrm>
+            <a:off x="5764394" y="3589606"/>
+            <a:ext cx="3132091" cy="3193057"/>
+          </a:xfrm>
+        </p:spPr>
+      </p:pic>
+      <p:sp>
+        <p:nvSpPr>
+          <p:cNvPr id="5" name="ZoneTexte 4"/>
+          <p:cNvSpPr txBox="1"/>
           <p:nvPr/>
         </p:nvSpPr>
         <p:spPr>
           <a:xfrm>
-            <a:off x="10371909" y="6488469"/>
-            <a:ext cx="1820091" cy="369531"/>
+            <a:off x="0" y="2798058"/>
+            <a:ext cx="12192000" cy="630942"/>
           </a:xfrm>
           <a:prstGeom prst="rect">
             <a:avLst/>
           </a:prstGeom>
+          <a:noFill/>
           <a:ln>
             <a:solidFill>
-              <a:schemeClr val="tx1"/>
+              <a:srgbClr val="0070C0"/>
             </a:solidFill>
           </a:ln>
-          <a:effectLst>
-            <a:outerShdw blurRad="50800" dir="14400000">
-              <a:srgbClr val="000000">
-                <a:alpha val="40000"/>
-              </a:srgbClr>
-            </a:outerShdw>
-          </a:effectLst>
-        </p:spPr>
-        <p:txBody>
-          <a:bodyPr vert="horz" lIns="91440" tIns="45720" rIns="91440" bIns="45720" rtlCol="0" anchor="t">
-            <a:normAutofit/>
+        </p:spPr>
+        <p:txBody>
+          <a:bodyPr wrap="square" rtlCol="0">
+            <a:spAutoFit/>
           </a:bodyPr>
-          <a:lstStyle>
-            <a:lvl1pPr marL="0" indent="0" algn="l" defTabSz="457200" rtl="0" eaLnBrk="1" latinLnBrk="0" hangingPunct="1">
-              <a:spcBef>
-                <a:spcPct val="20000"/>
-              </a:spcBef>
-              <a:spcAft>
-                <a:spcPts val="600"/>
-              </a:spcAft>
-              <a:buClr>
-                <a:schemeClr val="accent1"/>
-              </a:buClr>
-              <a:buFont typeface="Wingdings 2" charset="2"/>
-              <a:buNone/>
-              <a:defRPr sz="1800" kern="1200">
-                <a:solidFill>
-                  <a:schemeClr val="tx1"/>
-                </a:solidFill>
-                <a:latin typeface="+mn-lt"/>
-                <a:ea typeface="+mn-ea"/>
-                <a:cs typeface="+mn-cs"/>
-              </a:defRPr>
-            </a:lvl1pPr>
-            <a:lvl2pPr marL="457200" indent="0" algn="ctr" defTabSz="457200" rtl="0" eaLnBrk="1" latinLnBrk="0" hangingPunct="1">
-              <a:spcBef>
-                <a:spcPct val="20000"/>
-              </a:spcBef>
-              <a:spcAft>
-                <a:spcPts val="600"/>
-              </a:spcAft>
-              <a:buClr>
-                <a:schemeClr val="accent1"/>
-              </a:buClr>
-              <a:buFont typeface="Wingdings 2" charset="2"/>
-              <a:buNone/>
-              <a:defRPr sz="1600" kern="1200">
-                <a:solidFill>
-                  <a:schemeClr val="tx1">
-                    <a:tint val="75000"/>
-                  </a:schemeClr>
-                </a:solidFill>
-                <a:latin typeface="+mn-lt"/>
-                <a:ea typeface="+mn-ea"/>
-                <a:cs typeface="+mn-cs"/>
-              </a:defRPr>
-            </a:lvl2pPr>
-            <a:lvl3pPr marL="914400" indent="0" algn="ctr" defTabSz="457200" rtl="0" eaLnBrk="1" latinLnBrk="0" hangingPunct="1">
-              <a:spcBef>
-                <a:spcPct val="20000"/>
-              </a:spcBef>
-              <a:spcAft>
-                <a:spcPts val="600"/>
-              </a:spcAft>
-              <a:buClr>
-                <a:schemeClr val="accent1"/>
-              </a:buClr>
-              <a:buFont typeface="Wingdings 2" charset="2"/>
-              <a:buNone/>
-              <a:defRPr sz="1400" kern="1200">
-                <a:solidFill>
-                  <a:schemeClr val="tx1">
-                    <a:tint val="75000"/>
-                  </a:schemeClr>
-                </a:solidFill>
-                <a:latin typeface="+mn-lt"/>
-                <a:ea typeface="+mn-ea"/>
-                <a:cs typeface="+mn-cs"/>
-              </a:defRPr>
-            </a:lvl3pPr>
-            <a:lvl4pPr marL="1371600" indent="0" algn="ctr" defTabSz="457200" rtl="0" eaLnBrk="1" latinLnBrk="0" hangingPunct="1">
-              <a:spcBef>
-                <a:spcPct val="20000"/>
-              </a:spcBef>
-              <a:spcAft>
-                <a:spcPts val="600"/>
-              </a:spcAft>
-              <a:buClr>
-                <a:schemeClr val="accent1"/>
-              </a:buClr>
-              <a:buFont typeface="Wingdings 2" charset="2"/>
-              <a:buNone/>
-              <a:defRPr sz="1200" kern="1200">
-                <a:solidFill>
-                  <a:schemeClr val="tx1">
-                    <a:tint val="75000"/>
-                  </a:schemeClr>
-                </a:solidFill>
-                <a:latin typeface="+mn-lt"/>
-                <a:ea typeface="+mn-ea"/>
-                <a:cs typeface="+mn-cs"/>
-              </a:defRPr>
-            </a:lvl4pPr>
-            <a:lvl5pPr marL="1828800" indent="0" algn="ctr" defTabSz="457200" rtl="0" eaLnBrk="1" latinLnBrk="0" hangingPunct="1">
-              <a:spcBef>
-                <a:spcPct val="20000"/>
-              </a:spcBef>
-              <a:spcAft>
-                <a:spcPts val="600"/>
-              </a:spcAft>
-              <a:buClr>
-                <a:schemeClr val="accent1"/>
-              </a:buClr>
-              <a:buFont typeface="Wingdings 2" charset="2"/>
-              <a:buNone/>
-              <a:defRPr sz="1200" kern="1200">
-                <a:solidFill>
-                  <a:schemeClr val="tx1">
-                    <a:tint val="75000"/>
-                  </a:schemeClr>
-                </a:solidFill>
-                <a:latin typeface="+mn-lt"/>
-                <a:ea typeface="+mn-ea"/>
-                <a:cs typeface="+mn-cs"/>
-              </a:defRPr>
-            </a:lvl5pPr>
-            <a:lvl6pPr marL="2286000" indent="0" algn="ctr" defTabSz="457200" rtl="0" eaLnBrk="1" latinLnBrk="0" hangingPunct="1">
-              <a:spcBef>
-                <a:spcPct val="20000"/>
-              </a:spcBef>
-              <a:spcAft>
-                <a:spcPts val="600"/>
-              </a:spcAft>
-              <a:buClr>
-                <a:schemeClr val="accent1"/>
-              </a:buClr>
-              <a:buFont typeface="Wingdings 2" charset="2"/>
-              <a:buNone/>
-              <a:defRPr sz="1200" kern="1200">
-                <a:solidFill>
-                  <a:schemeClr val="tx1">
-                    <a:tint val="75000"/>
-                  </a:schemeClr>
-                </a:solidFill>
-                <a:latin typeface="+mn-lt"/>
-                <a:ea typeface="+mn-ea"/>
-                <a:cs typeface="+mn-cs"/>
-              </a:defRPr>
-            </a:lvl6pPr>
-            <a:lvl7pPr marL="2743200" indent="0" algn="ctr" defTabSz="457200" rtl="0" eaLnBrk="1" latinLnBrk="0" hangingPunct="1">
-              <a:spcBef>
-                <a:spcPct val="20000"/>
-              </a:spcBef>
-              <a:spcAft>
-                <a:spcPts val="600"/>
-              </a:spcAft>
-              <a:buClr>
-                <a:schemeClr val="accent1"/>
-              </a:buClr>
-              <a:buFont typeface="Wingdings 2" charset="2"/>
-              <a:buNone/>
-              <a:defRPr sz="1200" kern="1200">
-                <a:solidFill>
-                  <a:schemeClr val="tx1">
-                    <a:tint val="75000"/>
-                  </a:schemeClr>
-                </a:solidFill>
-                <a:latin typeface="+mn-lt"/>
-                <a:ea typeface="+mn-ea"/>
-                <a:cs typeface="+mn-cs"/>
-              </a:defRPr>
-            </a:lvl7pPr>
-            <a:lvl8pPr marL="3200400" indent="0" algn="ctr" defTabSz="457200" rtl="0" eaLnBrk="1" latinLnBrk="0" hangingPunct="1">
-              <a:spcBef>
-                <a:spcPct val="20000"/>
-              </a:spcBef>
-              <a:spcAft>
-                <a:spcPts val="600"/>
-              </a:spcAft>
-              <a:buClr>
-                <a:schemeClr val="accent1"/>
-              </a:buClr>
-              <a:buFont typeface="Wingdings 2" charset="2"/>
-              <a:buNone/>
-              <a:defRPr sz="1200" kern="1200">
-                <a:solidFill>
-                  <a:schemeClr val="tx1">
-                    <a:tint val="75000"/>
-                  </a:schemeClr>
-                </a:solidFill>
-                <a:latin typeface="+mn-lt"/>
-                <a:ea typeface="+mn-ea"/>
-                <a:cs typeface="+mn-cs"/>
-              </a:defRPr>
-            </a:lvl8pPr>
-            <a:lvl9pPr marL="3657600" indent="0" algn="ctr" defTabSz="457200" rtl="0" eaLnBrk="1" latinLnBrk="0" hangingPunct="1">
-              <a:spcBef>
-                <a:spcPct val="20000"/>
-              </a:spcBef>
-              <a:spcAft>
-                <a:spcPts val="600"/>
-              </a:spcAft>
-              <a:buClr>
-                <a:schemeClr val="accent1"/>
-              </a:buClr>
-              <a:buFont typeface="Wingdings 2" charset="2"/>
-              <a:buNone/>
-              <a:defRPr sz="1200" kern="1200">
-                <a:solidFill>
-                  <a:schemeClr val="tx1">
-                    <a:tint val="75000"/>
-                  </a:schemeClr>
-                </a:solidFill>
-                <a:latin typeface="+mn-lt"/>
-                <a:ea typeface="+mn-ea"/>
-                <a:cs typeface="+mn-cs"/>
-              </a:defRPr>
-            </a:lvl9pPr>
-          </a:lstStyle>
-          <a:p>
-            <a:r>
-              <a:rPr lang="fr-FR" dirty="0" smtClean="0"/>
-              <a:t>IN104 – Page 3</a:t>
-            </a:r>
-            <a:endParaRPr lang="fr-FR" dirty="0"/>
+          <a:lstStyle/>
+          <a:p>
+            <a:r>
+              <a:rPr lang="fr-FR" sz="3500" dirty="0" smtClean="0"/>
+              <a:t>Trouver le chemin optimal pour résoudre le labyrinthe</a:t>
+            </a:r>
+            <a:endParaRPr lang="fr-FR" sz="3500" dirty="0"/>
+          </a:p>
+        </p:txBody>
+      </p:sp>
+      <p:sp>
+        <p:nvSpPr>
+          <p:cNvPr id="7" name="Ellipse 6"/>
+          <p:cNvSpPr/>
+          <p:nvPr/>
+        </p:nvSpPr>
+        <p:spPr>
+          <a:xfrm>
+            <a:off x="6491745" y="5494919"/>
+            <a:ext cx="191588" cy="182880"/>
+          </a:xfrm>
+          <a:prstGeom prst="ellipse">
+            <a:avLst/>
+          </a:prstGeom>
+        </p:spPr>
+        <p:style>
+          <a:lnRef idx="2">
+            <a:schemeClr val="accent1">
+              <a:shade val="50000"/>
+            </a:schemeClr>
+          </a:lnRef>
+          <a:fillRef idx="1">
+            <a:schemeClr val="accent1"/>
+          </a:fillRef>
+          <a:effectRef idx="0">
+            <a:schemeClr val="accent1"/>
+          </a:effectRef>
+          <a:fontRef idx="minor">
+            <a:schemeClr val="lt1"/>
+          </a:fontRef>
+        </p:style>
+        <p:txBody>
+          <a:bodyPr rtlCol="0" anchor="ctr"/>
+          <a:lstStyle/>
+          <a:p>
+            <a:pPr algn="ctr"/>
+            <a:endParaRPr lang="fr-FR"/>
+          </a:p>
+        </p:txBody>
+      </p:sp>
+      <p:sp>
+        <p:nvSpPr>
+          <p:cNvPr id="8" name="Ellipse 7"/>
+          <p:cNvSpPr/>
+          <p:nvPr/>
+        </p:nvSpPr>
+        <p:spPr>
+          <a:xfrm>
+            <a:off x="6373685" y="6190207"/>
+            <a:ext cx="191588" cy="182880"/>
+          </a:xfrm>
+          <a:prstGeom prst="ellipse">
+            <a:avLst/>
+          </a:prstGeom>
+        </p:spPr>
+        <p:style>
+          <a:lnRef idx="2">
+            <a:schemeClr val="accent1">
+              <a:shade val="50000"/>
+            </a:schemeClr>
+          </a:lnRef>
+          <a:fillRef idx="1">
+            <a:schemeClr val="accent1"/>
+          </a:fillRef>
+          <a:effectRef idx="0">
+            <a:schemeClr val="accent1"/>
+          </a:effectRef>
+          <a:fontRef idx="minor">
+            <a:schemeClr val="lt1"/>
+          </a:fontRef>
+        </p:style>
+        <p:txBody>
+          <a:bodyPr rtlCol="0" anchor="ctr"/>
+          <a:lstStyle/>
+          <a:p>
+            <a:pPr algn="ctr"/>
+            <a:endParaRPr lang="fr-FR"/>
+          </a:p>
+        </p:txBody>
+      </p:sp>
+      <p:sp>
+        <p:nvSpPr>
+          <p:cNvPr id="9" name="Ellipse 8"/>
+          <p:cNvSpPr/>
+          <p:nvPr/>
+        </p:nvSpPr>
+        <p:spPr>
+          <a:xfrm>
+            <a:off x="7383053" y="4112900"/>
+            <a:ext cx="191588" cy="182880"/>
+          </a:xfrm>
+          <a:prstGeom prst="ellipse">
+            <a:avLst/>
+          </a:prstGeom>
+        </p:spPr>
+        <p:style>
+          <a:lnRef idx="2">
+            <a:schemeClr val="accent1">
+              <a:shade val="50000"/>
+            </a:schemeClr>
+          </a:lnRef>
+          <a:fillRef idx="1">
+            <a:schemeClr val="accent1"/>
+          </a:fillRef>
+          <a:effectRef idx="0">
+            <a:schemeClr val="accent1"/>
+          </a:effectRef>
+          <a:fontRef idx="minor">
+            <a:schemeClr val="lt1"/>
+          </a:fontRef>
+        </p:style>
+        <p:txBody>
+          <a:bodyPr rtlCol="0" anchor="ctr"/>
+          <a:lstStyle/>
+          <a:p>
+            <a:pPr algn="ctr"/>
+            <a:endParaRPr lang="fr-FR"/>
+          </a:p>
+        </p:txBody>
+      </p:sp>
+      <p:sp>
+        <p:nvSpPr>
+          <p:cNvPr id="10" name="Ellipse 9"/>
+          <p:cNvSpPr/>
+          <p:nvPr/>
+        </p:nvSpPr>
+        <p:spPr>
+          <a:xfrm>
+            <a:off x="7840068" y="6175580"/>
+            <a:ext cx="191588" cy="182880"/>
+          </a:xfrm>
+          <a:prstGeom prst="ellipse">
+            <a:avLst/>
+          </a:prstGeom>
+        </p:spPr>
+        <p:style>
+          <a:lnRef idx="2">
+            <a:schemeClr val="accent1">
+              <a:shade val="50000"/>
+            </a:schemeClr>
+          </a:lnRef>
+          <a:fillRef idx="1">
+            <a:schemeClr val="accent1"/>
+          </a:fillRef>
+          <a:effectRef idx="0">
+            <a:schemeClr val="accent1"/>
+          </a:effectRef>
+          <a:fontRef idx="minor">
+            <a:schemeClr val="lt1"/>
+          </a:fontRef>
+        </p:style>
+        <p:txBody>
+          <a:bodyPr rtlCol="0" anchor="ctr"/>
+          <a:lstStyle/>
+          <a:p>
+            <a:pPr algn="ctr"/>
+            <a:endParaRPr lang="fr-FR"/>
+          </a:p>
+        </p:txBody>
+      </p:sp>
+      <p:sp>
+        <p:nvSpPr>
+          <p:cNvPr id="11" name="Ellipse 10"/>
+          <p:cNvSpPr/>
+          <p:nvPr/>
+        </p:nvSpPr>
+        <p:spPr>
+          <a:xfrm>
+            <a:off x="8352331" y="4826752"/>
+            <a:ext cx="191588" cy="182880"/>
+          </a:xfrm>
+          <a:prstGeom prst="ellipse">
+            <a:avLst/>
+          </a:prstGeom>
+        </p:spPr>
+        <p:style>
+          <a:lnRef idx="2">
+            <a:schemeClr val="accent1">
+              <a:shade val="50000"/>
+            </a:schemeClr>
+          </a:lnRef>
+          <a:fillRef idx="1">
+            <a:schemeClr val="accent1"/>
+          </a:fillRef>
+          <a:effectRef idx="0">
+            <a:schemeClr val="accent1"/>
+          </a:effectRef>
+          <a:fontRef idx="minor">
+            <a:schemeClr val="lt1"/>
+          </a:fontRef>
+        </p:style>
+        <p:txBody>
+          <a:bodyPr rtlCol="0" anchor="ctr"/>
+          <a:lstStyle/>
+          <a:p>
+            <a:pPr algn="ctr"/>
+            <a:endParaRPr lang="fr-FR"/>
+          </a:p>
+        </p:txBody>
+      </p:sp>
+      <p:sp>
+        <p:nvSpPr>
+          <p:cNvPr id="12" name="Ellipse 11"/>
+          <p:cNvSpPr/>
+          <p:nvPr/>
+        </p:nvSpPr>
+        <p:spPr>
+          <a:xfrm>
+            <a:off x="2488429" y="5452762"/>
+            <a:ext cx="353598" cy="322214"/>
+          </a:xfrm>
+          <a:prstGeom prst="ellipse">
+            <a:avLst/>
+          </a:prstGeom>
+        </p:spPr>
+        <p:style>
+          <a:lnRef idx="2">
+            <a:schemeClr val="accent1">
+              <a:shade val="50000"/>
+            </a:schemeClr>
+          </a:lnRef>
+          <a:fillRef idx="1">
+            <a:schemeClr val="accent1"/>
+          </a:fillRef>
+          <a:effectRef idx="0">
+            <a:schemeClr val="accent1"/>
+          </a:effectRef>
+          <a:fontRef idx="minor">
+            <a:schemeClr val="lt1"/>
+          </a:fontRef>
+        </p:style>
+        <p:txBody>
+          <a:bodyPr rtlCol="0" anchor="ctr"/>
+          <a:lstStyle/>
+          <a:p>
+            <a:pPr algn="ctr"/>
+            <a:endParaRPr lang="fr-FR"/>
+          </a:p>
+        </p:txBody>
+      </p:sp>
+      <p:sp>
+        <p:nvSpPr>
+          <p:cNvPr id="14" name="ZoneTexte 13"/>
+          <p:cNvSpPr txBox="1"/>
+          <p:nvPr/>
+        </p:nvSpPr>
+        <p:spPr>
+          <a:xfrm>
+            <a:off x="3088475" y="5319695"/>
+            <a:ext cx="1372492" cy="477054"/>
+          </a:xfrm>
+          <a:prstGeom prst="rect">
+            <a:avLst/>
+          </a:prstGeom>
+          <a:noFill/>
+        </p:spPr>
+        <p:txBody>
+          <a:bodyPr wrap="none" rtlCol="0">
+            <a:spAutoFit/>
+          </a:bodyPr>
+          <a:lstStyle/>
+          <a:p>
+            <a:r>
+              <a:rPr lang="fr-FR" sz="2500" dirty="0" smtClean="0"/>
+              <a:t>5 points</a:t>
+            </a:r>
+            <a:endParaRPr lang="fr-FR" sz="2500" dirty="0"/>
+          </a:p>
+        </p:txBody>
+      </p:sp>
+      <p:sp>
+        <p:nvSpPr>
+          <p:cNvPr id="15" name="Ellipse 14"/>
+          <p:cNvSpPr/>
+          <p:nvPr/>
+        </p:nvSpPr>
+        <p:spPr>
+          <a:xfrm>
+            <a:off x="2488429" y="5820954"/>
+            <a:ext cx="353598" cy="320435"/>
+          </a:xfrm>
+          <a:prstGeom prst="ellipse">
+            <a:avLst/>
+          </a:prstGeom>
+          <a:solidFill>
+            <a:schemeClr val="accent6"/>
+          </a:solidFill>
+        </p:spPr>
+        <p:style>
+          <a:lnRef idx="2">
+            <a:schemeClr val="accent1">
+              <a:shade val="50000"/>
+            </a:schemeClr>
+          </a:lnRef>
+          <a:fillRef idx="1">
+            <a:schemeClr val="accent1"/>
+          </a:fillRef>
+          <a:effectRef idx="0">
+            <a:schemeClr val="accent1"/>
+          </a:effectRef>
+          <a:fontRef idx="minor">
+            <a:schemeClr val="lt1"/>
+          </a:fontRef>
+        </p:style>
+        <p:txBody>
+          <a:bodyPr rtlCol="0" anchor="ctr"/>
+          <a:lstStyle/>
+          <a:p>
+            <a:pPr algn="ctr"/>
+            <a:endParaRPr lang="fr-FR"/>
+          </a:p>
+        </p:txBody>
+      </p:sp>
+      <p:sp>
+        <p:nvSpPr>
+          <p:cNvPr id="16" name="Ellipse 15"/>
+          <p:cNvSpPr/>
+          <p:nvPr/>
+        </p:nvSpPr>
+        <p:spPr>
+          <a:xfrm>
+            <a:off x="7591548" y="6305589"/>
+            <a:ext cx="191588" cy="182880"/>
+          </a:xfrm>
+          <a:prstGeom prst="ellipse">
+            <a:avLst/>
+          </a:prstGeom>
+          <a:solidFill>
+            <a:schemeClr val="accent6"/>
+          </a:solidFill>
+        </p:spPr>
+        <p:style>
+          <a:lnRef idx="2">
+            <a:schemeClr val="accent1">
+              <a:shade val="50000"/>
+            </a:schemeClr>
+          </a:lnRef>
+          <a:fillRef idx="1">
+            <a:schemeClr val="accent1"/>
+          </a:fillRef>
+          <a:effectRef idx="0">
+            <a:schemeClr val="accent1"/>
+          </a:effectRef>
+          <a:fontRef idx="minor">
+            <a:schemeClr val="lt1"/>
+          </a:fontRef>
+        </p:style>
+        <p:txBody>
+          <a:bodyPr rtlCol="0" anchor="ctr"/>
+          <a:lstStyle/>
+          <a:p>
+            <a:pPr algn="ctr"/>
+            <a:endParaRPr lang="fr-FR"/>
+          </a:p>
+        </p:txBody>
+      </p:sp>
+      <p:sp>
+        <p:nvSpPr>
+          <p:cNvPr id="17" name="ZoneTexte 16"/>
+          <p:cNvSpPr txBox="1"/>
+          <p:nvPr/>
+        </p:nvSpPr>
+        <p:spPr>
+          <a:xfrm>
+            <a:off x="2910542" y="5734274"/>
+            <a:ext cx="1728358" cy="477054"/>
+          </a:xfrm>
+          <a:prstGeom prst="rect">
+            <a:avLst/>
+          </a:prstGeom>
+          <a:noFill/>
+        </p:spPr>
+        <p:txBody>
+          <a:bodyPr wrap="none" rtlCol="0">
+            <a:spAutoFit/>
+          </a:bodyPr>
+          <a:lstStyle/>
+          <a:p>
+            <a:r>
+              <a:rPr lang="fr-FR" sz="2500" dirty="0" smtClean="0"/>
+              <a:t>500 points</a:t>
+            </a:r>
+            <a:endParaRPr lang="fr-FR" sz="2500" dirty="0"/>
+          </a:p>
+        </p:txBody>
+      </p:sp>
+      <p:sp>
+        <p:nvSpPr>
+          <p:cNvPr id="18" name="Rectangle 17"/>
+          <p:cNvSpPr/>
+          <p:nvPr/>
+        </p:nvSpPr>
+        <p:spPr>
+          <a:xfrm>
+            <a:off x="2329974" y="4666898"/>
+            <a:ext cx="2442535" cy="1635870"/>
+          </a:xfrm>
+          <a:prstGeom prst="rect">
+            <a:avLst/>
+          </a:prstGeom>
+          <a:noFill/>
+        </p:spPr>
+        <p:style>
+          <a:lnRef idx="2">
+            <a:schemeClr val="accent1">
+              <a:shade val="50000"/>
+            </a:schemeClr>
+          </a:lnRef>
+          <a:fillRef idx="1">
+            <a:schemeClr val="accent1"/>
+          </a:fillRef>
+          <a:effectRef idx="0">
+            <a:schemeClr val="accent1"/>
+          </a:effectRef>
+          <a:fontRef idx="minor">
+            <a:schemeClr val="lt1"/>
+          </a:fontRef>
+        </p:style>
+        <p:txBody>
+          <a:bodyPr rtlCol="0" anchor="ctr"/>
+          <a:lstStyle/>
+          <a:p>
+            <a:pPr algn="ctr"/>
+            <a:endParaRPr lang="fr-FR"/>
+          </a:p>
+        </p:txBody>
+      </p:sp>
+      <p:sp>
+        <p:nvSpPr>
+          <p:cNvPr id="19" name="ZoneTexte 18"/>
+          <p:cNvSpPr txBox="1"/>
+          <p:nvPr/>
+        </p:nvSpPr>
+        <p:spPr>
+          <a:xfrm>
+            <a:off x="2329973" y="4112900"/>
+            <a:ext cx="2442535" cy="553998"/>
+          </a:xfrm>
+          <a:prstGeom prst="rect">
+            <a:avLst/>
+          </a:prstGeom>
+          <a:noFill/>
+          <a:ln>
+            <a:solidFill>
+              <a:schemeClr val="accent1"/>
+            </a:solidFill>
+          </a:ln>
+        </p:spPr>
+        <p:txBody>
+          <a:bodyPr wrap="square" rtlCol="0">
+            <a:spAutoFit/>
+          </a:bodyPr>
+          <a:lstStyle/>
+          <a:p>
+            <a:r>
+              <a:rPr lang="fr-FR" sz="3000" dirty="0" smtClean="0"/>
+              <a:t>Exemple</a:t>
+            </a:r>
+            <a:endParaRPr lang="fr-FR" sz="3000" dirty="0"/>
+          </a:p>
+        </p:txBody>
+      </p:sp>
+      <p:sp>
+        <p:nvSpPr>
+          <p:cNvPr id="20" name="Rectangle 19"/>
+          <p:cNvSpPr/>
+          <p:nvPr/>
+        </p:nvSpPr>
+        <p:spPr>
+          <a:xfrm>
+            <a:off x="2329975" y="4636194"/>
+            <a:ext cx="2385589" cy="477054"/>
+          </a:xfrm>
+          <a:prstGeom prst="rect">
+            <a:avLst/>
+          </a:prstGeom>
+        </p:spPr>
+        <p:txBody>
+          <a:bodyPr wrap="none">
+            <a:spAutoFit/>
+          </a:bodyPr>
+          <a:lstStyle/>
+          <a:p>
+            <a:r>
+              <a:rPr lang="fr-FR" sz="2500" dirty="0" smtClean="0"/>
+              <a:t>Récompenses</a:t>
+            </a:r>
+            <a:endParaRPr lang="fr-FR" sz="2500" dirty="0"/>
           </a:p>
         </p:txBody>
       </p:sp>
     </p:spTree>
     <p:extLst>
       <p:ext uri="{BB962C8B-B14F-4D97-AF65-F5344CB8AC3E}">
-        <p14:creationId xmlns:p14="http://schemas.microsoft.com/office/powerpoint/2010/main" val="3387067908"/>
+        <p14:creationId xmlns:p14="http://schemas.microsoft.com/office/powerpoint/2010/main" val="2402268947"/>
       </p:ext>
     </p:extLst>
   </p:cSld>
@@ -7073,12 +7039,12 @@
         </p:nvSpPr>
         <p:spPr>
           <a:xfrm>
-            <a:off x="0" y="447188"/>
-            <a:ext cx="12192000" cy="970450"/>
+            <a:off x="0" y="322217"/>
+            <a:ext cx="12192000" cy="896984"/>
           </a:xfrm>
           <a:ln>
             <a:solidFill>
-              <a:schemeClr val="accent2"/>
+              <a:srgbClr val="00B050"/>
             </a:solidFill>
           </a:ln>
         </p:spPr>
@@ -7087,8 +7053,28 @@
           <a:lstStyle/>
           <a:p>
             <a:r>
+              <a:rPr lang="fr-FR" sz="5400" dirty="0" smtClean="0">
+                <a:solidFill>
+                  <a:schemeClr val="accent6"/>
+                </a:solidFill>
+              </a:rPr>
+              <a:t>II</a:t>
+            </a:r>
+            <a:r>
+              <a:rPr lang="fr-FR" sz="5400" dirty="0">
+                <a:solidFill>
+                  <a:schemeClr val="accent6"/>
+                </a:solidFill>
+              </a:rPr>
+              <a:t>. </a:t>
+            </a:r>
+            <a:r>
               <a:rPr lang="fr-FR" sz="5400" dirty="0" smtClean="0"/>
-              <a:t>Solution : architecture et design</a:t>
+              <a:t>Solution </a:t>
+            </a:r>
+            <a:r>
+              <a:rPr lang="fr-FR" sz="5400" dirty="0" smtClean="0"/>
+              <a:t>: architecture et design</a:t>
             </a:r>
             <a:endParaRPr lang="fr-FR" sz="5400" dirty="0"/>
           </a:p>
@@ -7096,276 +7082,349 @@
       </p:sp>
       <p:sp>
         <p:nvSpPr>
-          <p:cNvPr id="3" name="Espace réservé du contenu 2"/>
-          <p:cNvSpPr>
-            <a:spLocks noGrp="1"/>
-          </p:cNvSpPr>
-          <p:nvPr>
-            <p:ph idx="1"/>
-          </p:nvPr>
-        </p:nvSpPr>
-        <p:spPr/>
-        <p:txBody>
-          <a:bodyPr/>
-          <a:lstStyle/>
-          <a:p>
-            <a:endParaRPr lang="fr-FR"/>
-          </a:p>
-        </p:txBody>
-      </p:sp>
-      <p:sp>
-        <p:nvSpPr>
-          <p:cNvPr id="5" name="Sous-titre 2"/>
-          <p:cNvSpPr txBox="1">
-            <a:spLocks/>
-          </p:cNvSpPr>
+          <p:cNvPr id="4" name="Rectangle à coins arrondis 3"/>
+          <p:cNvSpPr/>
           <p:nvPr/>
         </p:nvSpPr>
         <p:spPr>
           <a:xfrm>
-            <a:off x="10371909" y="6488469"/>
-            <a:ext cx="1820091" cy="369531"/>
+            <a:off x="696685" y="2225042"/>
+            <a:ext cx="10511245" cy="4563290"/>
+          </a:xfrm>
+          <a:prstGeom prst="roundRect">
+            <a:avLst/>
+          </a:prstGeom>
+        </p:spPr>
+        <p:style>
+          <a:lnRef idx="2">
+            <a:schemeClr val="accent1">
+              <a:shade val="50000"/>
+            </a:schemeClr>
+          </a:lnRef>
+          <a:fillRef idx="1">
+            <a:schemeClr val="accent1"/>
+          </a:fillRef>
+          <a:effectRef idx="0">
+            <a:schemeClr val="accent1"/>
+          </a:effectRef>
+          <a:fontRef idx="minor">
+            <a:schemeClr val="lt1"/>
+          </a:fontRef>
+        </p:style>
+        <p:txBody>
+          <a:bodyPr rtlCol="0" anchor="ctr"/>
+          <a:lstStyle/>
+          <a:p>
+            <a:pPr algn="ctr"/>
+            <a:endParaRPr lang="fr-FR" sz="3500" b="1" dirty="0"/>
+          </a:p>
+        </p:txBody>
+      </p:sp>
+      <p:cxnSp>
+        <p:nvCxnSpPr>
+          <p:cNvPr id="8" name="Connecteur droit 7"/>
+          <p:cNvCxnSpPr>
+            <a:stCxn id="4" idx="0"/>
+            <a:endCxn id="4" idx="2"/>
+          </p:cNvCxnSpPr>
+          <p:nvPr/>
+        </p:nvCxnSpPr>
+        <p:spPr>
+          <a:xfrm>
+            <a:off x="5952308" y="2225042"/>
+            <a:ext cx="0" cy="4563290"/>
+          </a:xfrm>
+          <a:prstGeom prst="line">
+            <a:avLst/>
+          </a:prstGeom>
+          <a:ln w="38100">
+            <a:solidFill>
+              <a:schemeClr val="accent4"/>
+            </a:solidFill>
+          </a:ln>
+        </p:spPr>
+        <p:style>
+          <a:lnRef idx="1">
+            <a:schemeClr val="accent1"/>
+          </a:lnRef>
+          <a:fillRef idx="0">
+            <a:schemeClr val="accent1"/>
+          </a:fillRef>
+          <a:effectRef idx="0">
+            <a:schemeClr val="accent1"/>
+          </a:effectRef>
+          <a:fontRef idx="minor">
+            <a:schemeClr val="tx1"/>
+          </a:fontRef>
+        </p:style>
+      </p:cxnSp>
+      <p:sp>
+        <p:nvSpPr>
+          <p:cNvPr id="9" name="ZoneTexte 8"/>
+          <p:cNvSpPr txBox="1"/>
+          <p:nvPr/>
+        </p:nvSpPr>
+        <p:spPr>
+          <a:xfrm>
+            <a:off x="2404200" y="2802998"/>
+            <a:ext cx="1810111" cy="477054"/>
           </a:xfrm>
           <a:prstGeom prst="rect">
+            <a:avLst/>
+          </a:prstGeom>
+          <a:noFill/>
+          <a:ln>
+            <a:solidFill>
+              <a:schemeClr val="accent4"/>
+            </a:solidFill>
+          </a:ln>
+        </p:spPr>
+        <p:txBody>
+          <a:bodyPr wrap="none" rtlCol="0">
+            <a:spAutoFit/>
+          </a:bodyPr>
+          <a:lstStyle/>
+          <a:p>
+            <a:r>
+              <a:rPr lang="fr-FR" sz="2500" b="1" dirty="0" smtClean="0"/>
+              <a:t>Labyrinthe</a:t>
+            </a:r>
+            <a:endParaRPr lang="fr-FR" sz="2500" b="1" dirty="0"/>
+          </a:p>
+        </p:txBody>
+      </p:sp>
+      <p:sp>
+        <p:nvSpPr>
+          <p:cNvPr id="10" name="ZoneTexte 9"/>
+          <p:cNvSpPr txBox="1"/>
+          <p:nvPr/>
+        </p:nvSpPr>
+        <p:spPr>
+          <a:xfrm>
+            <a:off x="7567748" y="2802998"/>
+            <a:ext cx="1151277" cy="477054"/>
+          </a:xfrm>
+          <a:prstGeom prst="rect">
+            <a:avLst/>
+          </a:prstGeom>
+          <a:noFill/>
+          <a:ln>
+            <a:solidFill>
+              <a:schemeClr val="accent4"/>
+            </a:solidFill>
+          </a:ln>
+        </p:spPr>
+        <p:txBody>
+          <a:bodyPr wrap="none" rtlCol="0">
+            <a:spAutoFit/>
+          </a:bodyPr>
+          <a:lstStyle/>
+          <a:p>
+            <a:r>
+              <a:rPr lang="fr-FR" sz="2500" b="1" dirty="0" smtClean="0"/>
+              <a:t>Agent</a:t>
+            </a:r>
+            <a:endParaRPr lang="fr-FR" sz="2500" b="1" dirty="0"/>
+          </a:p>
+        </p:txBody>
+      </p:sp>
+      <p:pic>
+        <p:nvPicPr>
+          <p:cNvPr id="11" name="Image 10"/>
+          <p:cNvPicPr>
+            <a:picLocks noChangeAspect="1"/>
+          </p:cNvPicPr>
+          <p:nvPr/>
+        </p:nvPicPr>
+        <p:blipFill>
+          <a:blip r:embed="rId2">
+            <a:extLst>
+              <a:ext uri="{28A0092B-C50C-407E-A947-70E740481C1C}">
+                <a14:useLocalDpi xmlns:a14="http://schemas.microsoft.com/office/drawing/2010/main" val="0"/>
+              </a:ext>
+            </a:extLst>
+          </a:blip>
+          <a:stretch>
+            <a:fillRect/>
+          </a:stretch>
+        </p:blipFill>
+        <p:spPr>
+          <a:xfrm>
+            <a:off x="6555460" y="3402946"/>
+            <a:ext cx="3175852" cy="3023963"/>
+          </a:xfrm>
+          <a:prstGeom prst="rect">
+            <a:avLst/>
+          </a:prstGeom>
+        </p:spPr>
+      </p:pic>
+      <p:pic>
+        <p:nvPicPr>
+          <p:cNvPr id="12" name="Image 11"/>
+          <p:cNvPicPr>
+            <a:picLocks noChangeAspect="1"/>
+          </p:cNvPicPr>
+          <p:nvPr/>
+        </p:nvPicPr>
+        <p:blipFill>
+          <a:blip r:embed="rId3">
+            <a:extLst>
+              <a:ext uri="{28A0092B-C50C-407E-A947-70E740481C1C}">
+                <a14:useLocalDpi xmlns:a14="http://schemas.microsoft.com/office/drawing/2010/main" val="0"/>
+              </a:ext>
+            </a:extLst>
+          </a:blip>
+          <a:stretch>
+            <a:fillRect/>
+          </a:stretch>
+        </p:blipFill>
+        <p:spPr>
+          <a:xfrm>
+            <a:off x="908155" y="3564309"/>
+            <a:ext cx="4802203" cy="2701239"/>
+          </a:xfrm>
+          <a:prstGeom prst="rect">
+            <a:avLst/>
+          </a:prstGeom>
+        </p:spPr>
+      </p:pic>
+      <p:sp>
+        <p:nvSpPr>
+          <p:cNvPr id="15" name="Ellipse 14"/>
+          <p:cNvSpPr/>
+          <p:nvPr/>
+        </p:nvSpPr>
+        <p:spPr>
+          <a:xfrm>
+            <a:off x="4855027" y="2377440"/>
+            <a:ext cx="2194560" cy="1025506"/>
+          </a:xfrm>
+          <a:prstGeom prst="ellipse">
             <a:avLst/>
           </a:prstGeom>
           <a:ln>
             <a:solidFill>
-              <a:schemeClr val="tx1"/>
+              <a:srgbClr val="FFC000"/>
             </a:solidFill>
           </a:ln>
-          <a:effectLst>
-            <a:outerShdw blurRad="50800" dir="14400000">
-              <a:srgbClr val="000000">
-                <a:alpha val="40000"/>
-              </a:srgbClr>
-            </a:outerShdw>
-          </a:effectLst>
-        </p:spPr>
-        <p:txBody>
-          <a:bodyPr vert="horz" lIns="91440" tIns="45720" rIns="91440" bIns="45720" rtlCol="0" anchor="t">
-            <a:normAutofit/>
-          </a:bodyPr>
-          <a:lstStyle>
-            <a:lvl1pPr marL="0" indent="0" algn="l" defTabSz="457200" rtl="0" eaLnBrk="1" latinLnBrk="0" hangingPunct="1">
-              <a:spcBef>
-                <a:spcPct val="20000"/>
-              </a:spcBef>
-              <a:spcAft>
-                <a:spcPts val="600"/>
-              </a:spcAft>
-              <a:buClr>
-                <a:schemeClr val="accent1"/>
-              </a:buClr>
-              <a:buFont typeface="Wingdings 2" charset="2"/>
-              <a:buNone/>
-              <a:defRPr sz="1800" kern="1200">
-                <a:solidFill>
-                  <a:schemeClr val="tx1"/>
-                </a:solidFill>
-                <a:latin typeface="+mn-lt"/>
-                <a:ea typeface="+mn-ea"/>
-                <a:cs typeface="+mn-cs"/>
-              </a:defRPr>
-            </a:lvl1pPr>
-            <a:lvl2pPr marL="457200" indent="0" algn="ctr" defTabSz="457200" rtl="0" eaLnBrk="1" latinLnBrk="0" hangingPunct="1">
-              <a:spcBef>
-                <a:spcPct val="20000"/>
-              </a:spcBef>
-              <a:spcAft>
-                <a:spcPts val="600"/>
-              </a:spcAft>
-              <a:buClr>
-                <a:schemeClr val="accent1"/>
-              </a:buClr>
-              <a:buFont typeface="Wingdings 2" charset="2"/>
-              <a:buNone/>
-              <a:defRPr sz="1600" kern="1200">
-                <a:solidFill>
-                  <a:schemeClr val="tx1">
-                    <a:tint val="75000"/>
-                  </a:schemeClr>
-                </a:solidFill>
-                <a:latin typeface="+mn-lt"/>
-                <a:ea typeface="+mn-ea"/>
-                <a:cs typeface="+mn-cs"/>
-              </a:defRPr>
-            </a:lvl2pPr>
-            <a:lvl3pPr marL="914400" indent="0" algn="ctr" defTabSz="457200" rtl="0" eaLnBrk="1" latinLnBrk="0" hangingPunct="1">
-              <a:spcBef>
-                <a:spcPct val="20000"/>
-              </a:spcBef>
-              <a:spcAft>
-                <a:spcPts val="600"/>
-              </a:spcAft>
-              <a:buClr>
-                <a:schemeClr val="accent1"/>
-              </a:buClr>
-              <a:buFont typeface="Wingdings 2" charset="2"/>
-              <a:buNone/>
-              <a:defRPr sz="1400" kern="1200">
-                <a:solidFill>
-                  <a:schemeClr val="tx1">
-                    <a:tint val="75000"/>
-                  </a:schemeClr>
-                </a:solidFill>
-                <a:latin typeface="+mn-lt"/>
-                <a:ea typeface="+mn-ea"/>
-                <a:cs typeface="+mn-cs"/>
-              </a:defRPr>
-            </a:lvl3pPr>
-            <a:lvl4pPr marL="1371600" indent="0" algn="ctr" defTabSz="457200" rtl="0" eaLnBrk="1" latinLnBrk="0" hangingPunct="1">
-              <a:spcBef>
-                <a:spcPct val="20000"/>
-              </a:spcBef>
-              <a:spcAft>
-                <a:spcPts val="600"/>
-              </a:spcAft>
-              <a:buClr>
-                <a:schemeClr val="accent1"/>
-              </a:buClr>
-              <a:buFont typeface="Wingdings 2" charset="2"/>
-              <a:buNone/>
-              <a:defRPr sz="1200" kern="1200">
-                <a:solidFill>
-                  <a:schemeClr val="tx1">
-                    <a:tint val="75000"/>
-                  </a:schemeClr>
-                </a:solidFill>
-                <a:latin typeface="+mn-lt"/>
-                <a:ea typeface="+mn-ea"/>
-                <a:cs typeface="+mn-cs"/>
-              </a:defRPr>
-            </a:lvl4pPr>
-            <a:lvl5pPr marL="1828800" indent="0" algn="ctr" defTabSz="457200" rtl="0" eaLnBrk="1" latinLnBrk="0" hangingPunct="1">
-              <a:spcBef>
-                <a:spcPct val="20000"/>
-              </a:spcBef>
-              <a:spcAft>
-                <a:spcPts val="600"/>
-              </a:spcAft>
-              <a:buClr>
-                <a:schemeClr val="accent1"/>
-              </a:buClr>
-              <a:buFont typeface="Wingdings 2" charset="2"/>
-              <a:buNone/>
-              <a:defRPr sz="1200" kern="1200">
-                <a:solidFill>
-                  <a:schemeClr val="tx1">
-                    <a:tint val="75000"/>
-                  </a:schemeClr>
-                </a:solidFill>
-                <a:latin typeface="+mn-lt"/>
-                <a:ea typeface="+mn-ea"/>
-                <a:cs typeface="+mn-cs"/>
-              </a:defRPr>
-            </a:lvl5pPr>
-            <a:lvl6pPr marL="2286000" indent="0" algn="ctr" defTabSz="457200" rtl="0" eaLnBrk="1" latinLnBrk="0" hangingPunct="1">
-              <a:spcBef>
-                <a:spcPct val="20000"/>
-              </a:spcBef>
-              <a:spcAft>
-                <a:spcPts val="600"/>
-              </a:spcAft>
-              <a:buClr>
-                <a:schemeClr val="accent1"/>
-              </a:buClr>
-              <a:buFont typeface="Wingdings 2" charset="2"/>
-              <a:buNone/>
-              <a:defRPr sz="1200" kern="1200">
-                <a:solidFill>
-                  <a:schemeClr val="tx1">
-                    <a:tint val="75000"/>
-                  </a:schemeClr>
-                </a:solidFill>
-                <a:latin typeface="+mn-lt"/>
-                <a:ea typeface="+mn-ea"/>
-                <a:cs typeface="+mn-cs"/>
-              </a:defRPr>
-            </a:lvl6pPr>
-            <a:lvl7pPr marL="2743200" indent="0" algn="ctr" defTabSz="457200" rtl="0" eaLnBrk="1" latinLnBrk="0" hangingPunct="1">
-              <a:spcBef>
-                <a:spcPct val="20000"/>
-              </a:spcBef>
-              <a:spcAft>
-                <a:spcPts val="600"/>
-              </a:spcAft>
-              <a:buClr>
-                <a:schemeClr val="accent1"/>
-              </a:buClr>
-              <a:buFont typeface="Wingdings 2" charset="2"/>
-              <a:buNone/>
-              <a:defRPr sz="1200" kern="1200">
-                <a:solidFill>
-                  <a:schemeClr val="tx1">
-                    <a:tint val="75000"/>
-                  </a:schemeClr>
-                </a:solidFill>
-                <a:latin typeface="+mn-lt"/>
-                <a:ea typeface="+mn-ea"/>
-                <a:cs typeface="+mn-cs"/>
-              </a:defRPr>
-            </a:lvl7pPr>
-            <a:lvl8pPr marL="3200400" indent="0" algn="ctr" defTabSz="457200" rtl="0" eaLnBrk="1" latinLnBrk="0" hangingPunct="1">
-              <a:spcBef>
-                <a:spcPct val="20000"/>
-              </a:spcBef>
-              <a:spcAft>
-                <a:spcPts val="600"/>
-              </a:spcAft>
-              <a:buClr>
-                <a:schemeClr val="accent1"/>
-              </a:buClr>
-              <a:buFont typeface="Wingdings 2" charset="2"/>
-              <a:buNone/>
-              <a:defRPr sz="1200" kern="1200">
-                <a:solidFill>
-                  <a:schemeClr val="tx1">
-                    <a:tint val="75000"/>
-                  </a:schemeClr>
-                </a:solidFill>
-                <a:latin typeface="+mn-lt"/>
-                <a:ea typeface="+mn-ea"/>
-                <a:cs typeface="+mn-cs"/>
-              </a:defRPr>
-            </a:lvl8pPr>
-            <a:lvl9pPr marL="3657600" indent="0" algn="ctr" defTabSz="457200" rtl="0" eaLnBrk="1" latinLnBrk="0" hangingPunct="1">
-              <a:spcBef>
-                <a:spcPct val="20000"/>
-              </a:spcBef>
-              <a:spcAft>
-                <a:spcPts val="600"/>
-              </a:spcAft>
-              <a:buClr>
-                <a:schemeClr val="accent1"/>
-              </a:buClr>
-              <a:buFont typeface="Wingdings 2" charset="2"/>
-              <a:buNone/>
-              <a:defRPr sz="1200" kern="1200">
-                <a:solidFill>
-                  <a:schemeClr val="tx1">
-                    <a:tint val="75000"/>
-                  </a:schemeClr>
-                </a:solidFill>
-                <a:latin typeface="+mn-lt"/>
-                <a:ea typeface="+mn-ea"/>
-                <a:cs typeface="+mn-cs"/>
-              </a:defRPr>
-            </a:lvl9pPr>
-          </a:lstStyle>
-          <a:p>
-            <a:r>
-              <a:rPr lang="fr-FR" dirty="0" smtClean="0"/>
-              <a:t>IN104 – Page 4</a:t>
-            </a:r>
-            <a:endParaRPr lang="fr-FR" dirty="0"/>
-          </a:p>
-        </p:txBody>
-      </p:sp>
+        </p:spPr>
+        <p:style>
+          <a:lnRef idx="2">
+            <a:schemeClr val="accent1">
+              <a:shade val="50000"/>
+            </a:schemeClr>
+          </a:lnRef>
+          <a:fillRef idx="1">
+            <a:schemeClr val="accent1"/>
+          </a:fillRef>
+          <a:effectRef idx="0">
+            <a:schemeClr val="accent1"/>
+          </a:effectRef>
+          <a:fontRef idx="minor">
+            <a:schemeClr val="lt1"/>
+          </a:fontRef>
+        </p:style>
+        <p:txBody>
+          <a:bodyPr rtlCol="0" anchor="ctr"/>
+          <a:lstStyle/>
+          <a:p>
+            <a:pPr algn="ctr"/>
+            <a:r>
+              <a:rPr lang="fr-FR" sz="3000" b="1" dirty="0" smtClean="0"/>
+              <a:t>System</a:t>
+            </a:r>
+            <a:endParaRPr lang="fr-FR" sz="3000" b="1" dirty="0"/>
+          </a:p>
+        </p:txBody>
+      </p:sp>
+      <p:cxnSp>
+        <p:nvCxnSpPr>
+          <p:cNvPr id="24" name="Connecteur en angle 23"/>
+          <p:cNvCxnSpPr>
+            <a:stCxn id="15" idx="7"/>
+            <a:endCxn id="10" idx="0"/>
+          </p:cNvCxnSpPr>
+          <p:nvPr/>
+        </p:nvCxnSpPr>
+        <p:spPr>
+          <a:xfrm rot="16200000" flipH="1">
+            <a:off x="7298106" y="1957717"/>
+            <a:ext cx="275376" cy="1415186"/>
+          </a:xfrm>
+          <a:prstGeom prst="bentConnector3">
+            <a:avLst>
+              <a:gd name="adj1" fmla="val -64815"/>
+            </a:avLst>
+          </a:prstGeom>
+          <a:ln w="28575">
+            <a:solidFill>
+              <a:srgbClr val="FF0000"/>
+            </a:solidFill>
+            <a:headEnd type="triangle"/>
+            <a:tailEnd type="triangle"/>
+          </a:ln>
+        </p:spPr>
+        <p:style>
+          <a:lnRef idx="1">
+            <a:schemeClr val="accent1"/>
+          </a:lnRef>
+          <a:fillRef idx="0">
+            <a:schemeClr val="accent1"/>
+          </a:fillRef>
+          <a:effectRef idx="0">
+            <a:schemeClr val="accent1"/>
+          </a:effectRef>
+          <a:fontRef idx="minor">
+            <a:schemeClr val="tx1"/>
+          </a:fontRef>
+        </p:style>
+      </p:cxnSp>
+      <p:cxnSp>
+        <p:nvCxnSpPr>
+          <p:cNvPr id="30" name="Connecteur en angle 29"/>
+          <p:cNvCxnSpPr>
+            <a:stCxn id="15" idx="1"/>
+            <a:endCxn id="9" idx="0"/>
+          </p:cNvCxnSpPr>
+          <p:nvPr/>
+        </p:nvCxnSpPr>
+        <p:spPr>
+          <a:xfrm rot="16200000" flipH="1" flipV="1">
+            <a:off x="4105147" y="1731731"/>
+            <a:ext cx="275376" cy="1867157"/>
+          </a:xfrm>
+          <a:prstGeom prst="bentConnector3">
+            <a:avLst>
+              <a:gd name="adj1" fmla="val -71140"/>
+            </a:avLst>
+          </a:prstGeom>
+          <a:ln w="28575">
+            <a:solidFill>
+              <a:srgbClr val="FF0000"/>
+            </a:solidFill>
+            <a:headEnd type="triangle"/>
+            <a:tailEnd type="triangle"/>
+          </a:ln>
+        </p:spPr>
+        <p:style>
+          <a:lnRef idx="1">
+            <a:schemeClr val="accent1"/>
+          </a:lnRef>
+          <a:fillRef idx="0">
+            <a:schemeClr val="accent1"/>
+          </a:fillRef>
+          <a:effectRef idx="0">
+            <a:schemeClr val="accent1"/>
+          </a:effectRef>
+          <a:fontRef idx="minor">
+            <a:schemeClr val="tx1"/>
+          </a:fontRef>
+        </p:style>
+      </p:cxnSp>
     </p:spTree>
     <p:extLst>
       <p:ext uri="{BB962C8B-B14F-4D97-AF65-F5344CB8AC3E}">
-        <p14:creationId xmlns:p14="http://schemas.microsoft.com/office/powerpoint/2010/main" val="2447309496"/>
+        <p14:creationId xmlns:p14="http://schemas.microsoft.com/office/powerpoint/2010/main" val="3387067908"/>
       </p:ext>
     </p:extLst>
   </p:cSld>
@@ -7411,12 +7470,12 @@
         </p:nvSpPr>
         <p:spPr>
           <a:xfrm>
-            <a:off x="0" y="447188"/>
-            <a:ext cx="12192000" cy="970450"/>
+            <a:off x="0" y="307851"/>
+            <a:ext cx="12192000" cy="926589"/>
           </a:xfrm>
           <a:ln>
             <a:solidFill>
-              <a:schemeClr val="accent2"/>
+              <a:srgbClr val="00B050"/>
             </a:solidFill>
           </a:ln>
         </p:spPr>
@@ -7425,285 +7484,53 @@
           <a:lstStyle/>
           <a:p>
             <a:r>
+              <a:rPr lang="fr-FR" sz="5400" dirty="0" smtClean="0">
+                <a:solidFill>
+                  <a:schemeClr val="accent6"/>
+                </a:solidFill>
+              </a:rPr>
+              <a:t>II. </a:t>
+            </a:r>
+            <a:r>
               <a:rPr lang="fr-FR" sz="5400" dirty="0" smtClean="0"/>
-              <a:t>Vie du projet</a:t>
+              <a:t>Solution </a:t>
+            </a:r>
+            <a:r>
+              <a:rPr lang="fr-FR" sz="5400" dirty="0" smtClean="0"/>
+              <a:t>: architecture et design</a:t>
             </a:r>
             <a:endParaRPr lang="fr-FR" sz="5400" dirty="0"/>
           </a:p>
         </p:txBody>
       </p:sp>
-      <p:sp>
-        <p:nvSpPr>
-          <p:cNvPr id="3" name="Espace réservé du contenu 2"/>
-          <p:cNvSpPr>
-            <a:spLocks noGrp="1"/>
-          </p:cNvSpPr>
-          <p:nvPr>
-            <p:ph idx="1"/>
-          </p:nvPr>
-        </p:nvSpPr>
-        <p:spPr/>
-        <p:txBody>
-          <a:bodyPr/>
-          <a:lstStyle/>
-          <a:p>
-            <a:endParaRPr lang="fr-FR"/>
-          </a:p>
-        </p:txBody>
-      </p:sp>
-      <p:sp>
-        <p:nvSpPr>
-          <p:cNvPr id="5" name="Sous-titre 2"/>
-          <p:cNvSpPr txBox="1">
-            <a:spLocks/>
-          </p:cNvSpPr>
+      <p:pic>
+        <p:nvPicPr>
+          <p:cNvPr id="4" name="Image 3"/>
+          <p:cNvPicPr>
+            <a:picLocks noChangeAspect="1"/>
+          </p:cNvPicPr>
           <p:nvPr/>
-        </p:nvSpPr>
+        </p:nvPicPr>
+        <p:blipFill>
+          <a:blip r:embed="rId3"/>
+          <a:stretch>
+            <a:fillRect/>
+          </a:stretch>
+        </p:blipFill>
         <p:spPr>
           <a:xfrm>
-            <a:off x="10371909" y="6488469"/>
-            <a:ext cx="1820091" cy="369531"/>
+            <a:off x="1367246" y="1896554"/>
+            <a:ext cx="8778240" cy="4961446"/>
           </a:xfrm>
           <a:prstGeom prst="rect">
             <a:avLst/>
           </a:prstGeom>
-          <a:ln>
-            <a:solidFill>
-              <a:schemeClr val="tx1"/>
-            </a:solidFill>
-          </a:ln>
-          <a:effectLst>
-            <a:outerShdw blurRad="50800" dir="14400000">
-              <a:srgbClr val="000000">
-                <a:alpha val="40000"/>
-              </a:srgbClr>
-            </a:outerShdw>
-          </a:effectLst>
-        </p:spPr>
-        <p:txBody>
-          <a:bodyPr vert="horz" lIns="91440" tIns="45720" rIns="91440" bIns="45720" rtlCol="0" anchor="t">
-            <a:normAutofit/>
-          </a:bodyPr>
-          <a:lstStyle>
-            <a:lvl1pPr marL="0" indent="0" algn="l" defTabSz="457200" rtl="0" eaLnBrk="1" latinLnBrk="0" hangingPunct="1">
-              <a:spcBef>
-                <a:spcPct val="20000"/>
-              </a:spcBef>
-              <a:spcAft>
-                <a:spcPts val="600"/>
-              </a:spcAft>
-              <a:buClr>
-                <a:schemeClr val="accent1"/>
-              </a:buClr>
-              <a:buFont typeface="Wingdings 2" charset="2"/>
-              <a:buNone/>
-              <a:defRPr sz="1800" kern="1200">
-                <a:solidFill>
-                  <a:schemeClr val="tx1"/>
-                </a:solidFill>
-                <a:latin typeface="+mn-lt"/>
-                <a:ea typeface="+mn-ea"/>
-                <a:cs typeface="+mn-cs"/>
-              </a:defRPr>
-            </a:lvl1pPr>
-            <a:lvl2pPr marL="457200" indent="0" algn="ctr" defTabSz="457200" rtl="0" eaLnBrk="1" latinLnBrk="0" hangingPunct="1">
-              <a:spcBef>
-                <a:spcPct val="20000"/>
-              </a:spcBef>
-              <a:spcAft>
-                <a:spcPts val="600"/>
-              </a:spcAft>
-              <a:buClr>
-                <a:schemeClr val="accent1"/>
-              </a:buClr>
-              <a:buFont typeface="Wingdings 2" charset="2"/>
-              <a:buNone/>
-              <a:defRPr sz="1600" kern="1200">
-                <a:solidFill>
-                  <a:schemeClr val="tx1">
-                    <a:tint val="75000"/>
-                  </a:schemeClr>
-                </a:solidFill>
-                <a:latin typeface="+mn-lt"/>
-                <a:ea typeface="+mn-ea"/>
-                <a:cs typeface="+mn-cs"/>
-              </a:defRPr>
-            </a:lvl2pPr>
-            <a:lvl3pPr marL="914400" indent="0" algn="ctr" defTabSz="457200" rtl="0" eaLnBrk="1" latinLnBrk="0" hangingPunct="1">
-              <a:spcBef>
-                <a:spcPct val="20000"/>
-              </a:spcBef>
-              <a:spcAft>
-                <a:spcPts val="600"/>
-              </a:spcAft>
-              <a:buClr>
-                <a:schemeClr val="accent1"/>
-              </a:buClr>
-              <a:buFont typeface="Wingdings 2" charset="2"/>
-              <a:buNone/>
-              <a:defRPr sz="1400" kern="1200">
-                <a:solidFill>
-                  <a:schemeClr val="tx1">
-                    <a:tint val="75000"/>
-                  </a:schemeClr>
-                </a:solidFill>
-                <a:latin typeface="+mn-lt"/>
-                <a:ea typeface="+mn-ea"/>
-                <a:cs typeface="+mn-cs"/>
-              </a:defRPr>
-            </a:lvl3pPr>
-            <a:lvl4pPr marL="1371600" indent="0" algn="ctr" defTabSz="457200" rtl="0" eaLnBrk="1" latinLnBrk="0" hangingPunct="1">
-              <a:spcBef>
-                <a:spcPct val="20000"/>
-              </a:spcBef>
-              <a:spcAft>
-                <a:spcPts val="600"/>
-              </a:spcAft>
-              <a:buClr>
-                <a:schemeClr val="accent1"/>
-              </a:buClr>
-              <a:buFont typeface="Wingdings 2" charset="2"/>
-              <a:buNone/>
-              <a:defRPr sz="1200" kern="1200">
-                <a:solidFill>
-                  <a:schemeClr val="tx1">
-                    <a:tint val="75000"/>
-                  </a:schemeClr>
-                </a:solidFill>
-                <a:latin typeface="+mn-lt"/>
-                <a:ea typeface="+mn-ea"/>
-                <a:cs typeface="+mn-cs"/>
-              </a:defRPr>
-            </a:lvl4pPr>
-            <a:lvl5pPr marL="1828800" indent="0" algn="ctr" defTabSz="457200" rtl="0" eaLnBrk="1" latinLnBrk="0" hangingPunct="1">
-              <a:spcBef>
-                <a:spcPct val="20000"/>
-              </a:spcBef>
-              <a:spcAft>
-                <a:spcPts val="600"/>
-              </a:spcAft>
-              <a:buClr>
-                <a:schemeClr val="accent1"/>
-              </a:buClr>
-              <a:buFont typeface="Wingdings 2" charset="2"/>
-              <a:buNone/>
-              <a:defRPr sz="1200" kern="1200">
-                <a:solidFill>
-                  <a:schemeClr val="tx1">
-                    <a:tint val="75000"/>
-                  </a:schemeClr>
-                </a:solidFill>
-                <a:latin typeface="+mn-lt"/>
-                <a:ea typeface="+mn-ea"/>
-                <a:cs typeface="+mn-cs"/>
-              </a:defRPr>
-            </a:lvl5pPr>
-            <a:lvl6pPr marL="2286000" indent="0" algn="ctr" defTabSz="457200" rtl="0" eaLnBrk="1" latinLnBrk="0" hangingPunct="1">
-              <a:spcBef>
-                <a:spcPct val="20000"/>
-              </a:spcBef>
-              <a:spcAft>
-                <a:spcPts val="600"/>
-              </a:spcAft>
-              <a:buClr>
-                <a:schemeClr val="accent1"/>
-              </a:buClr>
-              <a:buFont typeface="Wingdings 2" charset="2"/>
-              <a:buNone/>
-              <a:defRPr sz="1200" kern="1200">
-                <a:solidFill>
-                  <a:schemeClr val="tx1">
-                    <a:tint val="75000"/>
-                  </a:schemeClr>
-                </a:solidFill>
-                <a:latin typeface="+mn-lt"/>
-                <a:ea typeface="+mn-ea"/>
-                <a:cs typeface="+mn-cs"/>
-              </a:defRPr>
-            </a:lvl6pPr>
-            <a:lvl7pPr marL="2743200" indent="0" algn="ctr" defTabSz="457200" rtl="0" eaLnBrk="1" latinLnBrk="0" hangingPunct="1">
-              <a:spcBef>
-                <a:spcPct val="20000"/>
-              </a:spcBef>
-              <a:spcAft>
-                <a:spcPts val="600"/>
-              </a:spcAft>
-              <a:buClr>
-                <a:schemeClr val="accent1"/>
-              </a:buClr>
-              <a:buFont typeface="Wingdings 2" charset="2"/>
-              <a:buNone/>
-              <a:defRPr sz="1200" kern="1200">
-                <a:solidFill>
-                  <a:schemeClr val="tx1">
-                    <a:tint val="75000"/>
-                  </a:schemeClr>
-                </a:solidFill>
-                <a:latin typeface="+mn-lt"/>
-                <a:ea typeface="+mn-ea"/>
-                <a:cs typeface="+mn-cs"/>
-              </a:defRPr>
-            </a:lvl7pPr>
-            <a:lvl8pPr marL="3200400" indent="0" algn="ctr" defTabSz="457200" rtl="0" eaLnBrk="1" latinLnBrk="0" hangingPunct="1">
-              <a:spcBef>
-                <a:spcPct val="20000"/>
-              </a:spcBef>
-              <a:spcAft>
-                <a:spcPts val="600"/>
-              </a:spcAft>
-              <a:buClr>
-                <a:schemeClr val="accent1"/>
-              </a:buClr>
-              <a:buFont typeface="Wingdings 2" charset="2"/>
-              <a:buNone/>
-              <a:defRPr sz="1200" kern="1200">
-                <a:solidFill>
-                  <a:schemeClr val="tx1">
-                    <a:tint val="75000"/>
-                  </a:schemeClr>
-                </a:solidFill>
-                <a:latin typeface="+mn-lt"/>
-                <a:ea typeface="+mn-ea"/>
-                <a:cs typeface="+mn-cs"/>
-              </a:defRPr>
-            </a:lvl8pPr>
-            <a:lvl9pPr marL="3657600" indent="0" algn="ctr" defTabSz="457200" rtl="0" eaLnBrk="1" latinLnBrk="0" hangingPunct="1">
-              <a:spcBef>
-                <a:spcPct val="20000"/>
-              </a:spcBef>
-              <a:spcAft>
-                <a:spcPts val="600"/>
-              </a:spcAft>
-              <a:buClr>
-                <a:schemeClr val="accent1"/>
-              </a:buClr>
-              <a:buFont typeface="Wingdings 2" charset="2"/>
-              <a:buNone/>
-              <a:defRPr sz="1200" kern="1200">
-                <a:solidFill>
-                  <a:schemeClr val="tx1">
-                    <a:tint val="75000"/>
-                  </a:schemeClr>
-                </a:solidFill>
-                <a:latin typeface="+mn-lt"/>
-                <a:ea typeface="+mn-ea"/>
-                <a:cs typeface="+mn-cs"/>
-              </a:defRPr>
-            </a:lvl9pPr>
-          </a:lstStyle>
-          <a:p>
-            <a:r>
-              <a:rPr lang="fr-FR" dirty="0" smtClean="0"/>
-              <a:t>IN104 – Page 5</a:t>
-            </a:r>
-            <a:endParaRPr lang="fr-FR" dirty="0"/>
-          </a:p>
-        </p:txBody>
-      </p:sp>
+        </p:spPr>
+      </p:pic>
     </p:spTree>
     <p:extLst>
       <p:ext uri="{BB962C8B-B14F-4D97-AF65-F5344CB8AC3E}">
-        <p14:creationId xmlns:p14="http://schemas.microsoft.com/office/powerpoint/2010/main" val="2579637131"/>
+        <p14:creationId xmlns:p14="http://schemas.microsoft.com/office/powerpoint/2010/main" val="2447309496"/>
       </p:ext>
     </p:extLst>
   </p:cSld>
@@ -7749,12 +7576,12 @@
         </p:nvSpPr>
         <p:spPr>
           <a:xfrm>
-            <a:off x="0" y="447188"/>
-            <a:ext cx="12192000" cy="970450"/>
+            <a:off x="0" y="307851"/>
+            <a:ext cx="12192000" cy="926589"/>
           </a:xfrm>
           <a:ln>
             <a:solidFill>
-              <a:schemeClr val="accent2"/>
+              <a:srgbClr val="00B050"/>
             </a:solidFill>
           </a:ln>
         </p:spPr>
@@ -7763,285 +7590,61 @@
           <a:lstStyle/>
           <a:p>
             <a:r>
+              <a:rPr lang="fr-FR" sz="5400" dirty="0" smtClean="0">
+                <a:solidFill>
+                  <a:schemeClr val="accent6"/>
+                </a:solidFill>
+              </a:rPr>
+              <a:t>II</a:t>
+            </a:r>
+            <a:r>
+              <a:rPr lang="fr-FR" sz="5400" dirty="0">
+                <a:solidFill>
+                  <a:schemeClr val="accent6"/>
+                </a:solidFill>
+              </a:rPr>
+              <a:t>. </a:t>
+            </a:r>
+            <a:r>
               <a:rPr lang="fr-FR" sz="5400" dirty="0" smtClean="0"/>
-              <a:t>Performance</a:t>
+              <a:t>Solution </a:t>
+            </a:r>
+            <a:r>
+              <a:rPr lang="fr-FR" sz="5400" dirty="0" smtClean="0"/>
+              <a:t>: architecture et design</a:t>
             </a:r>
             <a:endParaRPr lang="fr-FR" sz="5400" dirty="0"/>
           </a:p>
         </p:txBody>
       </p:sp>
-      <p:sp>
-        <p:nvSpPr>
-          <p:cNvPr id="3" name="Espace réservé du contenu 2"/>
-          <p:cNvSpPr>
-            <a:spLocks noGrp="1"/>
-          </p:cNvSpPr>
-          <p:nvPr>
-            <p:ph idx="1"/>
-          </p:nvPr>
-        </p:nvSpPr>
-        <p:spPr/>
-        <p:txBody>
-          <a:bodyPr/>
-          <a:lstStyle/>
-          <a:p>
-            <a:endParaRPr lang="fr-FR"/>
-          </a:p>
-        </p:txBody>
-      </p:sp>
-      <p:sp>
-        <p:nvSpPr>
-          <p:cNvPr id="4" name="Sous-titre 2"/>
-          <p:cNvSpPr txBox="1">
-            <a:spLocks/>
-          </p:cNvSpPr>
+      <p:pic>
+        <p:nvPicPr>
+          <p:cNvPr id="3" name="Image 2"/>
+          <p:cNvPicPr>
+            <a:picLocks noChangeAspect="1"/>
+          </p:cNvPicPr>
           <p:nvPr/>
-        </p:nvSpPr>
+        </p:nvPicPr>
+        <p:blipFill>
+          <a:blip r:embed="rId3"/>
+          <a:stretch>
+            <a:fillRect/>
+          </a:stretch>
+        </p:blipFill>
         <p:spPr>
           <a:xfrm>
-            <a:off x="10371909" y="6488469"/>
-            <a:ext cx="1820091" cy="369531"/>
+            <a:off x="1489166" y="1899414"/>
+            <a:ext cx="8734696" cy="4958585"/>
           </a:xfrm>
           <a:prstGeom prst="rect">
             <a:avLst/>
           </a:prstGeom>
-          <a:ln>
-            <a:solidFill>
-              <a:schemeClr val="tx1"/>
-            </a:solidFill>
-          </a:ln>
-          <a:effectLst>
-            <a:outerShdw blurRad="50800" dir="14400000">
-              <a:srgbClr val="000000">
-                <a:alpha val="40000"/>
-              </a:srgbClr>
-            </a:outerShdw>
-          </a:effectLst>
-        </p:spPr>
-        <p:txBody>
-          <a:bodyPr vert="horz" lIns="91440" tIns="45720" rIns="91440" bIns="45720" rtlCol="0" anchor="t">
-            <a:normAutofit/>
-          </a:bodyPr>
-          <a:lstStyle>
-            <a:lvl1pPr marL="0" indent="0" algn="l" defTabSz="457200" rtl="0" eaLnBrk="1" latinLnBrk="0" hangingPunct="1">
-              <a:spcBef>
-                <a:spcPct val="20000"/>
-              </a:spcBef>
-              <a:spcAft>
-                <a:spcPts val="600"/>
-              </a:spcAft>
-              <a:buClr>
-                <a:schemeClr val="accent1"/>
-              </a:buClr>
-              <a:buFont typeface="Wingdings 2" charset="2"/>
-              <a:buNone/>
-              <a:defRPr sz="1800" kern="1200">
-                <a:solidFill>
-                  <a:schemeClr val="tx1"/>
-                </a:solidFill>
-                <a:latin typeface="+mn-lt"/>
-                <a:ea typeface="+mn-ea"/>
-                <a:cs typeface="+mn-cs"/>
-              </a:defRPr>
-            </a:lvl1pPr>
-            <a:lvl2pPr marL="457200" indent="0" algn="ctr" defTabSz="457200" rtl="0" eaLnBrk="1" latinLnBrk="0" hangingPunct="1">
-              <a:spcBef>
-                <a:spcPct val="20000"/>
-              </a:spcBef>
-              <a:spcAft>
-                <a:spcPts val="600"/>
-              </a:spcAft>
-              <a:buClr>
-                <a:schemeClr val="accent1"/>
-              </a:buClr>
-              <a:buFont typeface="Wingdings 2" charset="2"/>
-              <a:buNone/>
-              <a:defRPr sz="1600" kern="1200">
-                <a:solidFill>
-                  <a:schemeClr val="tx1">
-                    <a:tint val="75000"/>
-                  </a:schemeClr>
-                </a:solidFill>
-                <a:latin typeface="+mn-lt"/>
-                <a:ea typeface="+mn-ea"/>
-                <a:cs typeface="+mn-cs"/>
-              </a:defRPr>
-            </a:lvl2pPr>
-            <a:lvl3pPr marL="914400" indent="0" algn="ctr" defTabSz="457200" rtl="0" eaLnBrk="1" latinLnBrk="0" hangingPunct="1">
-              <a:spcBef>
-                <a:spcPct val="20000"/>
-              </a:spcBef>
-              <a:spcAft>
-                <a:spcPts val="600"/>
-              </a:spcAft>
-              <a:buClr>
-                <a:schemeClr val="accent1"/>
-              </a:buClr>
-              <a:buFont typeface="Wingdings 2" charset="2"/>
-              <a:buNone/>
-              <a:defRPr sz="1400" kern="1200">
-                <a:solidFill>
-                  <a:schemeClr val="tx1">
-                    <a:tint val="75000"/>
-                  </a:schemeClr>
-                </a:solidFill>
-                <a:latin typeface="+mn-lt"/>
-                <a:ea typeface="+mn-ea"/>
-                <a:cs typeface="+mn-cs"/>
-              </a:defRPr>
-            </a:lvl3pPr>
-            <a:lvl4pPr marL="1371600" indent="0" algn="ctr" defTabSz="457200" rtl="0" eaLnBrk="1" latinLnBrk="0" hangingPunct="1">
-              <a:spcBef>
-                <a:spcPct val="20000"/>
-              </a:spcBef>
-              <a:spcAft>
-                <a:spcPts val="600"/>
-              </a:spcAft>
-              <a:buClr>
-                <a:schemeClr val="accent1"/>
-              </a:buClr>
-              <a:buFont typeface="Wingdings 2" charset="2"/>
-              <a:buNone/>
-              <a:defRPr sz="1200" kern="1200">
-                <a:solidFill>
-                  <a:schemeClr val="tx1">
-                    <a:tint val="75000"/>
-                  </a:schemeClr>
-                </a:solidFill>
-                <a:latin typeface="+mn-lt"/>
-                <a:ea typeface="+mn-ea"/>
-                <a:cs typeface="+mn-cs"/>
-              </a:defRPr>
-            </a:lvl4pPr>
-            <a:lvl5pPr marL="1828800" indent="0" algn="ctr" defTabSz="457200" rtl="0" eaLnBrk="1" latinLnBrk="0" hangingPunct="1">
-              <a:spcBef>
-                <a:spcPct val="20000"/>
-              </a:spcBef>
-              <a:spcAft>
-                <a:spcPts val="600"/>
-              </a:spcAft>
-              <a:buClr>
-                <a:schemeClr val="accent1"/>
-              </a:buClr>
-              <a:buFont typeface="Wingdings 2" charset="2"/>
-              <a:buNone/>
-              <a:defRPr sz="1200" kern="1200">
-                <a:solidFill>
-                  <a:schemeClr val="tx1">
-                    <a:tint val="75000"/>
-                  </a:schemeClr>
-                </a:solidFill>
-                <a:latin typeface="+mn-lt"/>
-                <a:ea typeface="+mn-ea"/>
-                <a:cs typeface="+mn-cs"/>
-              </a:defRPr>
-            </a:lvl5pPr>
-            <a:lvl6pPr marL="2286000" indent="0" algn="ctr" defTabSz="457200" rtl="0" eaLnBrk="1" latinLnBrk="0" hangingPunct="1">
-              <a:spcBef>
-                <a:spcPct val="20000"/>
-              </a:spcBef>
-              <a:spcAft>
-                <a:spcPts val="600"/>
-              </a:spcAft>
-              <a:buClr>
-                <a:schemeClr val="accent1"/>
-              </a:buClr>
-              <a:buFont typeface="Wingdings 2" charset="2"/>
-              <a:buNone/>
-              <a:defRPr sz="1200" kern="1200">
-                <a:solidFill>
-                  <a:schemeClr val="tx1">
-                    <a:tint val="75000"/>
-                  </a:schemeClr>
-                </a:solidFill>
-                <a:latin typeface="+mn-lt"/>
-                <a:ea typeface="+mn-ea"/>
-                <a:cs typeface="+mn-cs"/>
-              </a:defRPr>
-            </a:lvl6pPr>
-            <a:lvl7pPr marL="2743200" indent="0" algn="ctr" defTabSz="457200" rtl="0" eaLnBrk="1" latinLnBrk="0" hangingPunct="1">
-              <a:spcBef>
-                <a:spcPct val="20000"/>
-              </a:spcBef>
-              <a:spcAft>
-                <a:spcPts val="600"/>
-              </a:spcAft>
-              <a:buClr>
-                <a:schemeClr val="accent1"/>
-              </a:buClr>
-              <a:buFont typeface="Wingdings 2" charset="2"/>
-              <a:buNone/>
-              <a:defRPr sz="1200" kern="1200">
-                <a:solidFill>
-                  <a:schemeClr val="tx1">
-                    <a:tint val="75000"/>
-                  </a:schemeClr>
-                </a:solidFill>
-                <a:latin typeface="+mn-lt"/>
-                <a:ea typeface="+mn-ea"/>
-                <a:cs typeface="+mn-cs"/>
-              </a:defRPr>
-            </a:lvl7pPr>
-            <a:lvl8pPr marL="3200400" indent="0" algn="ctr" defTabSz="457200" rtl="0" eaLnBrk="1" latinLnBrk="0" hangingPunct="1">
-              <a:spcBef>
-                <a:spcPct val="20000"/>
-              </a:spcBef>
-              <a:spcAft>
-                <a:spcPts val="600"/>
-              </a:spcAft>
-              <a:buClr>
-                <a:schemeClr val="accent1"/>
-              </a:buClr>
-              <a:buFont typeface="Wingdings 2" charset="2"/>
-              <a:buNone/>
-              <a:defRPr sz="1200" kern="1200">
-                <a:solidFill>
-                  <a:schemeClr val="tx1">
-                    <a:tint val="75000"/>
-                  </a:schemeClr>
-                </a:solidFill>
-                <a:latin typeface="+mn-lt"/>
-                <a:ea typeface="+mn-ea"/>
-                <a:cs typeface="+mn-cs"/>
-              </a:defRPr>
-            </a:lvl8pPr>
-            <a:lvl9pPr marL="3657600" indent="0" algn="ctr" defTabSz="457200" rtl="0" eaLnBrk="1" latinLnBrk="0" hangingPunct="1">
-              <a:spcBef>
-                <a:spcPct val="20000"/>
-              </a:spcBef>
-              <a:spcAft>
-                <a:spcPts val="600"/>
-              </a:spcAft>
-              <a:buClr>
-                <a:schemeClr val="accent1"/>
-              </a:buClr>
-              <a:buFont typeface="Wingdings 2" charset="2"/>
-              <a:buNone/>
-              <a:defRPr sz="1200" kern="1200">
-                <a:solidFill>
-                  <a:schemeClr val="tx1">
-                    <a:tint val="75000"/>
-                  </a:schemeClr>
-                </a:solidFill>
-                <a:latin typeface="+mn-lt"/>
-                <a:ea typeface="+mn-ea"/>
-                <a:cs typeface="+mn-cs"/>
-              </a:defRPr>
-            </a:lvl9pPr>
-          </a:lstStyle>
-          <a:p>
-            <a:r>
-              <a:rPr lang="fr-FR" dirty="0" smtClean="0"/>
-              <a:t>IN104 – Page 6</a:t>
-            </a:r>
-            <a:endParaRPr lang="fr-FR" dirty="0"/>
-          </a:p>
-        </p:txBody>
-      </p:sp>
+        </p:spPr>
+      </p:pic>
     </p:spTree>
     <p:extLst>
       <p:ext uri="{BB962C8B-B14F-4D97-AF65-F5344CB8AC3E}">
-        <p14:creationId xmlns:p14="http://schemas.microsoft.com/office/powerpoint/2010/main" val="2074799054"/>
+        <p14:creationId xmlns:p14="http://schemas.microsoft.com/office/powerpoint/2010/main" val="1247051528"/>
       </p:ext>
     </p:extLst>
   </p:cSld>
@@ -8087,12 +7690,12 @@
         </p:nvSpPr>
         <p:spPr>
           <a:xfrm>
-            <a:off x="0" y="447188"/>
-            <a:ext cx="12192000" cy="970450"/>
+            <a:off x="0" y="307851"/>
+            <a:ext cx="12192000" cy="926589"/>
           </a:xfrm>
           <a:ln>
             <a:solidFill>
-              <a:schemeClr val="accent2"/>
+              <a:srgbClr val="00B050"/>
             </a:solidFill>
           </a:ln>
         </p:spPr>
@@ -8101,285 +7704,77 @@
           <a:lstStyle/>
           <a:p>
             <a:r>
+              <a:rPr lang="fr-FR" sz="5400" dirty="0" smtClean="0">
+                <a:solidFill>
+                  <a:schemeClr val="accent6"/>
+                </a:solidFill>
+              </a:rPr>
+              <a:t>II. </a:t>
+            </a:r>
+            <a:r>
               <a:rPr lang="fr-FR" sz="5400" dirty="0" smtClean="0"/>
-              <a:t>Performance</a:t>
+              <a:t>Solution </a:t>
+            </a:r>
+            <a:r>
+              <a:rPr lang="fr-FR" sz="5400" dirty="0" smtClean="0"/>
+              <a:t>: architecture et design</a:t>
             </a:r>
             <a:endParaRPr lang="fr-FR" sz="5400" dirty="0"/>
           </a:p>
         </p:txBody>
       </p:sp>
-      <p:sp>
-        <p:nvSpPr>
-          <p:cNvPr id="3" name="Espace réservé du contenu 2"/>
-          <p:cNvSpPr>
-            <a:spLocks noGrp="1"/>
-          </p:cNvSpPr>
-          <p:nvPr>
-            <p:ph idx="1"/>
-          </p:nvPr>
-        </p:nvSpPr>
-        <p:spPr/>
-        <p:txBody>
-          <a:bodyPr/>
-          <a:lstStyle/>
-          <a:p>
-            <a:endParaRPr lang="fr-FR"/>
-          </a:p>
-        </p:txBody>
-      </p:sp>
-      <p:sp>
-        <p:nvSpPr>
-          <p:cNvPr id="4" name="Sous-titre 2"/>
-          <p:cNvSpPr txBox="1">
-            <a:spLocks/>
-          </p:cNvSpPr>
+      <p:pic>
+        <p:nvPicPr>
+          <p:cNvPr id="3" name="Image 2"/>
+          <p:cNvPicPr>
+            <a:picLocks noChangeAspect="1"/>
+          </p:cNvPicPr>
           <p:nvPr/>
-        </p:nvSpPr>
+        </p:nvPicPr>
+        <p:blipFill>
+          <a:blip r:embed="rId3"/>
+          <a:stretch>
+            <a:fillRect/>
+          </a:stretch>
+        </p:blipFill>
         <p:spPr>
           <a:xfrm>
-            <a:off x="10371909" y="6488469"/>
-            <a:ext cx="1820091" cy="369531"/>
+            <a:off x="0" y="1887784"/>
+            <a:ext cx="8281851" cy="4970216"/>
           </a:xfrm>
           <a:prstGeom prst="rect">
             <a:avLst/>
           </a:prstGeom>
-          <a:ln>
-            <a:solidFill>
-              <a:schemeClr val="tx1"/>
-            </a:solidFill>
-          </a:ln>
-          <a:effectLst>
-            <a:outerShdw blurRad="50800" dir="14400000">
-              <a:srgbClr val="000000">
-                <a:alpha val="40000"/>
-              </a:srgbClr>
-            </a:outerShdw>
-          </a:effectLst>
-        </p:spPr>
-        <p:txBody>
-          <a:bodyPr vert="horz" lIns="91440" tIns="45720" rIns="91440" bIns="45720" rtlCol="0" anchor="t">
-            <a:normAutofit/>
-          </a:bodyPr>
-          <a:lstStyle>
-            <a:lvl1pPr marL="0" indent="0" algn="l" defTabSz="457200" rtl="0" eaLnBrk="1" latinLnBrk="0" hangingPunct="1">
-              <a:spcBef>
-                <a:spcPct val="20000"/>
-              </a:spcBef>
-              <a:spcAft>
-                <a:spcPts val="600"/>
-              </a:spcAft>
-              <a:buClr>
-                <a:schemeClr val="accent1"/>
-              </a:buClr>
-              <a:buFont typeface="Wingdings 2" charset="2"/>
-              <a:buNone/>
-              <a:defRPr sz="1800" kern="1200">
-                <a:solidFill>
-                  <a:schemeClr val="tx1"/>
-                </a:solidFill>
-                <a:latin typeface="+mn-lt"/>
-                <a:ea typeface="+mn-ea"/>
-                <a:cs typeface="+mn-cs"/>
-              </a:defRPr>
-            </a:lvl1pPr>
-            <a:lvl2pPr marL="457200" indent="0" algn="ctr" defTabSz="457200" rtl="0" eaLnBrk="1" latinLnBrk="0" hangingPunct="1">
-              <a:spcBef>
-                <a:spcPct val="20000"/>
-              </a:spcBef>
-              <a:spcAft>
-                <a:spcPts val="600"/>
-              </a:spcAft>
-              <a:buClr>
-                <a:schemeClr val="accent1"/>
-              </a:buClr>
-              <a:buFont typeface="Wingdings 2" charset="2"/>
-              <a:buNone/>
-              <a:defRPr sz="1600" kern="1200">
-                <a:solidFill>
-                  <a:schemeClr val="tx1">
-                    <a:tint val="75000"/>
-                  </a:schemeClr>
-                </a:solidFill>
-                <a:latin typeface="+mn-lt"/>
-                <a:ea typeface="+mn-ea"/>
-                <a:cs typeface="+mn-cs"/>
-              </a:defRPr>
-            </a:lvl2pPr>
-            <a:lvl3pPr marL="914400" indent="0" algn="ctr" defTabSz="457200" rtl="0" eaLnBrk="1" latinLnBrk="0" hangingPunct="1">
-              <a:spcBef>
-                <a:spcPct val="20000"/>
-              </a:spcBef>
-              <a:spcAft>
-                <a:spcPts val="600"/>
-              </a:spcAft>
-              <a:buClr>
-                <a:schemeClr val="accent1"/>
-              </a:buClr>
-              <a:buFont typeface="Wingdings 2" charset="2"/>
-              <a:buNone/>
-              <a:defRPr sz="1400" kern="1200">
-                <a:solidFill>
-                  <a:schemeClr val="tx1">
-                    <a:tint val="75000"/>
-                  </a:schemeClr>
-                </a:solidFill>
-                <a:latin typeface="+mn-lt"/>
-                <a:ea typeface="+mn-ea"/>
-                <a:cs typeface="+mn-cs"/>
-              </a:defRPr>
-            </a:lvl3pPr>
-            <a:lvl4pPr marL="1371600" indent="0" algn="ctr" defTabSz="457200" rtl="0" eaLnBrk="1" latinLnBrk="0" hangingPunct="1">
-              <a:spcBef>
-                <a:spcPct val="20000"/>
-              </a:spcBef>
-              <a:spcAft>
-                <a:spcPts val="600"/>
-              </a:spcAft>
-              <a:buClr>
-                <a:schemeClr val="accent1"/>
-              </a:buClr>
-              <a:buFont typeface="Wingdings 2" charset="2"/>
-              <a:buNone/>
-              <a:defRPr sz="1200" kern="1200">
-                <a:solidFill>
-                  <a:schemeClr val="tx1">
-                    <a:tint val="75000"/>
-                  </a:schemeClr>
-                </a:solidFill>
-                <a:latin typeface="+mn-lt"/>
-                <a:ea typeface="+mn-ea"/>
-                <a:cs typeface="+mn-cs"/>
-              </a:defRPr>
-            </a:lvl4pPr>
-            <a:lvl5pPr marL="1828800" indent="0" algn="ctr" defTabSz="457200" rtl="0" eaLnBrk="1" latinLnBrk="0" hangingPunct="1">
-              <a:spcBef>
-                <a:spcPct val="20000"/>
-              </a:spcBef>
-              <a:spcAft>
-                <a:spcPts val="600"/>
-              </a:spcAft>
-              <a:buClr>
-                <a:schemeClr val="accent1"/>
-              </a:buClr>
-              <a:buFont typeface="Wingdings 2" charset="2"/>
-              <a:buNone/>
-              <a:defRPr sz="1200" kern="1200">
-                <a:solidFill>
-                  <a:schemeClr val="tx1">
-                    <a:tint val="75000"/>
-                  </a:schemeClr>
-                </a:solidFill>
-                <a:latin typeface="+mn-lt"/>
-                <a:ea typeface="+mn-ea"/>
-                <a:cs typeface="+mn-cs"/>
-              </a:defRPr>
-            </a:lvl5pPr>
-            <a:lvl6pPr marL="2286000" indent="0" algn="ctr" defTabSz="457200" rtl="0" eaLnBrk="1" latinLnBrk="0" hangingPunct="1">
-              <a:spcBef>
-                <a:spcPct val="20000"/>
-              </a:spcBef>
-              <a:spcAft>
-                <a:spcPts val="600"/>
-              </a:spcAft>
-              <a:buClr>
-                <a:schemeClr val="accent1"/>
-              </a:buClr>
-              <a:buFont typeface="Wingdings 2" charset="2"/>
-              <a:buNone/>
-              <a:defRPr sz="1200" kern="1200">
-                <a:solidFill>
-                  <a:schemeClr val="tx1">
-                    <a:tint val="75000"/>
-                  </a:schemeClr>
-                </a:solidFill>
-                <a:latin typeface="+mn-lt"/>
-                <a:ea typeface="+mn-ea"/>
-                <a:cs typeface="+mn-cs"/>
-              </a:defRPr>
-            </a:lvl6pPr>
-            <a:lvl7pPr marL="2743200" indent="0" algn="ctr" defTabSz="457200" rtl="0" eaLnBrk="1" latinLnBrk="0" hangingPunct="1">
-              <a:spcBef>
-                <a:spcPct val="20000"/>
-              </a:spcBef>
-              <a:spcAft>
-                <a:spcPts val="600"/>
-              </a:spcAft>
-              <a:buClr>
-                <a:schemeClr val="accent1"/>
-              </a:buClr>
-              <a:buFont typeface="Wingdings 2" charset="2"/>
-              <a:buNone/>
-              <a:defRPr sz="1200" kern="1200">
-                <a:solidFill>
-                  <a:schemeClr val="tx1">
-                    <a:tint val="75000"/>
-                  </a:schemeClr>
-                </a:solidFill>
-                <a:latin typeface="+mn-lt"/>
-                <a:ea typeface="+mn-ea"/>
-                <a:cs typeface="+mn-cs"/>
-              </a:defRPr>
-            </a:lvl7pPr>
-            <a:lvl8pPr marL="3200400" indent="0" algn="ctr" defTabSz="457200" rtl="0" eaLnBrk="1" latinLnBrk="0" hangingPunct="1">
-              <a:spcBef>
-                <a:spcPct val="20000"/>
-              </a:spcBef>
-              <a:spcAft>
-                <a:spcPts val="600"/>
-              </a:spcAft>
-              <a:buClr>
-                <a:schemeClr val="accent1"/>
-              </a:buClr>
-              <a:buFont typeface="Wingdings 2" charset="2"/>
-              <a:buNone/>
-              <a:defRPr sz="1200" kern="1200">
-                <a:solidFill>
-                  <a:schemeClr val="tx1">
-                    <a:tint val="75000"/>
-                  </a:schemeClr>
-                </a:solidFill>
-                <a:latin typeface="+mn-lt"/>
-                <a:ea typeface="+mn-ea"/>
-                <a:cs typeface="+mn-cs"/>
-              </a:defRPr>
-            </a:lvl8pPr>
-            <a:lvl9pPr marL="3657600" indent="0" algn="ctr" defTabSz="457200" rtl="0" eaLnBrk="1" latinLnBrk="0" hangingPunct="1">
-              <a:spcBef>
-                <a:spcPct val="20000"/>
-              </a:spcBef>
-              <a:spcAft>
-                <a:spcPts val="600"/>
-              </a:spcAft>
-              <a:buClr>
-                <a:schemeClr val="accent1"/>
-              </a:buClr>
-              <a:buFont typeface="Wingdings 2" charset="2"/>
-              <a:buNone/>
-              <a:defRPr sz="1200" kern="1200">
-                <a:solidFill>
-                  <a:schemeClr val="tx1">
-                    <a:tint val="75000"/>
-                  </a:schemeClr>
-                </a:solidFill>
-                <a:latin typeface="+mn-lt"/>
-                <a:ea typeface="+mn-ea"/>
-                <a:cs typeface="+mn-cs"/>
-              </a:defRPr>
-            </a:lvl9pPr>
-          </a:lstStyle>
-          <a:p>
-            <a:r>
-              <a:rPr lang="fr-FR" dirty="0" smtClean="0"/>
-              <a:t>IN104 – Page 7</a:t>
-            </a:r>
-            <a:endParaRPr lang="fr-FR" dirty="0"/>
-          </a:p>
-        </p:txBody>
-      </p:sp>
+        </p:spPr>
+      </p:pic>
+      <p:pic>
+        <p:nvPicPr>
+          <p:cNvPr id="4" name="Image 3"/>
+          <p:cNvPicPr>
+            <a:picLocks noChangeAspect="1"/>
+          </p:cNvPicPr>
+          <p:nvPr/>
+        </p:nvPicPr>
+        <p:blipFill>
+          <a:blip r:embed="rId4"/>
+          <a:stretch>
+            <a:fillRect/>
+          </a:stretch>
+        </p:blipFill>
+        <p:spPr>
+          <a:xfrm>
+            <a:off x="8528762" y="3034292"/>
+            <a:ext cx="3560400" cy="2677200"/>
+          </a:xfrm>
+          <a:prstGeom prst="rect">
+            <a:avLst/>
+          </a:prstGeom>
+        </p:spPr>
+      </p:pic>
     </p:spTree>
     <p:extLst>
       <p:ext uri="{BB962C8B-B14F-4D97-AF65-F5344CB8AC3E}">
-        <p14:creationId xmlns:p14="http://schemas.microsoft.com/office/powerpoint/2010/main" val="3817966102"/>
+        <p14:creationId xmlns:p14="http://schemas.microsoft.com/office/powerpoint/2010/main" val="3482149501"/>
       </p:ext>
     </p:extLst>
   </p:cSld>
@@ -8425,12 +7820,12 @@
         </p:nvSpPr>
         <p:spPr>
           <a:xfrm>
-            <a:off x="0" y="447188"/>
+            <a:off x="0" y="307850"/>
             <a:ext cx="12192000" cy="970450"/>
           </a:xfrm>
           <a:ln>
             <a:solidFill>
-              <a:schemeClr val="accent2"/>
+              <a:srgbClr val="00B050"/>
             </a:solidFill>
           </a:ln>
         </p:spPr>
@@ -8439,8 +7834,20 @@
           <a:lstStyle/>
           <a:p>
             <a:r>
+              <a:rPr lang="fr-FR" sz="5400" dirty="0">
+                <a:solidFill>
+                  <a:schemeClr val="accent6"/>
+                </a:solidFill>
+              </a:rPr>
+              <a:t>III. </a:t>
+            </a:r>
+            <a:r>
               <a:rPr lang="fr-FR" sz="5400" dirty="0" smtClean="0"/>
-              <a:t>Conclusion</a:t>
+              <a:t>Vie </a:t>
+            </a:r>
+            <a:r>
+              <a:rPr lang="fr-FR" sz="5400" dirty="0" smtClean="0"/>
+              <a:t>du projet</a:t>
             </a:r>
             <a:endParaRPr lang="fr-FR" sz="5400" dirty="0"/>
           </a:p>
@@ -8462,262 +7869,110 @@
           <a:lstStyle/>
           <a:p>
             <a:endParaRPr lang="fr-FR"/>
-          </a:p>
-        </p:txBody>
-      </p:sp>
-      <p:sp>
-        <p:nvSpPr>
-          <p:cNvPr id="4" name="Sous-titre 2"/>
-          <p:cNvSpPr txBox="1">
-            <a:spLocks/>
-          </p:cNvSpPr>
-          <p:nvPr/>
-        </p:nvSpPr>
-        <p:spPr>
-          <a:xfrm>
-            <a:off x="10371909" y="6488469"/>
-            <a:ext cx="1820091" cy="369531"/>
-          </a:xfrm>
-          <a:prstGeom prst="rect">
-            <a:avLst/>
-          </a:prstGeom>
-          <a:ln>
-            <a:solidFill>
-              <a:schemeClr val="tx1"/>
-            </a:solidFill>
-          </a:ln>
-          <a:effectLst>
-            <a:outerShdw blurRad="50800" dir="14400000">
-              <a:srgbClr val="000000">
-                <a:alpha val="40000"/>
-              </a:srgbClr>
-            </a:outerShdw>
-          </a:effectLst>
-        </p:spPr>
-        <p:txBody>
-          <a:bodyPr vert="horz" lIns="91440" tIns="45720" rIns="91440" bIns="45720" rtlCol="0" anchor="t">
-            <a:normAutofit/>
-          </a:bodyPr>
-          <a:lstStyle>
-            <a:lvl1pPr marL="0" indent="0" algn="l" defTabSz="457200" rtl="0" eaLnBrk="1" latinLnBrk="0" hangingPunct="1">
-              <a:spcBef>
-                <a:spcPct val="20000"/>
-              </a:spcBef>
-              <a:spcAft>
-                <a:spcPts val="600"/>
-              </a:spcAft>
-              <a:buClr>
-                <a:schemeClr val="accent1"/>
-              </a:buClr>
-              <a:buFont typeface="Wingdings 2" charset="2"/>
-              <a:buNone/>
-              <a:defRPr sz="1800" kern="1200">
-                <a:solidFill>
-                  <a:schemeClr val="tx1"/>
-                </a:solidFill>
-                <a:latin typeface="+mn-lt"/>
-                <a:ea typeface="+mn-ea"/>
-                <a:cs typeface="+mn-cs"/>
-              </a:defRPr>
-            </a:lvl1pPr>
-            <a:lvl2pPr marL="457200" indent="0" algn="ctr" defTabSz="457200" rtl="0" eaLnBrk="1" latinLnBrk="0" hangingPunct="1">
-              <a:spcBef>
-                <a:spcPct val="20000"/>
-              </a:spcBef>
-              <a:spcAft>
-                <a:spcPts val="600"/>
-              </a:spcAft>
-              <a:buClr>
-                <a:schemeClr val="accent1"/>
-              </a:buClr>
-              <a:buFont typeface="Wingdings 2" charset="2"/>
-              <a:buNone/>
-              <a:defRPr sz="1600" kern="1200">
-                <a:solidFill>
-                  <a:schemeClr val="tx1">
-                    <a:tint val="75000"/>
-                  </a:schemeClr>
-                </a:solidFill>
-                <a:latin typeface="+mn-lt"/>
-                <a:ea typeface="+mn-ea"/>
-                <a:cs typeface="+mn-cs"/>
-              </a:defRPr>
-            </a:lvl2pPr>
-            <a:lvl3pPr marL="914400" indent="0" algn="ctr" defTabSz="457200" rtl="0" eaLnBrk="1" latinLnBrk="0" hangingPunct="1">
-              <a:spcBef>
-                <a:spcPct val="20000"/>
-              </a:spcBef>
-              <a:spcAft>
-                <a:spcPts val="600"/>
-              </a:spcAft>
-              <a:buClr>
-                <a:schemeClr val="accent1"/>
-              </a:buClr>
-              <a:buFont typeface="Wingdings 2" charset="2"/>
-              <a:buNone/>
-              <a:defRPr sz="1400" kern="1200">
-                <a:solidFill>
-                  <a:schemeClr val="tx1">
-                    <a:tint val="75000"/>
-                  </a:schemeClr>
-                </a:solidFill>
-                <a:latin typeface="+mn-lt"/>
-                <a:ea typeface="+mn-ea"/>
-                <a:cs typeface="+mn-cs"/>
-              </a:defRPr>
-            </a:lvl3pPr>
-            <a:lvl4pPr marL="1371600" indent="0" algn="ctr" defTabSz="457200" rtl="0" eaLnBrk="1" latinLnBrk="0" hangingPunct="1">
-              <a:spcBef>
-                <a:spcPct val="20000"/>
-              </a:spcBef>
-              <a:spcAft>
-                <a:spcPts val="600"/>
-              </a:spcAft>
-              <a:buClr>
-                <a:schemeClr val="accent1"/>
-              </a:buClr>
-              <a:buFont typeface="Wingdings 2" charset="2"/>
-              <a:buNone/>
-              <a:defRPr sz="1200" kern="1200">
-                <a:solidFill>
-                  <a:schemeClr val="tx1">
-                    <a:tint val="75000"/>
-                  </a:schemeClr>
-                </a:solidFill>
-                <a:latin typeface="+mn-lt"/>
-                <a:ea typeface="+mn-ea"/>
-                <a:cs typeface="+mn-cs"/>
-              </a:defRPr>
-            </a:lvl4pPr>
-            <a:lvl5pPr marL="1828800" indent="0" algn="ctr" defTabSz="457200" rtl="0" eaLnBrk="1" latinLnBrk="0" hangingPunct="1">
-              <a:spcBef>
-                <a:spcPct val="20000"/>
-              </a:spcBef>
-              <a:spcAft>
-                <a:spcPts val="600"/>
-              </a:spcAft>
-              <a:buClr>
-                <a:schemeClr val="accent1"/>
-              </a:buClr>
-              <a:buFont typeface="Wingdings 2" charset="2"/>
-              <a:buNone/>
-              <a:defRPr sz="1200" kern="1200">
-                <a:solidFill>
-                  <a:schemeClr val="tx1">
-                    <a:tint val="75000"/>
-                  </a:schemeClr>
-                </a:solidFill>
-                <a:latin typeface="+mn-lt"/>
-                <a:ea typeface="+mn-ea"/>
-                <a:cs typeface="+mn-cs"/>
-              </a:defRPr>
-            </a:lvl5pPr>
-            <a:lvl6pPr marL="2286000" indent="0" algn="ctr" defTabSz="457200" rtl="0" eaLnBrk="1" latinLnBrk="0" hangingPunct="1">
-              <a:spcBef>
-                <a:spcPct val="20000"/>
-              </a:spcBef>
-              <a:spcAft>
-                <a:spcPts val="600"/>
-              </a:spcAft>
-              <a:buClr>
-                <a:schemeClr val="accent1"/>
-              </a:buClr>
-              <a:buFont typeface="Wingdings 2" charset="2"/>
-              <a:buNone/>
-              <a:defRPr sz="1200" kern="1200">
-                <a:solidFill>
-                  <a:schemeClr val="tx1">
-                    <a:tint val="75000"/>
-                  </a:schemeClr>
-                </a:solidFill>
-                <a:latin typeface="+mn-lt"/>
-                <a:ea typeface="+mn-ea"/>
-                <a:cs typeface="+mn-cs"/>
-              </a:defRPr>
-            </a:lvl6pPr>
-            <a:lvl7pPr marL="2743200" indent="0" algn="ctr" defTabSz="457200" rtl="0" eaLnBrk="1" latinLnBrk="0" hangingPunct="1">
-              <a:spcBef>
-                <a:spcPct val="20000"/>
-              </a:spcBef>
-              <a:spcAft>
-                <a:spcPts val="600"/>
-              </a:spcAft>
-              <a:buClr>
-                <a:schemeClr val="accent1"/>
-              </a:buClr>
-              <a:buFont typeface="Wingdings 2" charset="2"/>
-              <a:buNone/>
-              <a:defRPr sz="1200" kern="1200">
-                <a:solidFill>
-                  <a:schemeClr val="tx1">
-                    <a:tint val="75000"/>
-                  </a:schemeClr>
-                </a:solidFill>
-                <a:latin typeface="+mn-lt"/>
-                <a:ea typeface="+mn-ea"/>
-                <a:cs typeface="+mn-cs"/>
-              </a:defRPr>
-            </a:lvl7pPr>
-            <a:lvl8pPr marL="3200400" indent="0" algn="ctr" defTabSz="457200" rtl="0" eaLnBrk="1" latinLnBrk="0" hangingPunct="1">
-              <a:spcBef>
-                <a:spcPct val="20000"/>
-              </a:spcBef>
-              <a:spcAft>
-                <a:spcPts val="600"/>
-              </a:spcAft>
-              <a:buClr>
-                <a:schemeClr val="accent1"/>
-              </a:buClr>
-              <a:buFont typeface="Wingdings 2" charset="2"/>
-              <a:buNone/>
-              <a:defRPr sz="1200" kern="1200">
-                <a:solidFill>
-                  <a:schemeClr val="tx1">
-                    <a:tint val="75000"/>
-                  </a:schemeClr>
-                </a:solidFill>
-                <a:latin typeface="+mn-lt"/>
-                <a:ea typeface="+mn-ea"/>
-                <a:cs typeface="+mn-cs"/>
-              </a:defRPr>
-            </a:lvl8pPr>
-            <a:lvl9pPr marL="3657600" indent="0" algn="ctr" defTabSz="457200" rtl="0" eaLnBrk="1" latinLnBrk="0" hangingPunct="1">
-              <a:spcBef>
-                <a:spcPct val="20000"/>
-              </a:spcBef>
-              <a:spcAft>
-                <a:spcPts val="600"/>
-              </a:spcAft>
-              <a:buClr>
-                <a:schemeClr val="accent1"/>
-              </a:buClr>
-              <a:buFont typeface="Wingdings 2" charset="2"/>
-              <a:buNone/>
-              <a:defRPr sz="1200" kern="1200">
-                <a:solidFill>
-                  <a:schemeClr val="tx1">
-                    <a:tint val="75000"/>
-                  </a:schemeClr>
-                </a:solidFill>
-                <a:latin typeface="+mn-lt"/>
-                <a:ea typeface="+mn-ea"/>
-                <a:cs typeface="+mn-cs"/>
-              </a:defRPr>
-            </a:lvl9pPr>
-          </a:lstStyle>
-          <a:p>
-            <a:r>
-              <a:rPr lang="fr-FR" dirty="0" smtClean="0"/>
-              <a:t>IN104 – Page 8</a:t>
-            </a:r>
-            <a:endParaRPr lang="fr-FR" dirty="0"/>
           </a:p>
         </p:txBody>
       </p:sp>
     </p:spTree>
     <p:extLst>
       <p:ext uri="{BB962C8B-B14F-4D97-AF65-F5344CB8AC3E}">
-        <p14:creationId xmlns:p14="http://schemas.microsoft.com/office/powerpoint/2010/main" val="866067503"/>
+        <p14:creationId xmlns:p14="http://schemas.microsoft.com/office/powerpoint/2010/main" val="2579637131"/>
+      </p:ext>
+    </p:extLst>
+  </p:cSld>
+  <p:clrMapOvr>
+    <a:masterClrMapping/>
+  </p:clrMapOvr>
+  <p:timing>
+    <p:tnLst>
+      <p:par>
+        <p:cTn id="1" dur="indefinite" restart="never" nodeType="tmRoot"/>
+      </p:par>
+    </p:tnLst>
+  </p:timing>
+</p:sld>
+</file>
+
+<file path=ppt/slides/slide9.xml><?xml version="1.0" encoding="utf-8"?>
+<p:sld xmlns:a="http://schemas.openxmlformats.org/drawingml/2006/main" xmlns:r="http://schemas.openxmlformats.org/officeDocument/2006/relationships" xmlns:p="http://schemas.openxmlformats.org/presentationml/2006/main">
+  <p:cSld>
+    <p:spTree>
+      <p:nvGrpSpPr>
+        <p:cNvPr id="1" name=""/>
+        <p:cNvGrpSpPr/>
+        <p:nvPr/>
+      </p:nvGrpSpPr>
+      <p:grpSpPr>
+        <a:xfrm>
+          <a:off x="0" y="0"/>
+          <a:ext cx="0" cy="0"/>
+          <a:chOff x="0" y="0"/>
+          <a:chExt cx="0" cy="0"/>
+        </a:xfrm>
+      </p:grpSpPr>
+      <p:sp>
+        <p:nvSpPr>
+          <p:cNvPr id="2" name="Titre 1"/>
+          <p:cNvSpPr>
+            <a:spLocks noGrp="1"/>
+          </p:cNvSpPr>
+          <p:nvPr>
+            <p:ph type="title"/>
+          </p:nvPr>
+        </p:nvSpPr>
+        <p:spPr>
+          <a:xfrm>
+            <a:off x="0" y="264308"/>
+            <a:ext cx="12192000" cy="970450"/>
+          </a:xfrm>
+          <a:ln>
+            <a:solidFill>
+              <a:srgbClr val="00B050"/>
+            </a:solidFill>
+          </a:ln>
+        </p:spPr>
+        <p:txBody>
+          <a:bodyPr/>
+          <a:lstStyle/>
+          <a:p>
+            <a:r>
+              <a:rPr lang="fr-FR" sz="5400" dirty="0" smtClean="0">
+                <a:solidFill>
+                  <a:schemeClr val="accent6"/>
+                </a:solidFill>
+              </a:rPr>
+              <a:t>IV. </a:t>
+            </a:r>
+            <a:r>
+              <a:rPr lang="fr-FR" sz="5400" dirty="0" smtClean="0"/>
+              <a:t>Performance</a:t>
+            </a:r>
+            <a:endParaRPr lang="fr-FR" sz="5400" dirty="0"/>
+          </a:p>
+        </p:txBody>
+      </p:sp>
+      <p:sp>
+        <p:nvSpPr>
+          <p:cNvPr id="3" name="Espace réservé du contenu 2"/>
+          <p:cNvSpPr>
+            <a:spLocks noGrp="1"/>
+          </p:cNvSpPr>
+          <p:nvPr>
+            <p:ph idx="1"/>
+          </p:nvPr>
+        </p:nvSpPr>
+        <p:spPr/>
+        <p:txBody>
+          <a:bodyPr/>
+          <a:lstStyle/>
+          <a:p>
+            <a:endParaRPr lang="fr-FR"/>
+          </a:p>
+        </p:txBody>
+      </p:sp>
+    </p:spTree>
+    <p:extLst>
+      <p:ext uri="{BB962C8B-B14F-4D97-AF65-F5344CB8AC3E}">
+        <p14:creationId xmlns:p14="http://schemas.microsoft.com/office/powerpoint/2010/main" val="2074799054"/>
       </p:ext>
     </p:extLst>
   </p:cSld>
@@ -8737,15 +7992,15 @@
 <file path=ppt/theme/theme1.xml><?xml version="1.0" encoding="utf-8"?>
 <a:theme xmlns:a="http://schemas.openxmlformats.org/drawingml/2006/main" name="Concis">
   <a:themeElements>
-    <a:clrScheme name="Quotable">
+    <a:clrScheme name="Personnalisé 1">
       <a:dk1>
-        <a:sysClr val="windowText" lastClr="000000"/>
+        <a:srgbClr val="313131"/>
       </a:dk1>
       <a:lt1>
         <a:sysClr val="window" lastClr="FFFFFF"/>
       </a:lt1>
       <a:dk2>
-        <a:srgbClr val="212121"/>
+        <a:srgbClr val="313131"/>
       </a:dk2>
       <a:lt2>
         <a:srgbClr val="636363"/>
@@ -8775,7 +8030,7 @@
         <a:srgbClr val="A5A5A5"/>
       </a:folHlink>
     </a:clrScheme>
-    <a:fontScheme name="Quotable">
+    <a:fontScheme name="Concis">
       <a:majorFont>
         <a:latin typeface="Century Gothic" panose="020B0502020202020204"/>
         <a:ea typeface=""/>
@@ -8847,7 +8102,7 @@
         <a:font script="Geor" typeface="Sylfaen"/>
       </a:minorFont>
     </a:fontScheme>
-    <a:fmtScheme name="Quotable">
+    <a:fmtScheme name="Concis">
       <a:fillStyleLst>
         <a:solidFill>
           <a:schemeClr val="phClr"/>
@@ -8969,4 +8224,133 @@
     </a:ext>
   </a:extLst>
 </a:theme>
+</file>
+
+<file path=ppt/theme/themeOverride1.xml><?xml version="1.0" encoding="utf-8"?>
+<a:themeOverride xmlns:a="http://schemas.openxmlformats.org/drawingml/2006/main">
+  <a:clrScheme name="Personnalisé 1">
+    <a:dk1>
+      <a:srgbClr val="00C6BB"/>
+    </a:dk1>
+    <a:lt1>
+      <a:sysClr val="window" lastClr="FFFFFF"/>
+    </a:lt1>
+    <a:dk2>
+      <a:srgbClr val="00C6BB"/>
+    </a:dk2>
+    <a:lt2>
+      <a:srgbClr val="636363"/>
+    </a:lt2>
+    <a:accent1>
+      <a:srgbClr val="313131"/>
+    </a:accent1>
+    <a:accent2>
+      <a:srgbClr val="6FEBA0"/>
+    </a:accent2>
+    <a:accent3>
+      <a:srgbClr val="B6DF5E"/>
+    </a:accent3>
+    <a:accent4>
+      <a:srgbClr val="EFB251"/>
+    </a:accent4>
+    <a:accent5>
+      <a:srgbClr val="EF755F"/>
+    </a:accent5>
+    <a:accent6>
+      <a:srgbClr val="ED515C"/>
+    </a:accent6>
+    <a:hlink>
+      <a:srgbClr val="8F8F8F"/>
+    </a:hlink>
+    <a:folHlink>
+      <a:srgbClr val="A5A5A5"/>
+    </a:folHlink>
+  </a:clrScheme>
+</a:themeOverride>
+</file>
+
+<file path=ppt/theme/themeOverride2.xml><?xml version="1.0" encoding="utf-8"?>
+<a:themeOverride xmlns:a="http://schemas.openxmlformats.org/drawingml/2006/main">
+  <a:clrScheme name="Personnalisé 1">
+    <a:dk1>
+      <a:srgbClr val="00C6BB"/>
+    </a:dk1>
+    <a:lt1>
+      <a:sysClr val="window" lastClr="FFFFFF"/>
+    </a:lt1>
+    <a:dk2>
+      <a:srgbClr val="00C6BB"/>
+    </a:dk2>
+    <a:lt2>
+      <a:srgbClr val="636363"/>
+    </a:lt2>
+    <a:accent1>
+      <a:srgbClr val="313131"/>
+    </a:accent1>
+    <a:accent2>
+      <a:srgbClr val="6FEBA0"/>
+    </a:accent2>
+    <a:accent3>
+      <a:srgbClr val="B6DF5E"/>
+    </a:accent3>
+    <a:accent4>
+      <a:srgbClr val="EFB251"/>
+    </a:accent4>
+    <a:accent5>
+      <a:srgbClr val="EF755F"/>
+    </a:accent5>
+    <a:accent6>
+      <a:srgbClr val="ED515C"/>
+    </a:accent6>
+    <a:hlink>
+      <a:srgbClr val="8F8F8F"/>
+    </a:hlink>
+    <a:folHlink>
+      <a:srgbClr val="A5A5A5"/>
+    </a:folHlink>
+  </a:clrScheme>
+</a:themeOverride>
+</file>
+
+<file path=ppt/theme/themeOverride3.xml><?xml version="1.0" encoding="utf-8"?>
+<a:themeOverride xmlns:a="http://schemas.openxmlformats.org/drawingml/2006/main">
+  <a:clrScheme name="Personnalisé 1">
+    <a:dk1>
+      <a:srgbClr val="00C6BB"/>
+    </a:dk1>
+    <a:lt1>
+      <a:sysClr val="window" lastClr="FFFFFF"/>
+    </a:lt1>
+    <a:dk2>
+      <a:srgbClr val="00C6BB"/>
+    </a:dk2>
+    <a:lt2>
+      <a:srgbClr val="636363"/>
+    </a:lt2>
+    <a:accent1>
+      <a:srgbClr val="313131"/>
+    </a:accent1>
+    <a:accent2>
+      <a:srgbClr val="6FEBA0"/>
+    </a:accent2>
+    <a:accent3>
+      <a:srgbClr val="B6DF5E"/>
+    </a:accent3>
+    <a:accent4>
+      <a:srgbClr val="EFB251"/>
+    </a:accent4>
+    <a:accent5>
+      <a:srgbClr val="EF755F"/>
+    </a:accent5>
+    <a:accent6>
+      <a:srgbClr val="ED515C"/>
+    </a:accent6>
+    <a:hlink>
+      <a:srgbClr val="8F8F8F"/>
+    </a:hlink>
+    <a:folHlink>
+      <a:srgbClr val="A5A5A5"/>
+    </a:folHlink>
+  </a:clrScheme>
+</a:themeOverride>
 </file>
</xml_diff>

<commit_message>
Completing slides on Vie du projet and Performance
</commit_message>
<xml_diff>
--- a/Livrables/Présentation.pptx
+++ b/Livrables/Présentation.pptx
@@ -1,6 +1,6 @@
 
 <file path=ppt/presentation.xml><?xml version="1.0" encoding="utf-8"?>
-<p:presentation xmlns:a="http://schemas.openxmlformats.org/drawingml/2006/main" xmlns:r="http://schemas.openxmlformats.org/officeDocument/2006/relationships" xmlns:p="http://schemas.openxmlformats.org/presentationml/2006/main" autoCompressPictures="0">
+<p:presentation xmlns:a="http://schemas.openxmlformats.org/drawingml/2006/main" xmlns:r="http://schemas.openxmlformats.org/officeDocument/2006/relationships" xmlns:p="http://schemas.openxmlformats.org/presentationml/2006/main" saveSubsetFonts="1" autoCompressPictures="0">
   <p:sldMasterIdLst>
     <p:sldMasterId id="2147483667" r:id="rId1"/>
   </p:sldMasterIdLst>
@@ -13,9 +13,12 @@
     <p:sldId id="266" r:id="rId7"/>
     <p:sldId id="267" r:id="rId8"/>
     <p:sldId id="259" r:id="rId9"/>
-    <p:sldId id="260" r:id="rId10"/>
-    <p:sldId id="262" r:id="rId11"/>
-    <p:sldId id="263" r:id="rId12"/>
+    <p:sldId id="268" r:id="rId10"/>
+    <p:sldId id="269" r:id="rId11"/>
+    <p:sldId id="260" r:id="rId12"/>
+    <p:sldId id="262" r:id="rId13"/>
+    <p:sldId id="270" r:id="rId14"/>
+    <p:sldId id="263" r:id="rId15"/>
   </p:sldIdLst>
   <p:sldSz cx="12192000" cy="6858000"/>
   <p:notesSz cx="6858000" cy="9144000"/>
@@ -122,6 +125,11 @@
             <a:srgbClr val="A4A3A4"/>
           </p15:clr>
         </p15:guide>
+        <p15:guide id="2" pos="3840">
+          <p15:clr>
+            <a:srgbClr val="A4A3A4"/>
+          </p15:clr>
+        </p15:guide>
       </p15:sldGuideLst>
     </p:ext>
   </p:extLst>
@@ -223,7 +231,7 @@
           <a:effectLst/>
           <a:extLst>
             <a:ext uri="{91240B29-F687-4f45-9708-019B960494DF}">
-              <a14:hiddenLine xmlns:a14="http://schemas.microsoft.com/office/drawing/2010/main" xmlns="" w="9525">
+              <a14:hiddenLine xmlns="" xmlns:a14="http://schemas.microsoft.com/office/drawing/2010/main" w="9525">
                 <a:solidFill>
                   <a:srgbClr val="000000"/>
                 </a:solidFill>
@@ -416,7 +424,7 @@
             <a:fld id="{08B9EBBA-996F-894A-B54A-D6246ED52CEA}" type="datetimeFigureOut">
               <a:rPr lang="en-US" smtClean="0"/>
               <a:pPr/>
-              <a:t>6/11/2018</a:t>
+              <a:t>6/11/18</a:t>
             </a:fld>
             <a:endParaRPr lang="en-US" dirty="0"/>
           </a:p>
@@ -459,7 +467,7 @@
             <a:fld id="{D57F1E4F-1CFF-5643-939E-217C01CDF565}" type="slidenum">
               <a:rPr lang="en-US" smtClean="0"/>
               <a:pPr/>
-              <a:t>‹N°›</a:t>
+              <a:t>‹#›</a:t>
             </a:fld>
             <a:endParaRPr lang="en-US" dirty="0"/>
           </a:p>
@@ -736,7 +744,7 @@
             <a:fld id="{18C79C5D-2A6F-F04D-97DA-BEF2467B64E4}" type="datetimeFigureOut">
               <a:rPr lang="en-US" smtClean="0"/>
               <a:pPr/>
-              <a:t>6/11/2018</a:t>
+              <a:t>6/11/18</a:t>
             </a:fld>
             <a:endParaRPr lang="en-US" dirty="0"/>
           </a:p>
@@ -779,7 +787,7 @@
             <a:fld id="{D57F1E4F-1CFF-5643-939E-217C01CDF565}" type="slidenum">
               <a:rPr lang="en-US" smtClean="0"/>
               <a:pPr/>
-              <a:t>‹N°›</a:t>
+              <a:t>‹#›</a:t>
             </a:fld>
             <a:endParaRPr lang="en-US" dirty="0"/>
           </a:p>
@@ -1226,7 +1234,7 @@
             <a:fld id="{8DFA1846-DA80-1C48-A609-854EA85C59AD}" type="datetimeFigureOut">
               <a:rPr lang="en-US" smtClean="0"/>
               <a:pPr/>
-              <a:t>6/11/2018</a:t>
+              <a:t>6/11/18</a:t>
             </a:fld>
             <a:endParaRPr lang="en-US" dirty="0"/>
           </a:p>
@@ -1269,7 +1277,7 @@
             <a:fld id="{D57F1E4F-1CFF-5643-939E-217C01CDF565}" type="slidenum">
               <a:rPr lang="en-US" smtClean="0"/>
               <a:pPr/>
-              <a:t>‹N°›</a:t>
+              <a:t>‹#›</a:t>
             </a:fld>
             <a:endParaRPr lang="en-US" dirty="0"/>
           </a:p>
@@ -1597,7 +1605,7 @@
             <a:fld id="{FBF54567-0DE4-3F47-BF90-CB84690072F9}" type="datetimeFigureOut">
               <a:rPr lang="en-US" smtClean="0"/>
               <a:pPr/>
-              <a:t>6/11/2018</a:t>
+              <a:t>6/11/18</a:t>
             </a:fld>
             <a:endParaRPr lang="en-US" dirty="0"/>
           </a:p>
@@ -1640,7 +1648,7 @@
             <a:fld id="{D57F1E4F-1CFF-5643-939E-217C01CDF565}" type="slidenum">
               <a:rPr lang="en-US" smtClean="0"/>
               <a:pPr/>
-              <a:t>‹N°›</a:t>
+              <a:t>‹#›</a:t>
             </a:fld>
             <a:endParaRPr lang="en-US" dirty="0"/>
           </a:p>
@@ -1753,7 +1761,7 @@
           <a:ln/>
           <a:extLst>
             <a:ext uri="{91240B29-F687-4f45-9708-019B960494DF}">
-              <a14:hiddenLine xmlns:a14="http://schemas.microsoft.com/office/drawing/2010/main" xmlns="" w="9525">
+              <a14:hiddenLine xmlns="" xmlns:a14="http://schemas.microsoft.com/office/drawing/2010/main" w="9525">
                 <a:solidFill>
                   <a:srgbClr val="000000"/>
                 </a:solidFill>
@@ -1872,7 +1880,7 @@
             <a:fld id="{C6C52C72-DE31-F449-A4ED-4C594FD91407}" type="datetimeFigureOut">
               <a:rPr lang="en-US" smtClean="0"/>
               <a:pPr/>
-              <a:t>6/11/2018</a:t>
+              <a:t>6/11/18</a:t>
             </a:fld>
             <a:endParaRPr lang="en-US" dirty="0"/>
           </a:p>
@@ -1915,7 +1923,7 @@
             <a:fld id="{D57F1E4F-1CFF-5643-939E-217C01CDF565}" type="slidenum">
               <a:rPr lang="en-US" smtClean="0"/>
               <a:pPr/>
-              <a:t>‹N°›</a:t>
+              <a:t>‹#›</a:t>
             </a:fld>
             <a:endParaRPr lang="en-US" dirty="0"/>
           </a:p>
@@ -2030,7 +2038,7 @@
           <a:ln/>
           <a:extLst>
             <a:ext uri="{91240B29-F687-4f45-9708-019B960494DF}">
-              <a14:hiddenLine xmlns:a14="http://schemas.microsoft.com/office/drawing/2010/main" xmlns="" w="9525">
+              <a14:hiddenLine xmlns="" xmlns:a14="http://schemas.microsoft.com/office/drawing/2010/main" w="9525">
                 <a:solidFill>
                   <a:srgbClr val="000000"/>
                 </a:solidFill>
@@ -2159,7 +2167,7 @@
             <a:fld id="{ED62726E-379B-B349-9EED-81ED093FA806}" type="datetimeFigureOut">
               <a:rPr lang="en-US" smtClean="0"/>
               <a:pPr/>
-              <a:t>6/11/2018</a:t>
+              <a:t>6/11/18</a:t>
             </a:fld>
             <a:endParaRPr lang="en-US" dirty="0"/>
           </a:p>
@@ -2202,7 +2210,7 @@
             <a:fld id="{D57F1E4F-1CFF-5643-939E-217C01CDF565}" type="slidenum">
               <a:rPr lang="en-US" smtClean="0"/>
               <a:pPr/>
-              <a:t>‹N°›</a:t>
+              <a:t>‹#›</a:t>
             </a:fld>
             <a:endParaRPr lang="en-US" dirty="0"/>
           </a:p>
@@ -2315,7 +2323,7 @@
           <a:ln/>
           <a:extLst>
             <a:ext uri="{91240B29-F687-4f45-9708-019B960494DF}">
-              <a14:hiddenLine xmlns:a14="http://schemas.microsoft.com/office/drawing/2010/main" xmlns="" w="9525">
+              <a14:hiddenLine xmlns="" xmlns:a14="http://schemas.microsoft.com/office/drawing/2010/main" w="9525">
                 <a:solidFill>
                   <a:srgbClr val="000000"/>
                 </a:solidFill>
@@ -2444,7 +2452,7 @@
             <a:fld id="{9B3A1323-8D79-1946-B0D7-40001CF92E9D}" type="datetimeFigureOut">
               <a:rPr lang="en-US" smtClean="0"/>
               <a:pPr/>
-              <a:t>6/11/2018</a:t>
+              <a:t>6/11/18</a:t>
             </a:fld>
             <a:endParaRPr lang="en-US" dirty="0"/>
           </a:p>
@@ -2487,7 +2495,7 @@
             <a:fld id="{D57F1E4F-1CFF-5643-939E-217C01CDF565}" type="slidenum">
               <a:rPr lang="en-US" smtClean="0"/>
               <a:pPr/>
-              <a:t>‹N°›</a:t>
+              <a:t>‹#›</a:t>
             </a:fld>
             <a:endParaRPr lang="en-US" dirty="0"/>
           </a:p>
@@ -2789,7 +2797,7 @@
             <a:fld id="{8DFA1846-DA80-1C48-A609-854EA85C59AD}" type="datetimeFigureOut">
               <a:rPr lang="en-US" smtClean="0"/>
               <a:pPr/>
-              <a:t>6/11/2018</a:t>
+              <a:t>6/11/18</a:t>
             </a:fld>
             <a:endParaRPr lang="en-US" dirty="0"/>
           </a:p>
@@ -2832,7 +2840,7 @@
             <a:fld id="{D57F1E4F-1CFF-5643-939E-217C01CDF565}" type="slidenum">
               <a:rPr lang="en-US" smtClean="0"/>
               <a:pPr/>
-              <a:t>‹N°›</a:t>
+              <a:t>‹#›</a:t>
             </a:fld>
             <a:endParaRPr lang="en-US" dirty="0"/>
           </a:p>
@@ -2945,7 +2953,7 @@
           <a:ln/>
           <a:extLst>
             <a:ext uri="{91240B29-F687-4f45-9708-019B960494DF}">
-              <a14:hiddenLine xmlns:a14="http://schemas.microsoft.com/office/drawing/2010/main" xmlns="" w="9525">
+              <a14:hiddenLine xmlns="" xmlns:a14="http://schemas.microsoft.com/office/drawing/2010/main" w="9525">
                 <a:solidFill>
                   <a:srgbClr val="000000"/>
                 </a:solidFill>
@@ -3130,7 +3138,7 @@
             <a:fld id="{57302355-E14B-8545-A8F8-0FE83CC9D524}" type="datetimeFigureOut">
               <a:rPr lang="en-US" smtClean="0"/>
               <a:pPr/>
-              <a:t>6/11/2018</a:t>
+              <a:t>6/11/18</a:t>
             </a:fld>
             <a:endParaRPr lang="en-US" dirty="0"/>
           </a:p>
@@ -3173,7 +3181,7 @@
             <a:fld id="{D57F1E4F-1CFF-5643-939E-217C01CDF565}" type="slidenum">
               <a:rPr lang="en-US" smtClean="0"/>
               <a:pPr/>
-              <a:t>‹N°›</a:t>
+              <a:t>‹#›</a:t>
             </a:fld>
             <a:endParaRPr lang="en-US" dirty="0"/>
           </a:p>
@@ -3286,7 +3294,7 @@
           <a:ln/>
           <a:extLst>
             <a:ext uri="{91240B29-F687-4f45-9708-019B960494DF}">
-              <a14:hiddenLine xmlns:a14="http://schemas.microsoft.com/office/drawing/2010/main" xmlns="" w="9525">
+              <a14:hiddenLine xmlns="" xmlns:a14="http://schemas.microsoft.com/office/drawing/2010/main" w="9525">
                 <a:solidFill>
                   <a:srgbClr val="000000"/>
                 </a:solidFill>
@@ -3609,7 +3617,7 @@
             <a:fld id="{02640F58-564D-2B4F-AE67-E407BA4FCF45}" type="datetimeFigureOut">
               <a:rPr lang="en-US" smtClean="0"/>
               <a:pPr/>
-              <a:t>6/11/2018</a:t>
+              <a:t>6/11/18</a:t>
             </a:fld>
             <a:endParaRPr lang="en-US" dirty="0"/>
           </a:p>
@@ -3652,7 +3660,7 @@
             <a:fld id="{D57F1E4F-1CFF-5643-939E-217C01CDF565}" type="slidenum">
               <a:rPr lang="en-US" smtClean="0"/>
               <a:pPr/>
-              <a:t>‹N°›</a:t>
+              <a:t>‹#›</a:t>
             </a:fld>
             <a:endParaRPr lang="en-US" dirty="0"/>
           </a:p>
@@ -3765,7 +3773,7 @@
           <a:ln/>
           <a:extLst>
             <a:ext uri="{91240B29-F687-4f45-9708-019B960494DF}">
-              <a14:hiddenLine xmlns:a14="http://schemas.microsoft.com/office/drawing/2010/main" xmlns="" w="9525">
+              <a14:hiddenLine xmlns="" xmlns:a14="http://schemas.microsoft.com/office/drawing/2010/main" w="9525">
                 <a:solidFill>
                   <a:srgbClr val="000000"/>
                 </a:solidFill>
@@ -3832,7 +3840,7 @@
             <a:fld id="{F13A34C8-038E-2045-AF43-DF7DBB8E0E9E}" type="datetimeFigureOut">
               <a:rPr lang="en-US" smtClean="0"/>
               <a:pPr/>
-              <a:t>6/11/2018</a:t>
+              <a:t>6/11/18</a:t>
             </a:fld>
             <a:endParaRPr lang="en-US" dirty="0"/>
           </a:p>
@@ -3875,7 +3883,7 @@
             <a:fld id="{D57F1E4F-1CFF-5643-939E-217C01CDF565}" type="slidenum">
               <a:rPr lang="en-US" smtClean="0"/>
               <a:pPr/>
-              <a:t>‹N°›</a:t>
+              <a:t>‹#›</a:t>
             </a:fld>
             <a:endParaRPr lang="en-US" dirty="0"/>
           </a:p>
@@ -3929,7 +3937,7 @@
             <a:fld id="{8818C68F-D26B-8F47-958C-23B49CF8A634}" type="datetimeFigureOut">
               <a:rPr lang="en-US" smtClean="0"/>
               <a:pPr/>
-              <a:t>6/11/2018</a:t>
+              <a:t>6/11/18</a:t>
             </a:fld>
             <a:endParaRPr lang="en-US" dirty="0"/>
           </a:p>
@@ -3972,7 +3980,7 @@
             <a:fld id="{D57F1E4F-1CFF-5643-939E-217C01CDF565}" type="slidenum">
               <a:rPr lang="en-US" smtClean="0"/>
               <a:pPr/>
-              <a:t>‹N°›</a:t>
+              <a:t>‹#›</a:t>
             </a:fld>
             <a:endParaRPr lang="en-US" dirty="0"/>
           </a:p>
@@ -4198,7 +4206,7 @@
           <a:ln/>
           <a:extLst>
             <a:ext uri="{91240B29-F687-4f45-9708-019B960494DF}">
-              <a14:hiddenLine xmlns:a14="http://schemas.microsoft.com/office/drawing/2010/main" xmlns="" w="9525">
+              <a14:hiddenLine xmlns="" xmlns:a14="http://schemas.microsoft.com/office/drawing/2010/main" w="9525">
                 <a:solidFill>
                   <a:srgbClr val="000000"/>
                 </a:solidFill>
@@ -4398,7 +4406,7 @@
             <a:fld id="{D0DF5E60-9974-AC48-9591-99C2BB44B7CF}" type="datetimeFigureOut">
               <a:rPr lang="en-US" smtClean="0"/>
               <a:pPr/>
-              <a:t>6/11/2018</a:t>
+              <a:t>6/11/18</a:t>
             </a:fld>
             <a:endParaRPr lang="en-US" dirty="0"/>
           </a:p>
@@ -4441,7 +4449,7 @@
             <a:fld id="{D57F1E4F-1CFF-5643-939E-217C01CDF565}" type="slidenum">
               <a:rPr lang="en-US" smtClean="0"/>
               <a:pPr/>
-              <a:t>‹N°›</a:t>
+              <a:t>‹#›</a:t>
             </a:fld>
             <a:endParaRPr lang="en-US" dirty="0"/>
           </a:p>
@@ -4713,7 +4721,7 @@
             <a:fld id="{18C79C5D-2A6F-F04D-97DA-BEF2467B64E4}" type="datetimeFigureOut">
               <a:rPr lang="en-US" smtClean="0"/>
               <a:pPr/>
-              <a:t>6/11/2018</a:t>
+              <a:t>6/11/18</a:t>
             </a:fld>
             <a:endParaRPr lang="en-US" dirty="0"/>
           </a:p>
@@ -4766,7 +4774,7 @@
             <a:fld id="{D57F1E4F-1CFF-5643-939E-217C01CDF565}" type="slidenum">
               <a:rPr lang="en-US" smtClean="0"/>
               <a:pPr/>
-              <a:t>‹N°›</a:t>
+              <a:t>‹#›</a:t>
             </a:fld>
             <a:endParaRPr lang="en-US" dirty="0"/>
           </a:p>
@@ -4985,7 +4993,7 @@
             <a:fld id="{09B482E8-6E0E-1B4F-B1FD-C69DB9E858D9}" type="datetimeFigureOut">
               <a:rPr lang="en-US" smtClean="0"/>
               <a:pPr/>
-              <a:t>6/11/2018</a:t>
+              <a:t>6/11/18</a:t>
             </a:fld>
             <a:endParaRPr lang="en-US" dirty="0"/>
           </a:p>
@@ -5025,7 +5033,7 @@
             <a:fld id="{D57F1E4F-1CFF-5643-939E-217C01CDF565}" type="slidenum">
               <a:rPr lang="en-US" smtClean="0"/>
               <a:pPr/>
-              <a:t>‹N°›</a:t>
+              <a:t>‹#›</a:t>
             </a:fld>
             <a:endParaRPr lang="en-US" dirty="0"/>
           </a:p>
@@ -5498,15 +5506,7 @@
           <a:p>
             <a:r>
               <a:rPr lang="fr-FR" sz="2400" dirty="0" smtClean="0"/>
-              <a:t>Laurent </a:t>
-            </a:r>
-            <a:r>
-              <a:rPr lang="fr-FR" sz="2400" dirty="0" smtClean="0"/>
-              <a:t>LAM &amp; Luc </a:t>
-            </a:r>
-            <a:r>
-              <a:rPr lang="fr-FR" sz="2400" dirty="0" smtClean="0"/>
-              <a:t>ZORRILLA</a:t>
+              <a:t>Laurent LAM &amp; Luc ZORRILLA</a:t>
             </a:r>
             <a:endParaRPr lang="fr-FR" sz="2400" dirty="0"/>
           </a:p>
@@ -5954,7 +5954,7 @@
         </p:nvSpPr>
         <p:spPr>
           <a:xfrm>
-            <a:off x="0" y="264306"/>
+            <a:off x="0" y="307850"/>
             <a:ext cx="12192000" cy="970450"/>
           </a:xfrm>
           <a:ln>
@@ -5968,16 +5968,16 @@
           <a:lstStyle/>
           <a:p>
             <a:r>
-              <a:rPr lang="fr-FR" sz="5400" dirty="0" smtClean="0">
+              <a:rPr lang="fr-FR" sz="5400" dirty="0">
                 <a:solidFill>
                   <a:schemeClr val="accent6"/>
                 </a:solidFill>
               </a:rPr>
-              <a:t>IV. </a:t>
+              <a:t>III. </a:t>
             </a:r>
             <a:r>
               <a:rPr lang="fr-FR" sz="5400" dirty="0" smtClean="0"/>
-              <a:t>Performance</a:t>
+              <a:t>Vie du projet</a:t>
             </a:r>
             <a:endParaRPr lang="fr-FR" sz="5400" dirty="0"/>
           </a:p>
@@ -5998,14 +5998,124 @@
           <a:bodyPr/>
           <a:lstStyle/>
           <a:p>
-            <a:endParaRPr lang="fr-FR"/>
-          </a:p>
-        </p:txBody>
-      </p:sp>
+            <a:pPr marL="0" indent="0" algn="ctr">
+              <a:buNone/>
+            </a:pPr>
+            <a:r>
+              <a:rPr lang="fr-FR" sz="2000" b="1" dirty="0" smtClean="0"/>
+              <a:t>Expérience Git</a:t>
+            </a:r>
+          </a:p>
+          <a:p>
+            <a:pPr lvl="1"/>
+            <a:r>
+              <a:rPr lang="fr-FR" dirty="0" smtClean="0"/>
+              <a:t>Utilisation d’</a:t>
+            </a:r>
+            <a:r>
+              <a:rPr lang="fr-FR" dirty="0" err="1" smtClean="0"/>
+              <a:t>Atom</a:t>
+            </a:r>
+            <a:r>
+              <a:rPr lang="fr-FR" dirty="0" smtClean="0"/>
+              <a:t>		   et du package « Git Plus  »</a:t>
+            </a:r>
+          </a:p>
+          <a:p>
+            <a:pPr marL="457200" lvl="1" indent="0">
+              <a:buNone/>
+            </a:pPr>
+            <a:r>
+              <a:rPr lang="fr-FR" dirty="0" smtClean="0"/>
+              <a:t>	Interface graphique pour interagir avec Git</a:t>
+            </a:r>
+          </a:p>
+          <a:p>
+            <a:pPr lvl="2"/>
+            <a:r>
+              <a:rPr lang="fr-FR" dirty="0" smtClean="0"/>
+              <a:t>« Git </a:t>
+            </a:r>
+            <a:r>
+              <a:rPr lang="fr-FR" dirty="0" err="1" smtClean="0"/>
+              <a:t>add</a:t>
+            </a:r>
+            <a:r>
+              <a:rPr lang="fr-FR" dirty="0" smtClean="0"/>
+              <a:t> + commit + push » simplifié</a:t>
+            </a:r>
+          </a:p>
+          <a:p>
+            <a:pPr lvl="2"/>
+            <a:r>
+              <a:rPr lang="fr-FR" dirty="0" smtClean="0"/>
+              <a:t>Conflits facilement résolus et fusion instantanée</a:t>
+            </a:r>
+          </a:p>
+          <a:p>
+            <a:pPr lvl="1"/>
+            <a:r>
+              <a:rPr lang="fr-FR" dirty="0" smtClean="0"/>
+              <a:t>Avantages</a:t>
+            </a:r>
+            <a:endParaRPr lang="fr-FR" dirty="0"/>
+          </a:p>
+          <a:p>
+            <a:pPr lvl="2"/>
+            <a:r>
+              <a:rPr lang="fr-FR" dirty="0" smtClean="0"/>
+              <a:t>Travail en parallèle sur le même projet (potentiellement même fichier)</a:t>
+            </a:r>
+            <a:endParaRPr lang="fr-FR" dirty="0"/>
+          </a:p>
+          <a:p>
+            <a:pPr lvl="2"/>
+            <a:r>
+              <a:rPr lang="fr-FR" dirty="0" smtClean="0"/>
+              <a:t>Fonctionnalités très pratiques et productives pour un tel projet (+1000 lignes de code)</a:t>
+            </a:r>
+            <a:endParaRPr lang="fr-FR" dirty="0"/>
+          </a:p>
+          <a:p>
+            <a:pPr lvl="2"/>
+            <a:endParaRPr lang="fr-FR" dirty="0" smtClean="0"/>
+          </a:p>
+        </p:txBody>
+      </p:sp>
+      <p:pic>
+        <p:nvPicPr>
+          <p:cNvPr id="4" name="Image 3"/>
+          <p:cNvPicPr>
+            <a:picLocks noChangeAspect="1"/>
+          </p:cNvPicPr>
+          <p:nvPr/>
+        </p:nvPicPr>
+        <p:blipFill>
+          <a:blip r:embed="rId2">
+            <a:extLst>
+              <a:ext uri="{28A0092B-C50C-407E-A947-70E740481C1C}">
+                <a14:useLocalDpi xmlns:a14="http://schemas.microsoft.com/office/drawing/2010/main" val="0"/>
+              </a:ext>
+            </a:extLst>
+          </a:blip>
+          <a:stretch>
+            <a:fillRect/>
+          </a:stretch>
+        </p:blipFill>
+        <p:spPr>
+          <a:xfrm>
+            <a:off x="3467595" y="2561569"/>
+            <a:ext cx="725384" cy="725384"/>
+          </a:xfrm>
+          <a:prstGeom prst="rect">
+            <a:avLst/>
+          </a:prstGeom>
+        </p:spPr>
+      </p:pic>
     </p:spTree>
     <p:extLst>
       <p:ext uri="{BB962C8B-B14F-4D97-AF65-F5344CB8AC3E}">
-        <p14:creationId xmlns:p14="http://schemas.microsoft.com/office/powerpoint/2010/main" val="3817966102"/>
+        <p14:creationId xmlns:p14="http://schemas.microsoft.com/office/powerpoint/2010/main" val="1921831149"/>
       </p:ext>
     </p:extLst>
   </p:cSld>
@@ -6051,7 +6161,7 @@
         </p:nvSpPr>
         <p:spPr>
           <a:xfrm>
-            <a:off x="0" y="316559"/>
+            <a:off x="0" y="264308"/>
             <a:ext cx="12192000" cy="970450"/>
           </a:xfrm>
           <a:ln>
@@ -6070,6 +6180,676 @@
                   <a:schemeClr val="accent6"/>
                 </a:solidFill>
               </a:rPr>
+              <a:t>IV. </a:t>
+            </a:r>
+            <a:r>
+              <a:rPr lang="fr-FR" sz="5400" dirty="0" smtClean="0"/>
+              <a:t>Performance</a:t>
+            </a:r>
+            <a:endParaRPr lang="fr-FR" sz="5400" dirty="0"/>
+          </a:p>
+        </p:txBody>
+      </p:sp>
+      <p:sp>
+        <p:nvSpPr>
+          <p:cNvPr id="3" name="Espace réservé du contenu 2"/>
+          <p:cNvSpPr>
+            <a:spLocks noGrp="1"/>
+          </p:cNvSpPr>
+          <p:nvPr>
+            <p:ph idx="1"/>
+          </p:nvPr>
+        </p:nvSpPr>
+        <p:spPr/>
+        <p:txBody>
+          <a:bodyPr/>
+          <a:lstStyle/>
+          <a:p>
+            <a:r>
+              <a:rPr lang="fr-FR" dirty="0" smtClean="0"/>
+              <a:t>Influence du facteur d’apprentissage Gamma</a:t>
+            </a:r>
+          </a:p>
+          <a:p>
+            <a:pPr marL="0" indent="0" algn="ctr">
+              <a:buNone/>
+            </a:pPr>
+            <a:r>
+              <a:rPr lang="fr-FR" sz="1600" dirty="0" smtClean="0"/>
+              <a:t>							Conditions des tests</a:t>
+            </a:r>
+          </a:p>
+          <a:p>
+            <a:pPr marL="0" indent="0" algn="ctr">
+              <a:buNone/>
+            </a:pPr>
+            <a:r>
+              <a:rPr lang="fr-FR" sz="1200" dirty="0"/>
+              <a:t>	</a:t>
+            </a:r>
+            <a:r>
+              <a:rPr lang="fr-FR" sz="1200" dirty="0" smtClean="0"/>
+              <a:t>						Labyrinthe de taille 10x10</a:t>
+            </a:r>
+          </a:p>
+          <a:p>
+            <a:pPr marL="0" indent="0" algn="ctr">
+              <a:buNone/>
+            </a:pPr>
+            <a:r>
+              <a:rPr lang="fr-FR" sz="1200" dirty="0"/>
+              <a:t>	</a:t>
+            </a:r>
+            <a:r>
+              <a:rPr lang="fr-FR" sz="1200" dirty="0" smtClean="0"/>
+              <a:t>						Nombre d’épisodes :1000</a:t>
+            </a:r>
+          </a:p>
+          <a:p>
+            <a:pPr marL="0" indent="0" algn="ctr">
+              <a:buNone/>
+            </a:pPr>
+            <a:r>
+              <a:rPr lang="fr-FR" sz="1200" dirty="0"/>
+              <a:t>	</a:t>
+            </a:r>
+            <a:r>
+              <a:rPr lang="fr-FR" sz="1200" dirty="0" smtClean="0"/>
+              <a:t>								Nombre d’actions par épisode : 1000</a:t>
+            </a:r>
+          </a:p>
+          <a:p>
+            <a:pPr marL="0" indent="0" algn="ctr">
+              <a:buNone/>
+            </a:pPr>
+            <a:r>
+              <a:rPr lang="fr-FR" sz="1200" dirty="0"/>
+              <a:t>	</a:t>
+            </a:r>
+            <a:r>
+              <a:rPr lang="fr-FR" sz="1200" dirty="0" smtClean="0"/>
+              <a:t>											Ratio Victory : Nombre de victoires sur Nombre d’épisodes</a:t>
+            </a:r>
+          </a:p>
+          <a:p>
+            <a:pPr marL="0" indent="0" algn="ctr">
+              <a:buNone/>
+            </a:pPr>
+            <a:r>
+              <a:rPr lang="fr-FR" sz="1200" dirty="0"/>
+              <a:t>	</a:t>
+            </a:r>
+            <a:r>
+              <a:rPr lang="fr-FR" sz="1200" dirty="0" smtClean="0"/>
+              <a:t>									Gamma variant de 0,1 à 0,99 (pas de 0,1 ou 0,09)</a:t>
+            </a:r>
+          </a:p>
+          <a:p>
+            <a:pPr marL="0" indent="0" algn="ctr">
+              <a:buNone/>
+            </a:pPr>
+            <a:endParaRPr lang="fr-FR" sz="1200" dirty="0"/>
+          </a:p>
+          <a:p>
+            <a:pPr marL="0" indent="0" algn="ctr">
+              <a:buNone/>
+            </a:pPr>
+            <a:r>
+              <a:rPr lang="fr-FR" sz="1200" dirty="0" smtClean="0"/>
+              <a:t>						Pour un même labyrinthe:</a:t>
+            </a:r>
+          </a:p>
+          <a:p>
+            <a:pPr marL="0" indent="0" algn="ctr">
+              <a:buNone/>
+            </a:pPr>
+            <a:r>
+              <a:rPr lang="fr-FR" sz="1200" dirty="0" smtClean="0"/>
+              <a:t>											Moyenne sur 10 valeurs de Ratio pour chaque Gamma</a:t>
+            </a:r>
+            <a:endParaRPr lang="fr-FR" dirty="0" smtClean="0"/>
+          </a:p>
+          <a:p>
+            <a:endParaRPr lang="fr-FR" dirty="0"/>
+          </a:p>
+        </p:txBody>
+      </p:sp>
+      <p:pic>
+        <p:nvPicPr>
+          <p:cNvPr id="4" name="Image 3"/>
+          <p:cNvPicPr>
+            <a:picLocks noChangeAspect="1"/>
+          </p:cNvPicPr>
+          <p:nvPr/>
+        </p:nvPicPr>
+        <p:blipFill>
+          <a:blip r:embed="rId2">
+            <a:extLst>
+              <a:ext uri="{28A0092B-C50C-407E-A947-70E740481C1C}">
+                <a14:useLocalDpi xmlns:a14="http://schemas.microsoft.com/office/drawing/2010/main" val="0"/>
+              </a:ext>
+            </a:extLst>
+          </a:blip>
+          <a:stretch>
+            <a:fillRect/>
+          </a:stretch>
+        </p:blipFill>
+        <p:spPr>
+          <a:xfrm>
+            <a:off x="966652" y="2697300"/>
+            <a:ext cx="5379522" cy="3843829"/>
+          </a:xfrm>
+          <a:prstGeom prst="rect">
+            <a:avLst/>
+          </a:prstGeom>
+        </p:spPr>
+      </p:pic>
+    </p:spTree>
+    <p:extLst>
+      <p:ext uri="{BB962C8B-B14F-4D97-AF65-F5344CB8AC3E}">
+        <p14:creationId xmlns:p14="http://schemas.microsoft.com/office/powerpoint/2010/main" val="2074799054"/>
+      </p:ext>
+    </p:extLst>
+  </p:cSld>
+  <p:clrMapOvr>
+    <a:masterClrMapping/>
+  </p:clrMapOvr>
+  <p:timing>
+    <p:tnLst>
+      <p:par>
+        <p:cTn id="1" dur="indefinite" restart="never" nodeType="tmRoot"/>
+      </p:par>
+    </p:tnLst>
+  </p:timing>
+</p:sld>
+</file>
+
+<file path=ppt/slides/slide12.xml><?xml version="1.0" encoding="utf-8"?>
+<p:sld xmlns:a="http://schemas.openxmlformats.org/drawingml/2006/main" xmlns:r="http://schemas.openxmlformats.org/officeDocument/2006/relationships" xmlns:p="http://schemas.openxmlformats.org/presentationml/2006/main">
+  <p:cSld>
+    <p:spTree>
+      <p:nvGrpSpPr>
+        <p:cNvPr id="1" name=""/>
+        <p:cNvGrpSpPr/>
+        <p:nvPr/>
+      </p:nvGrpSpPr>
+      <p:grpSpPr>
+        <a:xfrm>
+          <a:off x="0" y="0"/>
+          <a:ext cx="0" cy="0"/>
+          <a:chOff x="0" y="0"/>
+          <a:chExt cx="0" cy="0"/>
+        </a:xfrm>
+      </p:grpSpPr>
+      <p:sp>
+        <p:nvSpPr>
+          <p:cNvPr id="2" name="Titre 1"/>
+          <p:cNvSpPr>
+            <a:spLocks noGrp="1"/>
+          </p:cNvSpPr>
+          <p:nvPr>
+            <p:ph type="title"/>
+          </p:nvPr>
+        </p:nvSpPr>
+        <p:spPr>
+          <a:xfrm>
+            <a:off x="0" y="264306"/>
+            <a:ext cx="12192000" cy="970450"/>
+          </a:xfrm>
+          <a:ln>
+            <a:solidFill>
+              <a:srgbClr val="00B050"/>
+            </a:solidFill>
+          </a:ln>
+        </p:spPr>
+        <p:txBody>
+          <a:bodyPr/>
+          <a:lstStyle/>
+          <a:p>
+            <a:r>
+              <a:rPr lang="fr-FR" sz="5400" dirty="0" smtClean="0">
+                <a:solidFill>
+                  <a:schemeClr val="accent6"/>
+                </a:solidFill>
+              </a:rPr>
+              <a:t>IV. </a:t>
+            </a:r>
+            <a:r>
+              <a:rPr lang="fr-FR" sz="5400" dirty="0" smtClean="0"/>
+              <a:t>Performance</a:t>
+            </a:r>
+            <a:endParaRPr lang="fr-FR" sz="5400" dirty="0"/>
+          </a:p>
+        </p:txBody>
+      </p:sp>
+      <p:sp>
+        <p:nvSpPr>
+          <p:cNvPr id="3" name="Espace réservé du contenu 2"/>
+          <p:cNvSpPr>
+            <a:spLocks noGrp="1"/>
+          </p:cNvSpPr>
+          <p:nvPr>
+            <p:ph idx="1"/>
+          </p:nvPr>
+        </p:nvSpPr>
+        <p:spPr>
+          <a:xfrm>
+            <a:off x="0" y="1888177"/>
+            <a:ext cx="12192000" cy="4969823"/>
+          </a:xfrm>
+        </p:spPr>
+        <p:txBody>
+          <a:bodyPr>
+            <a:normAutofit lnSpcReduction="10000"/>
+          </a:bodyPr>
+          <a:lstStyle/>
+          <a:p>
+            <a:pPr lvl="1"/>
+            <a:r>
+              <a:rPr lang="fr-FR" sz="1800" dirty="0" smtClean="0"/>
+              <a:t>Nombre de déplacements pour sortir du labyrinthe en fonction du nombre d’épisodes</a:t>
+            </a:r>
+          </a:p>
+          <a:p>
+            <a:pPr marL="0" indent="0" algn="ctr">
+              <a:buNone/>
+            </a:pPr>
+            <a:r>
+              <a:rPr lang="fr-FR" sz="1200" dirty="0"/>
+              <a:t>Labyrinthe 10x10 </a:t>
+            </a:r>
+            <a:r>
+              <a:rPr lang="fr-FR" sz="1200" dirty="0" smtClean="0"/>
+              <a:t> 500 épisodes 500 actions</a:t>
+            </a:r>
+            <a:endParaRPr lang="fr-FR" sz="1800" dirty="0" smtClean="0"/>
+          </a:p>
+          <a:p>
+            <a:endParaRPr lang="fr-FR" dirty="0"/>
+          </a:p>
+          <a:p>
+            <a:endParaRPr lang="fr-FR" dirty="0" smtClean="0"/>
+          </a:p>
+          <a:p>
+            <a:endParaRPr lang="fr-FR" dirty="0" smtClean="0"/>
+          </a:p>
+          <a:p>
+            <a:endParaRPr lang="fr-FR" dirty="0"/>
+          </a:p>
+          <a:p>
+            <a:endParaRPr lang="fr-FR" dirty="0" smtClean="0"/>
+          </a:p>
+          <a:p>
+            <a:endParaRPr lang="fr-FR" dirty="0"/>
+          </a:p>
+          <a:p>
+            <a:endParaRPr lang="fr-FR" dirty="0" smtClean="0"/>
+          </a:p>
+          <a:p>
+            <a:pPr marL="0" indent="0">
+              <a:buNone/>
+            </a:pPr>
+            <a:endParaRPr lang="fr-FR" sz="1200" dirty="0"/>
+          </a:p>
+          <a:p>
+            <a:pPr marL="0" indent="0">
+              <a:buNone/>
+            </a:pPr>
+            <a:endParaRPr lang="fr-FR" sz="1200" dirty="0" smtClean="0"/>
+          </a:p>
+          <a:p>
+            <a:pPr marL="0" indent="0">
+              <a:buNone/>
+            </a:pPr>
+            <a:r>
+              <a:rPr lang="fr-FR" sz="1200" dirty="0" smtClean="0"/>
+              <a:t>	Gamma : 0.1							Gamma : 0.4							Gamma : 0.8</a:t>
+            </a:r>
+            <a:endParaRPr lang="fr-FR" sz="1200" dirty="0" smtClean="0"/>
+          </a:p>
+          <a:p>
+            <a:pPr marL="0" indent="0">
+              <a:buNone/>
+            </a:pPr>
+            <a:r>
+              <a:rPr lang="fr-FR" sz="1200" dirty="0" smtClean="0"/>
+              <a:t>	Moyenne d’actions nécessaires :				Moyenne d’actions nécessaires :				Moyenne d’actions nécessaires :</a:t>
+            </a:r>
+          </a:p>
+          <a:p>
+            <a:pPr marL="0" indent="0">
+              <a:buNone/>
+            </a:pPr>
+            <a:r>
+              <a:rPr lang="fr-FR" sz="1200" dirty="0"/>
+              <a:t>	</a:t>
+            </a:r>
+            <a:r>
+              <a:rPr lang="fr-FR" sz="1200" dirty="0" smtClean="0"/>
+              <a:t>	80									50									10</a:t>
+            </a:r>
+            <a:endParaRPr lang="fr-FR" sz="1200" dirty="0"/>
+          </a:p>
+        </p:txBody>
+      </p:sp>
+      <p:pic>
+        <p:nvPicPr>
+          <p:cNvPr id="4" name="Image 3"/>
+          <p:cNvPicPr>
+            <a:picLocks noChangeAspect="1"/>
+          </p:cNvPicPr>
+          <p:nvPr/>
+        </p:nvPicPr>
+        <p:blipFill>
+          <a:blip r:embed="rId2">
+            <a:extLst>
+              <a:ext uri="{28A0092B-C50C-407E-A947-70E740481C1C}">
+                <a14:useLocalDpi xmlns:a14="http://schemas.microsoft.com/office/drawing/2010/main" val="0"/>
+              </a:ext>
+            </a:extLst>
+          </a:blip>
+          <a:stretch>
+            <a:fillRect/>
+          </a:stretch>
+        </p:blipFill>
+        <p:spPr>
+          <a:xfrm>
+            <a:off x="160697" y="2671948"/>
+            <a:ext cx="3577728" cy="3010914"/>
+          </a:xfrm>
+          <a:prstGeom prst="rect">
+            <a:avLst/>
+          </a:prstGeom>
+        </p:spPr>
+      </p:pic>
+      <p:pic>
+        <p:nvPicPr>
+          <p:cNvPr id="5" name="Image 4"/>
+          <p:cNvPicPr>
+            <a:picLocks noChangeAspect="1"/>
+          </p:cNvPicPr>
+          <p:nvPr/>
+        </p:nvPicPr>
+        <p:blipFill>
+          <a:blip r:embed="rId3">
+            <a:extLst>
+              <a:ext uri="{28A0092B-C50C-407E-A947-70E740481C1C}">
+                <a14:useLocalDpi xmlns:a14="http://schemas.microsoft.com/office/drawing/2010/main" val="0"/>
+              </a:ext>
+            </a:extLst>
+          </a:blip>
+          <a:stretch>
+            <a:fillRect/>
+          </a:stretch>
+        </p:blipFill>
+        <p:spPr>
+          <a:xfrm>
+            <a:off x="4250658" y="2671948"/>
+            <a:ext cx="3474943" cy="3010914"/>
+          </a:xfrm>
+          <a:prstGeom prst="rect">
+            <a:avLst/>
+          </a:prstGeom>
+        </p:spPr>
+      </p:pic>
+      <p:pic>
+        <p:nvPicPr>
+          <p:cNvPr id="6" name="Image 5"/>
+          <p:cNvPicPr>
+            <a:picLocks noChangeAspect="1"/>
+          </p:cNvPicPr>
+          <p:nvPr/>
+        </p:nvPicPr>
+        <p:blipFill>
+          <a:blip r:embed="rId4">
+            <a:extLst>
+              <a:ext uri="{28A0092B-C50C-407E-A947-70E740481C1C}">
+                <a14:useLocalDpi xmlns:a14="http://schemas.microsoft.com/office/drawing/2010/main" val="0"/>
+              </a:ext>
+            </a:extLst>
+          </a:blip>
+          <a:stretch>
+            <a:fillRect/>
+          </a:stretch>
+        </p:blipFill>
+        <p:spPr>
+          <a:xfrm>
+            <a:off x="8493477" y="2671948"/>
+            <a:ext cx="3537824" cy="3010914"/>
+          </a:xfrm>
+          <a:prstGeom prst="rect">
+            <a:avLst/>
+          </a:prstGeom>
+        </p:spPr>
+      </p:pic>
+    </p:spTree>
+    <p:extLst>
+      <p:ext uri="{BB962C8B-B14F-4D97-AF65-F5344CB8AC3E}">
+        <p14:creationId xmlns:p14="http://schemas.microsoft.com/office/powerpoint/2010/main" val="3817966102"/>
+      </p:ext>
+    </p:extLst>
+  </p:cSld>
+  <p:clrMapOvr>
+    <a:masterClrMapping/>
+  </p:clrMapOvr>
+  <p:timing>
+    <p:tnLst>
+      <p:par>
+        <p:cTn id="1" dur="indefinite" restart="never" nodeType="tmRoot"/>
+      </p:par>
+    </p:tnLst>
+  </p:timing>
+</p:sld>
+</file>
+
+<file path=ppt/slides/slide13.xml><?xml version="1.0" encoding="utf-8"?>
+<p:sld xmlns:a="http://schemas.openxmlformats.org/drawingml/2006/main" xmlns:r="http://schemas.openxmlformats.org/officeDocument/2006/relationships" xmlns:p="http://schemas.openxmlformats.org/presentationml/2006/main">
+  <p:cSld>
+    <p:spTree>
+      <p:nvGrpSpPr>
+        <p:cNvPr id="1" name=""/>
+        <p:cNvGrpSpPr/>
+        <p:nvPr/>
+      </p:nvGrpSpPr>
+      <p:grpSpPr>
+        <a:xfrm>
+          <a:off x="0" y="0"/>
+          <a:ext cx="0" cy="0"/>
+          <a:chOff x="0" y="0"/>
+          <a:chExt cx="0" cy="0"/>
+        </a:xfrm>
+      </p:grpSpPr>
+      <p:sp>
+        <p:nvSpPr>
+          <p:cNvPr id="2" name="Titre 1"/>
+          <p:cNvSpPr>
+            <a:spLocks noGrp="1"/>
+          </p:cNvSpPr>
+          <p:nvPr>
+            <p:ph type="title"/>
+          </p:nvPr>
+        </p:nvSpPr>
+        <p:spPr>
+          <a:xfrm>
+            <a:off x="0" y="264308"/>
+            <a:ext cx="12192000" cy="970450"/>
+          </a:xfrm>
+          <a:ln>
+            <a:solidFill>
+              <a:srgbClr val="00B050"/>
+            </a:solidFill>
+          </a:ln>
+        </p:spPr>
+        <p:txBody>
+          <a:bodyPr/>
+          <a:lstStyle/>
+          <a:p>
+            <a:r>
+              <a:rPr lang="fr-FR" sz="5400" dirty="0" smtClean="0">
+                <a:solidFill>
+                  <a:schemeClr val="accent6"/>
+                </a:solidFill>
+              </a:rPr>
+              <a:t>IV. </a:t>
+            </a:r>
+            <a:r>
+              <a:rPr lang="fr-FR" sz="5400" dirty="0" smtClean="0"/>
+              <a:t>Performance</a:t>
+            </a:r>
+            <a:endParaRPr lang="fr-FR" sz="5400" dirty="0"/>
+          </a:p>
+        </p:txBody>
+      </p:sp>
+      <p:sp>
+        <p:nvSpPr>
+          <p:cNvPr id="3" name="Espace réservé du contenu 2"/>
+          <p:cNvSpPr>
+            <a:spLocks noGrp="1"/>
+          </p:cNvSpPr>
+          <p:nvPr>
+            <p:ph idx="1"/>
+          </p:nvPr>
+        </p:nvSpPr>
+        <p:spPr/>
+        <p:txBody>
+          <a:bodyPr/>
+          <a:lstStyle/>
+          <a:p>
+            <a:r>
+              <a:rPr lang="fr-FR" dirty="0" smtClean="0"/>
+              <a:t>Défauts et améliorations possibles</a:t>
+            </a:r>
+          </a:p>
+          <a:p>
+            <a:pPr lvl="1"/>
+            <a:r>
+              <a:rPr lang="fr-FR" dirty="0" smtClean="0"/>
+              <a:t>Manque de puissance de calculs : Complexité spatiale et temporelle en O(n</a:t>
+            </a:r>
+            <a:r>
+              <a:rPr lang="fr-FR" baseline="30000" dirty="0" smtClean="0"/>
+              <a:t>3</a:t>
+            </a:r>
+            <a:r>
+              <a:rPr lang="fr-FR" dirty="0" smtClean="0"/>
+              <a:t>) en le nombre de cases du labyrinthe</a:t>
+            </a:r>
+          </a:p>
+          <a:p>
+            <a:pPr lvl="1"/>
+            <a:r>
+              <a:rPr lang="fr-FR" dirty="0" smtClean="0"/>
+              <a:t>Structure et architecture de l’environnement et de l’agent créés par nous-mêmes</a:t>
+            </a:r>
+          </a:p>
+          <a:p>
+            <a:pPr marL="457200" lvl="1" indent="0">
+              <a:buNone/>
+            </a:pPr>
+            <a:r>
+              <a:rPr lang="fr-FR" dirty="0" smtClean="0"/>
+              <a:t>	Non nécessairement optimal </a:t>
+            </a:r>
+          </a:p>
+          <a:p>
+            <a:pPr lvl="1"/>
+            <a:r>
+              <a:rPr lang="fr-FR" dirty="0" smtClean="0"/>
+              <a:t>Défauts d’un labyrinthe aléatoire</a:t>
+            </a:r>
+          </a:p>
+          <a:p>
+            <a:pPr lvl="2"/>
+            <a:r>
+              <a:rPr lang="fr-FR" dirty="0" smtClean="0"/>
+              <a:t>Chemin de l’entrée vers la sortie potentiellement bloquée par des murs </a:t>
+            </a:r>
+          </a:p>
+          <a:p>
+            <a:pPr lvl="2"/>
+            <a:r>
+              <a:rPr lang="fr-FR" dirty="0" smtClean="0"/>
+              <a:t>Entrée juste à côté de la sortie</a:t>
+            </a:r>
+            <a:endParaRPr lang="fr-FR" dirty="0"/>
+          </a:p>
+          <a:p>
+            <a:pPr lvl="1"/>
+            <a:r>
+              <a:rPr lang="fr-FR" dirty="0" smtClean="0"/>
+              <a:t>Mise à jour de la matrice de Qualité uniquement dans un rayon de deux cases de la position courante</a:t>
+            </a:r>
+          </a:p>
+        </p:txBody>
+      </p:sp>
+    </p:spTree>
+    <p:extLst>
+      <p:ext uri="{BB962C8B-B14F-4D97-AF65-F5344CB8AC3E}">
+        <p14:creationId xmlns:p14="http://schemas.microsoft.com/office/powerpoint/2010/main" val="1143721923"/>
+      </p:ext>
+    </p:extLst>
+  </p:cSld>
+  <p:clrMapOvr>
+    <a:masterClrMapping/>
+  </p:clrMapOvr>
+  <p:timing>
+    <p:tnLst>
+      <p:par>
+        <p:cTn id="1" dur="indefinite" restart="never" nodeType="tmRoot"/>
+      </p:par>
+    </p:tnLst>
+  </p:timing>
+</p:sld>
+</file>
+
+<file path=ppt/slides/slide14.xml><?xml version="1.0" encoding="utf-8"?>
+<p:sld xmlns:a="http://schemas.openxmlformats.org/drawingml/2006/main" xmlns:r="http://schemas.openxmlformats.org/officeDocument/2006/relationships" xmlns:p="http://schemas.openxmlformats.org/presentationml/2006/main">
+  <p:cSld>
+    <p:spTree>
+      <p:nvGrpSpPr>
+        <p:cNvPr id="1" name=""/>
+        <p:cNvGrpSpPr/>
+        <p:nvPr/>
+      </p:nvGrpSpPr>
+      <p:grpSpPr>
+        <a:xfrm>
+          <a:off x="0" y="0"/>
+          <a:ext cx="0" cy="0"/>
+          <a:chOff x="0" y="0"/>
+          <a:chExt cx="0" cy="0"/>
+        </a:xfrm>
+      </p:grpSpPr>
+      <p:sp>
+        <p:nvSpPr>
+          <p:cNvPr id="2" name="Titre 1"/>
+          <p:cNvSpPr>
+            <a:spLocks noGrp="1"/>
+          </p:cNvSpPr>
+          <p:nvPr>
+            <p:ph type="title"/>
+          </p:nvPr>
+        </p:nvSpPr>
+        <p:spPr>
+          <a:xfrm>
+            <a:off x="0" y="316559"/>
+            <a:ext cx="12192000" cy="970450"/>
+          </a:xfrm>
+          <a:ln>
+            <a:solidFill>
+              <a:srgbClr val="00B050"/>
+            </a:solidFill>
+          </a:ln>
+        </p:spPr>
+        <p:txBody>
+          <a:bodyPr/>
+          <a:lstStyle/>
+          <a:p>
+            <a:r>
+              <a:rPr lang="fr-FR" sz="5400" dirty="0" smtClean="0">
+                <a:solidFill>
+                  <a:schemeClr val="accent6"/>
+                </a:solidFill>
+              </a:rPr>
               <a:t>V. </a:t>
             </a:r>
             <a:r>
@@ -6095,7 +6875,45 @@
           <a:bodyPr/>
           <a:lstStyle/>
           <a:p>
-            <a:endParaRPr lang="fr-FR"/>
+            <a:r>
+              <a:rPr lang="fr-FR" dirty="0" smtClean="0"/>
+              <a:t>Modélisation et implémentation d’un projet conséquent</a:t>
+            </a:r>
+          </a:p>
+          <a:p>
+            <a:pPr marL="742950" lvl="2" indent="-342900"/>
+            <a:r>
+              <a:rPr lang="fr-FR" sz="1600" dirty="0"/>
+              <a:t>Recherche d’informations et état de l’art à effectuer avant de pouvoir commencer</a:t>
+            </a:r>
+          </a:p>
+          <a:p>
+            <a:endParaRPr lang="fr-FR" sz="1600" dirty="0" smtClean="0"/>
+          </a:p>
+          <a:p>
+            <a:r>
+              <a:rPr lang="fr-FR" dirty="0" smtClean="0"/>
+              <a:t>Expérimentation du logiciel </a:t>
+            </a:r>
+            <a:r>
+              <a:rPr lang="fr-FR" dirty="0" err="1" smtClean="0"/>
+              <a:t>Atom</a:t>
+            </a:r>
+            <a:r>
+              <a:rPr lang="fr-FR" dirty="0" smtClean="0"/>
+              <a:t> et de ses fonctionnalités Git</a:t>
+            </a:r>
+          </a:p>
+          <a:p>
+            <a:pPr lvl="1"/>
+            <a:r>
+              <a:rPr lang="fr-FR" dirty="0" smtClean="0"/>
+              <a:t>Outils optimisés permettant de gagner du temps et de l’efficacité</a:t>
+            </a:r>
+          </a:p>
+          <a:p>
+            <a:pPr lvl="1"/>
+            <a:endParaRPr lang="fr-FR" dirty="0" smtClean="0"/>
           </a:p>
         </p:txBody>
       </p:sp>
@@ -6353,6 +7171,259 @@
           </a:p>
         </p:txBody>
       </p:sp>
+      <p:sp>
+        <p:nvSpPr>
+          <p:cNvPr id="4" name="Sous-titre 2"/>
+          <p:cNvSpPr txBox="1">
+            <a:spLocks/>
+          </p:cNvSpPr>
+          <p:nvPr/>
+        </p:nvSpPr>
+        <p:spPr>
+          <a:xfrm>
+            <a:off x="9763433" y="6400801"/>
+            <a:ext cx="2428568" cy="457199"/>
+          </a:xfrm>
+          <a:prstGeom prst="rect">
+            <a:avLst/>
+          </a:prstGeom>
+          <a:ln>
+            <a:solidFill>
+              <a:schemeClr val="tx1"/>
+            </a:solidFill>
+          </a:ln>
+          <a:effectLst>
+            <a:outerShdw blurRad="50800" dir="14400000">
+              <a:srgbClr val="000000">
+                <a:alpha val="40000"/>
+              </a:srgbClr>
+            </a:outerShdw>
+          </a:effectLst>
+        </p:spPr>
+        <p:txBody>
+          <a:bodyPr vert="horz" lIns="91440" tIns="45720" rIns="91440" bIns="45720" rtlCol="0" anchor="t">
+            <a:noAutofit/>
+          </a:bodyPr>
+          <a:lstStyle>
+            <a:lvl1pPr marL="0" indent="0" algn="l" defTabSz="457200" rtl="0" eaLnBrk="1" latinLnBrk="0" hangingPunct="1">
+              <a:spcBef>
+                <a:spcPct val="20000"/>
+              </a:spcBef>
+              <a:spcAft>
+                <a:spcPts val="600"/>
+              </a:spcAft>
+              <a:buClr>
+                <a:schemeClr val="accent1"/>
+              </a:buClr>
+              <a:buFont typeface="Wingdings 2" charset="2"/>
+              <a:buNone/>
+              <a:defRPr sz="1800" kern="1200">
+                <a:solidFill>
+                  <a:schemeClr val="tx1"/>
+                </a:solidFill>
+                <a:latin typeface="+mn-lt"/>
+                <a:ea typeface="+mn-ea"/>
+                <a:cs typeface="+mn-cs"/>
+              </a:defRPr>
+            </a:lvl1pPr>
+            <a:lvl2pPr marL="457200" indent="0" algn="ctr" defTabSz="457200" rtl="0" eaLnBrk="1" latinLnBrk="0" hangingPunct="1">
+              <a:spcBef>
+                <a:spcPct val="20000"/>
+              </a:spcBef>
+              <a:spcAft>
+                <a:spcPts val="600"/>
+              </a:spcAft>
+              <a:buClr>
+                <a:schemeClr val="accent1"/>
+              </a:buClr>
+              <a:buFont typeface="Wingdings 2" charset="2"/>
+              <a:buNone/>
+              <a:defRPr sz="1600" kern="1200">
+                <a:solidFill>
+                  <a:schemeClr val="tx1">
+                    <a:tint val="75000"/>
+                  </a:schemeClr>
+                </a:solidFill>
+                <a:latin typeface="+mn-lt"/>
+                <a:ea typeface="+mn-ea"/>
+                <a:cs typeface="+mn-cs"/>
+              </a:defRPr>
+            </a:lvl2pPr>
+            <a:lvl3pPr marL="914400" indent="0" algn="ctr" defTabSz="457200" rtl="0" eaLnBrk="1" latinLnBrk="0" hangingPunct="1">
+              <a:spcBef>
+                <a:spcPct val="20000"/>
+              </a:spcBef>
+              <a:spcAft>
+                <a:spcPts val="600"/>
+              </a:spcAft>
+              <a:buClr>
+                <a:schemeClr val="accent1"/>
+              </a:buClr>
+              <a:buFont typeface="Wingdings 2" charset="2"/>
+              <a:buNone/>
+              <a:defRPr sz="1400" kern="1200">
+                <a:solidFill>
+                  <a:schemeClr val="tx1">
+                    <a:tint val="75000"/>
+                  </a:schemeClr>
+                </a:solidFill>
+                <a:latin typeface="+mn-lt"/>
+                <a:ea typeface="+mn-ea"/>
+                <a:cs typeface="+mn-cs"/>
+              </a:defRPr>
+            </a:lvl3pPr>
+            <a:lvl4pPr marL="1371600" indent="0" algn="ctr" defTabSz="457200" rtl="0" eaLnBrk="1" latinLnBrk="0" hangingPunct="1">
+              <a:spcBef>
+                <a:spcPct val="20000"/>
+              </a:spcBef>
+              <a:spcAft>
+                <a:spcPts val="600"/>
+              </a:spcAft>
+              <a:buClr>
+                <a:schemeClr val="accent1"/>
+              </a:buClr>
+              <a:buFont typeface="Wingdings 2" charset="2"/>
+              <a:buNone/>
+              <a:defRPr sz="1200" kern="1200">
+                <a:solidFill>
+                  <a:schemeClr val="tx1">
+                    <a:tint val="75000"/>
+                  </a:schemeClr>
+                </a:solidFill>
+                <a:latin typeface="+mn-lt"/>
+                <a:ea typeface="+mn-ea"/>
+                <a:cs typeface="+mn-cs"/>
+              </a:defRPr>
+            </a:lvl4pPr>
+            <a:lvl5pPr marL="1828800" indent="0" algn="ctr" defTabSz="457200" rtl="0" eaLnBrk="1" latinLnBrk="0" hangingPunct="1">
+              <a:spcBef>
+                <a:spcPct val="20000"/>
+              </a:spcBef>
+              <a:spcAft>
+                <a:spcPts val="600"/>
+              </a:spcAft>
+              <a:buClr>
+                <a:schemeClr val="accent1"/>
+              </a:buClr>
+              <a:buFont typeface="Wingdings 2" charset="2"/>
+              <a:buNone/>
+              <a:defRPr sz="1200" kern="1200">
+                <a:solidFill>
+                  <a:schemeClr val="tx1">
+                    <a:tint val="75000"/>
+                  </a:schemeClr>
+                </a:solidFill>
+                <a:latin typeface="+mn-lt"/>
+                <a:ea typeface="+mn-ea"/>
+                <a:cs typeface="+mn-cs"/>
+              </a:defRPr>
+            </a:lvl5pPr>
+            <a:lvl6pPr marL="2286000" indent="0" algn="ctr" defTabSz="457200" rtl="0" eaLnBrk="1" latinLnBrk="0" hangingPunct="1">
+              <a:spcBef>
+                <a:spcPct val="20000"/>
+              </a:spcBef>
+              <a:spcAft>
+                <a:spcPts val="600"/>
+              </a:spcAft>
+              <a:buClr>
+                <a:schemeClr val="accent1"/>
+              </a:buClr>
+              <a:buFont typeface="Wingdings 2" charset="2"/>
+              <a:buNone/>
+              <a:defRPr sz="1200" kern="1200">
+                <a:solidFill>
+                  <a:schemeClr val="tx1">
+                    <a:tint val="75000"/>
+                  </a:schemeClr>
+                </a:solidFill>
+                <a:latin typeface="+mn-lt"/>
+                <a:ea typeface="+mn-ea"/>
+                <a:cs typeface="+mn-cs"/>
+              </a:defRPr>
+            </a:lvl6pPr>
+            <a:lvl7pPr marL="2743200" indent="0" algn="ctr" defTabSz="457200" rtl="0" eaLnBrk="1" latinLnBrk="0" hangingPunct="1">
+              <a:spcBef>
+                <a:spcPct val="20000"/>
+              </a:spcBef>
+              <a:spcAft>
+                <a:spcPts val="600"/>
+              </a:spcAft>
+              <a:buClr>
+                <a:schemeClr val="accent1"/>
+              </a:buClr>
+              <a:buFont typeface="Wingdings 2" charset="2"/>
+              <a:buNone/>
+              <a:defRPr sz="1200" kern="1200">
+                <a:solidFill>
+                  <a:schemeClr val="tx1">
+                    <a:tint val="75000"/>
+                  </a:schemeClr>
+                </a:solidFill>
+                <a:latin typeface="+mn-lt"/>
+                <a:ea typeface="+mn-ea"/>
+                <a:cs typeface="+mn-cs"/>
+              </a:defRPr>
+            </a:lvl7pPr>
+            <a:lvl8pPr marL="3200400" indent="0" algn="ctr" defTabSz="457200" rtl="0" eaLnBrk="1" latinLnBrk="0" hangingPunct="1">
+              <a:spcBef>
+                <a:spcPct val="20000"/>
+              </a:spcBef>
+              <a:spcAft>
+                <a:spcPts val="600"/>
+              </a:spcAft>
+              <a:buClr>
+                <a:schemeClr val="accent1"/>
+              </a:buClr>
+              <a:buFont typeface="Wingdings 2" charset="2"/>
+              <a:buNone/>
+              <a:defRPr sz="1200" kern="1200">
+                <a:solidFill>
+                  <a:schemeClr val="tx1">
+                    <a:tint val="75000"/>
+                  </a:schemeClr>
+                </a:solidFill>
+                <a:latin typeface="+mn-lt"/>
+                <a:ea typeface="+mn-ea"/>
+                <a:cs typeface="+mn-cs"/>
+              </a:defRPr>
+            </a:lvl8pPr>
+            <a:lvl9pPr marL="3657600" indent="0" algn="ctr" defTabSz="457200" rtl="0" eaLnBrk="1" latinLnBrk="0" hangingPunct="1">
+              <a:spcBef>
+                <a:spcPct val="20000"/>
+              </a:spcBef>
+              <a:spcAft>
+                <a:spcPts val="600"/>
+              </a:spcAft>
+              <a:buClr>
+                <a:schemeClr val="accent1"/>
+              </a:buClr>
+              <a:buFont typeface="Wingdings 2" charset="2"/>
+              <a:buNone/>
+              <a:defRPr sz="1200" kern="1200">
+                <a:solidFill>
+                  <a:schemeClr val="tx1">
+                    <a:tint val="75000"/>
+                  </a:schemeClr>
+                </a:solidFill>
+                <a:latin typeface="+mn-lt"/>
+                <a:ea typeface="+mn-ea"/>
+                <a:cs typeface="+mn-cs"/>
+              </a:defRPr>
+            </a:lvl9pPr>
+          </a:lstStyle>
+          <a:p>
+            <a:r>
+              <a:rPr lang="fr-FR" sz="2400" dirty="0" smtClean="0"/>
+              <a:t>IN104 – Page </a:t>
+            </a:r>
+            <a:r>
+              <a:rPr lang="fr-FR" sz="2400" dirty="0" smtClean="0"/>
+              <a:t>2</a:t>
+            </a:r>
+            <a:endParaRPr lang="fr-FR" sz="2400" dirty="0"/>
+          </a:p>
+        </p:txBody>
+      </p:sp>
     </p:spTree>
     <p:extLst>
       <p:ext uri="{BB962C8B-B14F-4D97-AF65-F5344CB8AC3E}">
@@ -6425,11 +7496,7 @@
             </a:r>
             <a:r>
               <a:rPr lang="fr-FR" sz="5400" dirty="0" smtClean="0"/>
-              <a:t>Contexte </a:t>
-            </a:r>
-            <a:r>
-              <a:rPr lang="fr-FR" sz="5400" dirty="0" smtClean="0"/>
-              <a:t>et Problématique</a:t>
+              <a:t>Contexte et Problématique</a:t>
             </a:r>
             <a:endParaRPr lang="fr-FR" sz="5400" dirty="0"/>
           </a:p>
@@ -6987,6 +8054,259 @@
               <a:t>Récompenses</a:t>
             </a:r>
             <a:endParaRPr lang="fr-FR" sz="2500" dirty="0"/>
+          </a:p>
+        </p:txBody>
+      </p:sp>
+      <p:sp>
+        <p:nvSpPr>
+          <p:cNvPr id="21" name="Sous-titre 2"/>
+          <p:cNvSpPr txBox="1">
+            <a:spLocks/>
+          </p:cNvSpPr>
+          <p:nvPr/>
+        </p:nvSpPr>
+        <p:spPr>
+          <a:xfrm>
+            <a:off x="9763433" y="6400801"/>
+            <a:ext cx="2428568" cy="457199"/>
+          </a:xfrm>
+          <a:prstGeom prst="rect">
+            <a:avLst/>
+          </a:prstGeom>
+          <a:ln>
+            <a:solidFill>
+              <a:schemeClr val="tx1"/>
+            </a:solidFill>
+          </a:ln>
+          <a:effectLst>
+            <a:outerShdw blurRad="50800" dir="14400000">
+              <a:srgbClr val="000000">
+                <a:alpha val="40000"/>
+              </a:srgbClr>
+            </a:outerShdw>
+          </a:effectLst>
+        </p:spPr>
+        <p:txBody>
+          <a:bodyPr vert="horz" lIns="91440" tIns="45720" rIns="91440" bIns="45720" rtlCol="0" anchor="t">
+            <a:noAutofit/>
+          </a:bodyPr>
+          <a:lstStyle>
+            <a:lvl1pPr marL="0" indent="0" algn="l" defTabSz="457200" rtl="0" eaLnBrk="1" latinLnBrk="0" hangingPunct="1">
+              <a:spcBef>
+                <a:spcPct val="20000"/>
+              </a:spcBef>
+              <a:spcAft>
+                <a:spcPts val="600"/>
+              </a:spcAft>
+              <a:buClr>
+                <a:schemeClr val="accent1"/>
+              </a:buClr>
+              <a:buFont typeface="Wingdings 2" charset="2"/>
+              <a:buNone/>
+              <a:defRPr sz="1800" kern="1200">
+                <a:solidFill>
+                  <a:schemeClr val="tx1"/>
+                </a:solidFill>
+                <a:latin typeface="+mn-lt"/>
+                <a:ea typeface="+mn-ea"/>
+                <a:cs typeface="+mn-cs"/>
+              </a:defRPr>
+            </a:lvl1pPr>
+            <a:lvl2pPr marL="457200" indent="0" algn="ctr" defTabSz="457200" rtl="0" eaLnBrk="1" latinLnBrk="0" hangingPunct="1">
+              <a:spcBef>
+                <a:spcPct val="20000"/>
+              </a:spcBef>
+              <a:spcAft>
+                <a:spcPts val="600"/>
+              </a:spcAft>
+              <a:buClr>
+                <a:schemeClr val="accent1"/>
+              </a:buClr>
+              <a:buFont typeface="Wingdings 2" charset="2"/>
+              <a:buNone/>
+              <a:defRPr sz="1600" kern="1200">
+                <a:solidFill>
+                  <a:schemeClr val="tx1">
+                    <a:tint val="75000"/>
+                  </a:schemeClr>
+                </a:solidFill>
+                <a:latin typeface="+mn-lt"/>
+                <a:ea typeface="+mn-ea"/>
+                <a:cs typeface="+mn-cs"/>
+              </a:defRPr>
+            </a:lvl2pPr>
+            <a:lvl3pPr marL="914400" indent="0" algn="ctr" defTabSz="457200" rtl="0" eaLnBrk="1" latinLnBrk="0" hangingPunct="1">
+              <a:spcBef>
+                <a:spcPct val="20000"/>
+              </a:spcBef>
+              <a:spcAft>
+                <a:spcPts val="600"/>
+              </a:spcAft>
+              <a:buClr>
+                <a:schemeClr val="accent1"/>
+              </a:buClr>
+              <a:buFont typeface="Wingdings 2" charset="2"/>
+              <a:buNone/>
+              <a:defRPr sz="1400" kern="1200">
+                <a:solidFill>
+                  <a:schemeClr val="tx1">
+                    <a:tint val="75000"/>
+                  </a:schemeClr>
+                </a:solidFill>
+                <a:latin typeface="+mn-lt"/>
+                <a:ea typeface="+mn-ea"/>
+                <a:cs typeface="+mn-cs"/>
+              </a:defRPr>
+            </a:lvl3pPr>
+            <a:lvl4pPr marL="1371600" indent="0" algn="ctr" defTabSz="457200" rtl="0" eaLnBrk="1" latinLnBrk="0" hangingPunct="1">
+              <a:spcBef>
+                <a:spcPct val="20000"/>
+              </a:spcBef>
+              <a:spcAft>
+                <a:spcPts val="600"/>
+              </a:spcAft>
+              <a:buClr>
+                <a:schemeClr val="accent1"/>
+              </a:buClr>
+              <a:buFont typeface="Wingdings 2" charset="2"/>
+              <a:buNone/>
+              <a:defRPr sz="1200" kern="1200">
+                <a:solidFill>
+                  <a:schemeClr val="tx1">
+                    <a:tint val="75000"/>
+                  </a:schemeClr>
+                </a:solidFill>
+                <a:latin typeface="+mn-lt"/>
+                <a:ea typeface="+mn-ea"/>
+                <a:cs typeface="+mn-cs"/>
+              </a:defRPr>
+            </a:lvl4pPr>
+            <a:lvl5pPr marL="1828800" indent="0" algn="ctr" defTabSz="457200" rtl="0" eaLnBrk="1" latinLnBrk="0" hangingPunct="1">
+              <a:spcBef>
+                <a:spcPct val="20000"/>
+              </a:spcBef>
+              <a:spcAft>
+                <a:spcPts val="600"/>
+              </a:spcAft>
+              <a:buClr>
+                <a:schemeClr val="accent1"/>
+              </a:buClr>
+              <a:buFont typeface="Wingdings 2" charset="2"/>
+              <a:buNone/>
+              <a:defRPr sz="1200" kern="1200">
+                <a:solidFill>
+                  <a:schemeClr val="tx1">
+                    <a:tint val="75000"/>
+                  </a:schemeClr>
+                </a:solidFill>
+                <a:latin typeface="+mn-lt"/>
+                <a:ea typeface="+mn-ea"/>
+                <a:cs typeface="+mn-cs"/>
+              </a:defRPr>
+            </a:lvl5pPr>
+            <a:lvl6pPr marL="2286000" indent="0" algn="ctr" defTabSz="457200" rtl="0" eaLnBrk="1" latinLnBrk="0" hangingPunct="1">
+              <a:spcBef>
+                <a:spcPct val="20000"/>
+              </a:spcBef>
+              <a:spcAft>
+                <a:spcPts val="600"/>
+              </a:spcAft>
+              <a:buClr>
+                <a:schemeClr val="accent1"/>
+              </a:buClr>
+              <a:buFont typeface="Wingdings 2" charset="2"/>
+              <a:buNone/>
+              <a:defRPr sz="1200" kern="1200">
+                <a:solidFill>
+                  <a:schemeClr val="tx1">
+                    <a:tint val="75000"/>
+                  </a:schemeClr>
+                </a:solidFill>
+                <a:latin typeface="+mn-lt"/>
+                <a:ea typeface="+mn-ea"/>
+                <a:cs typeface="+mn-cs"/>
+              </a:defRPr>
+            </a:lvl6pPr>
+            <a:lvl7pPr marL="2743200" indent="0" algn="ctr" defTabSz="457200" rtl="0" eaLnBrk="1" latinLnBrk="0" hangingPunct="1">
+              <a:spcBef>
+                <a:spcPct val="20000"/>
+              </a:spcBef>
+              <a:spcAft>
+                <a:spcPts val="600"/>
+              </a:spcAft>
+              <a:buClr>
+                <a:schemeClr val="accent1"/>
+              </a:buClr>
+              <a:buFont typeface="Wingdings 2" charset="2"/>
+              <a:buNone/>
+              <a:defRPr sz="1200" kern="1200">
+                <a:solidFill>
+                  <a:schemeClr val="tx1">
+                    <a:tint val="75000"/>
+                  </a:schemeClr>
+                </a:solidFill>
+                <a:latin typeface="+mn-lt"/>
+                <a:ea typeface="+mn-ea"/>
+                <a:cs typeface="+mn-cs"/>
+              </a:defRPr>
+            </a:lvl7pPr>
+            <a:lvl8pPr marL="3200400" indent="0" algn="ctr" defTabSz="457200" rtl="0" eaLnBrk="1" latinLnBrk="0" hangingPunct="1">
+              <a:spcBef>
+                <a:spcPct val="20000"/>
+              </a:spcBef>
+              <a:spcAft>
+                <a:spcPts val="600"/>
+              </a:spcAft>
+              <a:buClr>
+                <a:schemeClr val="accent1"/>
+              </a:buClr>
+              <a:buFont typeface="Wingdings 2" charset="2"/>
+              <a:buNone/>
+              <a:defRPr sz="1200" kern="1200">
+                <a:solidFill>
+                  <a:schemeClr val="tx1">
+                    <a:tint val="75000"/>
+                  </a:schemeClr>
+                </a:solidFill>
+                <a:latin typeface="+mn-lt"/>
+                <a:ea typeface="+mn-ea"/>
+                <a:cs typeface="+mn-cs"/>
+              </a:defRPr>
+            </a:lvl8pPr>
+            <a:lvl9pPr marL="3657600" indent="0" algn="ctr" defTabSz="457200" rtl="0" eaLnBrk="1" latinLnBrk="0" hangingPunct="1">
+              <a:spcBef>
+                <a:spcPct val="20000"/>
+              </a:spcBef>
+              <a:spcAft>
+                <a:spcPts val="600"/>
+              </a:spcAft>
+              <a:buClr>
+                <a:schemeClr val="accent1"/>
+              </a:buClr>
+              <a:buFont typeface="Wingdings 2" charset="2"/>
+              <a:buNone/>
+              <a:defRPr sz="1200" kern="1200">
+                <a:solidFill>
+                  <a:schemeClr val="tx1">
+                    <a:tint val="75000"/>
+                  </a:schemeClr>
+                </a:solidFill>
+                <a:latin typeface="+mn-lt"/>
+                <a:ea typeface="+mn-ea"/>
+                <a:cs typeface="+mn-cs"/>
+              </a:defRPr>
+            </a:lvl9pPr>
+          </a:lstStyle>
+          <a:p>
+            <a:r>
+              <a:rPr lang="fr-FR" sz="2400" dirty="0" smtClean="0"/>
+              <a:t>IN104 – Page </a:t>
+            </a:r>
+            <a:r>
+              <a:rPr lang="fr-FR" sz="2400" dirty="0" smtClean="0"/>
+              <a:t>3</a:t>
+            </a:r>
+            <a:endParaRPr lang="fr-FR" sz="2400" dirty="0"/>
           </a:p>
         </p:txBody>
       </p:sp>
@@ -7070,11 +8390,7 @@
             </a:r>
             <a:r>
               <a:rPr lang="fr-FR" sz="5400" dirty="0" smtClean="0"/>
-              <a:t>Solution </a:t>
-            </a:r>
-            <a:r>
-              <a:rPr lang="fr-FR" sz="5400" dirty="0" smtClean="0"/>
-              <a:t>: architecture et design</a:t>
+              <a:t>Solution : architecture et design</a:t>
             </a:r>
             <a:endParaRPr lang="fr-FR" sz="5400" dirty="0"/>
           </a:p>
@@ -7493,11 +8809,7 @@
             </a:r>
             <a:r>
               <a:rPr lang="fr-FR" sz="5400" dirty="0" smtClean="0"/>
-              <a:t>Solution </a:t>
-            </a:r>
-            <a:r>
-              <a:rPr lang="fr-FR" sz="5400" dirty="0" smtClean="0"/>
-              <a:t>: architecture et design</a:t>
+              <a:t>Solution : architecture et design</a:t>
             </a:r>
             <a:endParaRPr lang="fr-FR" sz="5400" dirty="0"/>
           </a:p>
@@ -7607,11 +8919,7 @@
             </a:r>
             <a:r>
               <a:rPr lang="fr-FR" sz="5400" dirty="0" smtClean="0"/>
-              <a:t>Solution </a:t>
-            </a:r>
-            <a:r>
-              <a:rPr lang="fr-FR" sz="5400" dirty="0" smtClean="0"/>
-              <a:t>: architecture et design</a:t>
+              <a:t>Solution : architecture et design</a:t>
             </a:r>
             <a:endParaRPr lang="fr-FR" sz="5400" dirty="0"/>
           </a:p>
@@ -7713,11 +9021,7 @@
             </a:r>
             <a:r>
               <a:rPr lang="fr-FR" sz="5400" dirty="0" smtClean="0"/>
-              <a:t>Solution </a:t>
-            </a:r>
-            <a:r>
-              <a:rPr lang="fr-FR" sz="5400" dirty="0" smtClean="0"/>
-              <a:t>: architecture et design</a:t>
+              <a:t>Solution : architecture et design</a:t>
             </a:r>
             <a:endParaRPr lang="fr-FR" sz="5400" dirty="0"/>
           </a:p>
@@ -7843,11 +9147,7 @@
             </a:r>
             <a:r>
               <a:rPr lang="fr-FR" sz="5400" dirty="0" smtClean="0"/>
-              <a:t>Vie </a:t>
-            </a:r>
-            <a:r>
-              <a:rPr lang="fr-FR" sz="5400" dirty="0" smtClean="0"/>
-              <a:t>du projet</a:t>
+              <a:t>Vie du projet</a:t>
             </a:r>
             <a:endParaRPr lang="fr-FR" sz="5400" dirty="0"/>
           </a:p>
@@ -7868,7 +9168,82 @@
           <a:bodyPr/>
           <a:lstStyle/>
           <a:p>
-            <a:endParaRPr lang="fr-FR"/>
+            <a:pPr marL="0" indent="0" algn="ctr">
+              <a:buNone/>
+            </a:pPr>
+            <a:r>
+              <a:rPr lang="fr-FR" sz="2000" b="1" dirty="0" smtClean="0"/>
+              <a:t>1</a:t>
+            </a:r>
+            <a:r>
+              <a:rPr lang="fr-FR" sz="2000" b="1" baseline="30000" dirty="0" smtClean="0"/>
+              <a:t>ère</a:t>
+            </a:r>
+            <a:r>
+              <a:rPr lang="fr-FR" sz="2000" b="1" dirty="0" smtClean="0"/>
+              <a:t> partie du projet</a:t>
+            </a:r>
+          </a:p>
+          <a:p>
+            <a:r>
+              <a:rPr lang="fr-FR" dirty="0" smtClean="0"/>
+              <a:t>Classe Environnement 2D</a:t>
+            </a:r>
+          </a:p>
+          <a:p>
+            <a:pPr lvl="1"/>
+            <a:r>
+              <a:rPr lang="fr-FR" dirty="0"/>
+              <a:t>Modélisation d’un labyrinthe aléatoire et de ses différents états / Visualisation graphique</a:t>
+            </a:r>
+          </a:p>
+          <a:p>
+            <a:pPr lvl="1"/>
+            <a:r>
+              <a:rPr lang="fr-FR" dirty="0" smtClean="0"/>
+              <a:t>Méthode « </a:t>
+            </a:r>
+            <a:r>
+              <a:rPr lang="fr-FR" dirty="0" err="1" smtClean="0"/>
+              <a:t>possibleActions</a:t>
+            </a:r>
+            <a:r>
+              <a:rPr lang="fr-FR" dirty="0" smtClean="0"/>
+              <a:t> » essentielle </a:t>
+            </a:r>
+            <a:r>
+              <a:rPr lang="fr-FR" dirty="0"/>
+              <a:t>pour l’agent et évolution du </a:t>
+            </a:r>
+            <a:r>
+              <a:rPr lang="fr-FR" dirty="0" smtClean="0"/>
+              <a:t>labyrinthe</a:t>
+            </a:r>
+            <a:endParaRPr lang="fr-FR" dirty="0" smtClean="0"/>
+          </a:p>
+          <a:p>
+            <a:r>
+              <a:rPr lang="fr-FR" dirty="0" smtClean="0"/>
+              <a:t>Tests / Méthode agile</a:t>
+            </a:r>
+          </a:p>
+          <a:p>
+            <a:pPr lvl="1"/>
+            <a:r>
+              <a:rPr lang="fr-FR" dirty="0" smtClean="0"/>
+              <a:t>Tests unitaires de l’environnement et tests globaux de modélisation du labyrinthe</a:t>
+            </a:r>
+          </a:p>
+          <a:p>
+            <a:pPr lvl="1"/>
+            <a:r>
+              <a:rPr lang="fr-FR" dirty="0" smtClean="0"/>
+              <a:t>Classe Agent aléatoire</a:t>
+            </a:r>
+            <a:endParaRPr lang="fr-FR" dirty="0"/>
+          </a:p>
+          <a:p>
+            <a:endParaRPr lang="fr-FR" dirty="0"/>
           </a:p>
         </p:txBody>
       </p:sp>
@@ -7921,7 +9296,7 @@
         </p:nvSpPr>
         <p:spPr>
           <a:xfrm>
-            <a:off x="0" y="264308"/>
+            <a:off x="0" y="307850"/>
             <a:ext cx="12192000" cy="970450"/>
           </a:xfrm>
           <a:ln>
@@ -7935,16 +9310,16 @@
           <a:lstStyle/>
           <a:p>
             <a:r>
-              <a:rPr lang="fr-FR" sz="5400" dirty="0" smtClean="0">
+              <a:rPr lang="fr-FR" sz="5400" dirty="0">
                 <a:solidFill>
                   <a:schemeClr val="accent6"/>
                 </a:solidFill>
               </a:rPr>
-              <a:t>IV. </a:t>
+              <a:t>III. </a:t>
             </a:r>
             <a:r>
               <a:rPr lang="fr-FR" sz="5400" dirty="0" smtClean="0"/>
-              <a:t>Performance</a:t>
+              <a:t>Vie du projet</a:t>
             </a:r>
             <a:endParaRPr lang="fr-FR" sz="5400" dirty="0"/>
           </a:p>
@@ -7965,14 +9340,69 @@
           <a:bodyPr/>
           <a:lstStyle/>
           <a:p>
-            <a:endParaRPr lang="fr-FR"/>
+            <a:pPr marL="0" indent="0" algn="ctr">
+              <a:buNone/>
+            </a:pPr>
+            <a:r>
+              <a:rPr lang="fr-FR" sz="2000" b="1" dirty="0" smtClean="0"/>
+              <a:t>2</a:t>
+            </a:r>
+            <a:r>
+              <a:rPr lang="fr-FR" sz="2000" b="1" baseline="30000" dirty="0" smtClean="0"/>
+              <a:t>ème</a:t>
+            </a:r>
+            <a:r>
+              <a:rPr lang="fr-FR" sz="2000" b="1" dirty="0" smtClean="0"/>
+              <a:t> partie du projet</a:t>
+            </a:r>
+          </a:p>
+          <a:p>
+            <a:r>
+              <a:rPr lang="fr-FR" dirty="0" smtClean="0"/>
+              <a:t>Classe Agent Q-Learning</a:t>
+            </a:r>
+          </a:p>
+          <a:p>
+            <a:pPr lvl="1"/>
+            <a:r>
+              <a:rPr lang="fr-FR" dirty="0" smtClean="0"/>
+              <a:t>Matrice de Qualité et son évolution</a:t>
+            </a:r>
+            <a:endParaRPr lang="fr-FR" dirty="0"/>
+          </a:p>
+          <a:p>
+            <a:r>
+              <a:rPr lang="fr-FR" dirty="0" smtClean="0"/>
+              <a:t>Tests</a:t>
+            </a:r>
+          </a:p>
+          <a:p>
+            <a:pPr lvl="1"/>
+            <a:r>
+              <a:rPr lang="fr-FR" dirty="0" smtClean="0"/>
+              <a:t>Tests unitaires de l’agent et tests globaux appliqués au labyrinthe</a:t>
+            </a:r>
+          </a:p>
+          <a:p>
+            <a:pPr lvl="1"/>
+            <a:r>
+              <a:rPr lang="fr-FR" dirty="0" smtClean="0"/>
+              <a:t>Méthode pour créer un labyrinthe lu dans un fichier</a:t>
+            </a:r>
+          </a:p>
+          <a:p>
+            <a:pPr lvl="1"/>
+            <a:endParaRPr lang="fr-FR" dirty="0" smtClean="0"/>
+          </a:p>
+          <a:p>
+            <a:endParaRPr lang="fr-FR" dirty="0"/>
           </a:p>
         </p:txBody>
       </p:sp>
     </p:spTree>
     <p:extLst>
       <p:ext uri="{BB962C8B-B14F-4D97-AF65-F5344CB8AC3E}">
-        <p14:creationId xmlns:p14="http://schemas.microsoft.com/office/powerpoint/2010/main" val="2074799054"/>
+        <p14:creationId xmlns:p14="http://schemas.microsoft.com/office/powerpoint/2010/main" val="1023925425"/>
       </p:ext>
     </p:extLst>
   </p:cSld>

</xml_diff>

<commit_message>
Completing conclusion in slides
</commit_message>
<xml_diff>
--- a/Livrables/Présentation.pptx
+++ b/Livrables/Présentation.pptx
@@ -6112,6 +6112,263 @@
           </a:prstGeom>
         </p:spPr>
       </p:pic>
+      <p:sp>
+        <p:nvSpPr>
+          <p:cNvPr id="5" name="Sous-titre 2"/>
+          <p:cNvSpPr txBox="1">
+            <a:spLocks/>
+          </p:cNvSpPr>
+          <p:nvPr/>
+        </p:nvSpPr>
+        <p:spPr>
+          <a:xfrm>
+            <a:off x="9763433" y="6400801"/>
+            <a:ext cx="2428568" cy="457199"/>
+          </a:xfrm>
+          <a:prstGeom prst="rect">
+            <a:avLst/>
+          </a:prstGeom>
+          <a:ln>
+            <a:solidFill>
+              <a:schemeClr val="tx1"/>
+            </a:solidFill>
+          </a:ln>
+          <a:effectLst>
+            <a:outerShdw blurRad="50800" dir="14400000">
+              <a:srgbClr val="000000">
+                <a:alpha val="40000"/>
+              </a:srgbClr>
+            </a:outerShdw>
+          </a:effectLst>
+        </p:spPr>
+        <p:txBody>
+          <a:bodyPr vert="horz" lIns="91440" tIns="45720" rIns="91440" bIns="45720" rtlCol="0" anchor="t">
+            <a:noAutofit/>
+          </a:bodyPr>
+          <a:lstStyle>
+            <a:lvl1pPr marL="0" indent="0" algn="l" defTabSz="457200" rtl="0" eaLnBrk="1" latinLnBrk="0" hangingPunct="1">
+              <a:spcBef>
+                <a:spcPct val="20000"/>
+              </a:spcBef>
+              <a:spcAft>
+                <a:spcPts val="600"/>
+              </a:spcAft>
+              <a:buClr>
+                <a:schemeClr val="accent1"/>
+              </a:buClr>
+              <a:buFont typeface="Wingdings 2" charset="2"/>
+              <a:buNone/>
+              <a:defRPr sz="1800" kern="1200">
+                <a:solidFill>
+                  <a:schemeClr val="tx1"/>
+                </a:solidFill>
+                <a:latin typeface="+mn-lt"/>
+                <a:ea typeface="+mn-ea"/>
+                <a:cs typeface="+mn-cs"/>
+              </a:defRPr>
+            </a:lvl1pPr>
+            <a:lvl2pPr marL="457200" indent="0" algn="ctr" defTabSz="457200" rtl="0" eaLnBrk="1" latinLnBrk="0" hangingPunct="1">
+              <a:spcBef>
+                <a:spcPct val="20000"/>
+              </a:spcBef>
+              <a:spcAft>
+                <a:spcPts val="600"/>
+              </a:spcAft>
+              <a:buClr>
+                <a:schemeClr val="accent1"/>
+              </a:buClr>
+              <a:buFont typeface="Wingdings 2" charset="2"/>
+              <a:buNone/>
+              <a:defRPr sz="1600" kern="1200">
+                <a:solidFill>
+                  <a:schemeClr val="tx1">
+                    <a:tint val="75000"/>
+                  </a:schemeClr>
+                </a:solidFill>
+                <a:latin typeface="+mn-lt"/>
+                <a:ea typeface="+mn-ea"/>
+                <a:cs typeface="+mn-cs"/>
+              </a:defRPr>
+            </a:lvl2pPr>
+            <a:lvl3pPr marL="914400" indent="0" algn="ctr" defTabSz="457200" rtl="0" eaLnBrk="1" latinLnBrk="0" hangingPunct="1">
+              <a:spcBef>
+                <a:spcPct val="20000"/>
+              </a:spcBef>
+              <a:spcAft>
+                <a:spcPts val="600"/>
+              </a:spcAft>
+              <a:buClr>
+                <a:schemeClr val="accent1"/>
+              </a:buClr>
+              <a:buFont typeface="Wingdings 2" charset="2"/>
+              <a:buNone/>
+              <a:defRPr sz="1400" kern="1200">
+                <a:solidFill>
+                  <a:schemeClr val="tx1">
+                    <a:tint val="75000"/>
+                  </a:schemeClr>
+                </a:solidFill>
+                <a:latin typeface="+mn-lt"/>
+                <a:ea typeface="+mn-ea"/>
+                <a:cs typeface="+mn-cs"/>
+              </a:defRPr>
+            </a:lvl3pPr>
+            <a:lvl4pPr marL="1371600" indent="0" algn="ctr" defTabSz="457200" rtl="0" eaLnBrk="1" latinLnBrk="0" hangingPunct="1">
+              <a:spcBef>
+                <a:spcPct val="20000"/>
+              </a:spcBef>
+              <a:spcAft>
+                <a:spcPts val="600"/>
+              </a:spcAft>
+              <a:buClr>
+                <a:schemeClr val="accent1"/>
+              </a:buClr>
+              <a:buFont typeface="Wingdings 2" charset="2"/>
+              <a:buNone/>
+              <a:defRPr sz="1200" kern="1200">
+                <a:solidFill>
+                  <a:schemeClr val="tx1">
+                    <a:tint val="75000"/>
+                  </a:schemeClr>
+                </a:solidFill>
+                <a:latin typeface="+mn-lt"/>
+                <a:ea typeface="+mn-ea"/>
+                <a:cs typeface="+mn-cs"/>
+              </a:defRPr>
+            </a:lvl4pPr>
+            <a:lvl5pPr marL="1828800" indent="0" algn="ctr" defTabSz="457200" rtl="0" eaLnBrk="1" latinLnBrk="0" hangingPunct="1">
+              <a:spcBef>
+                <a:spcPct val="20000"/>
+              </a:spcBef>
+              <a:spcAft>
+                <a:spcPts val="600"/>
+              </a:spcAft>
+              <a:buClr>
+                <a:schemeClr val="accent1"/>
+              </a:buClr>
+              <a:buFont typeface="Wingdings 2" charset="2"/>
+              <a:buNone/>
+              <a:defRPr sz="1200" kern="1200">
+                <a:solidFill>
+                  <a:schemeClr val="tx1">
+                    <a:tint val="75000"/>
+                  </a:schemeClr>
+                </a:solidFill>
+                <a:latin typeface="+mn-lt"/>
+                <a:ea typeface="+mn-ea"/>
+                <a:cs typeface="+mn-cs"/>
+              </a:defRPr>
+            </a:lvl5pPr>
+            <a:lvl6pPr marL="2286000" indent="0" algn="ctr" defTabSz="457200" rtl="0" eaLnBrk="1" latinLnBrk="0" hangingPunct="1">
+              <a:spcBef>
+                <a:spcPct val="20000"/>
+              </a:spcBef>
+              <a:spcAft>
+                <a:spcPts val="600"/>
+              </a:spcAft>
+              <a:buClr>
+                <a:schemeClr val="accent1"/>
+              </a:buClr>
+              <a:buFont typeface="Wingdings 2" charset="2"/>
+              <a:buNone/>
+              <a:defRPr sz="1200" kern="1200">
+                <a:solidFill>
+                  <a:schemeClr val="tx1">
+                    <a:tint val="75000"/>
+                  </a:schemeClr>
+                </a:solidFill>
+                <a:latin typeface="+mn-lt"/>
+                <a:ea typeface="+mn-ea"/>
+                <a:cs typeface="+mn-cs"/>
+              </a:defRPr>
+            </a:lvl6pPr>
+            <a:lvl7pPr marL="2743200" indent="0" algn="ctr" defTabSz="457200" rtl="0" eaLnBrk="1" latinLnBrk="0" hangingPunct="1">
+              <a:spcBef>
+                <a:spcPct val="20000"/>
+              </a:spcBef>
+              <a:spcAft>
+                <a:spcPts val="600"/>
+              </a:spcAft>
+              <a:buClr>
+                <a:schemeClr val="accent1"/>
+              </a:buClr>
+              <a:buFont typeface="Wingdings 2" charset="2"/>
+              <a:buNone/>
+              <a:defRPr sz="1200" kern="1200">
+                <a:solidFill>
+                  <a:schemeClr val="tx1">
+                    <a:tint val="75000"/>
+                  </a:schemeClr>
+                </a:solidFill>
+                <a:latin typeface="+mn-lt"/>
+                <a:ea typeface="+mn-ea"/>
+                <a:cs typeface="+mn-cs"/>
+              </a:defRPr>
+            </a:lvl7pPr>
+            <a:lvl8pPr marL="3200400" indent="0" algn="ctr" defTabSz="457200" rtl="0" eaLnBrk="1" latinLnBrk="0" hangingPunct="1">
+              <a:spcBef>
+                <a:spcPct val="20000"/>
+              </a:spcBef>
+              <a:spcAft>
+                <a:spcPts val="600"/>
+              </a:spcAft>
+              <a:buClr>
+                <a:schemeClr val="accent1"/>
+              </a:buClr>
+              <a:buFont typeface="Wingdings 2" charset="2"/>
+              <a:buNone/>
+              <a:defRPr sz="1200" kern="1200">
+                <a:solidFill>
+                  <a:schemeClr val="tx1">
+                    <a:tint val="75000"/>
+                  </a:schemeClr>
+                </a:solidFill>
+                <a:latin typeface="+mn-lt"/>
+                <a:ea typeface="+mn-ea"/>
+                <a:cs typeface="+mn-cs"/>
+              </a:defRPr>
+            </a:lvl8pPr>
+            <a:lvl9pPr marL="3657600" indent="0" algn="ctr" defTabSz="457200" rtl="0" eaLnBrk="1" latinLnBrk="0" hangingPunct="1">
+              <a:spcBef>
+                <a:spcPct val="20000"/>
+              </a:spcBef>
+              <a:spcAft>
+                <a:spcPts val="600"/>
+              </a:spcAft>
+              <a:buClr>
+                <a:schemeClr val="accent1"/>
+              </a:buClr>
+              <a:buFont typeface="Wingdings 2" charset="2"/>
+              <a:buNone/>
+              <a:defRPr sz="1200" kern="1200">
+                <a:solidFill>
+                  <a:schemeClr val="tx1">
+                    <a:tint val="75000"/>
+                  </a:schemeClr>
+                </a:solidFill>
+                <a:latin typeface="+mn-lt"/>
+                <a:ea typeface="+mn-ea"/>
+                <a:cs typeface="+mn-cs"/>
+              </a:defRPr>
+            </a:lvl9pPr>
+          </a:lstStyle>
+          <a:p>
+            <a:r>
+              <a:rPr lang="fr-FR" sz="2400" dirty="0" smtClean="0"/>
+              <a:t>IN104 </a:t>
+            </a:r>
+            <a:r>
+              <a:rPr lang="fr-FR" sz="2400" dirty="0" smtClean="0"/>
+              <a:t>– Page </a:t>
+            </a:r>
+            <a:r>
+              <a:rPr lang="fr-FR" sz="1600" dirty="0" smtClean="0"/>
+              <a:t>11</a:t>
+            </a:r>
+            <a:endParaRPr lang="fr-FR" sz="1600" dirty="0"/>
+          </a:p>
+        </p:txBody>
+      </p:sp>
     </p:spTree>
     <p:extLst>
       <p:ext uri="{BB962C8B-B14F-4D97-AF65-F5344CB8AC3E}">
@@ -6344,6 +6601,263 @@
           </a:prstGeom>
         </p:spPr>
       </p:pic>
+      <p:sp>
+        <p:nvSpPr>
+          <p:cNvPr id="5" name="Sous-titre 2"/>
+          <p:cNvSpPr txBox="1">
+            <a:spLocks/>
+          </p:cNvSpPr>
+          <p:nvPr/>
+        </p:nvSpPr>
+        <p:spPr>
+          <a:xfrm>
+            <a:off x="9763433" y="6400801"/>
+            <a:ext cx="2428568" cy="457199"/>
+          </a:xfrm>
+          <a:prstGeom prst="rect">
+            <a:avLst/>
+          </a:prstGeom>
+          <a:ln>
+            <a:solidFill>
+              <a:schemeClr val="tx1"/>
+            </a:solidFill>
+          </a:ln>
+          <a:effectLst>
+            <a:outerShdw blurRad="50800" dir="14400000">
+              <a:srgbClr val="000000">
+                <a:alpha val="40000"/>
+              </a:srgbClr>
+            </a:outerShdw>
+          </a:effectLst>
+        </p:spPr>
+        <p:txBody>
+          <a:bodyPr vert="horz" lIns="91440" tIns="45720" rIns="91440" bIns="45720" rtlCol="0" anchor="t">
+            <a:noAutofit/>
+          </a:bodyPr>
+          <a:lstStyle>
+            <a:lvl1pPr marL="0" indent="0" algn="l" defTabSz="457200" rtl="0" eaLnBrk="1" latinLnBrk="0" hangingPunct="1">
+              <a:spcBef>
+                <a:spcPct val="20000"/>
+              </a:spcBef>
+              <a:spcAft>
+                <a:spcPts val="600"/>
+              </a:spcAft>
+              <a:buClr>
+                <a:schemeClr val="accent1"/>
+              </a:buClr>
+              <a:buFont typeface="Wingdings 2" charset="2"/>
+              <a:buNone/>
+              <a:defRPr sz="1800" kern="1200">
+                <a:solidFill>
+                  <a:schemeClr val="tx1"/>
+                </a:solidFill>
+                <a:latin typeface="+mn-lt"/>
+                <a:ea typeface="+mn-ea"/>
+                <a:cs typeface="+mn-cs"/>
+              </a:defRPr>
+            </a:lvl1pPr>
+            <a:lvl2pPr marL="457200" indent="0" algn="ctr" defTabSz="457200" rtl="0" eaLnBrk="1" latinLnBrk="0" hangingPunct="1">
+              <a:spcBef>
+                <a:spcPct val="20000"/>
+              </a:spcBef>
+              <a:spcAft>
+                <a:spcPts val="600"/>
+              </a:spcAft>
+              <a:buClr>
+                <a:schemeClr val="accent1"/>
+              </a:buClr>
+              <a:buFont typeface="Wingdings 2" charset="2"/>
+              <a:buNone/>
+              <a:defRPr sz="1600" kern="1200">
+                <a:solidFill>
+                  <a:schemeClr val="tx1">
+                    <a:tint val="75000"/>
+                  </a:schemeClr>
+                </a:solidFill>
+                <a:latin typeface="+mn-lt"/>
+                <a:ea typeface="+mn-ea"/>
+                <a:cs typeface="+mn-cs"/>
+              </a:defRPr>
+            </a:lvl2pPr>
+            <a:lvl3pPr marL="914400" indent="0" algn="ctr" defTabSz="457200" rtl="0" eaLnBrk="1" latinLnBrk="0" hangingPunct="1">
+              <a:spcBef>
+                <a:spcPct val="20000"/>
+              </a:spcBef>
+              <a:spcAft>
+                <a:spcPts val="600"/>
+              </a:spcAft>
+              <a:buClr>
+                <a:schemeClr val="accent1"/>
+              </a:buClr>
+              <a:buFont typeface="Wingdings 2" charset="2"/>
+              <a:buNone/>
+              <a:defRPr sz="1400" kern="1200">
+                <a:solidFill>
+                  <a:schemeClr val="tx1">
+                    <a:tint val="75000"/>
+                  </a:schemeClr>
+                </a:solidFill>
+                <a:latin typeface="+mn-lt"/>
+                <a:ea typeface="+mn-ea"/>
+                <a:cs typeface="+mn-cs"/>
+              </a:defRPr>
+            </a:lvl3pPr>
+            <a:lvl4pPr marL="1371600" indent="0" algn="ctr" defTabSz="457200" rtl="0" eaLnBrk="1" latinLnBrk="0" hangingPunct="1">
+              <a:spcBef>
+                <a:spcPct val="20000"/>
+              </a:spcBef>
+              <a:spcAft>
+                <a:spcPts val="600"/>
+              </a:spcAft>
+              <a:buClr>
+                <a:schemeClr val="accent1"/>
+              </a:buClr>
+              <a:buFont typeface="Wingdings 2" charset="2"/>
+              <a:buNone/>
+              <a:defRPr sz="1200" kern="1200">
+                <a:solidFill>
+                  <a:schemeClr val="tx1">
+                    <a:tint val="75000"/>
+                  </a:schemeClr>
+                </a:solidFill>
+                <a:latin typeface="+mn-lt"/>
+                <a:ea typeface="+mn-ea"/>
+                <a:cs typeface="+mn-cs"/>
+              </a:defRPr>
+            </a:lvl4pPr>
+            <a:lvl5pPr marL="1828800" indent="0" algn="ctr" defTabSz="457200" rtl="0" eaLnBrk="1" latinLnBrk="0" hangingPunct="1">
+              <a:spcBef>
+                <a:spcPct val="20000"/>
+              </a:spcBef>
+              <a:spcAft>
+                <a:spcPts val="600"/>
+              </a:spcAft>
+              <a:buClr>
+                <a:schemeClr val="accent1"/>
+              </a:buClr>
+              <a:buFont typeface="Wingdings 2" charset="2"/>
+              <a:buNone/>
+              <a:defRPr sz="1200" kern="1200">
+                <a:solidFill>
+                  <a:schemeClr val="tx1">
+                    <a:tint val="75000"/>
+                  </a:schemeClr>
+                </a:solidFill>
+                <a:latin typeface="+mn-lt"/>
+                <a:ea typeface="+mn-ea"/>
+                <a:cs typeface="+mn-cs"/>
+              </a:defRPr>
+            </a:lvl5pPr>
+            <a:lvl6pPr marL="2286000" indent="0" algn="ctr" defTabSz="457200" rtl="0" eaLnBrk="1" latinLnBrk="0" hangingPunct="1">
+              <a:spcBef>
+                <a:spcPct val="20000"/>
+              </a:spcBef>
+              <a:spcAft>
+                <a:spcPts val="600"/>
+              </a:spcAft>
+              <a:buClr>
+                <a:schemeClr val="accent1"/>
+              </a:buClr>
+              <a:buFont typeface="Wingdings 2" charset="2"/>
+              <a:buNone/>
+              <a:defRPr sz="1200" kern="1200">
+                <a:solidFill>
+                  <a:schemeClr val="tx1">
+                    <a:tint val="75000"/>
+                  </a:schemeClr>
+                </a:solidFill>
+                <a:latin typeface="+mn-lt"/>
+                <a:ea typeface="+mn-ea"/>
+                <a:cs typeface="+mn-cs"/>
+              </a:defRPr>
+            </a:lvl6pPr>
+            <a:lvl7pPr marL="2743200" indent="0" algn="ctr" defTabSz="457200" rtl="0" eaLnBrk="1" latinLnBrk="0" hangingPunct="1">
+              <a:spcBef>
+                <a:spcPct val="20000"/>
+              </a:spcBef>
+              <a:spcAft>
+                <a:spcPts val="600"/>
+              </a:spcAft>
+              <a:buClr>
+                <a:schemeClr val="accent1"/>
+              </a:buClr>
+              <a:buFont typeface="Wingdings 2" charset="2"/>
+              <a:buNone/>
+              <a:defRPr sz="1200" kern="1200">
+                <a:solidFill>
+                  <a:schemeClr val="tx1">
+                    <a:tint val="75000"/>
+                  </a:schemeClr>
+                </a:solidFill>
+                <a:latin typeface="+mn-lt"/>
+                <a:ea typeface="+mn-ea"/>
+                <a:cs typeface="+mn-cs"/>
+              </a:defRPr>
+            </a:lvl7pPr>
+            <a:lvl8pPr marL="3200400" indent="0" algn="ctr" defTabSz="457200" rtl="0" eaLnBrk="1" latinLnBrk="0" hangingPunct="1">
+              <a:spcBef>
+                <a:spcPct val="20000"/>
+              </a:spcBef>
+              <a:spcAft>
+                <a:spcPts val="600"/>
+              </a:spcAft>
+              <a:buClr>
+                <a:schemeClr val="accent1"/>
+              </a:buClr>
+              <a:buFont typeface="Wingdings 2" charset="2"/>
+              <a:buNone/>
+              <a:defRPr sz="1200" kern="1200">
+                <a:solidFill>
+                  <a:schemeClr val="tx1">
+                    <a:tint val="75000"/>
+                  </a:schemeClr>
+                </a:solidFill>
+                <a:latin typeface="+mn-lt"/>
+                <a:ea typeface="+mn-ea"/>
+                <a:cs typeface="+mn-cs"/>
+              </a:defRPr>
+            </a:lvl8pPr>
+            <a:lvl9pPr marL="3657600" indent="0" algn="ctr" defTabSz="457200" rtl="0" eaLnBrk="1" latinLnBrk="0" hangingPunct="1">
+              <a:spcBef>
+                <a:spcPct val="20000"/>
+              </a:spcBef>
+              <a:spcAft>
+                <a:spcPts val="600"/>
+              </a:spcAft>
+              <a:buClr>
+                <a:schemeClr val="accent1"/>
+              </a:buClr>
+              <a:buFont typeface="Wingdings 2" charset="2"/>
+              <a:buNone/>
+              <a:defRPr sz="1200" kern="1200">
+                <a:solidFill>
+                  <a:schemeClr val="tx1">
+                    <a:tint val="75000"/>
+                  </a:schemeClr>
+                </a:solidFill>
+                <a:latin typeface="+mn-lt"/>
+                <a:ea typeface="+mn-ea"/>
+                <a:cs typeface="+mn-cs"/>
+              </a:defRPr>
+            </a:lvl9pPr>
+          </a:lstStyle>
+          <a:p>
+            <a:r>
+              <a:rPr lang="fr-FR" sz="2400" dirty="0" smtClean="0"/>
+              <a:t>IN104 </a:t>
+            </a:r>
+            <a:r>
+              <a:rPr lang="fr-FR" sz="2400" dirty="0" smtClean="0"/>
+              <a:t>– Page </a:t>
+            </a:r>
+            <a:r>
+              <a:rPr lang="fr-FR" sz="1600" dirty="0" smtClean="0"/>
+              <a:t>12</a:t>
+            </a:r>
+            <a:endParaRPr lang="fr-FR" sz="1600" dirty="0"/>
+          </a:p>
+        </p:txBody>
+      </p:sp>
     </p:spTree>
     <p:extLst>
       <p:ext uri="{BB962C8B-B14F-4D97-AF65-F5344CB8AC3E}">
@@ -6622,6 +7136,263 @@
           </a:prstGeom>
         </p:spPr>
       </p:pic>
+      <p:sp>
+        <p:nvSpPr>
+          <p:cNvPr id="7" name="Sous-titre 2"/>
+          <p:cNvSpPr txBox="1">
+            <a:spLocks/>
+          </p:cNvSpPr>
+          <p:nvPr/>
+        </p:nvSpPr>
+        <p:spPr>
+          <a:xfrm>
+            <a:off x="9763433" y="6400801"/>
+            <a:ext cx="2428568" cy="457199"/>
+          </a:xfrm>
+          <a:prstGeom prst="rect">
+            <a:avLst/>
+          </a:prstGeom>
+          <a:ln>
+            <a:solidFill>
+              <a:schemeClr val="tx1"/>
+            </a:solidFill>
+          </a:ln>
+          <a:effectLst>
+            <a:outerShdw blurRad="50800" dir="14400000">
+              <a:srgbClr val="000000">
+                <a:alpha val="40000"/>
+              </a:srgbClr>
+            </a:outerShdw>
+          </a:effectLst>
+        </p:spPr>
+        <p:txBody>
+          <a:bodyPr vert="horz" lIns="91440" tIns="45720" rIns="91440" bIns="45720" rtlCol="0" anchor="t">
+            <a:noAutofit/>
+          </a:bodyPr>
+          <a:lstStyle>
+            <a:lvl1pPr marL="0" indent="0" algn="l" defTabSz="457200" rtl="0" eaLnBrk="1" latinLnBrk="0" hangingPunct="1">
+              <a:spcBef>
+                <a:spcPct val="20000"/>
+              </a:spcBef>
+              <a:spcAft>
+                <a:spcPts val="600"/>
+              </a:spcAft>
+              <a:buClr>
+                <a:schemeClr val="accent1"/>
+              </a:buClr>
+              <a:buFont typeface="Wingdings 2" charset="2"/>
+              <a:buNone/>
+              <a:defRPr sz="1800" kern="1200">
+                <a:solidFill>
+                  <a:schemeClr val="tx1"/>
+                </a:solidFill>
+                <a:latin typeface="+mn-lt"/>
+                <a:ea typeface="+mn-ea"/>
+                <a:cs typeface="+mn-cs"/>
+              </a:defRPr>
+            </a:lvl1pPr>
+            <a:lvl2pPr marL="457200" indent="0" algn="ctr" defTabSz="457200" rtl="0" eaLnBrk="1" latinLnBrk="0" hangingPunct="1">
+              <a:spcBef>
+                <a:spcPct val="20000"/>
+              </a:spcBef>
+              <a:spcAft>
+                <a:spcPts val="600"/>
+              </a:spcAft>
+              <a:buClr>
+                <a:schemeClr val="accent1"/>
+              </a:buClr>
+              <a:buFont typeface="Wingdings 2" charset="2"/>
+              <a:buNone/>
+              <a:defRPr sz="1600" kern="1200">
+                <a:solidFill>
+                  <a:schemeClr val="tx1">
+                    <a:tint val="75000"/>
+                  </a:schemeClr>
+                </a:solidFill>
+                <a:latin typeface="+mn-lt"/>
+                <a:ea typeface="+mn-ea"/>
+                <a:cs typeface="+mn-cs"/>
+              </a:defRPr>
+            </a:lvl2pPr>
+            <a:lvl3pPr marL="914400" indent="0" algn="ctr" defTabSz="457200" rtl="0" eaLnBrk="1" latinLnBrk="0" hangingPunct="1">
+              <a:spcBef>
+                <a:spcPct val="20000"/>
+              </a:spcBef>
+              <a:spcAft>
+                <a:spcPts val="600"/>
+              </a:spcAft>
+              <a:buClr>
+                <a:schemeClr val="accent1"/>
+              </a:buClr>
+              <a:buFont typeface="Wingdings 2" charset="2"/>
+              <a:buNone/>
+              <a:defRPr sz="1400" kern="1200">
+                <a:solidFill>
+                  <a:schemeClr val="tx1">
+                    <a:tint val="75000"/>
+                  </a:schemeClr>
+                </a:solidFill>
+                <a:latin typeface="+mn-lt"/>
+                <a:ea typeface="+mn-ea"/>
+                <a:cs typeface="+mn-cs"/>
+              </a:defRPr>
+            </a:lvl3pPr>
+            <a:lvl4pPr marL="1371600" indent="0" algn="ctr" defTabSz="457200" rtl="0" eaLnBrk="1" latinLnBrk="0" hangingPunct="1">
+              <a:spcBef>
+                <a:spcPct val="20000"/>
+              </a:spcBef>
+              <a:spcAft>
+                <a:spcPts val="600"/>
+              </a:spcAft>
+              <a:buClr>
+                <a:schemeClr val="accent1"/>
+              </a:buClr>
+              <a:buFont typeface="Wingdings 2" charset="2"/>
+              <a:buNone/>
+              <a:defRPr sz="1200" kern="1200">
+                <a:solidFill>
+                  <a:schemeClr val="tx1">
+                    <a:tint val="75000"/>
+                  </a:schemeClr>
+                </a:solidFill>
+                <a:latin typeface="+mn-lt"/>
+                <a:ea typeface="+mn-ea"/>
+                <a:cs typeface="+mn-cs"/>
+              </a:defRPr>
+            </a:lvl4pPr>
+            <a:lvl5pPr marL="1828800" indent="0" algn="ctr" defTabSz="457200" rtl="0" eaLnBrk="1" latinLnBrk="0" hangingPunct="1">
+              <a:spcBef>
+                <a:spcPct val="20000"/>
+              </a:spcBef>
+              <a:spcAft>
+                <a:spcPts val="600"/>
+              </a:spcAft>
+              <a:buClr>
+                <a:schemeClr val="accent1"/>
+              </a:buClr>
+              <a:buFont typeface="Wingdings 2" charset="2"/>
+              <a:buNone/>
+              <a:defRPr sz="1200" kern="1200">
+                <a:solidFill>
+                  <a:schemeClr val="tx1">
+                    <a:tint val="75000"/>
+                  </a:schemeClr>
+                </a:solidFill>
+                <a:latin typeface="+mn-lt"/>
+                <a:ea typeface="+mn-ea"/>
+                <a:cs typeface="+mn-cs"/>
+              </a:defRPr>
+            </a:lvl5pPr>
+            <a:lvl6pPr marL="2286000" indent="0" algn="ctr" defTabSz="457200" rtl="0" eaLnBrk="1" latinLnBrk="0" hangingPunct="1">
+              <a:spcBef>
+                <a:spcPct val="20000"/>
+              </a:spcBef>
+              <a:spcAft>
+                <a:spcPts val="600"/>
+              </a:spcAft>
+              <a:buClr>
+                <a:schemeClr val="accent1"/>
+              </a:buClr>
+              <a:buFont typeface="Wingdings 2" charset="2"/>
+              <a:buNone/>
+              <a:defRPr sz="1200" kern="1200">
+                <a:solidFill>
+                  <a:schemeClr val="tx1">
+                    <a:tint val="75000"/>
+                  </a:schemeClr>
+                </a:solidFill>
+                <a:latin typeface="+mn-lt"/>
+                <a:ea typeface="+mn-ea"/>
+                <a:cs typeface="+mn-cs"/>
+              </a:defRPr>
+            </a:lvl6pPr>
+            <a:lvl7pPr marL="2743200" indent="0" algn="ctr" defTabSz="457200" rtl="0" eaLnBrk="1" latinLnBrk="0" hangingPunct="1">
+              <a:spcBef>
+                <a:spcPct val="20000"/>
+              </a:spcBef>
+              <a:spcAft>
+                <a:spcPts val="600"/>
+              </a:spcAft>
+              <a:buClr>
+                <a:schemeClr val="accent1"/>
+              </a:buClr>
+              <a:buFont typeface="Wingdings 2" charset="2"/>
+              <a:buNone/>
+              <a:defRPr sz="1200" kern="1200">
+                <a:solidFill>
+                  <a:schemeClr val="tx1">
+                    <a:tint val="75000"/>
+                  </a:schemeClr>
+                </a:solidFill>
+                <a:latin typeface="+mn-lt"/>
+                <a:ea typeface="+mn-ea"/>
+                <a:cs typeface="+mn-cs"/>
+              </a:defRPr>
+            </a:lvl7pPr>
+            <a:lvl8pPr marL="3200400" indent="0" algn="ctr" defTabSz="457200" rtl="0" eaLnBrk="1" latinLnBrk="0" hangingPunct="1">
+              <a:spcBef>
+                <a:spcPct val="20000"/>
+              </a:spcBef>
+              <a:spcAft>
+                <a:spcPts val="600"/>
+              </a:spcAft>
+              <a:buClr>
+                <a:schemeClr val="accent1"/>
+              </a:buClr>
+              <a:buFont typeface="Wingdings 2" charset="2"/>
+              <a:buNone/>
+              <a:defRPr sz="1200" kern="1200">
+                <a:solidFill>
+                  <a:schemeClr val="tx1">
+                    <a:tint val="75000"/>
+                  </a:schemeClr>
+                </a:solidFill>
+                <a:latin typeface="+mn-lt"/>
+                <a:ea typeface="+mn-ea"/>
+                <a:cs typeface="+mn-cs"/>
+              </a:defRPr>
+            </a:lvl8pPr>
+            <a:lvl9pPr marL="3657600" indent="0" algn="ctr" defTabSz="457200" rtl="0" eaLnBrk="1" latinLnBrk="0" hangingPunct="1">
+              <a:spcBef>
+                <a:spcPct val="20000"/>
+              </a:spcBef>
+              <a:spcAft>
+                <a:spcPts val="600"/>
+              </a:spcAft>
+              <a:buClr>
+                <a:schemeClr val="accent1"/>
+              </a:buClr>
+              <a:buFont typeface="Wingdings 2" charset="2"/>
+              <a:buNone/>
+              <a:defRPr sz="1200" kern="1200">
+                <a:solidFill>
+                  <a:schemeClr val="tx1">
+                    <a:tint val="75000"/>
+                  </a:schemeClr>
+                </a:solidFill>
+                <a:latin typeface="+mn-lt"/>
+                <a:ea typeface="+mn-ea"/>
+                <a:cs typeface="+mn-cs"/>
+              </a:defRPr>
+            </a:lvl9pPr>
+          </a:lstStyle>
+          <a:p>
+            <a:r>
+              <a:rPr lang="fr-FR" sz="2400" dirty="0" smtClean="0"/>
+              <a:t>IN104 </a:t>
+            </a:r>
+            <a:r>
+              <a:rPr lang="fr-FR" sz="2400" dirty="0" smtClean="0"/>
+              <a:t>– Page </a:t>
+            </a:r>
+            <a:r>
+              <a:rPr lang="fr-FR" sz="1600" dirty="0" smtClean="0"/>
+              <a:t>13</a:t>
+            </a:r>
+            <a:endParaRPr lang="fr-FR" sz="1600" dirty="0"/>
+          </a:p>
+        </p:txBody>
+      </p:sp>
     </p:spTree>
     <p:extLst>
       <p:ext uri="{BB962C8B-B14F-4D97-AF65-F5344CB8AC3E}">
@@ -6782,6 +7553,263 @@
           </a:p>
         </p:txBody>
       </p:sp>
+      <p:sp>
+        <p:nvSpPr>
+          <p:cNvPr id="5" name="Sous-titre 2"/>
+          <p:cNvSpPr txBox="1">
+            <a:spLocks/>
+          </p:cNvSpPr>
+          <p:nvPr/>
+        </p:nvSpPr>
+        <p:spPr>
+          <a:xfrm>
+            <a:off x="9763433" y="6400801"/>
+            <a:ext cx="2428568" cy="457199"/>
+          </a:xfrm>
+          <a:prstGeom prst="rect">
+            <a:avLst/>
+          </a:prstGeom>
+          <a:ln>
+            <a:solidFill>
+              <a:schemeClr val="tx1"/>
+            </a:solidFill>
+          </a:ln>
+          <a:effectLst>
+            <a:outerShdw blurRad="50800" dir="14400000">
+              <a:srgbClr val="000000">
+                <a:alpha val="40000"/>
+              </a:srgbClr>
+            </a:outerShdw>
+          </a:effectLst>
+        </p:spPr>
+        <p:txBody>
+          <a:bodyPr vert="horz" lIns="91440" tIns="45720" rIns="91440" bIns="45720" rtlCol="0" anchor="t">
+            <a:noAutofit/>
+          </a:bodyPr>
+          <a:lstStyle>
+            <a:lvl1pPr marL="0" indent="0" algn="l" defTabSz="457200" rtl="0" eaLnBrk="1" latinLnBrk="0" hangingPunct="1">
+              <a:spcBef>
+                <a:spcPct val="20000"/>
+              </a:spcBef>
+              <a:spcAft>
+                <a:spcPts val="600"/>
+              </a:spcAft>
+              <a:buClr>
+                <a:schemeClr val="accent1"/>
+              </a:buClr>
+              <a:buFont typeface="Wingdings 2" charset="2"/>
+              <a:buNone/>
+              <a:defRPr sz="1800" kern="1200">
+                <a:solidFill>
+                  <a:schemeClr val="tx1"/>
+                </a:solidFill>
+                <a:latin typeface="+mn-lt"/>
+                <a:ea typeface="+mn-ea"/>
+                <a:cs typeface="+mn-cs"/>
+              </a:defRPr>
+            </a:lvl1pPr>
+            <a:lvl2pPr marL="457200" indent="0" algn="ctr" defTabSz="457200" rtl="0" eaLnBrk="1" latinLnBrk="0" hangingPunct="1">
+              <a:spcBef>
+                <a:spcPct val="20000"/>
+              </a:spcBef>
+              <a:spcAft>
+                <a:spcPts val="600"/>
+              </a:spcAft>
+              <a:buClr>
+                <a:schemeClr val="accent1"/>
+              </a:buClr>
+              <a:buFont typeface="Wingdings 2" charset="2"/>
+              <a:buNone/>
+              <a:defRPr sz="1600" kern="1200">
+                <a:solidFill>
+                  <a:schemeClr val="tx1">
+                    <a:tint val="75000"/>
+                  </a:schemeClr>
+                </a:solidFill>
+                <a:latin typeface="+mn-lt"/>
+                <a:ea typeface="+mn-ea"/>
+                <a:cs typeface="+mn-cs"/>
+              </a:defRPr>
+            </a:lvl2pPr>
+            <a:lvl3pPr marL="914400" indent="0" algn="ctr" defTabSz="457200" rtl="0" eaLnBrk="1" latinLnBrk="0" hangingPunct="1">
+              <a:spcBef>
+                <a:spcPct val="20000"/>
+              </a:spcBef>
+              <a:spcAft>
+                <a:spcPts val="600"/>
+              </a:spcAft>
+              <a:buClr>
+                <a:schemeClr val="accent1"/>
+              </a:buClr>
+              <a:buFont typeface="Wingdings 2" charset="2"/>
+              <a:buNone/>
+              <a:defRPr sz="1400" kern="1200">
+                <a:solidFill>
+                  <a:schemeClr val="tx1">
+                    <a:tint val="75000"/>
+                  </a:schemeClr>
+                </a:solidFill>
+                <a:latin typeface="+mn-lt"/>
+                <a:ea typeface="+mn-ea"/>
+                <a:cs typeface="+mn-cs"/>
+              </a:defRPr>
+            </a:lvl3pPr>
+            <a:lvl4pPr marL="1371600" indent="0" algn="ctr" defTabSz="457200" rtl="0" eaLnBrk="1" latinLnBrk="0" hangingPunct="1">
+              <a:spcBef>
+                <a:spcPct val="20000"/>
+              </a:spcBef>
+              <a:spcAft>
+                <a:spcPts val="600"/>
+              </a:spcAft>
+              <a:buClr>
+                <a:schemeClr val="accent1"/>
+              </a:buClr>
+              <a:buFont typeface="Wingdings 2" charset="2"/>
+              <a:buNone/>
+              <a:defRPr sz="1200" kern="1200">
+                <a:solidFill>
+                  <a:schemeClr val="tx1">
+                    <a:tint val="75000"/>
+                  </a:schemeClr>
+                </a:solidFill>
+                <a:latin typeface="+mn-lt"/>
+                <a:ea typeface="+mn-ea"/>
+                <a:cs typeface="+mn-cs"/>
+              </a:defRPr>
+            </a:lvl4pPr>
+            <a:lvl5pPr marL="1828800" indent="0" algn="ctr" defTabSz="457200" rtl="0" eaLnBrk="1" latinLnBrk="0" hangingPunct="1">
+              <a:spcBef>
+                <a:spcPct val="20000"/>
+              </a:spcBef>
+              <a:spcAft>
+                <a:spcPts val="600"/>
+              </a:spcAft>
+              <a:buClr>
+                <a:schemeClr val="accent1"/>
+              </a:buClr>
+              <a:buFont typeface="Wingdings 2" charset="2"/>
+              <a:buNone/>
+              <a:defRPr sz="1200" kern="1200">
+                <a:solidFill>
+                  <a:schemeClr val="tx1">
+                    <a:tint val="75000"/>
+                  </a:schemeClr>
+                </a:solidFill>
+                <a:latin typeface="+mn-lt"/>
+                <a:ea typeface="+mn-ea"/>
+                <a:cs typeface="+mn-cs"/>
+              </a:defRPr>
+            </a:lvl5pPr>
+            <a:lvl6pPr marL="2286000" indent="0" algn="ctr" defTabSz="457200" rtl="0" eaLnBrk="1" latinLnBrk="0" hangingPunct="1">
+              <a:spcBef>
+                <a:spcPct val="20000"/>
+              </a:spcBef>
+              <a:spcAft>
+                <a:spcPts val="600"/>
+              </a:spcAft>
+              <a:buClr>
+                <a:schemeClr val="accent1"/>
+              </a:buClr>
+              <a:buFont typeface="Wingdings 2" charset="2"/>
+              <a:buNone/>
+              <a:defRPr sz="1200" kern="1200">
+                <a:solidFill>
+                  <a:schemeClr val="tx1">
+                    <a:tint val="75000"/>
+                  </a:schemeClr>
+                </a:solidFill>
+                <a:latin typeface="+mn-lt"/>
+                <a:ea typeface="+mn-ea"/>
+                <a:cs typeface="+mn-cs"/>
+              </a:defRPr>
+            </a:lvl6pPr>
+            <a:lvl7pPr marL="2743200" indent="0" algn="ctr" defTabSz="457200" rtl="0" eaLnBrk="1" latinLnBrk="0" hangingPunct="1">
+              <a:spcBef>
+                <a:spcPct val="20000"/>
+              </a:spcBef>
+              <a:spcAft>
+                <a:spcPts val="600"/>
+              </a:spcAft>
+              <a:buClr>
+                <a:schemeClr val="accent1"/>
+              </a:buClr>
+              <a:buFont typeface="Wingdings 2" charset="2"/>
+              <a:buNone/>
+              <a:defRPr sz="1200" kern="1200">
+                <a:solidFill>
+                  <a:schemeClr val="tx1">
+                    <a:tint val="75000"/>
+                  </a:schemeClr>
+                </a:solidFill>
+                <a:latin typeface="+mn-lt"/>
+                <a:ea typeface="+mn-ea"/>
+                <a:cs typeface="+mn-cs"/>
+              </a:defRPr>
+            </a:lvl7pPr>
+            <a:lvl8pPr marL="3200400" indent="0" algn="ctr" defTabSz="457200" rtl="0" eaLnBrk="1" latinLnBrk="0" hangingPunct="1">
+              <a:spcBef>
+                <a:spcPct val="20000"/>
+              </a:spcBef>
+              <a:spcAft>
+                <a:spcPts val="600"/>
+              </a:spcAft>
+              <a:buClr>
+                <a:schemeClr val="accent1"/>
+              </a:buClr>
+              <a:buFont typeface="Wingdings 2" charset="2"/>
+              <a:buNone/>
+              <a:defRPr sz="1200" kern="1200">
+                <a:solidFill>
+                  <a:schemeClr val="tx1">
+                    <a:tint val="75000"/>
+                  </a:schemeClr>
+                </a:solidFill>
+                <a:latin typeface="+mn-lt"/>
+                <a:ea typeface="+mn-ea"/>
+                <a:cs typeface="+mn-cs"/>
+              </a:defRPr>
+            </a:lvl8pPr>
+            <a:lvl9pPr marL="3657600" indent="0" algn="ctr" defTabSz="457200" rtl="0" eaLnBrk="1" latinLnBrk="0" hangingPunct="1">
+              <a:spcBef>
+                <a:spcPct val="20000"/>
+              </a:spcBef>
+              <a:spcAft>
+                <a:spcPts val="600"/>
+              </a:spcAft>
+              <a:buClr>
+                <a:schemeClr val="accent1"/>
+              </a:buClr>
+              <a:buFont typeface="Wingdings 2" charset="2"/>
+              <a:buNone/>
+              <a:defRPr sz="1200" kern="1200">
+                <a:solidFill>
+                  <a:schemeClr val="tx1">
+                    <a:tint val="75000"/>
+                  </a:schemeClr>
+                </a:solidFill>
+                <a:latin typeface="+mn-lt"/>
+                <a:ea typeface="+mn-ea"/>
+                <a:cs typeface="+mn-cs"/>
+              </a:defRPr>
+            </a:lvl9pPr>
+          </a:lstStyle>
+          <a:p>
+            <a:r>
+              <a:rPr lang="fr-FR" sz="2400" dirty="0" smtClean="0"/>
+              <a:t>IN104 </a:t>
+            </a:r>
+            <a:r>
+              <a:rPr lang="fr-FR" sz="2400" dirty="0" smtClean="0"/>
+              <a:t>– Page </a:t>
+            </a:r>
+            <a:r>
+              <a:rPr lang="fr-FR" sz="1600" dirty="0" smtClean="0"/>
+              <a:t>14</a:t>
+            </a:r>
+            <a:endParaRPr lang="fr-FR" sz="1600" dirty="0"/>
+          </a:p>
+        </p:txBody>
+      </p:sp>
     </p:spTree>
     <p:extLst>
       <p:ext uri="{BB962C8B-B14F-4D97-AF65-F5344CB8AC3E}">
@@ -6870,7 +7898,12 @@
             <p:ph idx="1"/>
           </p:nvPr>
         </p:nvSpPr>
-        <p:spPr/>
+        <p:spPr>
+          <a:xfrm>
+            <a:off x="818712" y="2222287"/>
+            <a:ext cx="10554574" cy="4249765"/>
+          </a:xfrm>
+        </p:spPr>
         <p:txBody>
           <a:bodyPr/>
           <a:lstStyle/>
@@ -6914,6 +7947,276 @@
           <a:p>
             <a:pPr lvl="1"/>
             <a:endParaRPr lang="fr-FR" dirty="0" smtClean="0"/>
+          </a:p>
+          <a:p>
+            <a:r>
+              <a:rPr lang="fr-FR" dirty="0" smtClean="0"/>
+              <a:t>Expérience du travail de groupe pour des projets futurs</a:t>
+            </a:r>
+          </a:p>
+          <a:p>
+            <a:pPr lvl="1"/>
+            <a:r>
+              <a:rPr lang="fr-FR" dirty="0" smtClean="0"/>
+              <a:t>Organisation du projet et division des tâches</a:t>
+            </a:r>
+          </a:p>
+        </p:txBody>
+      </p:sp>
+      <p:sp>
+        <p:nvSpPr>
+          <p:cNvPr id="4" name="Sous-titre 2"/>
+          <p:cNvSpPr txBox="1">
+            <a:spLocks/>
+          </p:cNvSpPr>
+          <p:nvPr/>
+        </p:nvSpPr>
+        <p:spPr>
+          <a:xfrm>
+            <a:off x="9763433" y="6400801"/>
+            <a:ext cx="2428568" cy="457199"/>
+          </a:xfrm>
+          <a:prstGeom prst="rect">
+            <a:avLst/>
+          </a:prstGeom>
+          <a:ln>
+            <a:solidFill>
+              <a:schemeClr val="tx1"/>
+            </a:solidFill>
+          </a:ln>
+          <a:effectLst>
+            <a:outerShdw blurRad="50800" dir="14400000">
+              <a:srgbClr val="000000">
+                <a:alpha val="40000"/>
+              </a:srgbClr>
+            </a:outerShdw>
+          </a:effectLst>
+        </p:spPr>
+        <p:txBody>
+          <a:bodyPr vert="horz" lIns="91440" tIns="45720" rIns="91440" bIns="45720" rtlCol="0" anchor="t">
+            <a:noAutofit/>
+          </a:bodyPr>
+          <a:lstStyle>
+            <a:lvl1pPr marL="0" indent="0" algn="l" defTabSz="457200" rtl="0" eaLnBrk="1" latinLnBrk="0" hangingPunct="1">
+              <a:spcBef>
+                <a:spcPct val="20000"/>
+              </a:spcBef>
+              <a:spcAft>
+                <a:spcPts val="600"/>
+              </a:spcAft>
+              <a:buClr>
+                <a:schemeClr val="accent1"/>
+              </a:buClr>
+              <a:buFont typeface="Wingdings 2" charset="2"/>
+              <a:buNone/>
+              <a:defRPr sz="1800" kern="1200">
+                <a:solidFill>
+                  <a:schemeClr val="tx1"/>
+                </a:solidFill>
+                <a:latin typeface="+mn-lt"/>
+                <a:ea typeface="+mn-ea"/>
+                <a:cs typeface="+mn-cs"/>
+              </a:defRPr>
+            </a:lvl1pPr>
+            <a:lvl2pPr marL="457200" indent="0" algn="ctr" defTabSz="457200" rtl="0" eaLnBrk="1" latinLnBrk="0" hangingPunct="1">
+              <a:spcBef>
+                <a:spcPct val="20000"/>
+              </a:spcBef>
+              <a:spcAft>
+                <a:spcPts val="600"/>
+              </a:spcAft>
+              <a:buClr>
+                <a:schemeClr val="accent1"/>
+              </a:buClr>
+              <a:buFont typeface="Wingdings 2" charset="2"/>
+              <a:buNone/>
+              <a:defRPr sz="1600" kern="1200">
+                <a:solidFill>
+                  <a:schemeClr val="tx1">
+                    <a:tint val="75000"/>
+                  </a:schemeClr>
+                </a:solidFill>
+                <a:latin typeface="+mn-lt"/>
+                <a:ea typeface="+mn-ea"/>
+                <a:cs typeface="+mn-cs"/>
+              </a:defRPr>
+            </a:lvl2pPr>
+            <a:lvl3pPr marL="914400" indent="0" algn="ctr" defTabSz="457200" rtl="0" eaLnBrk="1" latinLnBrk="0" hangingPunct="1">
+              <a:spcBef>
+                <a:spcPct val="20000"/>
+              </a:spcBef>
+              <a:spcAft>
+                <a:spcPts val="600"/>
+              </a:spcAft>
+              <a:buClr>
+                <a:schemeClr val="accent1"/>
+              </a:buClr>
+              <a:buFont typeface="Wingdings 2" charset="2"/>
+              <a:buNone/>
+              <a:defRPr sz="1400" kern="1200">
+                <a:solidFill>
+                  <a:schemeClr val="tx1">
+                    <a:tint val="75000"/>
+                  </a:schemeClr>
+                </a:solidFill>
+                <a:latin typeface="+mn-lt"/>
+                <a:ea typeface="+mn-ea"/>
+                <a:cs typeface="+mn-cs"/>
+              </a:defRPr>
+            </a:lvl3pPr>
+            <a:lvl4pPr marL="1371600" indent="0" algn="ctr" defTabSz="457200" rtl="0" eaLnBrk="1" latinLnBrk="0" hangingPunct="1">
+              <a:spcBef>
+                <a:spcPct val="20000"/>
+              </a:spcBef>
+              <a:spcAft>
+                <a:spcPts val="600"/>
+              </a:spcAft>
+              <a:buClr>
+                <a:schemeClr val="accent1"/>
+              </a:buClr>
+              <a:buFont typeface="Wingdings 2" charset="2"/>
+              <a:buNone/>
+              <a:defRPr sz="1200" kern="1200">
+                <a:solidFill>
+                  <a:schemeClr val="tx1">
+                    <a:tint val="75000"/>
+                  </a:schemeClr>
+                </a:solidFill>
+                <a:latin typeface="+mn-lt"/>
+                <a:ea typeface="+mn-ea"/>
+                <a:cs typeface="+mn-cs"/>
+              </a:defRPr>
+            </a:lvl4pPr>
+            <a:lvl5pPr marL="1828800" indent="0" algn="ctr" defTabSz="457200" rtl="0" eaLnBrk="1" latinLnBrk="0" hangingPunct="1">
+              <a:spcBef>
+                <a:spcPct val="20000"/>
+              </a:spcBef>
+              <a:spcAft>
+                <a:spcPts val="600"/>
+              </a:spcAft>
+              <a:buClr>
+                <a:schemeClr val="accent1"/>
+              </a:buClr>
+              <a:buFont typeface="Wingdings 2" charset="2"/>
+              <a:buNone/>
+              <a:defRPr sz="1200" kern="1200">
+                <a:solidFill>
+                  <a:schemeClr val="tx1">
+                    <a:tint val="75000"/>
+                  </a:schemeClr>
+                </a:solidFill>
+                <a:latin typeface="+mn-lt"/>
+                <a:ea typeface="+mn-ea"/>
+                <a:cs typeface="+mn-cs"/>
+              </a:defRPr>
+            </a:lvl5pPr>
+            <a:lvl6pPr marL="2286000" indent="0" algn="ctr" defTabSz="457200" rtl="0" eaLnBrk="1" latinLnBrk="0" hangingPunct="1">
+              <a:spcBef>
+                <a:spcPct val="20000"/>
+              </a:spcBef>
+              <a:spcAft>
+                <a:spcPts val="600"/>
+              </a:spcAft>
+              <a:buClr>
+                <a:schemeClr val="accent1"/>
+              </a:buClr>
+              <a:buFont typeface="Wingdings 2" charset="2"/>
+              <a:buNone/>
+              <a:defRPr sz="1200" kern="1200">
+                <a:solidFill>
+                  <a:schemeClr val="tx1">
+                    <a:tint val="75000"/>
+                  </a:schemeClr>
+                </a:solidFill>
+                <a:latin typeface="+mn-lt"/>
+                <a:ea typeface="+mn-ea"/>
+                <a:cs typeface="+mn-cs"/>
+              </a:defRPr>
+            </a:lvl6pPr>
+            <a:lvl7pPr marL="2743200" indent="0" algn="ctr" defTabSz="457200" rtl="0" eaLnBrk="1" latinLnBrk="0" hangingPunct="1">
+              <a:spcBef>
+                <a:spcPct val="20000"/>
+              </a:spcBef>
+              <a:spcAft>
+                <a:spcPts val="600"/>
+              </a:spcAft>
+              <a:buClr>
+                <a:schemeClr val="accent1"/>
+              </a:buClr>
+              <a:buFont typeface="Wingdings 2" charset="2"/>
+              <a:buNone/>
+              <a:defRPr sz="1200" kern="1200">
+                <a:solidFill>
+                  <a:schemeClr val="tx1">
+                    <a:tint val="75000"/>
+                  </a:schemeClr>
+                </a:solidFill>
+                <a:latin typeface="+mn-lt"/>
+                <a:ea typeface="+mn-ea"/>
+                <a:cs typeface="+mn-cs"/>
+              </a:defRPr>
+            </a:lvl7pPr>
+            <a:lvl8pPr marL="3200400" indent="0" algn="ctr" defTabSz="457200" rtl="0" eaLnBrk="1" latinLnBrk="0" hangingPunct="1">
+              <a:spcBef>
+                <a:spcPct val="20000"/>
+              </a:spcBef>
+              <a:spcAft>
+                <a:spcPts val="600"/>
+              </a:spcAft>
+              <a:buClr>
+                <a:schemeClr val="accent1"/>
+              </a:buClr>
+              <a:buFont typeface="Wingdings 2" charset="2"/>
+              <a:buNone/>
+              <a:defRPr sz="1200" kern="1200">
+                <a:solidFill>
+                  <a:schemeClr val="tx1">
+                    <a:tint val="75000"/>
+                  </a:schemeClr>
+                </a:solidFill>
+                <a:latin typeface="+mn-lt"/>
+                <a:ea typeface="+mn-ea"/>
+                <a:cs typeface="+mn-cs"/>
+              </a:defRPr>
+            </a:lvl8pPr>
+            <a:lvl9pPr marL="3657600" indent="0" algn="ctr" defTabSz="457200" rtl="0" eaLnBrk="1" latinLnBrk="0" hangingPunct="1">
+              <a:spcBef>
+                <a:spcPct val="20000"/>
+              </a:spcBef>
+              <a:spcAft>
+                <a:spcPts val="600"/>
+              </a:spcAft>
+              <a:buClr>
+                <a:schemeClr val="accent1"/>
+              </a:buClr>
+              <a:buFont typeface="Wingdings 2" charset="2"/>
+              <a:buNone/>
+              <a:defRPr sz="1200" kern="1200">
+                <a:solidFill>
+                  <a:schemeClr val="tx1">
+                    <a:tint val="75000"/>
+                  </a:schemeClr>
+                </a:solidFill>
+                <a:latin typeface="+mn-lt"/>
+                <a:ea typeface="+mn-ea"/>
+                <a:cs typeface="+mn-cs"/>
+              </a:defRPr>
+            </a:lvl9pPr>
+          </a:lstStyle>
+          <a:p>
+            <a:r>
+              <a:rPr lang="fr-FR" sz="2400" dirty="0" smtClean="0"/>
+              <a:t>IN104 </a:t>
+            </a:r>
+            <a:r>
+              <a:rPr lang="fr-FR" sz="2400" dirty="0" smtClean="0"/>
+              <a:t>– Page </a:t>
+            </a:r>
+            <a:r>
+              <a:rPr lang="fr-FR" sz="1600" dirty="0" smtClean="0"/>
+              <a:t>15</a:t>
+            </a:r>
+            <a:endParaRPr lang="fr-FR" sz="1600" dirty="0"/>
           </a:p>
         </p:txBody>
       </p:sp>
@@ -8737,6 +10040,259 @@
           </a:fontRef>
         </p:style>
       </p:cxnSp>
+      <p:sp>
+        <p:nvSpPr>
+          <p:cNvPr id="13" name="Sous-titre 2"/>
+          <p:cNvSpPr txBox="1">
+            <a:spLocks/>
+          </p:cNvSpPr>
+          <p:nvPr/>
+        </p:nvSpPr>
+        <p:spPr>
+          <a:xfrm>
+            <a:off x="9763433" y="6400801"/>
+            <a:ext cx="2428568" cy="457199"/>
+          </a:xfrm>
+          <a:prstGeom prst="rect">
+            <a:avLst/>
+          </a:prstGeom>
+          <a:ln>
+            <a:solidFill>
+              <a:schemeClr val="tx1"/>
+            </a:solidFill>
+          </a:ln>
+          <a:effectLst>
+            <a:outerShdw blurRad="50800" dir="14400000">
+              <a:srgbClr val="000000">
+                <a:alpha val="40000"/>
+              </a:srgbClr>
+            </a:outerShdw>
+          </a:effectLst>
+        </p:spPr>
+        <p:txBody>
+          <a:bodyPr vert="horz" lIns="91440" tIns="45720" rIns="91440" bIns="45720" rtlCol="0" anchor="t">
+            <a:noAutofit/>
+          </a:bodyPr>
+          <a:lstStyle>
+            <a:lvl1pPr marL="0" indent="0" algn="l" defTabSz="457200" rtl="0" eaLnBrk="1" latinLnBrk="0" hangingPunct="1">
+              <a:spcBef>
+                <a:spcPct val="20000"/>
+              </a:spcBef>
+              <a:spcAft>
+                <a:spcPts val="600"/>
+              </a:spcAft>
+              <a:buClr>
+                <a:schemeClr val="accent1"/>
+              </a:buClr>
+              <a:buFont typeface="Wingdings 2" charset="2"/>
+              <a:buNone/>
+              <a:defRPr sz="1800" kern="1200">
+                <a:solidFill>
+                  <a:schemeClr val="tx1"/>
+                </a:solidFill>
+                <a:latin typeface="+mn-lt"/>
+                <a:ea typeface="+mn-ea"/>
+                <a:cs typeface="+mn-cs"/>
+              </a:defRPr>
+            </a:lvl1pPr>
+            <a:lvl2pPr marL="457200" indent="0" algn="ctr" defTabSz="457200" rtl="0" eaLnBrk="1" latinLnBrk="0" hangingPunct="1">
+              <a:spcBef>
+                <a:spcPct val="20000"/>
+              </a:spcBef>
+              <a:spcAft>
+                <a:spcPts val="600"/>
+              </a:spcAft>
+              <a:buClr>
+                <a:schemeClr val="accent1"/>
+              </a:buClr>
+              <a:buFont typeface="Wingdings 2" charset="2"/>
+              <a:buNone/>
+              <a:defRPr sz="1600" kern="1200">
+                <a:solidFill>
+                  <a:schemeClr val="tx1">
+                    <a:tint val="75000"/>
+                  </a:schemeClr>
+                </a:solidFill>
+                <a:latin typeface="+mn-lt"/>
+                <a:ea typeface="+mn-ea"/>
+                <a:cs typeface="+mn-cs"/>
+              </a:defRPr>
+            </a:lvl2pPr>
+            <a:lvl3pPr marL="914400" indent="0" algn="ctr" defTabSz="457200" rtl="0" eaLnBrk="1" latinLnBrk="0" hangingPunct="1">
+              <a:spcBef>
+                <a:spcPct val="20000"/>
+              </a:spcBef>
+              <a:spcAft>
+                <a:spcPts val="600"/>
+              </a:spcAft>
+              <a:buClr>
+                <a:schemeClr val="accent1"/>
+              </a:buClr>
+              <a:buFont typeface="Wingdings 2" charset="2"/>
+              <a:buNone/>
+              <a:defRPr sz="1400" kern="1200">
+                <a:solidFill>
+                  <a:schemeClr val="tx1">
+                    <a:tint val="75000"/>
+                  </a:schemeClr>
+                </a:solidFill>
+                <a:latin typeface="+mn-lt"/>
+                <a:ea typeface="+mn-ea"/>
+                <a:cs typeface="+mn-cs"/>
+              </a:defRPr>
+            </a:lvl3pPr>
+            <a:lvl4pPr marL="1371600" indent="0" algn="ctr" defTabSz="457200" rtl="0" eaLnBrk="1" latinLnBrk="0" hangingPunct="1">
+              <a:spcBef>
+                <a:spcPct val="20000"/>
+              </a:spcBef>
+              <a:spcAft>
+                <a:spcPts val="600"/>
+              </a:spcAft>
+              <a:buClr>
+                <a:schemeClr val="accent1"/>
+              </a:buClr>
+              <a:buFont typeface="Wingdings 2" charset="2"/>
+              <a:buNone/>
+              <a:defRPr sz="1200" kern="1200">
+                <a:solidFill>
+                  <a:schemeClr val="tx1">
+                    <a:tint val="75000"/>
+                  </a:schemeClr>
+                </a:solidFill>
+                <a:latin typeface="+mn-lt"/>
+                <a:ea typeface="+mn-ea"/>
+                <a:cs typeface="+mn-cs"/>
+              </a:defRPr>
+            </a:lvl4pPr>
+            <a:lvl5pPr marL="1828800" indent="0" algn="ctr" defTabSz="457200" rtl="0" eaLnBrk="1" latinLnBrk="0" hangingPunct="1">
+              <a:spcBef>
+                <a:spcPct val="20000"/>
+              </a:spcBef>
+              <a:spcAft>
+                <a:spcPts val="600"/>
+              </a:spcAft>
+              <a:buClr>
+                <a:schemeClr val="accent1"/>
+              </a:buClr>
+              <a:buFont typeface="Wingdings 2" charset="2"/>
+              <a:buNone/>
+              <a:defRPr sz="1200" kern="1200">
+                <a:solidFill>
+                  <a:schemeClr val="tx1">
+                    <a:tint val="75000"/>
+                  </a:schemeClr>
+                </a:solidFill>
+                <a:latin typeface="+mn-lt"/>
+                <a:ea typeface="+mn-ea"/>
+                <a:cs typeface="+mn-cs"/>
+              </a:defRPr>
+            </a:lvl5pPr>
+            <a:lvl6pPr marL="2286000" indent="0" algn="ctr" defTabSz="457200" rtl="0" eaLnBrk="1" latinLnBrk="0" hangingPunct="1">
+              <a:spcBef>
+                <a:spcPct val="20000"/>
+              </a:spcBef>
+              <a:spcAft>
+                <a:spcPts val="600"/>
+              </a:spcAft>
+              <a:buClr>
+                <a:schemeClr val="accent1"/>
+              </a:buClr>
+              <a:buFont typeface="Wingdings 2" charset="2"/>
+              <a:buNone/>
+              <a:defRPr sz="1200" kern="1200">
+                <a:solidFill>
+                  <a:schemeClr val="tx1">
+                    <a:tint val="75000"/>
+                  </a:schemeClr>
+                </a:solidFill>
+                <a:latin typeface="+mn-lt"/>
+                <a:ea typeface="+mn-ea"/>
+                <a:cs typeface="+mn-cs"/>
+              </a:defRPr>
+            </a:lvl6pPr>
+            <a:lvl7pPr marL="2743200" indent="0" algn="ctr" defTabSz="457200" rtl="0" eaLnBrk="1" latinLnBrk="0" hangingPunct="1">
+              <a:spcBef>
+                <a:spcPct val="20000"/>
+              </a:spcBef>
+              <a:spcAft>
+                <a:spcPts val="600"/>
+              </a:spcAft>
+              <a:buClr>
+                <a:schemeClr val="accent1"/>
+              </a:buClr>
+              <a:buFont typeface="Wingdings 2" charset="2"/>
+              <a:buNone/>
+              <a:defRPr sz="1200" kern="1200">
+                <a:solidFill>
+                  <a:schemeClr val="tx1">
+                    <a:tint val="75000"/>
+                  </a:schemeClr>
+                </a:solidFill>
+                <a:latin typeface="+mn-lt"/>
+                <a:ea typeface="+mn-ea"/>
+                <a:cs typeface="+mn-cs"/>
+              </a:defRPr>
+            </a:lvl7pPr>
+            <a:lvl8pPr marL="3200400" indent="0" algn="ctr" defTabSz="457200" rtl="0" eaLnBrk="1" latinLnBrk="0" hangingPunct="1">
+              <a:spcBef>
+                <a:spcPct val="20000"/>
+              </a:spcBef>
+              <a:spcAft>
+                <a:spcPts val="600"/>
+              </a:spcAft>
+              <a:buClr>
+                <a:schemeClr val="accent1"/>
+              </a:buClr>
+              <a:buFont typeface="Wingdings 2" charset="2"/>
+              <a:buNone/>
+              <a:defRPr sz="1200" kern="1200">
+                <a:solidFill>
+                  <a:schemeClr val="tx1">
+                    <a:tint val="75000"/>
+                  </a:schemeClr>
+                </a:solidFill>
+                <a:latin typeface="+mn-lt"/>
+                <a:ea typeface="+mn-ea"/>
+                <a:cs typeface="+mn-cs"/>
+              </a:defRPr>
+            </a:lvl8pPr>
+            <a:lvl9pPr marL="3657600" indent="0" algn="ctr" defTabSz="457200" rtl="0" eaLnBrk="1" latinLnBrk="0" hangingPunct="1">
+              <a:spcBef>
+                <a:spcPct val="20000"/>
+              </a:spcBef>
+              <a:spcAft>
+                <a:spcPts val="600"/>
+              </a:spcAft>
+              <a:buClr>
+                <a:schemeClr val="accent1"/>
+              </a:buClr>
+              <a:buFont typeface="Wingdings 2" charset="2"/>
+              <a:buNone/>
+              <a:defRPr sz="1200" kern="1200">
+                <a:solidFill>
+                  <a:schemeClr val="tx1">
+                    <a:tint val="75000"/>
+                  </a:schemeClr>
+                </a:solidFill>
+                <a:latin typeface="+mn-lt"/>
+                <a:ea typeface="+mn-ea"/>
+                <a:cs typeface="+mn-cs"/>
+              </a:defRPr>
+            </a:lvl9pPr>
+          </a:lstStyle>
+          <a:p>
+            <a:r>
+              <a:rPr lang="fr-FR" sz="2400" dirty="0" smtClean="0"/>
+              <a:t>IN104 – Page </a:t>
+            </a:r>
+            <a:r>
+              <a:rPr lang="fr-FR" sz="2400" dirty="0"/>
+              <a:t>4</a:t>
+            </a:r>
+            <a:endParaRPr lang="fr-FR" sz="2400" dirty="0"/>
+          </a:p>
+        </p:txBody>
+      </p:sp>
     </p:spTree>
     <p:extLst>
       <p:ext uri="{BB962C8B-B14F-4D97-AF65-F5344CB8AC3E}">
@@ -8839,6 +10395,259 @@
           </a:prstGeom>
         </p:spPr>
       </p:pic>
+      <p:sp>
+        <p:nvSpPr>
+          <p:cNvPr id="5" name="Sous-titre 2"/>
+          <p:cNvSpPr txBox="1">
+            <a:spLocks/>
+          </p:cNvSpPr>
+          <p:nvPr/>
+        </p:nvSpPr>
+        <p:spPr>
+          <a:xfrm>
+            <a:off x="9763433" y="6400801"/>
+            <a:ext cx="2428568" cy="457199"/>
+          </a:xfrm>
+          <a:prstGeom prst="rect">
+            <a:avLst/>
+          </a:prstGeom>
+          <a:ln>
+            <a:solidFill>
+              <a:schemeClr val="tx1"/>
+            </a:solidFill>
+          </a:ln>
+          <a:effectLst>
+            <a:outerShdw blurRad="50800" dir="14400000">
+              <a:srgbClr val="000000">
+                <a:alpha val="40000"/>
+              </a:srgbClr>
+            </a:outerShdw>
+          </a:effectLst>
+        </p:spPr>
+        <p:txBody>
+          <a:bodyPr vert="horz" lIns="91440" tIns="45720" rIns="91440" bIns="45720" rtlCol="0" anchor="t">
+            <a:noAutofit/>
+          </a:bodyPr>
+          <a:lstStyle>
+            <a:lvl1pPr marL="0" indent="0" algn="l" defTabSz="457200" rtl="0" eaLnBrk="1" latinLnBrk="0" hangingPunct="1">
+              <a:spcBef>
+                <a:spcPct val="20000"/>
+              </a:spcBef>
+              <a:spcAft>
+                <a:spcPts val="600"/>
+              </a:spcAft>
+              <a:buClr>
+                <a:schemeClr val="accent1"/>
+              </a:buClr>
+              <a:buFont typeface="Wingdings 2" charset="2"/>
+              <a:buNone/>
+              <a:defRPr sz="1800" kern="1200">
+                <a:solidFill>
+                  <a:schemeClr val="tx1"/>
+                </a:solidFill>
+                <a:latin typeface="+mn-lt"/>
+                <a:ea typeface="+mn-ea"/>
+                <a:cs typeface="+mn-cs"/>
+              </a:defRPr>
+            </a:lvl1pPr>
+            <a:lvl2pPr marL="457200" indent="0" algn="ctr" defTabSz="457200" rtl="0" eaLnBrk="1" latinLnBrk="0" hangingPunct="1">
+              <a:spcBef>
+                <a:spcPct val="20000"/>
+              </a:spcBef>
+              <a:spcAft>
+                <a:spcPts val="600"/>
+              </a:spcAft>
+              <a:buClr>
+                <a:schemeClr val="accent1"/>
+              </a:buClr>
+              <a:buFont typeface="Wingdings 2" charset="2"/>
+              <a:buNone/>
+              <a:defRPr sz="1600" kern="1200">
+                <a:solidFill>
+                  <a:schemeClr val="tx1">
+                    <a:tint val="75000"/>
+                  </a:schemeClr>
+                </a:solidFill>
+                <a:latin typeface="+mn-lt"/>
+                <a:ea typeface="+mn-ea"/>
+                <a:cs typeface="+mn-cs"/>
+              </a:defRPr>
+            </a:lvl2pPr>
+            <a:lvl3pPr marL="914400" indent="0" algn="ctr" defTabSz="457200" rtl="0" eaLnBrk="1" latinLnBrk="0" hangingPunct="1">
+              <a:spcBef>
+                <a:spcPct val="20000"/>
+              </a:spcBef>
+              <a:spcAft>
+                <a:spcPts val="600"/>
+              </a:spcAft>
+              <a:buClr>
+                <a:schemeClr val="accent1"/>
+              </a:buClr>
+              <a:buFont typeface="Wingdings 2" charset="2"/>
+              <a:buNone/>
+              <a:defRPr sz="1400" kern="1200">
+                <a:solidFill>
+                  <a:schemeClr val="tx1">
+                    <a:tint val="75000"/>
+                  </a:schemeClr>
+                </a:solidFill>
+                <a:latin typeface="+mn-lt"/>
+                <a:ea typeface="+mn-ea"/>
+                <a:cs typeface="+mn-cs"/>
+              </a:defRPr>
+            </a:lvl3pPr>
+            <a:lvl4pPr marL="1371600" indent="0" algn="ctr" defTabSz="457200" rtl="0" eaLnBrk="1" latinLnBrk="0" hangingPunct="1">
+              <a:spcBef>
+                <a:spcPct val="20000"/>
+              </a:spcBef>
+              <a:spcAft>
+                <a:spcPts val="600"/>
+              </a:spcAft>
+              <a:buClr>
+                <a:schemeClr val="accent1"/>
+              </a:buClr>
+              <a:buFont typeface="Wingdings 2" charset="2"/>
+              <a:buNone/>
+              <a:defRPr sz="1200" kern="1200">
+                <a:solidFill>
+                  <a:schemeClr val="tx1">
+                    <a:tint val="75000"/>
+                  </a:schemeClr>
+                </a:solidFill>
+                <a:latin typeface="+mn-lt"/>
+                <a:ea typeface="+mn-ea"/>
+                <a:cs typeface="+mn-cs"/>
+              </a:defRPr>
+            </a:lvl4pPr>
+            <a:lvl5pPr marL="1828800" indent="0" algn="ctr" defTabSz="457200" rtl="0" eaLnBrk="1" latinLnBrk="0" hangingPunct="1">
+              <a:spcBef>
+                <a:spcPct val="20000"/>
+              </a:spcBef>
+              <a:spcAft>
+                <a:spcPts val="600"/>
+              </a:spcAft>
+              <a:buClr>
+                <a:schemeClr val="accent1"/>
+              </a:buClr>
+              <a:buFont typeface="Wingdings 2" charset="2"/>
+              <a:buNone/>
+              <a:defRPr sz="1200" kern="1200">
+                <a:solidFill>
+                  <a:schemeClr val="tx1">
+                    <a:tint val="75000"/>
+                  </a:schemeClr>
+                </a:solidFill>
+                <a:latin typeface="+mn-lt"/>
+                <a:ea typeface="+mn-ea"/>
+                <a:cs typeface="+mn-cs"/>
+              </a:defRPr>
+            </a:lvl5pPr>
+            <a:lvl6pPr marL="2286000" indent="0" algn="ctr" defTabSz="457200" rtl="0" eaLnBrk="1" latinLnBrk="0" hangingPunct="1">
+              <a:spcBef>
+                <a:spcPct val="20000"/>
+              </a:spcBef>
+              <a:spcAft>
+                <a:spcPts val="600"/>
+              </a:spcAft>
+              <a:buClr>
+                <a:schemeClr val="accent1"/>
+              </a:buClr>
+              <a:buFont typeface="Wingdings 2" charset="2"/>
+              <a:buNone/>
+              <a:defRPr sz="1200" kern="1200">
+                <a:solidFill>
+                  <a:schemeClr val="tx1">
+                    <a:tint val="75000"/>
+                  </a:schemeClr>
+                </a:solidFill>
+                <a:latin typeface="+mn-lt"/>
+                <a:ea typeface="+mn-ea"/>
+                <a:cs typeface="+mn-cs"/>
+              </a:defRPr>
+            </a:lvl6pPr>
+            <a:lvl7pPr marL="2743200" indent="0" algn="ctr" defTabSz="457200" rtl="0" eaLnBrk="1" latinLnBrk="0" hangingPunct="1">
+              <a:spcBef>
+                <a:spcPct val="20000"/>
+              </a:spcBef>
+              <a:spcAft>
+                <a:spcPts val="600"/>
+              </a:spcAft>
+              <a:buClr>
+                <a:schemeClr val="accent1"/>
+              </a:buClr>
+              <a:buFont typeface="Wingdings 2" charset="2"/>
+              <a:buNone/>
+              <a:defRPr sz="1200" kern="1200">
+                <a:solidFill>
+                  <a:schemeClr val="tx1">
+                    <a:tint val="75000"/>
+                  </a:schemeClr>
+                </a:solidFill>
+                <a:latin typeface="+mn-lt"/>
+                <a:ea typeface="+mn-ea"/>
+                <a:cs typeface="+mn-cs"/>
+              </a:defRPr>
+            </a:lvl7pPr>
+            <a:lvl8pPr marL="3200400" indent="0" algn="ctr" defTabSz="457200" rtl="0" eaLnBrk="1" latinLnBrk="0" hangingPunct="1">
+              <a:spcBef>
+                <a:spcPct val="20000"/>
+              </a:spcBef>
+              <a:spcAft>
+                <a:spcPts val="600"/>
+              </a:spcAft>
+              <a:buClr>
+                <a:schemeClr val="accent1"/>
+              </a:buClr>
+              <a:buFont typeface="Wingdings 2" charset="2"/>
+              <a:buNone/>
+              <a:defRPr sz="1200" kern="1200">
+                <a:solidFill>
+                  <a:schemeClr val="tx1">
+                    <a:tint val="75000"/>
+                  </a:schemeClr>
+                </a:solidFill>
+                <a:latin typeface="+mn-lt"/>
+                <a:ea typeface="+mn-ea"/>
+                <a:cs typeface="+mn-cs"/>
+              </a:defRPr>
+            </a:lvl8pPr>
+            <a:lvl9pPr marL="3657600" indent="0" algn="ctr" defTabSz="457200" rtl="0" eaLnBrk="1" latinLnBrk="0" hangingPunct="1">
+              <a:spcBef>
+                <a:spcPct val="20000"/>
+              </a:spcBef>
+              <a:spcAft>
+                <a:spcPts val="600"/>
+              </a:spcAft>
+              <a:buClr>
+                <a:schemeClr val="accent1"/>
+              </a:buClr>
+              <a:buFont typeface="Wingdings 2" charset="2"/>
+              <a:buNone/>
+              <a:defRPr sz="1200" kern="1200">
+                <a:solidFill>
+                  <a:schemeClr val="tx1">
+                    <a:tint val="75000"/>
+                  </a:schemeClr>
+                </a:solidFill>
+                <a:latin typeface="+mn-lt"/>
+                <a:ea typeface="+mn-ea"/>
+                <a:cs typeface="+mn-cs"/>
+              </a:defRPr>
+            </a:lvl9pPr>
+          </a:lstStyle>
+          <a:p>
+            <a:r>
+              <a:rPr lang="fr-FR" sz="2400" dirty="0" smtClean="0"/>
+              <a:t>IN104 – Page </a:t>
+            </a:r>
+            <a:r>
+              <a:rPr lang="fr-FR" sz="2400" dirty="0"/>
+              <a:t>5</a:t>
+            </a:r>
+            <a:endParaRPr lang="fr-FR" sz="2400" dirty="0"/>
+          </a:p>
+        </p:txBody>
+      </p:sp>
     </p:spTree>
     <p:extLst>
       <p:ext uri="{BB962C8B-B14F-4D97-AF65-F5344CB8AC3E}">
@@ -8949,6 +10758,259 @@
           </a:prstGeom>
         </p:spPr>
       </p:pic>
+      <p:sp>
+        <p:nvSpPr>
+          <p:cNvPr id="4" name="Sous-titre 2"/>
+          <p:cNvSpPr txBox="1">
+            <a:spLocks/>
+          </p:cNvSpPr>
+          <p:nvPr/>
+        </p:nvSpPr>
+        <p:spPr>
+          <a:xfrm>
+            <a:off x="9763433" y="6400801"/>
+            <a:ext cx="2428568" cy="457199"/>
+          </a:xfrm>
+          <a:prstGeom prst="rect">
+            <a:avLst/>
+          </a:prstGeom>
+          <a:ln>
+            <a:solidFill>
+              <a:schemeClr val="tx1"/>
+            </a:solidFill>
+          </a:ln>
+          <a:effectLst>
+            <a:outerShdw blurRad="50800" dir="14400000">
+              <a:srgbClr val="000000">
+                <a:alpha val="40000"/>
+              </a:srgbClr>
+            </a:outerShdw>
+          </a:effectLst>
+        </p:spPr>
+        <p:txBody>
+          <a:bodyPr vert="horz" lIns="91440" tIns="45720" rIns="91440" bIns="45720" rtlCol="0" anchor="t">
+            <a:noAutofit/>
+          </a:bodyPr>
+          <a:lstStyle>
+            <a:lvl1pPr marL="0" indent="0" algn="l" defTabSz="457200" rtl="0" eaLnBrk="1" latinLnBrk="0" hangingPunct="1">
+              <a:spcBef>
+                <a:spcPct val="20000"/>
+              </a:spcBef>
+              <a:spcAft>
+                <a:spcPts val="600"/>
+              </a:spcAft>
+              <a:buClr>
+                <a:schemeClr val="accent1"/>
+              </a:buClr>
+              <a:buFont typeface="Wingdings 2" charset="2"/>
+              <a:buNone/>
+              <a:defRPr sz="1800" kern="1200">
+                <a:solidFill>
+                  <a:schemeClr val="tx1"/>
+                </a:solidFill>
+                <a:latin typeface="+mn-lt"/>
+                <a:ea typeface="+mn-ea"/>
+                <a:cs typeface="+mn-cs"/>
+              </a:defRPr>
+            </a:lvl1pPr>
+            <a:lvl2pPr marL="457200" indent="0" algn="ctr" defTabSz="457200" rtl="0" eaLnBrk="1" latinLnBrk="0" hangingPunct="1">
+              <a:spcBef>
+                <a:spcPct val="20000"/>
+              </a:spcBef>
+              <a:spcAft>
+                <a:spcPts val="600"/>
+              </a:spcAft>
+              <a:buClr>
+                <a:schemeClr val="accent1"/>
+              </a:buClr>
+              <a:buFont typeface="Wingdings 2" charset="2"/>
+              <a:buNone/>
+              <a:defRPr sz="1600" kern="1200">
+                <a:solidFill>
+                  <a:schemeClr val="tx1">
+                    <a:tint val="75000"/>
+                  </a:schemeClr>
+                </a:solidFill>
+                <a:latin typeface="+mn-lt"/>
+                <a:ea typeface="+mn-ea"/>
+                <a:cs typeface="+mn-cs"/>
+              </a:defRPr>
+            </a:lvl2pPr>
+            <a:lvl3pPr marL="914400" indent="0" algn="ctr" defTabSz="457200" rtl="0" eaLnBrk="1" latinLnBrk="0" hangingPunct="1">
+              <a:spcBef>
+                <a:spcPct val="20000"/>
+              </a:spcBef>
+              <a:spcAft>
+                <a:spcPts val="600"/>
+              </a:spcAft>
+              <a:buClr>
+                <a:schemeClr val="accent1"/>
+              </a:buClr>
+              <a:buFont typeface="Wingdings 2" charset="2"/>
+              <a:buNone/>
+              <a:defRPr sz="1400" kern="1200">
+                <a:solidFill>
+                  <a:schemeClr val="tx1">
+                    <a:tint val="75000"/>
+                  </a:schemeClr>
+                </a:solidFill>
+                <a:latin typeface="+mn-lt"/>
+                <a:ea typeface="+mn-ea"/>
+                <a:cs typeface="+mn-cs"/>
+              </a:defRPr>
+            </a:lvl3pPr>
+            <a:lvl4pPr marL="1371600" indent="0" algn="ctr" defTabSz="457200" rtl="0" eaLnBrk="1" latinLnBrk="0" hangingPunct="1">
+              <a:spcBef>
+                <a:spcPct val="20000"/>
+              </a:spcBef>
+              <a:spcAft>
+                <a:spcPts val="600"/>
+              </a:spcAft>
+              <a:buClr>
+                <a:schemeClr val="accent1"/>
+              </a:buClr>
+              <a:buFont typeface="Wingdings 2" charset="2"/>
+              <a:buNone/>
+              <a:defRPr sz="1200" kern="1200">
+                <a:solidFill>
+                  <a:schemeClr val="tx1">
+                    <a:tint val="75000"/>
+                  </a:schemeClr>
+                </a:solidFill>
+                <a:latin typeface="+mn-lt"/>
+                <a:ea typeface="+mn-ea"/>
+                <a:cs typeface="+mn-cs"/>
+              </a:defRPr>
+            </a:lvl4pPr>
+            <a:lvl5pPr marL="1828800" indent="0" algn="ctr" defTabSz="457200" rtl="0" eaLnBrk="1" latinLnBrk="0" hangingPunct="1">
+              <a:spcBef>
+                <a:spcPct val="20000"/>
+              </a:spcBef>
+              <a:spcAft>
+                <a:spcPts val="600"/>
+              </a:spcAft>
+              <a:buClr>
+                <a:schemeClr val="accent1"/>
+              </a:buClr>
+              <a:buFont typeface="Wingdings 2" charset="2"/>
+              <a:buNone/>
+              <a:defRPr sz="1200" kern="1200">
+                <a:solidFill>
+                  <a:schemeClr val="tx1">
+                    <a:tint val="75000"/>
+                  </a:schemeClr>
+                </a:solidFill>
+                <a:latin typeface="+mn-lt"/>
+                <a:ea typeface="+mn-ea"/>
+                <a:cs typeface="+mn-cs"/>
+              </a:defRPr>
+            </a:lvl5pPr>
+            <a:lvl6pPr marL="2286000" indent="0" algn="ctr" defTabSz="457200" rtl="0" eaLnBrk="1" latinLnBrk="0" hangingPunct="1">
+              <a:spcBef>
+                <a:spcPct val="20000"/>
+              </a:spcBef>
+              <a:spcAft>
+                <a:spcPts val="600"/>
+              </a:spcAft>
+              <a:buClr>
+                <a:schemeClr val="accent1"/>
+              </a:buClr>
+              <a:buFont typeface="Wingdings 2" charset="2"/>
+              <a:buNone/>
+              <a:defRPr sz="1200" kern="1200">
+                <a:solidFill>
+                  <a:schemeClr val="tx1">
+                    <a:tint val="75000"/>
+                  </a:schemeClr>
+                </a:solidFill>
+                <a:latin typeface="+mn-lt"/>
+                <a:ea typeface="+mn-ea"/>
+                <a:cs typeface="+mn-cs"/>
+              </a:defRPr>
+            </a:lvl6pPr>
+            <a:lvl7pPr marL="2743200" indent="0" algn="ctr" defTabSz="457200" rtl="0" eaLnBrk="1" latinLnBrk="0" hangingPunct="1">
+              <a:spcBef>
+                <a:spcPct val="20000"/>
+              </a:spcBef>
+              <a:spcAft>
+                <a:spcPts val="600"/>
+              </a:spcAft>
+              <a:buClr>
+                <a:schemeClr val="accent1"/>
+              </a:buClr>
+              <a:buFont typeface="Wingdings 2" charset="2"/>
+              <a:buNone/>
+              <a:defRPr sz="1200" kern="1200">
+                <a:solidFill>
+                  <a:schemeClr val="tx1">
+                    <a:tint val="75000"/>
+                  </a:schemeClr>
+                </a:solidFill>
+                <a:latin typeface="+mn-lt"/>
+                <a:ea typeface="+mn-ea"/>
+                <a:cs typeface="+mn-cs"/>
+              </a:defRPr>
+            </a:lvl7pPr>
+            <a:lvl8pPr marL="3200400" indent="0" algn="ctr" defTabSz="457200" rtl="0" eaLnBrk="1" latinLnBrk="0" hangingPunct="1">
+              <a:spcBef>
+                <a:spcPct val="20000"/>
+              </a:spcBef>
+              <a:spcAft>
+                <a:spcPts val="600"/>
+              </a:spcAft>
+              <a:buClr>
+                <a:schemeClr val="accent1"/>
+              </a:buClr>
+              <a:buFont typeface="Wingdings 2" charset="2"/>
+              <a:buNone/>
+              <a:defRPr sz="1200" kern="1200">
+                <a:solidFill>
+                  <a:schemeClr val="tx1">
+                    <a:tint val="75000"/>
+                  </a:schemeClr>
+                </a:solidFill>
+                <a:latin typeface="+mn-lt"/>
+                <a:ea typeface="+mn-ea"/>
+                <a:cs typeface="+mn-cs"/>
+              </a:defRPr>
+            </a:lvl8pPr>
+            <a:lvl9pPr marL="3657600" indent="0" algn="ctr" defTabSz="457200" rtl="0" eaLnBrk="1" latinLnBrk="0" hangingPunct="1">
+              <a:spcBef>
+                <a:spcPct val="20000"/>
+              </a:spcBef>
+              <a:spcAft>
+                <a:spcPts val="600"/>
+              </a:spcAft>
+              <a:buClr>
+                <a:schemeClr val="accent1"/>
+              </a:buClr>
+              <a:buFont typeface="Wingdings 2" charset="2"/>
+              <a:buNone/>
+              <a:defRPr sz="1200" kern="1200">
+                <a:solidFill>
+                  <a:schemeClr val="tx1">
+                    <a:tint val="75000"/>
+                  </a:schemeClr>
+                </a:solidFill>
+                <a:latin typeface="+mn-lt"/>
+                <a:ea typeface="+mn-ea"/>
+                <a:cs typeface="+mn-cs"/>
+              </a:defRPr>
+            </a:lvl9pPr>
+          </a:lstStyle>
+          <a:p>
+            <a:r>
+              <a:rPr lang="fr-FR" sz="2400" dirty="0" smtClean="0"/>
+              <a:t>IN104 – </a:t>
+            </a:r>
+            <a:r>
+              <a:rPr lang="fr-FR" sz="2400" dirty="0" smtClean="0"/>
+              <a:t>Page 6</a:t>
+            </a:r>
+            <a:endParaRPr lang="fr-FR" sz="2400" dirty="0"/>
+          </a:p>
+        </p:txBody>
+      </p:sp>
     </p:spTree>
     <p:extLst>
       <p:ext uri="{BB962C8B-B14F-4D97-AF65-F5344CB8AC3E}">
@@ -9075,6 +11137,259 @@
           </a:prstGeom>
         </p:spPr>
       </p:pic>
+      <p:sp>
+        <p:nvSpPr>
+          <p:cNvPr id="5" name="Sous-titre 2"/>
+          <p:cNvSpPr txBox="1">
+            <a:spLocks/>
+          </p:cNvSpPr>
+          <p:nvPr/>
+        </p:nvSpPr>
+        <p:spPr>
+          <a:xfrm>
+            <a:off x="9763433" y="6400801"/>
+            <a:ext cx="2428568" cy="457199"/>
+          </a:xfrm>
+          <a:prstGeom prst="rect">
+            <a:avLst/>
+          </a:prstGeom>
+          <a:ln>
+            <a:solidFill>
+              <a:schemeClr val="tx1"/>
+            </a:solidFill>
+          </a:ln>
+          <a:effectLst>
+            <a:outerShdw blurRad="50800" dir="14400000">
+              <a:srgbClr val="000000">
+                <a:alpha val="40000"/>
+              </a:srgbClr>
+            </a:outerShdw>
+          </a:effectLst>
+        </p:spPr>
+        <p:txBody>
+          <a:bodyPr vert="horz" lIns="91440" tIns="45720" rIns="91440" bIns="45720" rtlCol="0" anchor="t">
+            <a:noAutofit/>
+          </a:bodyPr>
+          <a:lstStyle>
+            <a:lvl1pPr marL="0" indent="0" algn="l" defTabSz="457200" rtl="0" eaLnBrk="1" latinLnBrk="0" hangingPunct="1">
+              <a:spcBef>
+                <a:spcPct val="20000"/>
+              </a:spcBef>
+              <a:spcAft>
+                <a:spcPts val="600"/>
+              </a:spcAft>
+              <a:buClr>
+                <a:schemeClr val="accent1"/>
+              </a:buClr>
+              <a:buFont typeface="Wingdings 2" charset="2"/>
+              <a:buNone/>
+              <a:defRPr sz="1800" kern="1200">
+                <a:solidFill>
+                  <a:schemeClr val="tx1"/>
+                </a:solidFill>
+                <a:latin typeface="+mn-lt"/>
+                <a:ea typeface="+mn-ea"/>
+                <a:cs typeface="+mn-cs"/>
+              </a:defRPr>
+            </a:lvl1pPr>
+            <a:lvl2pPr marL="457200" indent="0" algn="ctr" defTabSz="457200" rtl="0" eaLnBrk="1" latinLnBrk="0" hangingPunct="1">
+              <a:spcBef>
+                <a:spcPct val="20000"/>
+              </a:spcBef>
+              <a:spcAft>
+                <a:spcPts val="600"/>
+              </a:spcAft>
+              <a:buClr>
+                <a:schemeClr val="accent1"/>
+              </a:buClr>
+              <a:buFont typeface="Wingdings 2" charset="2"/>
+              <a:buNone/>
+              <a:defRPr sz="1600" kern="1200">
+                <a:solidFill>
+                  <a:schemeClr val="tx1">
+                    <a:tint val="75000"/>
+                  </a:schemeClr>
+                </a:solidFill>
+                <a:latin typeface="+mn-lt"/>
+                <a:ea typeface="+mn-ea"/>
+                <a:cs typeface="+mn-cs"/>
+              </a:defRPr>
+            </a:lvl2pPr>
+            <a:lvl3pPr marL="914400" indent="0" algn="ctr" defTabSz="457200" rtl="0" eaLnBrk="1" latinLnBrk="0" hangingPunct="1">
+              <a:spcBef>
+                <a:spcPct val="20000"/>
+              </a:spcBef>
+              <a:spcAft>
+                <a:spcPts val="600"/>
+              </a:spcAft>
+              <a:buClr>
+                <a:schemeClr val="accent1"/>
+              </a:buClr>
+              <a:buFont typeface="Wingdings 2" charset="2"/>
+              <a:buNone/>
+              <a:defRPr sz="1400" kern="1200">
+                <a:solidFill>
+                  <a:schemeClr val="tx1">
+                    <a:tint val="75000"/>
+                  </a:schemeClr>
+                </a:solidFill>
+                <a:latin typeface="+mn-lt"/>
+                <a:ea typeface="+mn-ea"/>
+                <a:cs typeface="+mn-cs"/>
+              </a:defRPr>
+            </a:lvl3pPr>
+            <a:lvl4pPr marL="1371600" indent="0" algn="ctr" defTabSz="457200" rtl="0" eaLnBrk="1" latinLnBrk="0" hangingPunct="1">
+              <a:spcBef>
+                <a:spcPct val="20000"/>
+              </a:spcBef>
+              <a:spcAft>
+                <a:spcPts val="600"/>
+              </a:spcAft>
+              <a:buClr>
+                <a:schemeClr val="accent1"/>
+              </a:buClr>
+              <a:buFont typeface="Wingdings 2" charset="2"/>
+              <a:buNone/>
+              <a:defRPr sz="1200" kern="1200">
+                <a:solidFill>
+                  <a:schemeClr val="tx1">
+                    <a:tint val="75000"/>
+                  </a:schemeClr>
+                </a:solidFill>
+                <a:latin typeface="+mn-lt"/>
+                <a:ea typeface="+mn-ea"/>
+                <a:cs typeface="+mn-cs"/>
+              </a:defRPr>
+            </a:lvl4pPr>
+            <a:lvl5pPr marL="1828800" indent="0" algn="ctr" defTabSz="457200" rtl="0" eaLnBrk="1" latinLnBrk="0" hangingPunct="1">
+              <a:spcBef>
+                <a:spcPct val="20000"/>
+              </a:spcBef>
+              <a:spcAft>
+                <a:spcPts val="600"/>
+              </a:spcAft>
+              <a:buClr>
+                <a:schemeClr val="accent1"/>
+              </a:buClr>
+              <a:buFont typeface="Wingdings 2" charset="2"/>
+              <a:buNone/>
+              <a:defRPr sz="1200" kern="1200">
+                <a:solidFill>
+                  <a:schemeClr val="tx1">
+                    <a:tint val="75000"/>
+                  </a:schemeClr>
+                </a:solidFill>
+                <a:latin typeface="+mn-lt"/>
+                <a:ea typeface="+mn-ea"/>
+                <a:cs typeface="+mn-cs"/>
+              </a:defRPr>
+            </a:lvl5pPr>
+            <a:lvl6pPr marL="2286000" indent="0" algn="ctr" defTabSz="457200" rtl="0" eaLnBrk="1" latinLnBrk="0" hangingPunct="1">
+              <a:spcBef>
+                <a:spcPct val="20000"/>
+              </a:spcBef>
+              <a:spcAft>
+                <a:spcPts val="600"/>
+              </a:spcAft>
+              <a:buClr>
+                <a:schemeClr val="accent1"/>
+              </a:buClr>
+              <a:buFont typeface="Wingdings 2" charset="2"/>
+              <a:buNone/>
+              <a:defRPr sz="1200" kern="1200">
+                <a:solidFill>
+                  <a:schemeClr val="tx1">
+                    <a:tint val="75000"/>
+                  </a:schemeClr>
+                </a:solidFill>
+                <a:latin typeface="+mn-lt"/>
+                <a:ea typeface="+mn-ea"/>
+                <a:cs typeface="+mn-cs"/>
+              </a:defRPr>
+            </a:lvl6pPr>
+            <a:lvl7pPr marL="2743200" indent="0" algn="ctr" defTabSz="457200" rtl="0" eaLnBrk="1" latinLnBrk="0" hangingPunct="1">
+              <a:spcBef>
+                <a:spcPct val="20000"/>
+              </a:spcBef>
+              <a:spcAft>
+                <a:spcPts val="600"/>
+              </a:spcAft>
+              <a:buClr>
+                <a:schemeClr val="accent1"/>
+              </a:buClr>
+              <a:buFont typeface="Wingdings 2" charset="2"/>
+              <a:buNone/>
+              <a:defRPr sz="1200" kern="1200">
+                <a:solidFill>
+                  <a:schemeClr val="tx1">
+                    <a:tint val="75000"/>
+                  </a:schemeClr>
+                </a:solidFill>
+                <a:latin typeface="+mn-lt"/>
+                <a:ea typeface="+mn-ea"/>
+                <a:cs typeface="+mn-cs"/>
+              </a:defRPr>
+            </a:lvl7pPr>
+            <a:lvl8pPr marL="3200400" indent="0" algn="ctr" defTabSz="457200" rtl="0" eaLnBrk="1" latinLnBrk="0" hangingPunct="1">
+              <a:spcBef>
+                <a:spcPct val="20000"/>
+              </a:spcBef>
+              <a:spcAft>
+                <a:spcPts val="600"/>
+              </a:spcAft>
+              <a:buClr>
+                <a:schemeClr val="accent1"/>
+              </a:buClr>
+              <a:buFont typeface="Wingdings 2" charset="2"/>
+              <a:buNone/>
+              <a:defRPr sz="1200" kern="1200">
+                <a:solidFill>
+                  <a:schemeClr val="tx1">
+                    <a:tint val="75000"/>
+                  </a:schemeClr>
+                </a:solidFill>
+                <a:latin typeface="+mn-lt"/>
+                <a:ea typeface="+mn-ea"/>
+                <a:cs typeface="+mn-cs"/>
+              </a:defRPr>
+            </a:lvl8pPr>
+            <a:lvl9pPr marL="3657600" indent="0" algn="ctr" defTabSz="457200" rtl="0" eaLnBrk="1" latinLnBrk="0" hangingPunct="1">
+              <a:spcBef>
+                <a:spcPct val="20000"/>
+              </a:spcBef>
+              <a:spcAft>
+                <a:spcPts val="600"/>
+              </a:spcAft>
+              <a:buClr>
+                <a:schemeClr val="accent1"/>
+              </a:buClr>
+              <a:buFont typeface="Wingdings 2" charset="2"/>
+              <a:buNone/>
+              <a:defRPr sz="1200" kern="1200">
+                <a:solidFill>
+                  <a:schemeClr val="tx1">
+                    <a:tint val="75000"/>
+                  </a:schemeClr>
+                </a:solidFill>
+                <a:latin typeface="+mn-lt"/>
+                <a:ea typeface="+mn-ea"/>
+                <a:cs typeface="+mn-cs"/>
+              </a:defRPr>
+            </a:lvl9pPr>
+          </a:lstStyle>
+          <a:p>
+            <a:r>
+              <a:rPr lang="fr-FR" sz="2400" dirty="0" smtClean="0"/>
+              <a:t>IN104 – Page </a:t>
+            </a:r>
+            <a:r>
+              <a:rPr lang="fr-FR" sz="2400" dirty="0"/>
+              <a:t>7</a:t>
+            </a:r>
+            <a:endParaRPr lang="fr-FR" sz="2400" dirty="0"/>
+          </a:p>
+        </p:txBody>
+      </p:sp>
     </p:spTree>
     <p:extLst>
       <p:ext uri="{BB962C8B-B14F-4D97-AF65-F5344CB8AC3E}">
@@ -9247,6 +11562,259 @@
           </a:p>
         </p:txBody>
       </p:sp>
+      <p:sp>
+        <p:nvSpPr>
+          <p:cNvPr id="4" name="Sous-titre 2"/>
+          <p:cNvSpPr txBox="1">
+            <a:spLocks/>
+          </p:cNvSpPr>
+          <p:nvPr/>
+        </p:nvSpPr>
+        <p:spPr>
+          <a:xfrm>
+            <a:off x="9763433" y="6400801"/>
+            <a:ext cx="2428568" cy="457199"/>
+          </a:xfrm>
+          <a:prstGeom prst="rect">
+            <a:avLst/>
+          </a:prstGeom>
+          <a:ln>
+            <a:solidFill>
+              <a:schemeClr val="tx1"/>
+            </a:solidFill>
+          </a:ln>
+          <a:effectLst>
+            <a:outerShdw blurRad="50800" dir="14400000">
+              <a:srgbClr val="000000">
+                <a:alpha val="40000"/>
+              </a:srgbClr>
+            </a:outerShdw>
+          </a:effectLst>
+        </p:spPr>
+        <p:txBody>
+          <a:bodyPr vert="horz" lIns="91440" tIns="45720" rIns="91440" bIns="45720" rtlCol="0" anchor="t">
+            <a:noAutofit/>
+          </a:bodyPr>
+          <a:lstStyle>
+            <a:lvl1pPr marL="0" indent="0" algn="l" defTabSz="457200" rtl="0" eaLnBrk="1" latinLnBrk="0" hangingPunct="1">
+              <a:spcBef>
+                <a:spcPct val="20000"/>
+              </a:spcBef>
+              <a:spcAft>
+                <a:spcPts val="600"/>
+              </a:spcAft>
+              <a:buClr>
+                <a:schemeClr val="accent1"/>
+              </a:buClr>
+              <a:buFont typeface="Wingdings 2" charset="2"/>
+              <a:buNone/>
+              <a:defRPr sz="1800" kern="1200">
+                <a:solidFill>
+                  <a:schemeClr val="tx1"/>
+                </a:solidFill>
+                <a:latin typeface="+mn-lt"/>
+                <a:ea typeface="+mn-ea"/>
+                <a:cs typeface="+mn-cs"/>
+              </a:defRPr>
+            </a:lvl1pPr>
+            <a:lvl2pPr marL="457200" indent="0" algn="ctr" defTabSz="457200" rtl="0" eaLnBrk="1" latinLnBrk="0" hangingPunct="1">
+              <a:spcBef>
+                <a:spcPct val="20000"/>
+              </a:spcBef>
+              <a:spcAft>
+                <a:spcPts val="600"/>
+              </a:spcAft>
+              <a:buClr>
+                <a:schemeClr val="accent1"/>
+              </a:buClr>
+              <a:buFont typeface="Wingdings 2" charset="2"/>
+              <a:buNone/>
+              <a:defRPr sz="1600" kern="1200">
+                <a:solidFill>
+                  <a:schemeClr val="tx1">
+                    <a:tint val="75000"/>
+                  </a:schemeClr>
+                </a:solidFill>
+                <a:latin typeface="+mn-lt"/>
+                <a:ea typeface="+mn-ea"/>
+                <a:cs typeface="+mn-cs"/>
+              </a:defRPr>
+            </a:lvl2pPr>
+            <a:lvl3pPr marL="914400" indent="0" algn="ctr" defTabSz="457200" rtl="0" eaLnBrk="1" latinLnBrk="0" hangingPunct="1">
+              <a:spcBef>
+                <a:spcPct val="20000"/>
+              </a:spcBef>
+              <a:spcAft>
+                <a:spcPts val="600"/>
+              </a:spcAft>
+              <a:buClr>
+                <a:schemeClr val="accent1"/>
+              </a:buClr>
+              <a:buFont typeface="Wingdings 2" charset="2"/>
+              <a:buNone/>
+              <a:defRPr sz="1400" kern="1200">
+                <a:solidFill>
+                  <a:schemeClr val="tx1">
+                    <a:tint val="75000"/>
+                  </a:schemeClr>
+                </a:solidFill>
+                <a:latin typeface="+mn-lt"/>
+                <a:ea typeface="+mn-ea"/>
+                <a:cs typeface="+mn-cs"/>
+              </a:defRPr>
+            </a:lvl3pPr>
+            <a:lvl4pPr marL="1371600" indent="0" algn="ctr" defTabSz="457200" rtl="0" eaLnBrk="1" latinLnBrk="0" hangingPunct="1">
+              <a:spcBef>
+                <a:spcPct val="20000"/>
+              </a:spcBef>
+              <a:spcAft>
+                <a:spcPts val="600"/>
+              </a:spcAft>
+              <a:buClr>
+                <a:schemeClr val="accent1"/>
+              </a:buClr>
+              <a:buFont typeface="Wingdings 2" charset="2"/>
+              <a:buNone/>
+              <a:defRPr sz="1200" kern="1200">
+                <a:solidFill>
+                  <a:schemeClr val="tx1">
+                    <a:tint val="75000"/>
+                  </a:schemeClr>
+                </a:solidFill>
+                <a:latin typeface="+mn-lt"/>
+                <a:ea typeface="+mn-ea"/>
+                <a:cs typeface="+mn-cs"/>
+              </a:defRPr>
+            </a:lvl4pPr>
+            <a:lvl5pPr marL="1828800" indent="0" algn="ctr" defTabSz="457200" rtl="0" eaLnBrk="1" latinLnBrk="0" hangingPunct="1">
+              <a:spcBef>
+                <a:spcPct val="20000"/>
+              </a:spcBef>
+              <a:spcAft>
+                <a:spcPts val="600"/>
+              </a:spcAft>
+              <a:buClr>
+                <a:schemeClr val="accent1"/>
+              </a:buClr>
+              <a:buFont typeface="Wingdings 2" charset="2"/>
+              <a:buNone/>
+              <a:defRPr sz="1200" kern="1200">
+                <a:solidFill>
+                  <a:schemeClr val="tx1">
+                    <a:tint val="75000"/>
+                  </a:schemeClr>
+                </a:solidFill>
+                <a:latin typeface="+mn-lt"/>
+                <a:ea typeface="+mn-ea"/>
+                <a:cs typeface="+mn-cs"/>
+              </a:defRPr>
+            </a:lvl5pPr>
+            <a:lvl6pPr marL="2286000" indent="0" algn="ctr" defTabSz="457200" rtl="0" eaLnBrk="1" latinLnBrk="0" hangingPunct="1">
+              <a:spcBef>
+                <a:spcPct val="20000"/>
+              </a:spcBef>
+              <a:spcAft>
+                <a:spcPts val="600"/>
+              </a:spcAft>
+              <a:buClr>
+                <a:schemeClr val="accent1"/>
+              </a:buClr>
+              <a:buFont typeface="Wingdings 2" charset="2"/>
+              <a:buNone/>
+              <a:defRPr sz="1200" kern="1200">
+                <a:solidFill>
+                  <a:schemeClr val="tx1">
+                    <a:tint val="75000"/>
+                  </a:schemeClr>
+                </a:solidFill>
+                <a:latin typeface="+mn-lt"/>
+                <a:ea typeface="+mn-ea"/>
+                <a:cs typeface="+mn-cs"/>
+              </a:defRPr>
+            </a:lvl6pPr>
+            <a:lvl7pPr marL="2743200" indent="0" algn="ctr" defTabSz="457200" rtl="0" eaLnBrk="1" latinLnBrk="0" hangingPunct="1">
+              <a:spcBef>
+                <a:spcPct val="20000"/>
+              </a:spcBef>
+              <a:spcAft>
+                <a:spcPts val="600"/>
+              </a:spcAft>
+              <a:buClr>
+                <a:schemeClr val="accent1"/>
+              </a:buClr>
+              <a:buFont typeface="Wingdings 2" charset="2"/>
+              <a:buNone/>
+              <a:defRPr sz="1200" kern="1200">
+                <a:solidFill>
+                  <a:schemeClr val="tx1">
+                    <a:tint val="75000"/>
+                  </a:schemeClr>
+                </a:solidFill>
+                <a:latin typeface="+mn-lt"/>
+                <a:ea typeface="+mn-ea"/>
+                <a:cs typeface="+mn-cs"/>
+              </a:defRPr>
+            </a:lvl7pPr>
+            <a:lvl8pPr marL="3200400" indent="0" algn="ctr" defTabSz="457200" rtl="0" eaLnBrk="1" latinLnBrk="0" hangingPunct="1">
+              <a:spcBef>
+                <a:spcPct val="20000"/>
+              </a:spcBef>
+              <a:spcAft>
+                <a:spcPts val="600"/>
+              </a:spcAft>
+              <a:buClr>
+                <a:schemeClr val="accent1"/>
+              </a:buClr>
+              <a:buFont typeface="Wingdings 2" charset="2"/>
+              <a:buNone/>
+              <a:defRPr sz="1200" kern="1200">
+                <a:solidFill>
+                  <a:schemeClr val="tx1">
+                    <a:tint val="75000"/>
+                  </a:schemeClr>
+                </a:solidFill>
+                <a:latin typeface="+mn-lt"/>
+                <a:ea typeface="+mn-ea"/>
+                <a:cs typeface="+mn-cs"/>
+              </a:defRPr>
+            </a:lvl8pPr>
+            <a:lvl9pPr marL="3657600" indent="0" algn="ctr" defTabSz="457200" rtl="0" eaLnBrk="1" latinLnBrk="0" hangingPunct="1">
+              <a:spcBef>
+                <a:spcPct val="20000"/>
+              </a:spcBef>
+              <a:spcAft>
+                <a:spcPts val="600"/>
+              </a:spcAft>
+              <a:buClr>
+                <a:schemeClr val="accent1"/>
+              </a:buClr>
+              <a:buFont typeface="Wingdings 2" charset="2"/>
+              <a:buNone/>
+              <a:defRPr sz="1200" kern="1200">
+                <a:solidFill>
+                  <a:schemeClr val="tx1">
+                    <a:tint val="75000"/>
+                  </a:schemeClr>
+                </a:solidFill>
+                <a:latin typeface="+mn-lt"/>
+                <a:ea typeface="+mn-ea"/>
+                <a:cs typeface="+mn-cs"/>
+              </a:defRPr>
+            </a:lvl9pPr>
+          </a:lstStyle>
+          <a:p>
+            <a:r>
+              <a:rPr lang="fr-FR" sz="2400" dirty="0" smtClean="0"/>
+              <a:t>IN104 – Page </a:t>
+            </a:r>
+            <a:r>
+              <a:rPr lang="fr-FR" sz="2400" dirty="0"/>
+              <a:t>9</a:t>
+            </a:r>
+            <a:endParaRPr lang="fr-FR" sz="2400" dirty="0"/>
+          </a:p>
+        </p:txBody>
+      </p:sp>
     </p:spTree>
     <p:extLst>
       <p:ext uri="{BB962C8B-B14F-4D97-AF65-F5344CB8AC3E}">
@@ -9396,6 +11964,263 @@
           </a:p>
           <a:p>
             <a:endParaRPr lang="fr-FR" dirty="0"/>
+          </a:p>
+        </p:txBody>
+      </p:sp>
+      <p:sp>
+        <p:nvSpPr>
+          <p:cNvPr id="5" name="Sous-titre 2"/>
+          <p:cNvSpPr txBox="1">
+            <a:spLocks/>
+          </p:cNvSpPr>
+          <p:nvPr/>
+        </p:nvSpPr>
+        <p:spPr>
+          <a:xfrm>
+            <a:off x="9763433" y="6400801"/>
+            <a:ext cx="2428568" cy="457199"/>
+          </a:xfrm>
+          <a:prstGeom prst="rect">
+            <a:avLst/>
+          </a:prstGeom>
+          <a:ln>
+            <a:solidFill>
+              <a:schemeClr val="tx1"/>
+            </a:solidFill>
+          </a:ln>
+          <a:effectLst>
+            <a:outerShdw blurRad="50800" dir="14400000">
+              <a:srgbClr val="000000">
+                <a:alpha val="40000"/>
+              </a:srgbClr>
+            </a:outerShdw>
+          </a:effectLst>
+        </p:spPr>
+        <p:txBody>
+          <a:bodyPr vert="horz" lIns="91440" tIns="45720" rIns="91440" bIns="45720" rtlCol="0" anchor="t">
+            <a:noAutofit/>
+          </a:bodyPr>
+          <a:lstStyle>
+            <a:lvl1pPr marL="0" indent="0" algn="l" defTabSz="457200" rtl="0" eaLnBrk="1" latinLnBrk="0" hangingPunct="1">
+              <a:spcBef>
+                <a:spcPct val="20000"/>
+              </a:spcBef>
+              <a:spcAft>
+                <a:spcPts val="600"/>
+              </a:spcAft>
+              <a:buClr>
+                <a:schemeClr val="accent1"/>
+              </a:buClr>
+              <a:buFont typeface="Wingdings 2" charset="2"/>
+              <a:buNone/>
+              <a:defRPr sz="1800" kern="1200">
+                <a:solidFill>
+                  <a:schemeClr val="tx1"/>
+                </a:solidFill>
+                <a:latin typeface="+mn-lt"/>
+                <a:ea typeface="+mn-ea"/>
+                <a:cs typeface="+mn-cs"/>
+              </a:defRPr>
+            </a:lvl1pPr>
+            <a:lvl2pPr marL="457200" indent="0" algn="ctr" defTabSz="457200" rtl="0" eaLnBrk="1" latinLnBrk="0" hangingPunct="1">
+              <a:spcBef>
+                <a:spcPct val="20000"/>
+              </a:spcBef>
+              <a:spcAft>
+                <a:spcPts val="600"/>
+              </a:spcAft>
+              <a:buClr>
+                <a:schemeClr val="accent1"/>
+              </a:buClr>
+              <a:buFont typeface="Wingdings 2" charset="2"/>
+              <a:buNone/>
+              <a:defRPr sz="1600" kern="1200">
+                <a:solidFill>
+                  <a:schemeClr val="tx1">
+                    <a:tint val="75000"/>
+                  </a:schemeClr>
+                </a:solidFill>
+                <a:latin typeface="+mn-lt"/>
+                <a:ea typeface="+mn-ea"/>
+                <a:cs typeface="+mn-cs"/>
+              </a:defRPr>
+            </a:lvl2pPr>
+            <a:lvl3pPr marL="914400" indent="0" algn="ctr" defTabSz="457200" rtl="0" eaLnBrk="1" latinLnBrk="0" hangingPunct="1">
+              <a:spcBef>
+                <a:spcPct val="20000"/>
+              </a:spcBef>
+              <a:spcAft>
+                <a:spcPts val="600"/>
+              </a:spcAft>
+              <a:buClr>
+                <a:schemeClr val="accent1"/>
+              </a:buClr>
+              <a:buFont typeface="Wingdings 2" charset="2"/>
+              <a:buNone/>
+              <a:defRPr sz="1400" kern="1200">
+                <a:solidFill>
+                  <a:schemeClr val="tx1">
+                    <a:tint val="75000"/>
+                  </a:schemeClr>
+                </a:solidFill>
+                <a:latin typeface="+mn-lt"/>
+                <a:ea typeface="+mn-ea"/>
+                <a:cs typeface="+mn-cs"/>
+              </a:defRPr>
+            </a:lvl3pPr>
+            <a:lvl4pPr marL="1371600" indent="0" algn="ctr" defTabSz="457200" rtl="0" eaLnBrk="1" latinLnBrk="0" hangingPunct="1">
+              <a:spcBef>
+                <a:spcPct val="20000"/>
+              </a:spcBef>
+              <a:spcAft>
+                <a:spcPts val="600"/>
+              </a:spcAft>
+              <a:buClr>
+                <a:schemeClr val="accent1"/>
+              </a:buClr>
+              <a:buFont typeface="Wingdings 2" charset="2"/>
+              <a:buNone/>
+              <a:defRPr sz="1200" kern="1200">
+                <a:solidFill>
+                  <a:schemeClr val="tx1">
+                    <a:tint val="75000"/>
+                  </a:schemeClr>
+                </a:solidFill>
+                <a:latin typeface="+mn-lt"/>
+                <a:ea typeface="+mn-ea"/>
+                <a:cs typeface="+mn-cs"/>
+              </a:defRPr>
+            </a:lvl4pPr>
+            <a:lvl5pPr marL="1828800" indent="0" algn="ctr" defTabSz="457200" rtl="0" eaLnBrk="1" latinLnBrk="0" hangingPunct="1">
+              <a:spcBef>
+                <a:spcPct val="20000"/>
+              </a:spcBef>
+              <a:spcAft>
+                <a:spcPts val="600"/>
+              </a:spcAft>
+              <a:buClr>
+                <a:schemeClr val="accent1"/>
+              </a:buClr>
+              <a:buFont typeface="Wingdings 2" charset="2"/>
+              <a:buNone/>
+              <a:defRPr sz="1200" kern="1200">
+                <a:solidFill>
+                  <a:schemeClr val="tx1">
+                    <a:tint val="75000"/>
+                  </a:schemeClr>
+                </a:solidFill>
+                <a:latin typeface="+mn-lt"/>
+                <a:ea typeface="+mn-ea"/>
+                <a:cs typeface="+mn-cs"/>
+              </a:defRPr>
+            </a:lvl5pPr>
+            <a:lvl6pPr marL="2286000" indent="0" algn="ctr" defTabSz="457200" rtl="0" eaLnBrk="1" latinLnBrk="0" hangingPunct="1">
+              <a:spcBef>
+                <a:spcPct val="20000"/>
+              </a:spcBef>
+              <a:spcAft>
+                <a:spcPts val="600"/>
+              </a:spcAft>
+              <a:buClr>
+                <a:schemeClr val="accent1"/>
+              </a:buClr>
+              <a:buFont typeface="Wingdings 2" charset="2"/>
+              <a:buNone/>
+              <a:defRPr sz="1200" kern="1200">
+                <a:solidFill>
+                  <a:schemeClr val="tx1">
+                    <a:tint val="75000"/>
+                  </a:schemeClr>
+                </a:solidFill>
+                <a:latin typeface="+mn-lt"/>
+                <a:ea typeface="+mn-ea"/>
+                <a:cs typeface="+mn-cs"/>
+              </a:defRPr>
+            </a:lvl6pPr>
+            <a:lvl7pPr marL="2743200" indent="0" algn="ctr" defTabSz="457200" rtl="0" eaLnBrk="1" latinLnBrk="0" hangingPunct="1">
+              <a:spcBef>
+                <a:spcPct val="20000"/>
+              </a:spcBef>
+              <a:spcAft>
+                <a:spcPts val="600"/>
+              </a:spcAft>
+              <a:buClr>
+                <a:schemeClr val="accent1"/>
+              </a:buClr>
+              <a:buFont typeface="Wingdings 2" charset="2"/>
+              <a:buNone/>
+              <a:defRPr sz="1200" kern="1200">
+                <a:solidFill>
+                  <a:schemeClr val="tx1">
+                    <a:tint val="75000"/>
+                  </a:schemeClr>
+                </a:solidFill>
+                <a:latin typeface="+mn-lt"/>
+                <a:ea typeface="+mn-ea"/>
+                <a:cs typeface="+mn-cs"/>
+              </a:defRPr>
+            </a:lvl7pPr>
+            <a:lvl8pPr marL="3200400" indent="0" algn="ctr" defTabSz="457200" rtl="0" eaLnBrk="1" latinLnBrk="0" hangingPunct="1">
+              <a:spcBef>
+                <a:spcPct val="20000"/>
+              </a:spcBef>
+              <a:spcAft>
+                <a:spcPts val="600"/>
+              </a:spcAft>
+              <a:buClr>
+                <a:schemeClr val="accent1"/>
+              </a:buClr>
+              <a:buFont typeface="Wingdings 2" charset="2"/>
+              <a:buNone/>
+              <a:defRPr sz="1200" kern="1200">
+                <a:solidFill>
+                  <a:schemeClr val="tx1">
+                    <a:tint val="75000"/>
+                  </a:schemeClr>
+                </a:solidFill>
+                <a:latin typeface="+mn-lt"/>
+                <a:ea typeface="+mn-ea"/>
+                <a:cs typeface="+mn-cs"/>
+              </a:defRPr>
+            </a:lvl8pPr>
+            <a:lvl9pPr marL="3657600" indent="0" algn="ctr" defTabSz="457200" rtl="0" eaLnBrk="1" latinLnBrk="0" hangingPunct="1">
+              <a:spcBef>
+                <a:spcPct val="20000"/>
+              </a:spcBef>
+              <a:spcAft>
+                <a:spcPts val="600"/>
+              </a:spcAft>
+              <a:buClr>
+                <a:schemeClr val="accent1"/>
+              </a:buClr>
+              <a:buFont typeface="Wingdings 2" charset="2"/>
+              <a:buNone/>
+              <a:defRPr sz="1200" kern="1200">
+                <a:solidFill>
+                  <a:schemeClr val="tx1">
+                    <a:tint val="75000"/>
+                  </a:schemeClr>
+                </a:solidFill>
+                <a:latin typeface="+mn-lt"/>
+                <a:ea typeface="+mn-ea"/>
+                <a:cs typeface="+mn-cs"/>
+              </a:defRPr>
+            </a:lvl9pPr>
+          </a:lstStyle>
+          <a:p>
+            <a:r>
+              <a:rPr lang="fr-FR" sz="2400" dirty="0" smtClean="0"/>
+              <a:t>IN104 </a:t>
+            </a:r>
+            <a:r>
+              <a:rPr lang="fr-FR" sz="2400" dirty="0" smtClean="0"/>
+              <a:t>– Page </a:t>
+            </a:r>
+            <a:r>
+              <a:rPr lang="fr-FR" sz="1600" dirty="0" smtClean="0"/>
+              <a:t>10</a:t>
+            </a:r>
+            <a:endParaRPr lang="fr-FR" sz="1600" dirty="0"/>
           </a:p>
         </p:txBody>
       </p:sp>

</xml_diff>

<commit_message>
FINALLLLLL COMITTT (ou peut-être pas)
</commit_message>
<xml_diff>
--- a/Livrables/Présentation.pptx
+++ b/Livrables/Présentation.pptx
@@ -10,8 +10,8 @@
     <p:sldId id="257" r:id="rId4"/>
     <p:sldId id="258" r:id="rId5"/>
     <p:sldId id="261" r:id="rId6"/>
-    <p:sldId id="266" r:id="rId7"/>
-    <p:sldId id="267" r:id="rId8"/>
+    <p:sldId id="267" r:id="rId7"/>
+    <p:sldId id="271" r:id="rId8"/>
     <p:sldId id="259" r:id="rId9"/>
     <p:sldId id="268" r:id="rId10"/>
     <p:sldId id="269" r:id="rId11"/>
@@ -231,7 +231,7 @@
           <a:effectLst/>
           <a:extLst>
             <a:ext uri="{91240B29-F687-4f45-9708-019B960494DF}">
-              <a14:hiddenLine xmlns="" xmlns:a14="http://schemas.microsoft.com/office/drawing/2010/main" w="9525">
+              <a14:hiddenLine xmlns:a14="http://schemas.microsoft.com/office/drawing/2010/main" xmlns="" w="9525">
                 <a:solidFill>
                   <a:srgbClr val="000000"/>
                 </a:solidFill>
@@ -424,7 +424,7 @@
             <a:fld id="{08B9EBBA-996F-894A-B54A-D6246ED52CEA}" type="datetimeFigureOut">
               <a:rPr lang="en-US" smtClean="0"/>
               <a:pPr/>
-              <a:t>6/11/18</a:t>
+              <a:t>6/11/2018</a:t>
             </a:fld>
             <a:endParaRPr lang="en-US" dirty="0"/>
           </a:p>
@@ -467,7 +467,7 @@
             <a:fld id="{D57F1E4F-1CFF-5643-939E-217C01CDF565}" type="slidenum">
               <a:rPr lang="en-US" smtClean="0"/>
               <a:pPr/>
-              <a:t>‹#›</a:t>
+              <a:t>‹N°›</a:t>
             </a:fld>
             <a:endParaRPr lang="en-US" dirty="0"/>
           </a:p>
@@ -744,7 +744,7 @@
             <a:fld id="{18C79C5D-2A6F-F04D-97DA-BEF2467B64E4}" type="datetimeFigureOut">
               <a:rPr lang="en-US" smtClean="0"/>
               <a:pPr/>
-              <a:t>6/11/18</a:t>
+              <a:t>6/11/2018</a:t>
             </a:fld>
             <a:endParaRPr lang="en-US" dirty="0"/>
           </a:p>
@@ -787,7 +787,7 @@
             <a:fld id="{D57F1E4F-1CFF-5643-939E-217C01CDF565}" type="slidenum">
               <a:rPr lang="en-US" smtClean="0"/>
               <a:pPr/>
-              <a:t>‹#›</a:t>
+              <a:t>‹N°›</a:t>
             </a:fld>
             <a:endParaRPr lang="en-US" dirty="0"/>
           </a:p>
@@ -1234,7 +1234,7 @@
             <a:fld id="{8DFA1846-DA80-1C48-A609-854EA85C59AD}" type="datetimeFigureOut">
               <a:rPr lang="en-US" smtClean="0"/>
               <a:pPr/>
-              <a:t>6/11/18</a:t>
+              <a:t>6/11/2018</a:t>
             </a:fld>
             <a:endParaRPr lang="en-US" dirty="0"/>
           </a:p>
@@ -1277,7 +1277,7 @@
             <a:fld id="{D57F1E4F-1CFF-5643-939E-217C01CDF565}" type="slidenum">
               <a:rPr lang="en-US" smtClean="0"/>
               <a:pPr/>
-              <a:t>‹#›</a:t>
+              <a:t>‹N°›</a:t>
             </a:fld>
             <a:endParaRPr lang="en-US" dirty="0"/>
           </a:p>
@@ -1605,7 +1605,7 @@
             <a:fld id="{FBF54567-0DE4-3F47-BF90-CB84690072F9}" type="datetimeFigureOut">
               <a:rPr lang="en-US" smtClean="0"/>
               <a:pPr/>
-              <a:t>6/11/18</a:t>
+              <a:t>6/11/2018</a:t>
             </a:fld>
             <a:endParaRPr lang="en-US" dirty="0"/>
           </a:p>
@@ -1648,7 +1648,7 @@
             <a:fld id="{D57F1E4F-1CFF-5643-939E-217C01CDF565}" type="slidenum">
               <a:rPr lang="en-US" smtClean="0"/>
               <a:pPr/>
-              <a:t>‹#›</a:t>
+              <a:t>‹N°›</a:t>
             </a:fld>
             <a:endParaRPr lang="en-US" dirty="0"/>
           </a:p>
@@ -1761,7 +1761,7 @@
           <a:ln/>
           <a:extLst>
             <a:ext uri="{91240B29-F687-4f45-9708-019B960494DF}">
-              <a14:hiddenLine xmlns="" xmlns:a14="http://schemas.microsoft.com/office/drawing/2010/main" w="9525">
+              <a14:hiddenLine xmlns:a14="http://schemas.microsoft.com/office/drawing/2010/main" xmlns="" w="9525">
                 <a:solidFill>
                   <a:srgbClr val="000000"/>
                 </a:solidFill>
@@ -1880,7 +1880,7 @@
             <a:fld id="{C6C52C72-DE31-F449-A4ED-4C594FD91407}" type="datetimeFigureOut">
               <a:rPr lang="en-US" smtClean="0"/>
               <a:pPr/>
-              <a:t>6/11/18</a:t>
+              <a:t>6/11/2018</a:t>
             </a:fld>
             <a:endParaRPr lang="en-US" dirty="0"/>
           </a:p>
@@ -1923,7 +1923,7 @@
             <a:fld id="{D57F1E4F-1CFF-5643-939E-217C01CDF565}" type="slidenum">
               <a:rPr lang="en-US" smtClean="0"/>
               <a:pPr/>
-              <a:t>‹#›</a:t>
+              <a:t>‹N°›</a:t>
             </a:fld>
             <a:endParaRPr lang="en-US" dirty="0"/>
           </a:p>
@@ -2038,7 +2038,7 @@
           <a:ln/>
           <a:extLst>
             <a:ext uri="{91240B29-F687-4f45-9708-019B960494DF}">
-              <a14:hiddenLine xmlns="" xmlns:a14="http://schemas.microsoft.com/office/drawing/2010/main" w="9525">
+              <a14:hiddenLine xmlns:a14="http://schemas.microsoft.com/office/drawing/2010/main" xmlns="" w="9525">
                 <a:solidFill>
                   <a:srgbClr val="000000"/>
                 </a:solidFill>
@@ -2167,7 +2167,7 @@
             <a:fld id="{ED62726E-379B-B349-9EED-81ED093FA806}" type="datetimeFigureOut">
               <a:rPr lang="en-US" smtClean="0"/>
               <a:pPr/>
-              <a:t>6/11/18</a:t>
+              <a:t>6/11/2018</a:t>
             </a:fld>
             <a:endParaRPr lang="en-US" dirty="0"/>
           </a:p>
@@ -2210,7 +2210,7 @@
             <a:fld id="{D57F1E4F-1CFF-5643-939E-217C01CDF565}" type="slidenum">
               <a:rPr lang="en-US" smtClean="0"/>
               <a:pPr/>
-              <a:t>‹#›</a:t>
+              <a:t>‹N°›</a:t>
             </a:fld>
             <a:endParaRPr lang="en-US" dirty="0"/>
           </a:p>
@@ -2323,7 +2323,7 @@
           <a:ln/>
           <a:extLst>
             <a:ext uri="{91240B29-F687-4f45-9708-019B960494DF}">
-              <a14:hiddenLine xmlns="" xmlns:a14="http://schemas.microsoft.com/office/drawing/2010/main" w="9525">
+              <a14:hiddenLine xmlns:a14="http://schemas.microsoft.com/office/drawing/2010/main" xmlns="" w="9525">
                 <a:solidFill>
                   <a:srgbClr val="000000"/>
                 </a:solidFill>
@@ -2452,7 +2452,7 @@
             <a:fld id="{9B3A1323-8D79-1946-B0D7-40001CF92E9D}" type="datetimeFigureOut">
               <a:rPr lang="en-US" smtClean="0"/>
               <a:pPr/>
-              <a:t>6/11/18</a:t>
+              <a:t>6/11/2018</a:t>
             </a:fld>
             <a:endParaRPr lang="en-US" dirty="0"/>
           </a:p>
@@ -2495,7 +2495,7 @@
             <a:fld id="{D57F1E4F-1CFF-5643-939E-217C01CDF565}" type="slidenum">
               <a:rPr lang="en-US" smtClean="0"/>
               <a:pPr/>
-              <a:t>‹#›</a:t>
+              <a:t>‹N°›</a:t>
             </a:fld>
             <a:endParaRPr lang="en-US" dirty="0"/>
           </a:p>
@@ -2797,7 +2797,7 @@
             <a:fld id="{8DFA1846-DA80-1C48-A609-854EA85C59AD}" type="datetimeFigureOut">
               <a:rPr lang="en-US" smtClean="0"/>
               <a:pPr/>
-              <a:t>6/11/18</a:t>
+              <a:t>6/11/2018</a:t>
             </a:fld>
             <a:endParaRPr lang="en-US" dirty="0"/>
           </a:p>
@@ -2840,7 +2840,7 @@
             <a:fld id="{D57F1E4F-1CFF-5643-939E-217C01CDF565}" type="slidenum">
               <a:rPr lang="en-US" smtClean="0"/>
               <a:pPr/>
-              <a:t>‹#›</a:t>
+              <a:t>‹N°›</a:t>
             </a:fld>
             <a:endParaRPr lang="en-US" dirty="0"/>
           </a:p>
@@ -2953,7 +2953,7 @@
           <a:ln/>
           <a:extLst>
             <a:ext uri="{91240B29-F687-4f45-9708-019B960494DF}">
-              <a14:hiddenLine xmlns="" xmlns:a14="http://schemas.microsoft.com/office/drawing/2010/main" w="9525">
+              <a14:hiddenLine xmlns:a14="http://schemas.microsoft.com/office/drawing/2010/main" xmlns="" w="9525">
                 <a:solidFill>
                   <a:srgbClr val="000000"/>
                 </a:solidFill>
@@ -3138,7 +3138,7 @@
             <a:fld id="{57302355-E14B-8545-A8F8-0FE83CC9D524}" type="datetimeFigureOut">
               <a:rPr lang="en-US" smtClean="0"/>
               <a:pPr/>
-              <a:t>6/11/18</a:t>
+              <a:t>6/11/2018</a:t>
             </a:fld>
             <a:endParaRPr lang="en-US" dirty="0"/>
           </a:p>
@@ -3181,7 +3181,7 @@
             <a:fld id="{D57F1E4F-1CFF-5643-939E-217C01CDF565}" type="slidenum">
               <a:rPr lang="en-US" smtClean="0"/>
               <a:pPr/>
-              <a:t>‹#›</a:t>
+              <a:t>‹N°›</a:t>
             </a:fld>
             <a:endParaRPr lang="en-US" dirty="0"/>
           </a:p>
@@ -3294,7 +3294,7 @@
           <a:ln/>
           <a:extLst>
             <a:ext uri="{91240B29-F687-4f45-9708-019B960494DF}">
-              <a14:hiddenLine xmlns="" xmlns:a14="http://schemas.microsoft.com/office/drawing/2010/main" w="9525">
+              <a14:hiddenLine xmlns:a14="http://schemas.microsoft.com/office/drawing/2010/main" xmlns="" w="9525">
                 <a:solidFill>
                   <a:srgbClr val="000000"/>
                 </a:solidFill>
@@ -3617,7 +3617,7 @@
             <a:fld id="{02640F58-564D-2B4F-AE67-E407BA4FCF45}" type="datetimeFigureOut">
               <a:rPr lang="en-US" smtClean="0"/>
               <a:pPr/>
-              <a:t>6/11/18</a:t>
+              <a:t>6/11/2018</a:t>
             </a:fld>
             <a:endParaRPr lang="en-US" dirty="0"/>
           </a:p>
@@ -3660,7 +3660,7 @@
             <a:fld id="{D57F1E4F-1CFF-5643-939E-217C01CDF565}" type="slidenum">
               <a:rPr lang="en-US" smtClean="0"/>
               <a:pPr/>
-              <a:t>‹#›</a:t>
+              <a:t>‹N°›</a:t>
             </a:fld>
             <a:endParaRPr lang="en-US" dirty="0"/>
           </a:p>
@@ -3773,7 +3773,7 @@
           <a:ln/>
           <a:extLst>
             <a:ext uri="{91240B29-F687-4f45-9708-019B960494DF}">
-              <a14:hiddenLine xmlns="" xmlns:a14="http://schemas.microsoft.com/office/drawing/2010/main" w="9525">
+              <a14:hiddenLine xmlns:a14="http://schemas.microsoft.com/office/drawing/2010/main" xmlns="" w="9525">
                 <a:solidFill>
                   <a:srgbClr val="000000"/>
                 </a:solidFill>
@@ -3840,7 +3840,7 @@
             <a:fld id="{F13A34C8-038E-2045-AF43-DF7DBB8E0E9E}" type="datetimeFigureOut">
               <a:rPr lang="en-US" smtClean="0"/>
               <a:pPr/>
-              <a:t>6/11/18</a:t>
+              <a:t>6/11/2018</a:t>
             </a:fld>
             <a:endParaRPr lang="en-US" dirty="0"/>
           </a:p>
@@ -3883,7 +3883,7 @@
             <a:fld id="{D57F1E4F-1CFF-5643-939E-217C01CDF565}" type="slidenum">
               <a:rPr lang="en-US" smtClean="0"/>
               <a:pPr/>
-              <a:t>‹#›</a:t>
+              <a:t>‹N°›</a:t>
             </a:fld>
             <a:endParaRPr lang="en-US" dirty="0"/>
           </a:p>
@@ -3937,7 +3937,7 @@
             <a:fld id="{8818C68F-D26B-8F47-958C-23B49CF8A634}" type="datetimeFigureOut">
               <a:rPr lang="en-US" smtClean="0"/>
               <a:pPr/>
-              <a:t>6/11/18</a:t>
+              <a:t>6/11/2018</a:t>
             </a:fld>
             <a:endParaRPr lang="en-US" dirty="0"/>
           </a:p>
@@ -3980,7 +3980,7 @@
             <a:fld id="{D57F1E4F-1CFF-5643-939E-217C01CDF565}" type="slidenum">
               <a:rPr lang="en-US" smtClean="0"/>
               <a:pPr/>
-              <a:t>‹#›</a:t>
+              <a:t>‹N°›</a:t>
             </a:fld>
             <a:endParaRPr lang="en-US" dirty="0"/>
           </a:p>
@@ -4206,7 +4206,7 @@
           <a:ln/>
           <a:extLst>
             <a:ext uri="{91240B29-F687-4f45-9708-019B960494DF}">
-              <a14:hiddenLine xmlns="" xmlns:a14="http://schemas.microsoft.com/office/drawing/2010/main" w="9525">
+              <a14:hiddenLine xmlns:a14="http://schemas.microsoft.com/office/drawing/2010/main" xmlns="" w="9525">
                 <a:solidFill>
                   <a:srgbClr val="000000"/>
                 </a:solidFill>
@@ -4406,7 +4406,7 @@
             <a:fld id="{D0DF5E60-9974-AC48-9591-99C2BB44B7CF}" type="datetimeFigureOut">
               <a:rPr lang="en-US" smtClean="0"/>
               <a:pPr/>
-              <a:t>6/11/18</a:t>
+              <a:t>6/11/2018</a:t>
             </a:fld>
             <a:endParaRPr lang="en-US" dirty="0"/>
           </a:p>
@@ -4449,7 +4449,7 @@
             <a:fld id="{D57F1E4F-1CFF-5643-939E-217C01CDF565}" type="slidenum">
               <a:rPr lang="en-US" smtClean="0"/>
               <a:pPr/>
-              <a:t>‹#›</a:t>
+              <a:t>‹N°›</a:t>
             </a:fld>
             <a:endParaRPr lang="en-US" dirty="0"/>
           </a:p>
@@ -4721,7 +4721,7 @@
             <a:fld id="{18C79C5D-2A6F-F04D-97DA-BEF2467B64E4}" type="datetimeFigureOut">
               <a:rPr lang="en-US" smtClean="0"/>
               <a:pPr/>
-              <a:t>6/11/18</a:t>
+              <a:t>6/11/2018</a:t>
             </a:fld>
             <a:endParaRPr lang="en-US" dirty="0"/>
           </a:p>
@@ -4774,7 +4774,7 @@
             <a:fld id="{D57F1E4F-1CFF-5643-939E-217C01CDF565}" type="slidenum">
               <a:rPr lang="en-US" smtClean="0"/>
               <a:pPr/>
-              <a:t>‹#›</a:t>
+              <a:t>‹N°›</a:t>
             </a:fld>
             <a:endParaRPr lang="en-US" dirty="0"/>
           </a:p>
@@ -4993,7 +4993,7 @@
             <a:fld id="{09B482E8-6E0E-1B4F-B1FD-C69DB9E858D9}" type="datetimeFigureOut">
               <a:rPr lang="en-US" smtClean="0"/>
               <a:pPr/>
-              <a:t>6/11/18</a:t>
+              <a:t>6/11/2018</a:t>
             </a:fld>
             <a:endParaRPr lang="en-US" dirty="0"/>
           </a:p>
@@ -5033,7 +5033,7 @@
             <a:fld id="{D57F1E4F-1CFF-5643-939E-217C01CDF565}" type="slidenum">
               <a:rPr lang="en-US" smtClean="0"/>
               <a:pPr/>
-              <a:t>‹#›</a:t>
+              <a:t>‹N°›</a:t>
             </a:fld>
             <a:endParaRPr lang="en-US" dirty="0"/>
           </a:p>
@@ -5899,9 +5899,13 @@
           <a:p>
             <a:r>
               <a:rPr lang="fr-FR" sz="2400" dirty="0" smtClean="0"/>
-              <a:t>IN104 – Page 1</a:t>
-            </a:r>
-            <a:endParaRPr lang="fr-FR" sz="2400" dirty="0"/>
+              <a:t>IN104 – Page </a:t>
+            </a:r>
+            <a:r>
+              <a:rPr lang="fr-FR" sz="1600" dirty="0" smtClean="0"/>
+              <a:t>1</a:t>
+            </a:r>
+            <a:endParaRPr lang="fr-FR" sz="1600" dirty="0"/>
           </a:p>
         </p:txBody>
       </p:sp>
@@ -6355,15 +6359,11 @@
           <a:p>
             <a:r>
               <a:rPr lang="fr-FR" sz="2400" dirty="0" smtClean="0"/>
-              <a:t>IN104 </a:t>
-            </a:r>
-            <a:r>
-              <a:rPr lang="fr-FR" sz="2400" dirty="0" smtClean="0"/>
-              <a:t>– Page </a:t>
+              <a:t>IN104 – Page </a:t>
             </a:r>
             <a:r>
               <a:rPr lang="fr-FR" sz="1600" dirty="0" smtClean="0"/>
-              <a:t>11</a:t>
+              <a:t>10</a:t>
             </a:r>
             <a:endParaRPr lang="fr-FR" sz="1600" dirty="0"/>
           </a:p>
@@ -6844,16 +6844,14 @@
           <a:p>
             <a:r>
               <a:rPr lang="fr-FR" sz="2400" dirty="0" smtClean="0"/>
-              <a:t>IN104 </a:t>
-            </a:r>
-            <a:r>
-              <a:rPr lang="fr-FR" sz="2400" dirty="0" smtClean="0"/>
-              <a:t>– Page </a:t>
+              <a:t>IN104 – Page </a:t>
             </a:r>
             <a:r>
               <a:rPr lang="fr-FR" sz="1600" dirty="0" smtClean="0"/>
-              <a:t>12</a:t>
-            </a:r>
+              <a:t>11</a:t>
+            </a:r>
+          </a:p>
+          <a:p>
             <a:endParaRPr lang="fr-FR" sz="1600" dirty="0"/>
           </a:p>
         </p:txBody>
@@ -7019,7 +7017,6 @@
               <a:rPr lang="fr-FR" sz="1200" dirty="0" smtClean="0"/>
               <a:t>	Gamma : 0.1							Gamma : 0.4							Gamma : 0.8</a:t>
             </a:r>
-            <a:endParaRPr lang="fr-FR" sz="1200" dirty="0" smtClean="0"/>
           </a:p>
           <a:p>
             <a:pPr marL="0" indent="0">
@@ -7379,16 +7376,14 @@
           <a:p>
             <a:r>
               <a:rPr lang="fr-FR" sz="2400" dirty="0" smtClean="0"/>
-              <a:t>IN104 </a:t>
-            </a:r>
-            <a:r>
-              <a:rPr lang="fr-FR" sz="2400" dirty="0" smtClean="0"/>
-              <a:t>– Page </a:t>
+              <a:t>IN104 – Page </a:t>
             </a:r>
             <a:r>
               <a:rPr lang="fr-FR" sz="1600" dirty="0" smtClean="0"/>
-              <a:t>13</a:t>
-            </a:r>
+              <a:t>12</a:t>
+            </a:r>
+          </a:p>
+          <a:p>
             <a:endParaRPr lang="fr-FR" sz="1600" dirty="0"/>
           </a:p>
         </p:txBody>
@@ -7796,16 +7791,14 @@
           <a:p>
             <a:r>
               <a:rPr lang="fr-FR" sz="2400" dirty="0" smtClean="0"/>
-              <a:t>IN104 </a:t>
-            </a:r>
-            <a:r>
-              <a:rPr lang="fr-FR" sz="2400" dirty="0" smtClean="0"/>
-              <a:t>– Page </a:t>
+              <a:t>IN104 – Page </a:t>
             </a:r>
             <a:r>
               <a:rPr lang="fr-FR" sz="1600" dirty="0" smtClean="0"/>
-              <a:t>14</a:t>
-            </a:r>
+              <a:t>13</a:t>
+            </a:r>
+          </a:p>
+          <a:p>
             <a:endParaRPr lang="fr-FR" sz="1600" dirty="0"/>
           </a:p>
         </p:txBody>
@@ -8206,16 +8199,14 @@
           <a:p>
             <a:r>
               <a:rPr lang="fr-FR" sz="2400" dirty="0" smtClean="0"/>
-              <a:t>IN104 </a:t>
-            </a:r>
-            <a:r>
-              <a:rPr lang="fr-FR" sz="2400" dirty="0" smtClean="0"/>
-              <a:t>– Page </a:t>
+              <a:t>IN104 – Page </a:t>
             </a:r>
             <a:r>
               <a:rPr lang="fr-FR" sz="1600" dirty="0" smtClean="0"/>
-              <a:t>15</a:t>
-            </a:r>
+              <a:t>14</a:t>
+            </a:r>
+          </a:p>
+          <a:p>
             <a:endParaRPr lang="fr-FR" sz="1600" dirty="0"/>
           </a:p>
         </p:txBody>
@@ -8720,10 +8711,10 @@
               <a:t>IN104 – Page </a:t>
             </a:r>
             <a:r>
-              <a:rPr lang="fr-FR" sz="2400" dirty="0" smtClean="0"/>
+              <a:rPr lang="fr-FR" sz="1600" dirty="0" smtClean="0"/>
               <a:t>2</a:t>
             </a:r>
-            <a:endParaRPr lang="fr-FR" sz="2400" dirty="0"/>
+            <a:endParaRPr lang="fr-FR" sz="1600" dirty="0"/>
           </a:p>
         </p:txBody>
       </p:sp>
@@ -9606,10 +9597,10 @@
               <a:t>IN104 – Page </a:t>
             </a:r>
             <a:r>
-              <a:rPr lang="fr-FR" sz="2400" dirty="0" smtClean="0"/>
+              <a:rPr lang="fr-FR" sz="1600" dirty="0" smtClean="0"/>
               <a:t>3</a:t>
             </a:r>
-            <a:endParaRPr lang="fr-FR" sz="2400" dirty="0"/>
+            <a:endParaRPr lang="fr-FR" sz="1600" dirty="0"/>
           </a:p>
         </p:txBody>
       </p:sp>
@@ -10286,10 +10277,9 @@
               <a:t>IN104 – Page </a:t>
             </a:r>
             <a:r>
-              <a:rPr lang="fr-FR" sz="2400" dirty="0"/>
+              <a:rPr lang="fr-FR" sz="1600" dirty="0"/>
               <a:t>4</a:t>
             </a:r>
-            <a:endParaRPr lang="fr-FR" sz="2400" dirty="0"/>
           </a:p>
         </p:txBody>
       </p:sp>
@@ -10387,7 +10377,7 @@
         </p:blipFill>
         <p:spPr>
           <a:xfrm>
-            <a:off x="1367246" y="1896554"/>
+            <a:off x="653143" y="1896554"/>
             <a:ext cx="8778240" cy="4961446"/>
           </a:xfrm>
           <a:prstGeom prst="rect">
@@ -10641,10 +10631,9 @@
               <a:t>IN104 – Page </a:t>
             </a:r>
             <a:r>
-              <a:rPr lang="fr-FR" sz="2400" dirty="0"/>
+              <a:rPr lang="fr-FR" sz="1600" dirty="0"/>
               <a:t>5</a:t>
             </a:r>
-            <a:endParaRPr lang="fr-FR" sz="2400" dirty="0"/>
           </a:p>
         </p:txBody>
       </p:sp>
@@ -10669,369 +10658,6 @@
 </file>
 
 <file path=ppt/slides/slide6.xml><?xml version="1.0" encoding="utf-8"?>
-<p:sld xmlns:a="http://schemas.openxmlformats.org/drawingml/2006/main" xmlns:r="http://schemas.openxmlformats.org/officeDocument/2006/relationships" xmlns:p="http://schemas.openxmlformats.org/presentationml/2006/main">
-  <p:cSld>
-    <p:spTree>
-      <p:nvGrpSpPr>
-        <p:cNvPr id="1" name=""/>
-        <p:cNvGrpSpPr/>
-        <p:nvPr/>
-      </p:nvGrpSpPr>
-      <p:grpSpPr>
-        <a:xfrm>
-          <a:off x="0" y="0"/>
-          <a:ext cx="0" cy="0"/>
-          <a:chOff x="0" y="0"/>
-          <a:chExt cx="0" cy="0"/>
-        </a:xfrm>
-      </p:grpSpPr>
-      <p:sp>
-        <p:nvSpPr>
-          <p:cNvPr id="2" name="Titre 1"/>
-          <p:cNvSpPr>
-            <a:spLocks noGrp="1"/>
-          </p:cNvSpPr>
-          <p:nvPr>
-            <p:ph type="title"/>
-          </p:nvPr>
-        </p:nvSpPr>
-        <p:spPr>
-          <a:xfrm>
-            <a:off x="0" y="307851"/>
-            <a:ext cx="12192000" cy="926589"/>
-          </a:xfrm>
-          <a:ln>
-            <a:solidFill>
-              <a:srgbClr val="00B050"/>
-            </a:solidFill>
-          </a:ln>
-        </p:spPr>
-        <p:txBody>
-          <a:bodyPr/>
-          <a:lstStyle/>
-          <a:p>
-            <a:r>
-              <a:rPr lang="fr-FR" sz="5400" dirty="0" smtClean="0">
-                <a:solidFill>
-                  <a:schemeClr val="accent6"/>
-                </a:solidFill>
-              </a:rPr>
-              <a:t>II</a:t>
-            </a:r>
-            <a:r>
-              <a:rPr lang="fr-FR" sz="5400" dirty="0">
-                <a:solidFill>
-                  <a:schemeClr val="accent6"/>
-                </a:solidFill>
-              </a:rPr>
-              <a:t>. </a:t>
-            </a:r>
-            <a:r>
-              <a:rPr lang="fr-FR" sz="5400" dirty="0" smtClean="0"/>
-              <a:t>Solution : architecture et design</a:t>
-            </a:r>
-            <a:endParaRPr lang="fr-FR" sz="5400" dirty="0"/>
-          </a:p>
-        </p:txBody>
-      </p:sp>
-      <p:pic>
-        <p:nvPicPr>
-          <p:cNvPr id="3" name="Image 2"/>
-          <p:cNvPicPr>
-            <a:picLocks noChangeAspect="1"/>
-          </p:cNvPicPr>
-          <p:nvPr/>
-        </p:nvPicPr>
-        <p:blipFill>
-          <a:blip r:embed="rId3"/>
-          <a:stretch>
-            <a:fillRect/>
-          </a:stretch>
-        </p:blipFill>
-        <p:spPr>
-          <a:xfrm>
-            <a:off x="1489166" y="1899414"/>
-            <a:ext cx="8734696" cy="4958585"/>
-          </a:xfrm>
-          <a:prstGeom prst="rect">
-            <a:avLst/>
-          </a:prstGeom>
-        </p:spPr>
-      </p:pic>
-      <p:sp>
-        <p:nvSpPr>
-          <p:cNvPr id="4" name="Sous-titre 2"/>
-          <p:cNvSpPr txBox="1">
-            <a:spLocks/>
-          </p:cNvSpPr>
-          <p:nvPr/>
-        </p:nvSpPr>
-        <p:spPr>
-          <a:xfrm>
-            <a:off x="9763433" y="6400801"/>
-            <a:ext cx="2428568" cy="457199"/>
-          </a:xfrm>
-          <a:prstGeom prst="rect">
-            <a:avLst/>
-          </a:prstGeom>
-          <a:ln>
-            <a:solidFill>
-              <a:schemeClr val="tx1"/>
-            </a:solidFill>
-          </a:ln>
-          <a:effectLst>
-            <a:outerShdw blurRad="50800" dir="14400000">
-              <a:srgbClr val="000000">
-                <a:alpha val="40000"/>
-              </a:srgbClr>
-            </a:outerShdw>
-          </a:effectLst>
-        </p:spPr>
-        <p:txBody>
-          <a:bodyPr vert="horz" lIns="91440" tIns="45720" rIns="91440" bIns="45720" rtlCol="0" anchor="t">
-            <a:noAutofit/>
-          </a:bodyPr>
-          <a:lstStyle>
-            <a:lvl1pPr marL="0" indent="0" algn="l" defTabSz="457200" rtl="0" eaLnBrk="1" latinLnBrk="0" hangingPunct="1">
-              <a:spcBef>
-                <a:spcPct val="20000"/>
-              </a:spcBef>
-              <a:spcAft>
-                <a:spcPts val="600"/>
-              </a:spcAft>
-              <a:buClr>
-                <a:schemeClr val="accent1"/>
-              </a:buClr>
-              <a:buFont typeface="Wingdings 2" charset="2"/>
-              <a:buNone/>
-              <a:defRPr sz="1800" kern="1200">
-                <a:solidFill>
-                  <a:schemeClr val="tx1"/>
-                </a:solidFill>
-                <a:latin typeface="+mn-lt"/>
-                <a:ea typeface="+mn-ea"/>
-                <a:cs typeface="+mn-cs"/>
-              </a:defRPr>
-            </a:lvl1pPr>
-            <a:lvl2pPr marL="457200" indent="0" algn="ctr" defTabSz="457200" rtl="0" eaLnBrk="1" latinLnBrk="0" hangingPunct="1">
-              <a:spcBef>
-                <a:spcPct val="20000"/>
-              </a:spcBef>
-              <a:spcAft>
-                <a:spcPts val="600"/>
-              </a:spcAft>
-              <a:buClr>
-                <a:schemeClr val="accent1"/>
-              </a:buClr>
-              <a:buFont typeface="Wingdings 2" charset="2"/>
-              <a:buNone/>
-              <a:defRPr sz="1600" kern="1200">
-                <a:solidFill>
-                  <a:schemeClr val="tx1">
-                    <a:tint val="75000"/>
-                  </a:schemeClr>
-                </a:solidFill>
-                <a:latin typeface="+mn-lt"/>
-                <a:ea typeface="+mn-ea"/>
-                <a:cs typeface="+mn-cs"/>
-              </a:defRPr>
-            </a:lvl2pPr>
-            <a:lvl3pPr marL="914400" indent="0" algn="ctr" defTabSz="457200" rtl="0" eaLnBrk="1" latinLnBrk="0" hangingPunct="1">
-              <a:spcBef>
-                <a:spcPct val="20000"/>
-              </a:spcBef>
-              <a:spcAft>
-                <a:spcPts val="600"/>
-              </a:spcAft>
-              <a:buClr>
-                <a:schemeClr val="accent1"/>
-              </a:buClr>
-              <a:buFont typeface="Wingdings 2" charset="2"/>
-              <a:buNone/>
-              <a:defRPr sz="1400" kern="1200">
-                <a:solidFill>
-                  <a:schemeClr val="tx1">
-                    <a:tint val="75000"/>
-                  </a:schemeClr>
-                </a:solidFill>
-                <a:latin typeface="+mn-lt"/>
-                <a:ea typeface="+mn-ea"/>
-                <a:cs typeface="+mn-cs"/>
-              </a:defRPr>
-            </a:lvl3pPr>
-            <a:lvl4pPr marL="1371600" indent="0" algn="ctr" defTabSz="457200" rtl="0" eaLnBrk="1" latinLnBrk="0" hangingPunct="1">
-              <a:spcBef>
-                <a:spcPct val="20000"/>
-              </a:spcBef>
-              <a:spcAft>
-                <a:spcPts val="600"/>
-              </a:spcAft>
-              <a:buClr>
-                <a:schemeClr val="accent1"/>
-              </a:buClr>
-              <a:buFont typeface="Wingdings 2" charset="2"/>
-              <a:buNone/>
-              <a:defRPr sz="1200" kern="1200">
-                <a:solidFill>
-                  <a:schemeClr val="tx1">
-                    <a:tint val="75000"/>
-                  </a:schemeClr>
-                </a:solidFill>
-                <a:latin typeface="+mn-lt"/>
-                <a:ea typeface="+mn-ea"/>
-                <a:cs typeface="+mn-cs"/>
-              </a:defRPr>
-            </a:lvl4pPr>
-            <a:lvl5pPr marL="1828800" indent="0" algn="ctr" defTabSz="457200" rtl="0" eaLnBrk="1" latinLnBrk="0" hangingPunct="1">
-              <a:spcBef>
-                <a:spcPct val="20000"/>
-              </a:spcBef>
-              <a:spcAft>
-                <a:spcPts val="600"/>
-              </a:spcAft>
-              <a:buClr>
-                <a:schemeClr val="accent1"/>
-              </a:buClr>
-              <a:buFont typeface="Wingdings 2" charset="2"/>
-              <a:buNone/>
-              <a:defRPr sz="1200" kern="1200">
-                <a:solidFill>
-                  <a:schemeClr val="tx1">
-                    <a:tint val="75000"/>
-                  </a:schemeClr>
-                </a:solidFill>
-                <a:latin typeface="+mn-lt"/>
-                <a:ea typeface="+mn-ea"/>
-                <a:cs typeface="+mn-cs"/>
-              </a:defRPr>
-            </a:lvl5pPr>
-            <a:lvl6pPr marL="2286000" indent="0" algn="ctr" defTabSz="457200" rtl="0" eaLnBrk="1" latinLnBrk="0" hangingPunct="1">
-              <a:spcBef>
-                <a:spcPct val="20000"/>
-              </a:spcBef>
-              <a:spcAft>
-                <a:spcPts val="600"/>
-              </a:spcAft>
-              <a:buClr>
-                <a:schemeClr val="accent1"/>
-              </a:buClr>
-              <a:buFont typeface="Wingdings 2" charset="2"/>
-              <a:buNone/>
-              <a:defRPr sz="1200" kern="1200">
-                <a:solidFill>
-                  <a:schemeClr val="tx1">
-                    <a:tint val="75000"/>
-                  </a:schemeClr>
-                </a:solidFill>
-                <a:latin typeface="+mn-lt"/>
-                <a:ea typeface="+mn-ea"/>
-                <a:cs typeface="+mn-cs"/>
-              </a:defRPr>
-            </a:lvl6pPr>
-            <a:lvl7pPr marL="2743200" indent="0" algn="ctr" defTabSz="457200" rtl="0" eaLnBrk="1" latinLnBrk="0" hangingPunct="1">
-              <a:spcBef>
-                <a:spcPct val="20000"/>
-              </a:spcBef>
-              <a:spcAft>
-                <a:spcPts val="600"/>
-              </a:spcAft>
-              <a:buClr>
-                <a:schemeClr val="accent1"/>
-              </a:buClr>
-              <a:buFont typeface="Wingdings 2" charset="2"/>
-              <a:buNone/>
-              <a:defRPr sz="1200" kern="1200">
-                <a:solidFill>
-                  <a:schemeClr val="tx1">
-                    <a:tint val="75000"/>
-                  </a:schemeClr>
-                </a:solidFill>
-                <a:latin typeface="+mn-lt"/>
-                <a:ea typeface="+mn-ea"/>
-                <a:cs typeface="+mn-cs"/>
-              </a:defRPr>
-            </a:lvl7pPr>
-            <a:lvl8pPr marL="3200400" indent="0" algn="ctr" defTabSz="457200" rtl="0" eaLnBrk="1" latinLnBrk="0" hangingPunct="1">
-              <a:spcBef>
-                <a:spcPct val="20000"/>
-              </a:spcBef>
-              <a:spcAft>
-                <a:spcPts val="600"/>
-              </a:spcAft>
-              <a:buClr>
-                <a:schemeClr val="accent1"/>
-              </a:buClr>
-              <a:buFont typeface="Wingdings 2" charset="2"/>
-              <a:buNone/>
-              <a:defRPr sz="1200" kern="1200">
-                <a:solidFill>
-                  <a:schemeClr val="tx1">
-                    <a:tint val="75000"/>
-                  </a:schemeClr>
-                </a:solidFill>
-                <a:latin typeface="+mn-lt"/>
-                <a:ea typeface="+mn-ea"/>
-                <a:cs typeface="+mn-cs"/>
-              </a:defRPr>
-            </a:lvl8pPr>
-            <a:lvl9pPr marL="3657600" indent="0" algn="ctr" defTabSz="457200" rtl="0" eaLnBrk="1" latinLnBrk="0" hangingPunct="1">
-              <a:spcBef>
-                <a:spcPct val="20000"/>
-              </a:spcBef>
-              <a:spcAft>
-                <a:spcPts val="600"/>
-              </a:spcAft>
-              <a:buClr>
-                <a:schemeClr val="accent1"/>
-              </a:buClr>
-              <a:buFont typeface="Wingdings 2" charset="2"/>
-              <a:buNone/>
-              <a:defRPr sz="1200" kern="1200">
-                <a:solidFill>
-                  <a:schemeClr val="tx1">
-                    <a:tint val="75000"/>
-                  </a:schemeClr>
-                </a:solidFill>
-                <a:latin typeface="+mn-lt"/>
-                <a:ea typeface="+mn-ea"/>
-                <a:cs typeface="+mn-cs"/>
-              </a:defRPr>
-            </a:lvl9pPr>
-          </a:lstStyle>
-          <a:p>
-            <a:r>
-              <a:rPr lang="fr-FR" sz="2400" dirty="0" smtClean="0"/>
-              <a:t>IN104 – </a:t>
-            </a:r>
-            <a:r>
-              <a:rPr lang="fr-FR" sz="2400" dirty="0" smtClean="0"/>
-              <a:t>Page 6</a:t>
-            </a:r>
-            <a:endParaRPr lang="fr-FR" sz="2400" dirty="0"/>
-          </a:p>
-        </p:txBody>
-      </p:sp>
-    </p:spTree>
-    <p:extLst>
-      <p:ext uri="{BB962C8B-B14F-4D97-AF65-F5344CB8AC3E}">
-        <p14:creationId xmlns:p14="http://schemas.microsoft.com/office/powerpoint/2010/main" val="1247051528"/>
-      </p:ext>
-    </p:extLst>
-  </p:cSld>
-  <p:clrMapOvr>
-    <a:masterClrMapping/>
-  </p:clrMapOvr>
-  <p:timing>
-    <p:tnLst>
-      <p:par>
-        <p:cTn id="1" dur="indefinite" restart="never" nodeType="tmRoot"/>
-      </p:par>
-    </p:tnLst>
-  </p:timing>
-</p:sld>
-</file>
-
-<file path=ppt/slides/slide7.xml><?xml version="1.0" encoding="utf-8"?>
 <p:sld xmlns:a="http://schemas.openxmlformats.org/drawingml/2006/main" xmlns:r="http://schemas.openxmlformats.org/officeDocument/2006/relationships" xmlns:p="http://schemas.openxmlformats.org/presentationml/2006/main">
   <p:cSld>
     <p:spTree>
@@ -11383,10 +11009,10 @@
               <a:t>IN104 – Page </a:t>
             </a:r>
             <a:r>
-              <a:rPr lang="fr-FR" sz="2400" dirty="0"/>
-              <a:t>7</a:t>
-            </a:r>
-            <a:endParaRPr lang="fr-FR" sz="2400" dirty="0"/>
+              <a:rPr lang="fr-FR" sz="1600" dirty="0" smtClean="0"/>
+              <a:t>6</a:t>
+            </a:r>
+            <a:endParaRPr lang="fr-FR" sz="1600" dirty="0"/>
           </a:p>
         </p:txBody>
       </p:sp>
@@ -11410,7 +11036,7 @@
 </p:sld>
 </file>
 
-<file path=ppt/slides/slide8.xml><?xml version="1.0" encoding="utf-8"?>
+<file path=ppt/slides/slide7.xml><?xml version="1.0" encoding="utf-8"?>
 <p:sld xmlns:a="http://schemas.openxmlformats.org/drawingml/2006/main" xmlns:r="http://schemas.openxmlformats.org/officeDocument/2006/relationships" xmlns:p="http://schemas.openxmlformats.org/presentationml/2006/main">
   <p:cSld>
     <p:spTree>
@@ -11437,134 +11063,82 @@
             <p:ph type="title"/>
           </p:nvPr>
         </p:nvSpPr>
+        <p:spPr/>
+        <p:txBody>
+          <a:bodyPr/>
+          <a:lstStyle/>
+          <a:p>
+            <a:r>
+              <a:rPr lang="fr-FR" sz="5400" dirty="0" smtClean="0"/>
+              <a:t>Parenthèse – Le Q-Learning</a:t>
+            </a:r>
+            <a:endParaRPr lang="fr-FR" sz="5400" dirty="0"/>
+          </a:p>
+        </p:txBody>
+      </p:sp>
+      <p:pic>
+        <p:nvPicPr>
+          <p:cNvPr id="4" name="Image 3"/>
+          <p:cNvPicPr>
+            <a:picLocks noChangeAspect="1"/>
+          </p:cNvPicPr>
+          <p:nvPr/>
+        </p:nvPicPr>
+        <p:blipFill>
+          <a:blip r:embed="rId2">
+            <a:extLst>
+              <a:ext uri="{28A0092B-C50C-407E-A947-70E740481C1C}">
+                <a14:useLocalDpi xmlns:a14="http://schemas.microsoft.com/office/drawing/2010/main" val="0"/>
+              </a:ext>
+            </a:extLst>
+          </a:blip>
+          <a:stretch>
+            <a:fillRect/>
+          </a:stretch>
+        </p:blipFill>
         <p:spPr>
           <a:xfrm>
-            <a:off x="0" y="307850"/>
-            <a:ext cx="12192000" cy="970450"/>
+            <a:off x="0" y="2777719"/>
+            <a:ext cx="7298005" cy="2467823"/>
           </a:xfrm>
-          <a:ln>
-            <a:solidFill>
-              <a:srgbClr val="00B050"/>
-            </a:solidFill>
-          </a:ln>
+          <a:prstGeom prst="rect">
+            <a:avLst/>
+          </a:prstGeom>
         </p:spPr>
-        <p:txBody>
-          <a:bodyPr/>
-          <a:lstStyle/>
-          <a:p>
-            <a:r>
-              <a:rPr lang="fr-FR" sz="5400" dirty="0">
-                <a:solidFill>
-                  <a:schemeClr val="accent6"/>
-                </a:solidFill>
-              </a:rPr>
-              <a:t>III. </a:t>
-            </a:r>
-            <a:r>
-              <a:rPr lang="fr-FR" sz="5400" dirty="0" smtClean="0"/>
-              <a:t>Vie du projet</a:t>
-            </a:r>
-            <a:endParaRPr lang="fr-FR" sz="5400" dirty="0"/>
-          </a:p>
-        </p:txBody>
-      </p:sp>
-      <p:sp>
-        <p:nvSpPr>
-          <p:cNvPr id="3" name="Espace réservé du contenu 2"/>
-          <p:cNvSpPr>
-            <a:spLocks noGrp="1"/>
-          </p:cNvSpPr>
-          <p:nvPr>
-            <p:ph idx="1"/>
-          </p:nvPr>
-        </p:nvSpPr>
-        <p:spPr/>
-        <p:txBody>
-          <a:bodyPr/>
-          <a:lstStyle/>
-          <a:p>
-            <a:pPr marL="0" indent="0" algn="ctr">
-              <a:buNone/>
-            </a:pPr>
-            <a:r>
-              <a:rPr lang="fr-FR" sz="2000" b="1" dirty="0" smtClean="0"/>
-              <a:t>1</a:t>
-            </a:r>
-            <a:r>
-              <a:rPr lang="fr-FR" sz="2000" b="1" baseline="30000" dirty="0" smtClean="0"/>
-              <a:t>ère</a:t>
-            </a:r>
-            <a:r>
-              <a:rPr lang="fr-FR" sz="2000" b="1" dirty="0" smtClean="0"/>
-              <a:t> partie du projet</a:t>
-            </a:r>
-          </a:p>
-          <a:p>
-            <a:r>
-              <a:rPr lang="fr-FR" dirty="0" smtClean="0"/>
-              <a:t>Classe Environnement 2D</a:t>
-            </a:r>
-          </a:p>
-          <a:p>
-            <a:pPr lvl="1"/>
-            <a:r>
-              <a:rPr lang="fr-FR" dirty="0"/>
-              <a:t>Modélisation d’un labyrinthe aléatoire et de ses différents états / Visualisation graphique</a:t>
-            </a:r>
-          </a:p>
-          <a:p>
-            <a:pPr lvl="1"/>
-            <a:r>
-              <a:rPr lang="fr-FR" dirty="0" smtClean="0"/>
-              <a:t>Méthode « </a:t>
-            </a:r>
-            <a:r>
-              <a:rPr lang="fr-FR" dirty="0" err="1" smtClean="0"/>
-              <a:t>possibleActions</a:t>
-            </a:r>
-            <a:r>
-              <a:rPr lang="fr-FR" dirty="0" smtClean="0"/>
-              <a:t> » essentielle </a:t>
-            </a:r>
-            <a:r>
-              <a:rPr lang="fr-FR" dirty="0"/>
-              <a:t>pour l’agent et évolution du </a:t>
-            </a:r>
-            <a:r>
-              <a:rPr lang="fr-FR" dirty="0" smtClean="0"/>
-              <a:t>labyrinthe</a:t>
-            </a:r>
-            <a:endParaRPr lang="fr-FR" dirty="0" smtClean="0"/>
-          </a:p>
-          <a:p>
-            <a:r>
-              <a:rPr lang="fr-FR" dirty="0" smtClean="0"/>
-              <a:t>Tests / Méthode agile</a:t>
-            </a:r>
-          </a:p>
-          <a:p>
-            <a:pPr lvl="1"/>
-            <a:r>
-              <a:rPr lang="fr-FR" dirty="0" smtClean="0"/>
-              <a:t>Tests unitaires de l’environnement et tests globaux de modélisation du labyrinthe</a:t>
-            </a:r>
-          </a:p>
-          <a:p>
-            <a:pPr lvl="1"/>
-            <a:r>
-              <a:rPr lang="fr-FR" dirty="0" smtClean="0"/>
-              <a:t>Classe Agent aléatoire</a:t>
-            </a:r>
-            <a:endParaRPr lang="fr-FR" dirty="0"/>
-          </a:p>
-          <a:p>
-            <a:endParaRPr lang="fr-FR" dirty="0"/>
-          </a:p>
-        </p:txBody>
-      </p:sp>
-      <p:sp>
-        <p:nvSpPr>
-          <p:cNvPr id="4" name="Sous-titre 2"/>
+      </p:pic>
+      <p:pic>
+        <p:nvPicPr>
+          <p:cNvPr id="7" name="Image 6"/>
+          <p:cNvPicPr>
+            <a:picLocks noChangeAspect="1"/>
+          </p:cNvPicPr>
+          <p:nvPr/>
+        </p:nvPicPr>
+        <p:blipFill>
+          <a:blip r:embed="rId3">
+            <a:extLst>
+              <a:ext uri="{28A0092B-C50C-407E-A947-70E740481C1C}">
+                <a14:useLocalDpi xmlns:a14="http://schemas.microsoft.com/office/drawing/2010/main" val="0"/>
+              </a:ext>
+            </a:extLst>
+          </a:blip>
+          <a:stretch>
+            <a:fillRect/>
+          </a:stretch>
+        </p:blipFill>
+        <p:spPr>
+          <a:xfrm>
+            <a:off x="7422585" y="1997887"/>
+            <a:ext cx="4447197" cy="4288746"/>
+          </a:xfrm>
+          <a:prstGeom prst="rect">
+            <a:avLst/>
+          </a:prstGeom>
+        </p:spPr>
+      </p:pic>
+      <p:sp>
+        <p:nvSpPr>
+          <p:cNvPr id="5" name="Sous-titre 2"/>
           <p:cNvSpPr txBox="1">
             <a:spLocks/>
           </p:cNvSpPr>
@@ -11808,10 +11382,427 @@
               <a:t>IN104 – Page </a:t>
             </a:r>
             <a:r>
-              <a:rPr lang="fr-FR" sz="2400" dirty="0"/>
-              <a:t>9</a:t>
-            </a:r>
-            <a:endParaRPr lang="fr-FR" sz="2400" dirty="0"/>
+              <a:rPr lang="fr-FR" sz="1600" dirty="0" smtClean="0"/>
+              <a:t>7</a:t>
+            </a:r>
+            <a:endParaRPr lang="fr-FR" sz="1600" dirty="0"/>
+          </a:p>
+        </p:txBody>
+      </p:sp>
+    </p:spTree>
+    <p:extLst>
+      <p:ext uri="{BB962C8B-B14F-4D97-AF65-F5344CB8AC3E}">
+        <p14:creationId xmlns:p14="http://schemas.microsoft.com/office/powerpoint/2010/main" val="2942058184"/>
+      </p:ext>
+    </p:extLst>
+  </p:cSld>
+  <p:clrMapOvr>
+    <a:masterClrMapping/>
+  </p:clrMapOvr>
+</p:sld>
+</file>
+
+<file path=ppt/slides/slide8.xml><?xml version="1.0" encoding="utf-8"?>
+<p:sld xmlns:a="http://schemas.openxmlformats.org/drawingml/2006/main" xmlns:r="http://schemas.openxmlformats.org/officeDocument/2006/relationships" xmlns:p="http://schemas.openxmlformats.org/presentationml/2006/main">
+  <p:cSld>
+    <p:spTree>
+      <p:nvGrpSpPr>
+        <p:cNvPr id="1" name=""/>
+        <p:cNvGrpSpPr/>
+        <p:nvPr/>
+      </p:nvGrpSpPr>
+      <p:grpSpPr>
+        <a:xfrm>
+          <a:off x="0" y="0"/>
+          <a:ext cx="0" cy="0"/>
+          <a:chOff x="0" y="0"/>
+          <a:chExt cx="0" cy="0"/>
+        </a:xfrm>
+      </p:grpSpPr>
+      <p:sp>
+        <p:nvSpPr>
+          <p:cNvPr id="2" name="Titre 1"/>
+          <p:cNvSpPr>
+            <a:spLocks noGrp="1"/>
+          </p:cNvSpPr>
+          <p:nvPr>
+            <p:ph type="title"/>
+          </p:nvPr>
+        </p:nvSpPr>
+        <p:spPr>
+          <a:xfrm>
+            <a:off x="0" y="307850"/>
+            <a:ext cx="12192000" cy="970450"/>
+          </a:xfrm>
+          <a:ln>
+            <a:solidFill>
+              <a:srgbClr val="00B050"/>
+            </a:solidFill>
+          </a:ln>
+        </p:spPr>
+        <p:txBody>
+          <a:bodyPr/>
+          <a:lstStyle/>
+          <a:p>
+            <a:r>
+              <a:rPr lang="fr-FR" sz="5400" dirty="0">
+                <a:solidFill>
+                  <a:schemeClr val="accent6"/>
+                </a:solidFill>
+              </a:rPr>
+              <a:t>III. </a:t>
+            </a:r>
+            <a:r>
+              <a:rPr lang="fr-FR" sz="5400" dirty="0" smtClean="0"/>
+              <a:t>Vie du projet</a:t>
+            </a:r>
+            <a:endParaRPr lang="fr-FR" sz="5400" dirty="0"/>
+          </a:p>
+        </p:txBody>
+      </p:sp>
+      <p:sp>
+        <p:nvSpPr>
+          <p:cNvPr id="3" name="Espace réservé du contenu 2"/>
+          <p:cNvSpPr>
+            <a:spLocks noGrp="1"/>
+          </p:cNvSpPr>
+          <p:nvPr>
+            <p:ph idx="1"/>
+          </p:nvPr>
+        </p:nvSpPr>
+        <p:spPr/>
+        <p:txBody>
+          <a:bodyPr/>
+          <a:lstStyle/>
+          <a:p>
+            <a:pPr marL="0" indent="0" algn="ctr">
+              <a:buNone/>
+            </a:pPr>
+            <a:r>
+              <a:rPr lang="fr-FR" sz="2000" b="1" dirty="0" smtClean="0"/>
+              <a:t>1</a:t>
+            </a:r>
+            <a:r>
+              <a:rPr lang="fr-FR" sz="2000" b="1" baseline="30000" dirty="0" smtClean="0"/>
+              <a:t>ère</a:t>
+            </a:r>
+            <a:r>
+              <a:rPr lang="fr-FR" sz="2000" b="1" dirty="0" smtClean="0"/>
+              <a:t> partie du projet</a:t>
+            </a:r>
+          </a:p>
+          <a:p>
+            <a:r>
+              <a:rPr lang="fr-FR" dirty="0" smtClean="0"/>
+              <a:t>Classe Environnement 2D</a:t>
+            </a:r>
+          </a:p>
+          <a:p>
+            <a:pPr lvl="1"/>
+            <a:r>
+              <a:rPr lang="fr-FR" dirty="0"/>
+              <a:t>Modélisation d’un labyrinthe aléatoire et de ses différents états / Visualisation graphique</a:t>
+            </a:r>
+          </a:p>
+          <a:p>
+            <a:pPr lvl="1"/>
+            <a:r>
+              <a:rPr lang="fr-FR" dirty="0" smtClean="0"/>
+              <a:t>Méthode « </a:t>
+            </a:r>
+            <a:r>
+              <a:rPr lang="fr-FR" dirty="0" err="1" smtClean="0"/>
+              <a:t>possibleActions</a:t>
+            </a:r>
+            <a:r>
+              <a:rPr lang="fr-FR" dirty="0" smtClean="0"/>
+              <a:t> » essentielle </a:t>
+            </a:r>
+            <a:r>
+              <a:rPr lang="fr-FR" dirty="0"/>
+              <a:t>pour l’agent et évolution du </a:t>
+            </a:r>
+            <a:r>
+              <a:rPr lang="fr-FR" dirty="0" smtClean="0"/>
+              <a:t>labyrinthe</a:t>
+            </a:r>
+          </a:p>
+          <a:p>
+            <a:r>
+              <a:rPr lang="fr-FR" dirty="0" smtClean="0"/>
+              <a:t>Tests / Méthode agile</a:t>
+            </a:r>
+          </a:p>
+          <a:p>
+            <a:pPr lvl="1"/>
+            <a:r>
+              <a:rPr lang="fr-FR" dirty="0" smtClean="0"/>
+              <a:t>Tests unitaires de l’environnement et tests globaux de modélisation du labyrinthe</a:t>
+            </a:r>
+          </a:p>
+          <a:p>
+            <a:pPr lvl="1"/>
+            <a:r>
+              <a:rPr lang="fr-FR" dirty="0" smtClean="0"/>
+              <a:t>Classe Agent aléatoire</a:t>
+            </a:r>
+            <a:endParaRPr lang="fr-FR" dirty="0"/>
+          </a:p>
+          <a:p>
+            <a:endParaRPr lang="fr-FR" dirty="0"/>
+          </a:p>
+        </p:txBody>
+      </p:sp>
+      <p:sp>
+        <p:nvSpPr>
+          <p:cNvPr id="4" name="Sous-titre 2"/>
+          <p:cNvSpPr txBox="1">
+            <a:spLocks/>
+          </p:cNvSpPr>
+          <p:nvPr/>
+        </p:nvSpPr>
+        <p:spPr>
+          <a:xfrm>
+            <a:off x="9763433" y="6400801"/>
+            <a:ext cx="2428568" cy="457199"/>
+          </a:xfrm>
+          <a:prstGeom prst="rect">
+            <a:avLst/>
+          </a:prstGeom>
+          <a:ln>
+            <a:solidFill>
+              <a:schemeClr val="tx1"/>
+            </a:solidFill>
+          </a:ln>
+          <a:effectLst>
+            <a:outerShdw blurRad="50800" dir="14400000">
+              <a:srgbClr val="000000">
+                <a:alpha val="40000"/>
+              </a:srgbClr>
+            </a:outerShdw>
+          </a:effectLst>
+        </p:spPr>
+        <p:txBody>
+          <a:bodyPr vert="horz" lIns="91440" tIns="45720" rIns="91440" bIns="45720" rtlCol="0" anchor="t">
+            <a:noAutofit/>
+          </a:bodyPr>
+          <a:lstStyle>
+            <a:lvl1pPr marL="0" indent="0" algn="l" defTabSz="457200" rtl="0" eaLnBrk="1" latinLnBrk="0" hangingPunct="1">
+              <a:spcBef>
+                <a:spcPct val="20000"/>
+              </a:spcBef>
+              <a:spcAft>
+                <a:spcPts val="600"/>
+              </a:spcAft>
+              <a:buClr>
+                <a:schemeClr val="accent1"/>
+              </a:buClr>
+              <a:buFont typeface="Wingdings 2" charset="2"/>
+              <a:buNone/>
+              <a:defRPr sz="1800" kern="1200">
+                <a:solidFill>
+                  <a:schemeClr val="tx1"/>
+                </a:solidFill>
+                <a:latin typeface="+mn-lt"/>
+                <a:ea typeface="+mn-ea"/>
+                <a:cs typeface="+mn-cs"/>
+              </a:defRPr>
+            </a:lvl1pPr>
+            <a:lvl2pPr marL="457200" indent="0" algn="ctr" defTabSz="457200" rtl="0" eaLnBrk="1" latinLnBrk="0" hangingPunct="1">
+              <a:spcBef>
+                <a:spcPct val="20000"/>
+              </a:spcBef>
+              <a:spcAft>
+                <a:spcPts val="600"/>
+              </a:spcAft>
+              <a:buClr>
+                <a:schemeClr val="accent1"/>
+              </a:buClr>
+              <a:buFont typeface="Wingdings 2" charset="2"/>
+              <a:buNone/>
+              <a:defRPr sz="1600" kern="1200">
+                <a:solidFill>
+                  <a:schemeClr val="tx1">
+                    <a:tint val="75000"/>
+                  </a:schemeClr>
+                </a:solidFill>
+                <a:latin typeface="+mn-lt"/>
+                <a:ea typeface="+mn-ea"/>
+                <a:cs typeface="+mn-cs"/>
+              </a:defRPr>
+            </a:lvl2pPr>
+            <a:lvl3pPr marL="914400" indent="0" algn="ctr" defTabSz="457200" rtl="0" eaLnBrk="1" latinLnBrk="0" hangingPunct="1">
+              <a:spcBef>
+                <a:spcPct val="20000"/>
+              </a:spcBef>
+              <a:spcAft>
+                <a:spcPts val="600"/>
+              </a:spcAft>
+              <a:buClr>
+                <a:schemeClr val="accent1"/>
+              </a:buClr>
+              <a:buFont typeface="Wingdings 2" charset="2"/>
+              <a:buNone/>
+              <a:defRPr sz="1400" kern="1200">
+                <a:solidFill>
+                  <a:schemeClr val="tx1">
+                    <a:tint val="75000"/>
+                  </a:schemeClr>
+                </a:solidFill>
+                <a:latin typeface="+mn-lt"/>
+                <a:ea typeface="+mn-ea"/>
+                <a:cs typeface="+mn-cs"/>
+              </a:defRPr>
+            </a:lvl3pPr>
+            <a:lvl4pPr marL="1371600" indent="0" algn="ctr" defTabSz="457200" rtl="0" eaLnBrk="1" latinLnBrk="0" hangingPunct="1">
+              <a:spcBef>
+                <a:spcPct val="20000"/>
+              </a:spcBef>
+              <a:spcAft>
+                <a:spcPts val="600"/>
+              </a:spcAft>
+              <a:buClr>
+                <a:schemeClr val="accent1"/>
+              </a:buClr>
+              <a:buFont typeface="Wingdings 2" charset="2"/>
+              <a:buNone/>
+              <a:defRPr sz="1200" kern="1200">
+                <a:solidFill>
+                  <a:schemeClr val="tx1">
+                    <a:tint val="75000"/>
+                  </a:schemeClr>
+                </a:solidFill>
+                <a:latin typeface="+mn-lt"/>
+                <a:ea typeface="+mn-ea"/>
+                <a:cs typeface="+mn-cs"/>
+              </a:defRPr>
+            </a:lvl4pPr>
+            <a:lvl5pPr marL="1828800" indent="0" algn="ctr" defTabSz="457200" rtl="0" eaLnBrk="1" latinLnBrk="0" hangingPunct="1">
+              <a:spcBef>
+                <a:spcPct val="20000"/>
+              </a:spcBef>
+              <a:spcAft>
+                <a:spcPts val="600"/>
+              </a:spcAft>
+              <a:buClr>
+                <a:schemeClr val="accent1"/>
+              </a:buClr>
+              <a:buFont typeface="Wingdings 2" charset="2"/>
+              <a:buNone/>
+              <a:defRPr sz="1200" kern="1200">
+                <a:solidFill>
+                  <a:schemeClr val="tx1">
+                    <a:tint val="75000"/>
+                  </a:schemeClr>
+                </a:solidFill>
+                <a:latin typeface="+mn-lt"/>
+                <a:ea typeface="+mn-ea"/>
+                <a:cs typeface="+mn-cs"/>
+              </a:defRPr>
+            </a:lvl5pPr>
+            <a:lvl6pPr marL="2286000" indent="0" algn="ctr" defTabSz="457200" rtl="0" eaLnBrk="1" latinLnBrk="0" hangingPunct="1">
+              <a:spcBef>
+                <a:spcPct val="20000"/>
+              </a:spcBef>
+              <a:spcAft>
+                <a:spcPts val="600"/>
+              </a:spcAft>
+              <a:buClr>
+                <a:schemeClr val="accent1"/>
+              </a:buClr>
+              <a:buFont typeface="Wingdings 2" charset="2"/>
+              <a:buNone/>
+              <a:defRPr sz="1200" kern="1200">
+                <a:solidFill>
+                  <a:schemeClr val="tx1">
+                    <a:tint val="75000"/>
+                  </a:schemeClr>
+                </a:solidFill>
+                <a:latin typeface="+mn-lt"/>
+                <a:ea typeface="+mn-ea"/>
+                <a:cs typeface="+mn-cs"/>
+              </a:defRPr>
+            </a:lvl6pPr>
+            <a:lvl7pPr marL="2743200" indent="0" algn="ctr" defTabSz="457200" rtl="0" eaLnBrk="1" latinLnBrk="0" hangingPunct="1">
+              <a:spcBef>
+                <a:spcPct val="20000"/>
+              </a:spcBef>
+              <a:spcAft>
+                <a:spcPts val="600"/>
+              </a:spcAft>
+              <a:buClr>
+                <a:schemeClr val="accent1"/>
+              </a:buClr>
+              <a:buFont typeface="Wingdings 2" charset="2"/>
+              <a:buNone/>
+              <a:defRPr sz="1200" kern="1200">
+                <a:solidFill>
+                  <a:schemeClr val="tx1">
+                    <a:tint val="75000"/>
+                  </a:schemeClr>
+                </a:solidFill>
+                <a:latin typeface="+mn-lt"/>
+                <a:ea typeface="+mn-ea"/>
+                <a:cs typeface="+mn-cs"/>
+              </a:defRPr>
+            </a:lvl7pPr>
+            <a:lvl8pPr marL="3200400" indent="0" algn="ctr" defTabSz="457200" rtl="0" eaLnBrk="1" latinLnBrk="0" hangingPunct="1">
+              <a:spcBef>
+                <a:spcPct val="20000"/>
+              </a:spcBef>
+              <a:spcAft>
+                <a:spcPts val="600"/>
+              </a:spcAft>
+              <a:buClr>
+                <a:schemeClr val="accent1"/>
+              </a:buClr>
+              <a:buFont typeface="Wingdings 2" charset="2"/>
+              <a:buNone/>
+              <a:defRPr sz="1200" kern="1200">
+                <a:solidFill>
+                  <a:schemeClr val="tx1">
+                    <a:tint val="75000"/>
+                  </a:schemeClr>
+                </a:solidFill>
+                <a:latin typeface="+mn-lt"/>
+                <a:ea typeface="+mn-ea"/>
+                <a:cs typeface="+mn-cs"/>
+              </a:defRPr>
+            </a:lvl8pPr>
+            <a:lvl9pPr marL="3657600" indent="0" algn="ctr" defTabSz="457200" rtl="0" eaLnBrk="1" latinLnBrk="0" hangingPunct="1">
+              <a:spcBef>
+                <a:spcPct val="20000"/>
+              </a:spcBef>
+              <a:spcAft>
+                <a:spcPts val="600"/>
+              </a:spcAft>
+              <a:buClr>
+                <a:schemeClr val="accent1"/>
+              </a:buClr>
+              <a:buFont typeface="Wingdings 2" charset="2"/>
+              <a:buNone/>
+              <a:defRPr sz="1200" kern="1200">
+                <a:solidFill>
+                  <a:schemeClr val="tx1">
+                    <a:tint val="75000"/>
+                  </a:schemeClr>
+                </a:solidFill>
+                <a:latin typeface="+mn-lt"/>
+                <a:ea typeface="+mn-ea"/>
+                <a:cs typeface="+mn-cs"/>
+              </a:defRPr>
+            </a:lvl9pPr>
+          </a:lstStyle>
+          <a:p>
+            <a:r>
+              <a:rPr lang="fr-FR" sz="2400" dirty="0" smtClean="0"/>
+              <a:t>IN104 – Page </a:t>
+            </a:r>
+            <a:r>
+              <a:rPr lang="fr-FR" sz="1600" dirty="0" smtClean="0"/>
+              <a:t>8</a:t>
+            </a:r>
+            <a:endParaRPr lang="fr-FR" sz="1600" dirty="0"/>
           </a:p>
         </p:txBody>
       </p:sp>
@@ -11977,7 +11968,7 @@
         </p:nvSpPr>
         <p:spPr>
           <a:xfrm>
-            <a:off x="9763433" y="6400801"/>
+            <a:off x="9763432" y="6400801"/>
             <a:ext cx="2428568" cy="457199"/>
           </a:xfrm>
           <a:prstGeom prst="rect">
@@ -12210,15 +12201,11 @@
           <a:p>
             <a:r>
               <a:rPr lang="fr-FR" sz="2400" dirty="0" smtClean="0"/>
-              <a:t>IN104 </a:t>
-            </a:r>
-            <a:r>
-              <a:rPr lang="fr-FR" sz="2400" dirty="0" smtClean="0"/>
-              <a:t>– Page </a:t>
+              <a:t>IN104 – Page </a:t>
             </a:r>
             <a:r>
               <a:rPr lang="fr-FR" sz="1600" dirty="0" smtClean="0"/>
-              <a:t>10</a:t>
+              <a:t>9</a:t>
             </a:r>
             <a:endParaRPr lang="fr-FR" sz="1600" dirty="0"/>
           </a:p>
@@ -12565,47 +12552,4 @@
     </a:folHlink>
   </a:clrScheme>
 </a:themeOverride>
-</file>
-
-<file path=ppt/theme/themeOverride3.xml><?xml version="1.0" encoding="utf-8"?>
-<a:themeOverride xmlns:a="http://schemas.openxmlformats.org/drawingml/2006/main">
-  <a:clrScheme name="Personnalisé 1">
-    <a:dk1>
-      <a:srgbClr val="00C6BB"/>
-    </a:dk1>
-    <a:lt1>
-      <a:sysClr val="window" lastClr="FFFFFF"/>
-    </a:lt1>
-    <a:dk2>
-      <a:srgbClr val="00C6BB"/>
-    </a:dk2>
-    <a:lt2>
-      <a:srgbClr val="636363"/>
-    </a:lt2>
-    <a:accent1>
-      <a:srgbClr val="313131"/>
-    </a:accent1>
-    <a:accent2>
-      <a:srgbClr val="6FEBA0"/>
-    </a:accent2>
-    <a:accent3>
-      <a:srgbClr val="B6DF5E"/>
-    </a:accent3>
-    <a:accent4>
-      <a:srgbClr val="EFB251"/>
-    </a:accent4>
-    <a:accent5>
-      <a:srgbClr val="EF755F"/>
-    </a:accent5>
-    <a:accent6>
-      <a:srgbClr val="ED515C"/>
-    </a:accent6>
-    <a:hlink>
-      <a:srgbClr val="8F8F8F"/>
-    </a:hlink>
-    <a:folHlink>
-      <a:srgbClr val="A5A5A5"/>
-    </a:folHlink>
-  </a:clrScheme>
-</a:themeOverride>
 </file>
</xml_diff>